<commit_message>
DanilF: Added inheritance section.
</commit_message>
<xml_diff>
--- a/Presentation/TypeScriptFundamentals.pptx
+++ b/Presentation/TypeScriptFundamentals.pptx
@@ -32,6 +32,10 @@
     <p:sldId id="281" r:id="rId26"/>
     <p:sldId id="282" r:id="rId27"/>
     <p:sldId id="283" r:id="rId28"/>
+    <p:sldId id="284" r:id="rId29"/>
+    <p:sldId id="285" r:id="rId30"/>
+    <p:sldId id="286" r:id="rId31"/>
+    <p:sldId id="287" r:id="rId32"/>
   </p:sldIdLst>
   <p:sldSz cx="12192000" cy="6858000"/>
   <p:notesSz cx="6858000" cy="9144000"/>
@@ -170,12 +174,27 @@
             <p14:sldId id="281"/>
             <p14:sldId id="282"/>
             <p14:sldId id="283"/>
+            <p14:sldId id="284"/>
+            <p14:sldId id="285"/>
+            <p14:sldId id="286"/>
+            <p14:sldId id="287"/>
           </p14:sldIdLst>
         </p14:section>
       </p14:sectionLst>
     </p:ext>
     <p:ext uri="{EFAFB233-063F-42B5-8137-9DF3F51BA10A}">
-      <p15:sldGuideLst xmlns:p15="http://schemas.microsoft.com/office/powerpoint/2012/main" xmlns=""/>
+      <p15:sldGuideLst xmlns:p15="http://schemas.microsoft.com/office/powerpoint/2012/main">
+        <p15:guide id="1" orient="horz" pos="2160">
+          <p15:clr>
+            <a:srgbClr val="A4A3A4"/>
+          </p15:clr>
+        </p15:guide>
+        <p15:guide id="2" pos="3840">
+          <p15:clr>
+            <a:srgbClr val="A4A3A4"/>
+          </p15:clr>
+        </p15:guide>
+      </p15:sldGuideLst>
     </p:ext>
   </p:extLst>
 </p:presentation>
@@ -12758,6 +12777,1400 @@
       </p:sp>
       <p:sp>
         <p:nvSpPr>
+          <p:cNvPr id="4" name="Rectangle 3"/>
+          <p:cNvSpPr/>
+          <p:nvPr/>
+        </p:nvSpPr>
+        <p:spPr>
+          <a:xfrm>
+            <a:off x="752856" y="1178560"/>
+            <a:ext cx="7952232" cy="6118406"/>
+          </a:xfrm>
+          <a:prstGeom prst="rect">
+            <a:avLst/>
+          </a:prstGeom>
+        </p:spPr>
+        <p:txBody>
+          <a:bodyPr wrap="square">
+            <a:spAutoFit/>
+          </a:bodyPr>
+          <a:lstStyle/>
+          <a:p>
+            <a:pPr>
+              <a:lnSpc>
+                <a:spcPct val="107000"/>
+              </a:lnSpc>
+              <a:tabLst>
+                <a:tab pos="581660" algn="l"/>
+                <a:tab pos="1163320" algn="l"/>
+                <a:tab pos="1744980" algn="l"/>
+                <a:tab pos="2326640" algn="l"/>
+                <a:tab pos="2908300" algn="l"/>
+                <a:tab pos="3489960" algn="l"/>
+                <a:tab pos="4071620" algn="l"/>
+                <a:tab pos="4653280" algn="l"/>
+                <a:tab pos="5234940" algn="l"/>
+                <a:tab pos="5816600" algn="l"/>
+                <a:tab pos="6398260" algn="l"/>
+                <a:tab pos="6979920" algn="l"/>
+                <a:tab pos="7561580" algn="l"/>
+                <a:tab pos="8143240" algn="l"/>
+                <a:tab pos="8724900" algn="l"/>
+                <a:tab pos="9306560" algn="l"/>
+              </a:tabLst>
+            </a:pPr>
+            <a:r>
+              <a:rPr lang="en-US" dirty="0">
+                <a:solidFill>
+                  <a:srgbClr val="0000FF"/>
+                </a:solidFill>
+                <a:latin typeface="Consolas" panose="020B0609020204030204" pitchFamily="49" charset="0"/>
+                <a:ea typeface="Times New Roman" panose="02020603050405020304" pitchFamily="18" charset="0"/>
+                <a:cs typeface="Times New Roman" panose="02020603050405020304" pitchFamily="18" charset="0"/>
+              </a:rPr>
+              <a:t>class</a:t>
+            </a:r>
+            <a:r>
+              <a:rPr lang="en-US" dirty="0">
+                <a:solidFill>
+                  <a:srgbClr val="000000"/>
+                </a:solidFill>
+                <a:latin typeface="Consolas" panose="020B0609020204030204" pitchFamily="49" charset="0"/>
+                <a:ea typeface="Times New Roman" panose="02020603050405020304" pitchFamily="18" charset="0"/>
+                <a:cs typeface="Times New Roman" panose="02020603050405020304" pitchFamily="18" charset="0"/>
+              </a:rPr>
+              <a:t> </a:t>
+            </a:r>
+            <a:r>
+              <a:rPr lang="en-US" dirty="0" err="1">
+                <a:solidFill>
+                  <a:srgbClr val="000000"/>
+                </a:solidFill>
+                <a:latin typeface="Consolas" panose="020B0609020204030204" pitchFamily="49" charset="0"/>
+                <a:ea typeface="Times New Roman" panose="02020603050405020304" pitchFamily="18" charset="0"/>
+                <a:cs typeface="Times New Roman" panose="02020603050405020304" pitchFamily="18" charset="0"/>
+              </a:rPr>
+              <a:t>BaseClass</a:t>
+            </a:r>
+            <a:r>
+              <a:rPr lang="en-US" dirty="0">
+                <a:solidFill>
+                  <a:srgbClr val="000000"/>
+                </a:solidFill>
+                <a:latin typeface="Consolas" panose="020B0609020204030204" pitchFamily="49" charset="0"/>
+                <a:ea typeface="Times New Roman" panose="02020603050405020304" pitchFamily="18" charset="0"/>
+                <a:cs typeface="Times New Roman" panose="02020603050405020304" pitchFamily="18" charset="0"/>
+              </a:rPr>
+              <a:t> {</a:t>
+            </a:r>
+            <a:endParaRPr lang="en-US" sz="2400" dirty="0">
+              <a:latin typeface="Calibri" panose="020F0502020204030204" pitchFamily="34" charset="0"/>
+              <a:ea typeface="Calibri" panose="020F0502020204030204" pitchFamily="34" charset="0"/>
+              <a:cs typeface="Times New Roman" panose="02020603050405020304" pitchFamily="18" charset="0"/>
+            </a:endParaRPr>
+          </a:p>
+          <a:p>
+            <a:pPr>
+              <a:lnSpc>
+                <a:spcPct val="107000"/>
+              </a:lnSpc>
+              <a:tabLst>
+                <a:tab pos="581660" algn="l"/>
+                <a:tab pos="1163320" algn="l"/>
+                <a:tab pos="1744980" algn="l"/>
+                <a:tab pos="2326640" algn="l"/>
+                <a:tab pos="2908300" algn="l"/>
+                <a:tab pos="3489960" algn="l"/>
+                <a:tab pos="4071620" algn="l"/>
+                <a:tab pos="4653280" algn="l"/>
+                <a:tab pos="5234940" algn="l"/>
+                <a:tab pos="5816600" algn="l"/>
+                <a:tab pos="6398260" algn="l"/>
+                <a:tab pos="6979920" algn="l"/>
+                <a:tab pos="7561580" algn="l"/>
+                <a:tab pos="8143240" algn="l"/>
+                <a:tab pos="8724900" algn="l"/>
+                <a:tab pos="9306560" algn="l"/>
+              </a:tabLst>
+            </a:pPr>
+            <a:r>
+              <a:rPr lang="en-US" dirty="0">
+                <a:solidFill>
+                  <a:srgbClr val="000000"/>
+                </a:solidFill>
+                <a:latin typeface="Consolas" panose="020B0609020204030204" pitchFamily="49" charset="0"/>
+                <a:ea typeface="Times New Roman" panose="02020603050405020304" pitchFamily="18" charset="0"/>
+                <a:cs typeface="Times New Roman" panose="02020603050405020304" pitchFamily="18" charset="0"/>
+              </a:rPr>
+              <a:t>    </a:t>
+            </a:r>
+            <a:r>
+              <a:rPr lang="en-US" dirty="0">
+                <a:solidFill>
+                  <a:srgbClr val="0000FF"/>
+                </a:solidFill>
+                <a:latin typeface="Consolas" panose="020B0609020204030204" pitchFamily="49" charset="0"/>
+                <a:ea typeface="Times New Roman" panose="02020603050405020304" pitchFamily="18" charset="0"/>
+                <a:cs typeface="Times New Roman" panose="02020603050405020304" pitchFamily="18" charset="0"/>
+              </a:rPr>
+              <a:t>private</a:t>
+            </a:r>
+            <a:r>
+              <a:rPr lang="en-US" dirty="0">
+                <a:solidFill>
+                  <a:srgbClr val="000000"/>
+                </a:solidFill>
+                <a:latin typeface="Consolas" panose="020B0609020204030204" pitchFamily="49" charset="0"/>
+                <a:ea typeface="Times New Roman" panose="02020603050405020304" pitchFamily="18" charset="0"/>
+                <a:cs typeface="Times New Roman" panose="02020603050405020304" pitchFamily="18" charset="0"/>
+              </a:rPr>
+              <a:t> value: </a:t>
+            </a:r>
+            <a:r>
+              <a:rPr lang="en-US" dirty="0">
+                <a:solidFill>
+                  <a:srgbClr val="0000FF"/>
+                </a:solidFill>
+                <a:latin typeface="Consolas" panose="020B0609020204030204" pitchFamily="49" charset="0"/>
+                <a:ea typeface="Times New Roman" panose="02020603050405020304" pitchFamily="18" charset="0"/>
+                <a:cs typeface="Times New Roman" panose="02020603050405020304" pitchFamily="18" charset="0"/>
+              </a:rPr>
+              <a:t>string</a:t>
+            </a:r>
+            <a:r>
+              <a:rPr lang="en-US" dirty="0">
+                <a:solidFill>
+                  <a:srgbClr val="000000"/>
+                </a:solidFill>
+                <a:latin typeface="Consolas" panose="020B0609020204030204" pitchFamily="49" charset="0"/>
+                <a:ea typeface="Times New Roman" panose="02020603050405020304" pitchFamily="18" charset="0"/>
+                <a:cs typeface="Times New Roman" panose="02020603050405020304" pitchFamily="18" charset="0"/>
+              </a:rPr>
+              <a:t>;</a:t>
+            </a:r>
+            <a:endParaRPr lang="en-US" sz="2400" dirty="0">
+              <a:latin typeface="Calibri" panose="020F0502020204030204" pitchFamily="34" charset="0"/>
+              <a:ea typeface="Calibri" panose="020F0502020204030204" pitchFamily="34" charset="0"/>
+              <a:cs typeface="Times New Roman" panose="02020603050405020304" pitchFamily="18" charset="0"/>
+            </a:endParaRPr>
+          </a:p>
+          <a:p>
+            <a:pPr>
+              <a:lnSpc>
+                <a:spcPct val="107000"/>
+              </a:lnSpc>
+              <a:tabLst>
+                <a:tab pos="581660" algn="l"/>
+                <a:tab pos="1163320" algn="l"/>
+                <a:tab pos="1744980" algn="l"/>
+                <a:tab pos="2326640" algn="l"/>
+                <a:tab pos="2908300" algn="l"/>
+                <a:tab pos="3489960" algn="l"/>
+                <a:tab pos="4071620" algn="l"/>
+                <a:tab pos="4653280" algn="l"/>
+                <a:tab pos="5234940" algn="l"/>
+                <a:tab pos="5816600" algn="l"/>
+                <a:tab pos="6398260" algn="l"/>
+                <a:tab pos="6979920" algn="l"/>
+                <a:tab pos="7561580" algn="l"/>
+                <a:tab pos="8143240" algn="l"/>
+                <a:tab pos="8724900" algn="l"/>
+                <a:tab pos="9306560" algn="l"/>
+              </a:tabLst>
+            </a:pPr>
+            <a:r>
+              <a:rPr lang="en-US" dirty="0">
+                <a:solidFill>
+                  <a:srgbClr val="000000"/>
+                </a:solidFill>
+                <a:latin typeface="Consolas" panose="020B0609020204030204" pitchFamily="49" charset="0"/>
+                <a:ea typeface="Times New Roman" panose="02020603050405020304" pitchFamily="18" charset="0"/>
+                <a:cs typeface="Times New Roman" panose="02020603050405020304" pitchFamily="18" charset="0"/>
+              </a:rPr>
+              <a:t> </a:t>
+            </a:r>
+            <a:endParaRPr lang="en-US" sz="2400" dirty="0">
+              <a:latin typeface="Calibri" panose="020F0502020204030204" pitchFamily="34" charset="0"/>
+              <a:ea typeface="Calibri" panose="020F0502020204030204" pitchFamily="34" charset="0"/>
+              <a:cs typeface="Times New Roman" panose="02020603050405020304" pitchFamily="18" charset="0"/>
+            </a:endParaRPr>
+          </a:p>
+          <a:p>
+            <a:pPr>
+              <a:lnSpc>
+                <a:spcPct val="107000"/>
+              </a:lnSpc>
+              <a:tabLst>
+                <a:tab pos="581660" algn="l"/>
+                <a:tab pos="1163320" algn="l"/>
+                <a:tab pos="1744980" algn="l"/>
+                <a:tab pos="2326640" algn="l"/>
+                <a:tab pos="2908300" algn="l"/>
+                <a:tab pos="3489960" algn="l"/>
+                <a:tab pos="4071620" algn="l"/>
+                <a:tab pos="4653280" algn="l"/>
+                <a:tab pos="5234940" algn="l"/>
+                <a:tab pos="5816600" algn="l"/>
+                <a:tab pos="6398260" algn="l"/>
+                <a:tab pos="6979920" algn="l"/>
+                <a:tab pos="7561580" algn="l"/>
+                <a:tab pos="8143240" algn="l"/>
+                <a:tab pos="8724900" algn="l"/>
+                <a:tab pos="9306560" algn="l"/>
+              </a:tabLst>
+            </a:pPr>
+            <a:r>
+              <a:rPr lang="en-US" dirty="0">
+                <a:solidFill>
+                  <a:srgbClr val="000000"/>
+                </a:solidFill>
+                <a:latin typeface="Consolas" panose="020B0609020204030204" pitchFamily="49" charset="0"/>
+                <a:ea typeface="Times New Roman" panose="02020603050405020304" pitchFamily="18" charset="0"/>
+                <a:cs typeface="Times New Roman" panose="02020603050405020304" pitchFamily="18" charset="0"/>
+              </a:rPr>
+              <a:t>    </a:t>
+            </a:r>
+            <a:r>
+              <a:rPr lang="en-US" dirty="0">
+                <a:solidFill>
+                  <a:srgbClr val="0000FF"/>
+                </a:solidFill>
+                <a:latin typeface="Consolas" panose="020B0609020204030204" pitchFamily="49" charset="0"/>
+                <a:ea typeface="Times New Roman" panose="02020603050405020304" pitchFamily="18" charset="0"/>
+                <a:cs typeface="Times New Roman" panose="02020603050405020304" pitchFamily="18" charset="0"/>
+              </a:rPr>
+              <a:t>constructor</a:t>
+            </a:r>
+            <a:r>
+              <a:rPr lang="en-US" dirty="0">
+                <a:solidFill>
+                  <a:srgbClr val="000000"/>
+                </a:solidFill>
+                <a:latin typeface="Consolas" panose="020B0609020204030204" pitchFamily="49" charset="0"/>
+                <a:ea typeface="Times New Roman" panose="02020603050405020304" pitchFamily="18" charset="0"/>
+                <a:cs typeface="Times New Roman" panose="02020603050405020304" pitchFamily="18" charset="0"/>
+              </a:rPr>
+              <a:t>(value: </a:t>
+            </a:r>
+            <a:r>
+              <a:rPr lang="en-US" dirty="0">
+                <a:solidFill>
+                  <a:srgbClr val="0000FF"/>
+                </a:solidFill>
+                <a:latin typeface="Consolas" panose="020B0609020204030204" pitchFamily="49" charset="0"/>
+                <a:ea typeface="Times New Roman" panose="02020603050405020304" pitchFamily="18" charset="0"/>
+                <a:cs typeface="Times New Roman" panose="02020603050405020304" pitchFamily="18" charset="0"/>
+              </a:rPr>
+              <a:t>string</a:t>
+            </a:r>
+            <a:r>
+              <a:rPr lang="en-US" dirty="0">
+                <a:solidFill>
+                  <a:srgbClr val="000000"/>
+                </a:solidFill>
+                <a:latin typeface="Consolas" panose="020B0609020204030204" pitchFamily="49" charset="0"/>
+                <a:ea typeface="Times New Roman" panose="02020603050405020304" pitchFamily="18" charset="0"/>
+                <a:cs typeface="Times New Roman" panose="02020603050405020304" pitchFamily="18" charset="0"/>
+              </a:rPr>
+              <a:t>) {</a:t>
+            </a:r>
+            <a:endParaRPr lang="en-US" sz="2400" dirty="0">
+              <a:latin typeface="Calibri" panose="020F0502020204030204" pitchFamily="34" charset="0"/>
+              <a:ea typeface="Calibri" panose="020F0502020204030204" pitchFamily="34" charset="0"/>
+              <a:cs typeface="Times New Roman" panose="02020603050405020304" pitchFamily="18" charset="0"/>
+            </a:endParaRPr>
+          </a:p>
+          <a:p>
+            <a:pPr>
+              <a:lnSpc>
+                <a:spcPct val="107000"/>
+              </a:lnSpc>
+              <a:tabLst>
+                <a:tab pos="581660" algn="l"/>
+                <a:tab pos="1163320" algn="l"/>
+                <a:tab pos="1744980" algn="l"/>
+                <a:tab pos="2326640" algn="l"/>
+                <a:tab pos="2908300" algn="l"/>
+                <a:tab pos="3489960" algn="l"/>
+                <a:tab pos="4071620" algn="l"/>
+                <a:tab pos="4653280" algn="l"/>
+                <a:tab pos="5234940" algn="l"/>
+                <a:tab pos="5816600" algn="l"/>
+                <a:tab pos="6398260" algn="l"/>
+                <a:tab pos="6979920" algn="l"/>
+                <a:tab pos="7561580" algn="l"/>
+                <a:tab pos="8143240" algn="l"/>
+                <a:tab pos="8724900" algn="l"/>
+                <a:tab pos="9306560" algn="l"/>
+              </a:tabLst>
+            </a:pPr>
+            <a:r>
+              <a:rPr lang="en-US" dirty="0">
+                <a:solidFill>
+                  <a:srgbClr val="000000"/>
+                </a:solidFill>
+                <a:latin typeface="Consolas" panose="020B0609020204030204" pitchFamily="49" charset="0"/>
+                <a:ea typeface="Times New Roman" panose="02020603050405020304" pitchFamily="18" charset="0"/>
+                <a:cs typeface="Times New Roman" panose="02020603050405020304" pitchFamily="18" charset="0"/>
+              </a:rPr>
+              <a:t>        </a:t>
+            </a:r>
+            <a:r>
+              <a:rPr lang="en-US" dirty="0" err="1">
+                <a:solidFill>
+                  <a:srgbClr val="0000FF"/>
+                </a:solidFill>
+                <a:latin typeface="Consolas" panose="020B0609020204030204" pitchFamily="49" charset="0"/>
+                <a:ea typeface="Times New Roman" panose="02020603050405020304" pitchFamily="18" charset="0"/>
+                <a:cs typeface="Times New Roman" panose="02020603050405020304" pitchFamily="18" charset="0"/>
+              </a:rPr>
+              <a:t>this</a:t>
+            </a:r>
+            <a:r>
+              <a:rPr lang="en-US" dirty="0" err="1">
+                <a:solidFill>
+                  <a:srgbClr val="000000"/>
+                </a:solidFill>
+                <a:latin typeface="Consolas" panose="020B0609020204030204" pitchFamily="49" charset="0"/>
+                <a:ea typeface="Times New Roman" panose="02020603050405020304" pitchFamily="18" charset="0"/>
+                <a:cs typeface="Times New Roman" panose="02020603050405020304" pitchFamily="18" charset="0"/>
+              </a:rPr>
+              <a:t>.value</a:t>
+            </a:r>
+            <a:r>
+              <a:rPr lang="en-US" dirty="0">
+                <a:solidFill>
+                  <a:srgbClr val="000000"/>
+                </a:solidFill>
+                <a:latin typeface="Consolas" panose="020B0609020204030204" pitchFamily="49" charset="0"/>
+                <a:ea typeface="Times New Roman" panose="02020603050405020304" pitchFamily="18" charset="0"/>
+                <a:cs typeface="Times New Roman" panose="02020603050405020304" pitchFamily="18" charset="0"/>
+              </a:rPr>
+              <a:t> = value;</a:t>
+            </a:r>
+            <a:endParaRPr lang="en-US" sz="2400" dirty="0">
+              <a:latin typeface="Calibri" panose="020F0502020204030204" pitchFamily="34" charset="0"/>
+              <a:ea typeface="Calibri" panose="020F0502020204030204" pitchFamily="34" charset="0"/>
+              <a:cs typeface="Times New Roman" panose="02020603050405020304" pitchFamily="18" charset="0"/>
+            </a:endParaRPr>
+          </a:p>
+          <a:p>
+            <a:pPr>
+              <a:lnSpc>
+                <a:spcPct val="107000"/>
+              </a:lnSpc>
+              <a:tabLst>
+                <a:tab pos="581660" algn="l"/>
+                <a:tab pos="1163320" algn="l"/>
+                <a:tab pos="1744980" algn="l"/>
+                <a:tab pos="2326640" algn="l"/>
+                <a:tab pos="2908300" algn="l"/>
+                <a:tab pos="3489960" algn="l"/>
+                <a:tab pos="4071620" algn="l"/>
+                <a:tab pos="4653280" algn="l"/>
+                <a:tab pos="5234940" algn="l"/>
+                <a:tab pos="5816600" algn="l"/>
+                <a:tab pos="6398260" algn="l"/>
+                <a:tab pos="6979920" algn="l"/>
+                <a:tab pos="7561580" algn="l"/>
+                <a:tab pos="8143240" algn="l"/>
+                <a:tab pos="8724900" algn="l"/>
+                <a:tab pos="9306560" algn="l"/>
+              </a:tabLst>
+            </a:pPr>
+            <a:r>
+              <a:rPr lang="en-US" dirty="0">
+                <a:solidFill>
+                  <a:srgbClr val="000000"/>
+                </a:solidFill>
+                <a:latin typeface="Consolas" panose="020B0609020204030204" pitchFamily="49" charset="0"/>
+                <a:ea typeface="Times New Roman" panose="02020603050405020304" pitchFamily="18" charset="0"/>
+                <a:cs typeface="Times New Roman" panose="02020603050405020304" pitchFamily="18" charset="0"/>
+              </a:rPr>
+              <a:t>    }</a:t>
+            </a:r>
+            <a:endParaRPr lang="en-US" sz="2400" dirty="0">
+              <a:latin typeface="Calibri" panose="020F0502020204030204" pitchFamily="34" charset="0"/>
+              <a:ea typeface="Calibri" panose="020F0502020204030204" pitchFamily="34" charset="0"/>
+              <a:cs typeface="Times New Roman" panose="02020603050405020304" pitchFamily="18" charset="0"/>
+            </a:endParaRPr>
+          </a:p>
+          <a:p>
+            <a:pPr>
+              <a:lnSpc>
+                <a:spcPct val="107000"/>
+              </a:lnSpc>
+              <a:tabLst>
+                <a:tab pos="581660" algn="l"/>
+                <a:tab pos="1163320" algn="l"/>
+                <a:tab pos="1744980" algn="l"/>
+                <a:tab pos="2326640" algn="l"/>
+                <a:tab pos="2908300" algn="l"/>
+                <a:tab pos="3489960" algn="l"/>
+                <a:tab pos="4071620" algn="l"/>
+                <a:tab pos="4653280" algn="l"/>
+                <a:tab pos="5234940" algn="l"/>
+                <a:tab pos="5816600" algn="l"/>
+                <a:tab pos="6398260" algn="l"/>
+                <a:tab pos="6979920" algn="l"/>
+                <a:tab pos="7561580" algn="l"/>
+                <a:tab pos="8143240" algn="l"/>
+                <a:tab pos="8724900" algn="l"/>
+                <a:tab pos="9306560" algn="l"/>
+              </a:tabLst>
+            </a:pPr>
+            <a:r>
+              <a:rPr lang="en-US" dirty="0">
+                <a:solidFill>
+                  <a:srgbClr val="000000"/>
+                </a:solidFill>
+                <a:latin typeface="Consolas" panose="020B0609020204030204" pitchFamily="49" charset="0"/>
+                <a:ea typeface="Times New Roman" panose="02020603050405020304" pitchFamily="18" charset="0"/>
+                <a:cs typeface="Times New Roman" panose="02020603050405020304" pitchFamily="18" charset="0"/>
+              </a:rPr>
+              <a:t> </a:t>
+            </a:r>
+            <a:endParaRPr lang="en-US" sz="2400" dirty="0">
+              <a:latin typeface="Calibri" panose="020F0502020204030204" pitchFamily="34" charset="0"/>
+              <a:ea typeface="Calibri" panose="020F0502020204030204" pitchFamily="34" charset="0"/>
+              <a:cs typeface="Times New Roman" panose="02020603050405020304" pitchFamily="18" charset="0"/>
+            </a:endParaRPr>
+          </a:p>
+          <a:p>
+            <a:pPr>
+              <a:lnSpc>
+                <a:spcPct val="107000"/>
+              </a:lnSpc>
+              <a:tabLst>
+                <a:tab pos="581660" algn="l"/>
+                <a:tab pos="1163320" algn="l"/>
+                <a:tab pos="1744980" algn="l"/>
+                <a:tab pos="2326640" algn="l"/>
+                <a:tab pos="2908300" algn="l"/>
+                <a:tab pos="3489960" algn="l"/>
+                <a:tab pos="4071620" algn="l"/>
+                <a:tab pos="4653280" algn="l"/>
+                <a:tab pos="5234940" algn="l"/>
+                <a:tab pos="5816600" algn="l"/>
+                <a:tab pos="6398260" algn="l"/>
+                <a:tab pos="6979920" algn="l"/>
+                <a:tab pos="7561580" algn="l"/>
+                <a:tab pos="8143240" algn="l"/>
+                <a:tab pos="8724900" algn="l"/>
+                <a:tab pos="9306560" algn="l"/>
+              </a:tabLst>
+            </a:pPr>
+            <a:r>
+              <a:rPr lang="en-US" dirty="0">
+                <a:solidFill>
+                  <a:srgbClr val="000000"/>
+                </a:solidFill>
+                <a:latin typeface="Consolas" panose="020B0609020204030204" pitchFamily="49" charset="0"/>
+                <a:ea typeface="Times New Roman" panose="02020603050405020304" pitchFamily="18" charset="0"/>
+                <a:cs typeface="Times New Roman" panose="02020603050405020304" pitchFamily="18" charset="0"/>
+              </a:rPr>
+              <a:t>    </a:t>
+            </a:r>
+            <a:r>
+              <a:rPr lang="en-US" dirty="0" err="1">
+                <a:solidFill>
+                  <a:srgbClr val="000000"/>
+                </a:solidFill>
+                <a:latin typeface="Consolas" panose="020B0609020204030204" pitchFamily="49" charset="0"/>
+                <a:ea typeface="Times New Roman" panose="02020603050405020304" pitchFamily="18" charset="0"/>
+                <a:cs typeface="Times New Roman" panose="02020603050405020304" pitchFamily="18" charset="0"/>
+              </a:rPr>
+              <a:t>getValue</a:t>
+            </a:r>
+            <a:r>
+              <a:rPr lang="en-US" dirty="0">
+                <a:solidFill>
+                  <a:srgbClr val="000000"/>
+                </a:solidFill>
+                <a:latin typeface="Consolas" panose="020B0609020204030204" pitchFamily="49" charset="0"/>
+                <a:ea typeface="Times New Roman" panose="02020603050405020304" pitchFamily="18" charset="0"/>
+                <a:cs typeface="Times New Roman" panose="02020603050405020304" pitchFamily="18" charset="0"/>
+              </a:rPr>
+              <a:t>(): </a:t>
+            </a:r>
+            <a:r>
+              <a:rPr lang="en-US" dirty="0">
+                <a:solidFill>
+                  <a:srgbClr val="0000FF"/>
+                </a:solidFill>
+                <a:latin typeface="Consolas" panose="020B0609020204030204" pitchFamily="49" charset="0"/>
+                <a:ea typeface="Times New Roman" panose="02020603050405020304" pitchFamily="18" charset="0"/>
+                <a:cs typeface="Times New Roman" panose="02020603050405020304" pitchFamily="18" charset="0"/>
+              </a:rPr>
+              <a:t>string</a:t>
+            </a:r>
+            <a:r>
+              <a:rPr lang="en-US" dirty="0">
+                <a:solidFill>
+                  <a:srgbClr val="000000"/>
+                </a:solidFill>
+                <a:latin typeface="Consolas" panose="020B0609020204030204" pitchFamily="49" charset="0"/>
+                <a:ea typeface="Times New Roman" panose="02020603050405020304" pitchFamily="18" charset="0"/>
+                <a:cs typeface="Times New Roman" panose="02020603050405020304" pitchFamily="18" charset="0"/>
+              </a:rPr>
+              <a:t> { </a:t>
+            </a:r>
+            <a:r>
+              <a:rPr lang="en-US" dirty="0">
+                <a:solidFill>
+                  <a:srgbClr val="0000FF"/>
+                </a:solidFill>
+                <a:latin typeface="Consolas" panose="020B0609020204030204" pitchFamily="49" charset="0"/>
+                <a:ea typeface="Times New Roman" panose="02020603050405020304" pitchFamily="18" charset="0"/>
+                <a:cs typeface="Times New Roman" panose="02020603050405020304" pitchFamily="18" charset="0"/>
+              </a:rPr>
+              <a:t>return</a:t>
+            </a:r>
+            <a:r>
+              <a:rPr lang="en-US" dirty="0">
+                <a:solidFill>
+                  <a:srgbClr val="000000"/>
+                </a:solidFill>
+                <a:latin typeface="Consolas" panose="020B0609020204030204" pitchFamily="49" charset="0"/>
+                <a:ea typeface="Times New Roman" panose="02020603050405020304" pitchFamily="18" charset="0"/>
+                <a:cs typeface="Times New Roman" panose="02020603050405020304" pitchFamily="18" charset="0"/>
+              </a:rPr>
+              <a:t> </a:t>
+            </a:r>
+            <a:r>
+              <a:rPr lang="en-US" dirty="0" err="1">
+                <a:solidFill>
+                  <a:srgbClr val="0000FF"/>
+                </a:solidFill>
+                <a:latin typeface="Consolas" panose="020B0609020204030204" pitchFamily="49" charset="0"/>
+                <a:ea typeface="Times New Roman" panose="02020603050405020304" pitchFamily="18" charset="0"/>
+                <a:cs typeface="Times New Roman" panose="02020603050405020304" pitchFamily="18" charset="0"/>
+              </a:rPr>
+              <a:t>this</a:t>
+            </a:r>
+            <a:r>
+              <a:rPr lang="en-US" dirty="0" err="1">
+                <a:solidFill>
+                  <a:srgbClr val="000000"/>
+                </a:solidFill>
+                <a:latin typeface="Consolas" panose="020B0609020204030204" pitchFamily="49" charset="0"/>
+                <a:ea typeface="Times New Roman" panose="02020603050405020304" pitchFamily="18" charset="0"/>
+                <a:cs typeface="Times New Roman" panose="02020603050405020304" pitchFamily="18" charset="0"/>
+              </a:rPr>
+              <a:t>.value</a:t>
+            </a:r>
+            <a:r>
+              <a:rPr lang="en-US" dirty="0">
+                <a:solidFill>
+                  <a:srgbClr val="000000"/>
+                </a:solidFill>
+                <a:latin typeface="Consolas" panose="020B0609020204030204" pitchFamily="49" charset="0"/>
+                <a:ea typeface="Times New Roman" panose="02020603050405020304" pitchFamily="18" charset="0"/>
+                <a:cs typeface="Times New Roman" panose="02020603050405020304" pitchFamily="18" charset="0"/>
+              </a:rPr>
+              <a:t>; }</a:t>
+            </a:r>
+            <a:endParaRPr lang="en-US" sz="2400" dirty="0">
+              <a:latin typeface="Calibri" panose="020F0502020204030204" pitchFamily="34" charset="0"/>
+              <a:ea typeface="Calibri" panose="020F0502020204030204" pitchFamily="34" charset="0"/>
+              <a:cs typeface="Times New Roman" panose="02020603050405020304" pitchFamily="18" charset="0"/>
+            </a:endParaRPr>
+          </a:p>
+          <a:p>
+            <a:pPr>
+              <a:lnSpc>
+                <a:spcPct val="107000"/>
+              </a:lnSpc>
+              <a:tabLst>
+                <a:tab pos="581660" algn="l"/>
+                <a:tab pos="1163320" algn="l"/>
+                <a:tab pos="1744980" algn="l"/>
+                <a:tab pos="2326640" algn="l"/>
+                <a:tab pos="2908300" algn="l"/>
+                <a:tab pos="3489960" algn="l"/>
+                <a:tab pos="4071620" algn="l"/>
+                <a:tab pos="4653280" algn="l"/>
+                <a:tab pos="5234940" algn="l"/>
+                <a:tab pos="5816600" algn="l"/>
+                <a:tab pos="6398260" algn="l"/>
+                <a:tab pos="6979920" algn="l"/>
+                <a:tab pos="7561580" algn="l"/>
+                <a:tab pos="8143240" algn="l"/>
+                <a:tab pos="8724900" algn="l"/>
+                <a:tab pos="9306560" algn="l"/>
+              </a:tabLst>
+            </a:pPr>
+            <a:r>
+              <a:rPr lang="en-US" dirty="0">
+                <a:solidFill>
+                  <a:srgbClr val="000000"/>
+                </a:solidFill>
+                <a:latin typeface="Consolas" panose="020B0609020204030204" pitchFamily="49" charset="0"/>
+                <a:ea typeface="Times New Roman" panose="02020603050405020304" pitchFamily="18" charset="0"/>
+                <a:cs typeface="Times New Roman" panose="02020603050405020304" pitchFamily="18" charset="0"/>
+              </a:rPr>
+              <a:t>}</a:t>
+            </a:r>
+            <a:endParaRPr lang="en-US" sz="2400" dirty="0">
+              <a:latin typeface="Calibri" panose="020F0502020204030204" pitchFamily="34" charset="0"/>
+              <a:ea typeface="Calibri" panose="020F0502020204030204" pitchFamily="34" charset="0"/>
+              <a:cs typeface="Times New Roman" panose="02020603050405020304" pitchFamily="18" charset="0"/>
+            </a:endParaRPr>
+          </a:p>
+          <a:p>
+            <a:pPr>
+              <a:lnSpc>
+                <a:spcPct val="107000"/>
+              </a:lnSpc>
+              <a:tabLst>
+                <a:tab pos="581660" algn="l"/>
+                <a:tab pos="1163320" algn="l"/>
+                <a:tab pos="1744980" algn="l"/>
+                <a:tab pos="2326640" algn="l"/>
+                <a:tab pos="2908300" algn="l"/>
+                <a:tab pos="3489960" algn="l"/>
+                <a:tab pos="4071620" algn="l"/>
+                <a:tab pos="4653280" algn="l"/>
+                <a:tab pos="5234940" algn="l"/>
+                <a:tab pos="5816600" algn="l"/>
+                <a:tab pos="6398260" algn="l"/>
+                <a:tab pos="6979920" algn="l"/>
+                <a:tab pos="7561580" algn="l"/>
+                <a:tab pos="8143240" algn="l"/>
+                <a:tab pos="8724900" algn="l"/>
+                <a:tab pos="9306560" algn="l"/>
+              </a:tabLst>
+            </a:pPr>
+            <a:r>
+              <a:rPr lang="en-US" dirty="0">
+                <a:solidFill>
+                  <a:srgbClr val="000000"/>
+                </a:solidFill>
+                <a:latin typeface="Consolas" panose="020B0609020204030204" pitchFamily="49" charset="0"/>
+                <a:ea typeface="Times New Roman" panose="02020603050405020304" pitchFamily="18" charset="0"/>
+                <a:cs typeface="Times New Roman" panose="02020603050405020304" pitchFamily="18" charset="0"/>
+              </a:rPr>
+              <a:t> </a:t>
+            </a:r>
+            <a:endParaRPr lang="en-US" sz="2400" dirty="0">
+              <a:latin typeface="Calibri" panose="020F0502020204030204" pitchFamily="34" charset="0"/>
+              <a:ea typeface="Calibri" panose="020F0502020204030204" pitchFamily="34" charset="0"/>
+              <a:cs typeface="Times New Roman" panose="02020603050405020304" pitchFamily="18" charset="0"/>
+            </a:endParaRPr>
+          </a:p>
+          <a:p>
+            <a:pPr>
+              <a:lnSpc>
+                <a:spcPct val="107000"/>
+              </a:lnSpc>
+              <a:tabLst>
+                <a:tab pos="581660" algn="l"/>
+                <a:tab pos="1163320" algn="l"/>
+                <a:tab pos="1744980" algn="l"/>
+                <a:tab pos="2326640" algn="l"/>
+                <a:tab pos="2908300" algn="l"/>
+                <a:tab pos="3489960" algn="l"/>
+                <a:tab pos="4071620" algn="l"/>
+                <a:tab pos="4653280" algn="l"/>
+                <a:tab pos="5234940" algn="l"/>
+                <a:tab pos="5816600" algn="l"/>
+                <a:tab pos="6398260" algn="l"/>
+                <a:tab pos="6979920" algn="l"/>
+                <a:tab pos="7561580" algn="l"/>
+                <a:tab pos="8143240" algn="l"/>
+                <a:tab pos="8724900" algn="l"/>
+                <a:tab pos="9306560" algn="l"/>
+              </a:tabLst>
+            </a:pPr>
+            <a:r>
+              <a:rPr lang="en-US" dirty="0">
+                <a:solidFill>
+                  <a:srgbClr val="0000FF"/>
+                </a:solidFill>
+                <a:latin typeface="Consolas" panose="020B0609020204030204" pitchFamily="49" charset="0"/>
+                <a:ea typeface="Times New Roman" panose="02020603050405020304" pitchFamily="18" charset="0"/>
+                <a:cs typeface="Times New Roman" panose="02020603050405020304" pitchFamily="18" charset="0"/>
+              </a:rPr>
+              <a:t>class</a:t>
+            </a:r>
+            <a:r>
+              <a:rPr lang="en-US" dirty="0">
+                <a:solidFill>
+                  <a:srgbClr val="000000"/>
+                </a:solidFill>
+                <a:latin typeface="Consolas" panose="020B0609020204030204" pitchFamily="49" charset="0"/>
+                <a:ea typeface="Times New Roman" panose="02020603050405020304" pitchFamily="18" charset="0"/>
+                <a:cs typeface="Times New Roman" panose="02020603050405020304" pitchFamily="18" charset="0"/>
+              </a:rPr>
+              <a:t> </a:t>
+            </a:r>
+            <a:r>
+              <a:rPr lang="en-US" dirty="0" err="1">
+                <a:solidFill>
+                  <a:srgbClr val="000000"/>
+                </a:solidFill>
+                <a:latin typeface="Consolas" panose="020B0609020204030204" pitchFamily="49" charset="0"/>
+                <a:ea typeface="Times New Roman" panose="02020603050405020304" pitchFamily="18" charset="0"/>
+                <a:cs typeface="Times New Roman" panose="02020603050405020304" pitchFamily="18" charset="0"/>
+              </a:rPr>
+              <a:t>DerivedClass</a:t>
+            </a:r>
+            <a:r>
+              <a:rPr lang="en-US" dirty="0">
+                <a:solidFill>
+                  <a:srgbClr val="000000"/>
+                </a:solidFill>
+                <a:latin typeface="Consolas" panose="020B0609020204030204" pitchFamily="49" charset="0"/>
+                <a:ea typeface="Times New Roman" panose="02020603050405020304" pitchFamily="18" charset="0"/>
+                <a:cs typeface="Times New Roman" panose="02020603050405020304" pitchFamily="18" charset="0"/>
+              </a:rPr>
+              <a:t> </a:t>
+            </a:r>
+            <a:r>
+              <a:rPr lang="en-US" dirty="0">
+                <a:solidFill>
+                  <a:srgbClr val="0000FF"/>
+                </a:solidFill>
+                <a:latin typeface="Consolas" panose="020B0609020204030204" pitchFamily="49" charset="0"/>
+                <a:ea typeface="Times New Roman" panose="02020603050405020304" pitchFamily="18" charset="0"/>
+                <a:cs typeface="Times New Roman" panose="02020603050405020304" pitchFamily="18" charset="0"/>
+              </a:rPr>
+              <a:t>extends</a:t>
+            </a:r>
+            <a:r>
+              <a:rPr lang="en-US" dirty="0">
+                <a:solidFill>
+                  <a:srgbClr val="000000"/>
+                </a:solidFill>
+                <a:latin typeface="Consolas" panose="020B0609020204030204" pitchFamily="49" charset="0"/>
+                <a:ea typeface="Times New Roman" panose="02020603050405020304" pitchFamily="18" charset="0"/>
+                <a:cs typeface="Times New Roman" panose="02020603050405020304" pitchFamily="18" charset="0"/>
+              </a:rPr>
+              <a:t> </a:t>
+            </a:r>
+            <a:r>
+              <a:rPr lang="en-US" dirty="0" err="1">
+                <a:solidFill>
+                  <a:srgbClr val="000000"/>
+                </a:solidFill>
+                <a:latin typeface="Consolas" panose="020B0609020204030204" pitchFamily="49" charset="0"/>
+                <a:ea typeface="Times New Roman" panose="02020603050405020304" pitchFamily="18" charset="0"/>
+                <a:cs typeface="Times New Roman" panose="02020603050405020304" pitchFamily="18" charset="0"/>
+              </a:rPr>
+              <a:t>BaseClass</a:t>
+            </a:r>
+            <a:r>
+              <a:rPr lang="en-US" dirty="0">
+                <a:solidFill>
+                  <a:srgbClr val="000000"/>
+                </a:solidFill>
+                <a:latin typeface="Consolas" panose="020B0609020204030204" pitchFamily="49" charset="0"/>
+                <a:ea typeface="Times New Roman" panose="02020603050405020304" pitchFamily="18" charset="0"/>
+                <a:cs typeface="Times New Roman" panose="02020603050405020304" pitchFamily="18" charset="0"/>
+              </a:rPr>
+              <a:t> {</a:t>
+            </a:r>
+            <a:endParaRPr lang="en-US" sz="2400" dirty="0">
+              <a:latin typeface="Calibri" panose="020F0502020204030204" pitchFamily="34" charset="0"/>
+              <a:ea typeface="Calibri" panose="020F0502020204030204" pitchFamily="34" charset="0"/>
+              <a:cs typeface="Times New Roman" panose="02020603050405020304" pitchFamily="18" charset="0"/>
+            </a:endParaRPr>
+          </a:p>
+          <a:p>
+            <a:pPr>
+              <a:lnSpc>
+                <a:spcPct val="107000"/>
+              </a:lnSpc>
+              <a:tabLst>
+                <a:tab pos="581660" algn="l"/>
+                <a:tab pos="1163320" algn="l"/>
+                <a:tab pos="1744980" algn="l"/>
+                <a:tab pos="2326640" algn="l"/>
+                <a:tab pos="2908300" algn="l"/>
+                <a:tab pos="3489960" algn="l"/>
+                <a:tab pos="4071620" algn="l"/>
+                <a:tab pos="4653280" algn="l"/>
+                <a:tab pos="5234940" algn="l"/>
+                <a:tab pos="5816600" algn="l"/>
+                <a:tab pos="6398260" algn="l"/>
+                <a:tab pos="6979920" algn="l"/>
+                <a:tab pos="7561580" algn="l"/>
+                <a:tab pos="8143240" algn="l"/>
+                <a:tab pos="8724900" algn="l"/>
+                <a:tab pos="9306560" algn="l"/>
+              </a:tabLst>
+            </a:pPr>
+            <a:r>
+              <a:rPr lang="en-US" dirty="0">
+                <a:solidFill>
+                  <a:srgbClr val="000000"/>
+                </a:solidFill>
+                <a:latin typeface="Consolas" panose="020B0609020204030204" pitchFamily="49" charset="0"/>
+                <a:ea typeface="Times New Roman" panose="02020603050405020304" pitchFamily="18" charset="0"/>
+                <a:cs typeface="Times New Roman" panose="02020603050405020304" pitchFamily="18" charset="0"/>
+              </a:rPr>
+              <a:t>    </a:t>
+            </a:r>
+            <a:r>
+              <a:rPr lang="en-US" dirty="0">
+                <a:solidFill>
+                  <a:srgbClr val="0000FF"/>
+                </a:solidFill>
+                <a:latin typeface="Consolas" panose="020B0609020204030204" pitchFamily="49" charset="0"/>
+                <a:ea typeface="Times New Roman" panose="02020603050405020304" pitchFamily="18" charset="0"/>
+                <a:cs typeface="Times New Roman" panose="02020603050405020304" pitchFamily="18" charset="0"/>
+              </a:rPr>
+              <a:t>constructor</a:t>
+            </a:r>
+            <a:r>
+              <a:rPr lang="en-US" dirty="0">
+                <a:solidFill>
+                  <a:srgbClr val="000000"/>
+                </a:solidFill>
+                <a:latin typeface="Consolas" panose="020B0609020204030204" pitchFamily="49" charset="0"/>
+                <a:ea typeface="Times New Roman" panose="02020603050405020304" pitchFamily="18" charset="0"/>
+                <a:cs typeface="Times New Roman" panose="02020603050405020304" pitchFamily="18" charset="0"/>
+              </a:rPr>
+              <a:t>(value: </a:t>
+            </a:r>
+            <a:r>
+              <a:rPr lang="en-US" dirty="0">
+                <a:solidFill>
+                  <a:srgbClr val="0000FF"/>
+                </a:solidFill>
+                <a:latin typeface="Consolas" panose="020B0609020204030204" pitchFamily="49" charset="0"/>
+                <a:ea typeface="Times New Roman" panose="02020603050405020304" pitchFamily="18" charset="0"/>
+                <a:cs typeface="Times New Roman" panose="02020603050405020304" pitchFamily="18" charset="0"/>
+              </a:rPr>
+              <a:t>string</a:t>
+            </a:r>
+            <a:r>
+              <a:rPr lang="en-US" dirty="0">
+                <a:solidFill>
+                  <a:srgbClr val="000000"/>
+                </a:solidFill>
+                <a:latin typeface="Consolas" panose="020B0609020204030204" pitchFamily="49" charset="0"/>
+                <a:ea typeface="Times New Roman" panose="02020603050405020304" pitchFamily="18" charset="0"/>
+                <a:cs typeface="Times New Roman" panose="02020603050405020304" pitchFamily="18" charset="0"/>
+              </a:rPr>
+              <a:t>) {</a:t>
+            </a:r>
+            <a:endParaRPr lang="en-US" sz="2400" dirty="0">
+              <a:latin typeface="Calibri" panose="020F0502020204030204" pitchFamily="34" charset="0"/>
+              <a:ea typeface="Calibri" panose="020F0502020204030204" pitchFamily="34" charset="0"/>
+              <a:cs typeface="Times New Roman" panose="02020603050405020304" pitchFamily="18" charset="0"/>
+            </a:endParaRPr>
+          </a:p>
+          <a:p>
+            <a:pPr>
+              <a:lnSpc>
+                <a:spcPct val="107000"/>
+              </a:lnSpc>
+              <a:tabLst>
+                <a:tab pos="581660" algn="l"/>
+                <a:tab pos="1163320" algn="l"/>
+                <a:tab pos="1744980" algn="l"/>
+                <a:tab pos="2326640" algn="l"/>
+                <a:tab pos="2908300" algn="l"/>
+                <a:tab pos="3489960" algn="l"/>
+                <a:tab pos="4071620" algn="l"/>
+                <a:tab pos="4653280" algn="l"/>
+                <a:tab pos="5234940" algn="l"/>
+                <a:tab pos="5816600" algn="l"/>
+                <a:tab pos="6398260" algn="l"/>
+                <a:tab pos="6979920" algn="l"/>
+                <a:tab pos="7561580" algn="l"/>
+                <a:tab pos="8143240" algn="l"/>
+                <a:tab pos="8724900" algn="l"/>
+                <a:tab pos="9306560" algn="l"/>
+              </a:tabLst>
+            </a:pPr>
+            <a:r>
+              <a:rPr lang="en-US" dirty="0">
+                <a:solidFill>
+                  <a:srgbClr val="000000"/>
+                </a:solidFill>
+                <a:latin typeface="Consolas" panose="020B0609020204030204" pitchFamily="49" charset="0"/>
+                <a:ea typeface="Times New Roman" panose="02020603050405020304" pitchFamily="18" charset="0"/>
+                <a:cs typeface="Times New Roman" panose="02020603050405020304" pitchFamily="18" charset="0"/>
+              </a:rPr>
+              <a:t>        </a:t>
+            </a:r>
+            <a:r>
+              <a:rPr lang="en-US" dirty="0">
+                <a:solidFill>
+                  <a:srgbClr val="0000FF"/>
+                </a:solidFill>
+                <a:latin typeface="Consolas" panose="020B0609020204030204" pitchFamily="49" charset="0"/>
+                <a:ea typeface="Times New Roman" panose="02020603050405020304" pitchFamily="18" charset="0"/>
+                <a:cs typeface="Times New Roman" panose="02020603050405020304" pitchFamily="18" charset="0"/>
+              </a:rPr>
+              <a:t>super</a:t>
+            </a:r>
+            <a:r>
+              <a:rPr lang="en-US" dirty="0">
+                <a:solidFill>
+                  <a:srgbClr val="000000"/>
+                </a:solidFill>
+                <a:latin typeface="Consolas" panose="020B0609020204030204" pitchFamily="49" charset="0"/>
+                <a:ea typeface="Times New Roman" panose="02020603050405020304" pitchFamily="18" charset="0"/>
+                <a:cs typeface="Times New Roman" panose="02020603050405020304" pitchFamily="18" charset="0"/>
+              </a:rPr>
+              <a:t>(value);</a:t>
+            </a:r>
+            <a:endParaRPr lang="en-US" sz="2400" dirty="0">
+              <a:latin typeface="Calibri" panose="020F0502020204030204" pitchFamily="34" charset="0"/>
+              <a:ea typeface="Calibri" panose="020F0502020204030204" pitchFamily="34" charset="0"/>
+              <a:cs typeface="Times New Roman" panose="02020603050405020304" pitchFamily="18" charset="0"/>
+            </a:endParaRPr>
+          </a:p>
+          <a:p>
+            <a:pPr>
+              <a:lnSpc>
+                <a:spcPct val="107000"/>
+              </a:lnSpc>
+              <a:tabLst>
+                <a:tab pos="581660" algn="l"/>
+                <a:tab pos="1163320" algn="l"/>
+                <a:tab pos="1744980" algn="l"/>
+                <a:tab pos="2326640" algn="l"/>
+                <a:tab pos="2908300" algn="l"/>
+                <a:tab pos="3489960" algn="l"/>
+                <a:tab pos="4071620" algn="l"/>
+                <a:tab pos="4653280" algn="l"/>
+                <a:tab pos="5234940" algn="l"/>
+                <a:tab pos="5816600" algn="l"/>
+                <a:tab pos="6398260" algn="l"/>
+                <a:tab pos="6979920" algn="l"/>
+                <a:tab pos="7561580" algn="l"/>
+                <a:tab pos="8143240" algn="l"/>
+                <a:tab pos="8724900" algn="l"/>
+                <a:tab pos="9306560" algn="l"/>
+              </a:tabLst>
+            </a:pPr>
+            <a:r>
+              <a:rPr lang="en-US" dirty="0">
+                <a:solidFill>
+                  <a:srgbClr val="000000"/>
+                </a:solidFill>
+                <a:latin typeface="Consolas" panose="020B0609020204030204" pitchFamily="49" charset="0"/>
+                <a:ea typeface="Times New Roman" panose="02020603050405020304" pitchFamily="18" charset="0"/>
+                <a:cs typeface="Times New Roman" panose="02020603050405020304" pitchFamily="18" charset="0"/>
+              </a:rPr>
+              <a:t>    }</a:t>
+            </a:r>
+            <a:endParaRPr lang="en-US" sz="2400" dirty="0">
+              <a:latin typeface="Calibri" panose="020F0502020204030204" pitchFamily="34" charset="0"/>
+              <a:ea typeface="Calibri" panose="020F0502020204030204" pitchFamily="34" charset="0"/>
+              <a:cs typeface="Times New Roman" panose="02020603050405020304" pitchFamily="18" charset="0"/>
+            </a:endParaRPr>
+          </a:p>
+          <a:p>
+            <a:pPr>
+              <a:lnSpc>
+                <a:spcPct val="107000"/>
+              </a:lnSpc>
+              <a:tabLst>
+                <a:tab pos="581660" algn="l"/>
+                <a:tab pos="1163320" algn="l"/>
+                <a:tab pos="1744980" algn="l"/>
+                <a:tab pos="2326640" algn="l"/>
+                <a:tab pos="2908300" algn="l"/>
+                <a:tab pos="3489960" algn="l"/>
+                <a:tab pos="4071620" algn="l"/>
+                <a:tab pos="4653280" algn="l"/>
+                <a:tab pos="5234940" algn="l"/>
+                <a:tab pos="5816600" algn="l"/>
+                <a:tab pos="6398260" algn="l"/>
+                <a:tab pos="6979920" algn="l"/>
+                <a:tab pos="7561580" algn="l"/>
+                <a:tab pos="8143240" algn="l"/>
+                <a:tab pos="8724900" algn="l"/>
+                <a:tab pos="9306560" algn="l"/>
+              </a:tabLst>
+            </a:pPr>
+            <a:r>
+              <a:rPr lang="en-US" dirty="0">
+                <a:solidFill>
+                  <a:srgbClr val="000000"/>
+                </a:solidFill>
+                <a:latin typeface="Consolas" panose="020B0609020204030204" pitchFamily="49" charset="0"/>
+                <a:ea typeface="Times New Roman" panose="02020603050405020304" pitchFamily="18" charset="0"/>
+                <a:cs typeface="Times New Roman" panose="02020603050405020304" pitchFamily="18" charset="0"/>
+              </a:rPr>
+              <a:t> </a:t>
+            </a:r>
+            <a:endParaRPr lang="en-US" sz="2400" dirty="0">
+              <a:latin typeface="Calibri" panose="020F0502020204030204" pitchFamily="34" charset="0"/>
+              <a:ea typeface="Calibri" panose="020F0502020204030204" pitchFamily="34" charset="0"/>
+              <a:cs typeface="Times New Roman" panose="02020603050405020304" pitchFamily="18" charset="0"/>
+            </a:endParaRPr>
+          </a:p>
+          <a:p>
+            <a:pPr>
+              <a:lnSpc>
+                <a:spcPct val="107000"/>
+              </a:lnSpc>
+              <a:tabLst>
+                <a:tab pos="581660" algn="l"/>
+                <a:tab pos="1163320" algn="l"/>
+                <a:tab pos="1744980" algn="l"/>
+                <a:tab pos="2326640" algn="l"/>
+                <a:tab pos="2908300" algn="l"/>
+                <a:tab pos="3489960" algn="l"/>
+                <a:tab pos="4071620" algn="l"/>
+                <a:tab pos="4653280" algn="l"/>
+                <a:tab pos="5234940" algn="l"/>
+                <a:tab pos="5816600" algn="l"/>
+                <a:tab pos="6398260" algn="l"/>
+                <a:tab pos="6979920" algn="l"/>
+                <a:tab pos="7561580" algn="l"/>
+                <a:tab pos="8143240" algn="l"/>
+                <a:tab pos="8724900" algn="l"/>
+                <a:tab pos="9306560" algn="l"/>
+              </a:tabLst>
+            </a:pPr>
+            <a:r>
+              <a:rPr lang="en-US" dirty="0">
+                <a:solidFill>
+                  <a:srgbClr val="000000"/>
+                </a:solidFill>
+                <a:latin typeface="Consolas" panose="020B0609020204030204" pitchFamily="49" charset="0"/>
+                <a:ea typeface="Times New Roman" panose="02020603050405020304" pitchFamily="18" charset="0"/>
+                <a:cs typeface="Times New Roman" panose="02020603050405020304" pitchFamily="18" charset="0"/>
+              </a:rPr>
+              <a:t>    </a:t>
+            </a:r>
+            <a:r>
+              <a:rPr lang="en-US" dirty="0" err="1">
+                <a:solidFill>
+                  <a:srgbClr val="000000"/>
+                </a:solidFill>
+                <a:latin typeface="Consolas" panose="020B0609020204030204" pitchFamily="49" charset="0"/>
+                <a:ea typeface="Times New Roman" panose="02020603050405020304" pitchFamily="18" charset="0"/>
+                <a:cs typeface="Times New Roman" panose="02020603050405020304" pitchFamily="18" charset="0"/>
+              </a:rPr>
+              <a:t>getValue</a:t>
+            </a:r>
+            <a:r>
+              <a:rPr lang="en-US" dirty="0">
+                <a:solidFill>
+                  <a:srgbClr val="000000"/>
+                </a:solidFill>
+                <a:latin typeface="Consolas" panose="020B0609020204030204" pitchFamily="49" charset="0"/>
+                <a:ea typeface="Times New Roman" panose="02020603050405020304" pitchFamily="18" charset="0"/>
+                <a:cs typeface="Times New Roman" panose="02020603050405020304" pitchFamily="18" charset="0"/>
+              </a:rPr>
+              <a:t>(): </a:t>
+            </a:r>
+            <a:r>
+              <a:rPr lang="en-US" dirty="0">
+                <a:solidFill>
+                  <a:srgbClr val="0000FF"/>
+                </a:solidFill>
+                <a:latin typeface="Consolas" panose="020B0609020204030204" pitchFamily="49" charset="0"/>
+                <a:ea typeface="Times New Roman" panose="02020603050405020304" pitchFamily="18" charset="0"/>
+                <a:cs typeface="Times New Roman" panose="02020603050405020304" pitchFamily="18" charset="0"/>
+              </a:rPr>
+              <a:t>string</a:t>
+            </a:r>
+            <a:r>
+              <a:rPr lang="en-US" dirty="0">
+                <a:solidFill>
+                  <a:srgbClr val="000000"/>
+                </a:solidFill>
+                <a:latin typeface="Consolas" panose="020B0609020204030204" pitchFamily="49" charset="0"/>
+                <a:ea typeface="Times New Roman" panose="02020603050405020304" pitchFamily="18" charset="0"/>
+                <a:cs typeface="Times New Roman" panose="02020603050405020304" pitchFamily="18" charset="0"/>
+              </a:rPr>
+              <a:t> {</a:t>
+            </a:r>
+            <a:endParaRPr lang="en-US" sz="2400" dirty="0">
+              <a:latin typeface="Calibri" panose="020F0502020204030204" pitchFamily="34" charset="0"/>
+              <a:ea typeface="Calibri" panose="020F0502020204030204" pitchFamily="34" charset="0"/>
+              <a:cs typeface="Times New Roman" panose="02020603050405020304" pitchFamily="18" charset="0"/>
+            </a:endParaRPr>
+          </a:p>
+          <a:p>
+            <a:pPr>
+              <a:lnSpc>
+                <a:spcPct val="107000"/>
+              </a:lnSpc>
+              <a:tabLst>
+                <a:tab pos="581660" algn="l"/>
+                <a:tab pos="1163320" algn="l"/>
+                <a:tab pos="1744980" algn="l"/>
+                <a:tab pos="2326640" algn="l"/>
+                <a:tab pos="2908300" algn="l"/>
+                <a:tab pos="3489960" algn="l"/>
+                <a:tab pos="4071620" algn="l"/>
+                <a:tab pos="4653280" algn="l"/>
+                <a:tab pos="5234940" algn="l"/>
+                <a:tab pos="5816600" algn="l"/>
+                <a:tab pos="6398260" algn="l"/>
+                <a:tab pos="6979920" algn="l"/>
+                <a:tab pos="7561580" algn="l"/>
+                <a:tab pos="8143240" algn="l"/>
+                <a:tab pos="8724900" algn="l"/>
+                <a:tab pos="9306560" algn="l"/>
+              </a:tabLst>
+            </a:pPr>
+            <a:r>
+              <a:rPr lang="en-US" dirty="0">
+                <a:solidFill>
+                  <a:srgbClr val="000000"/>
+                </a:solidFill>
+                <a:latin typeface="Consolas" panose="020B0609020204030204" pitchFamily="49" charset="0"/>
+                <a:ea typeface="Times New Roman" panose="02020603050405020304" pitchFamily="18" charset="0"/>
+                <a:cs typeface="Times New Roman" panose="02020603050405020304" pitchFamily="18" charset="0"/>
+              </a:rPr>
+              <a:t>        </a:t>
+            </a:r>
+            <a:r>
+              <a:rPr lang="en-US" dirty="0">
+                <a:solidFill>
+                  <a:srgbClr val="0000FF"/>
+                </a:solidFill>
+                <a:latin typeface="Consolas" panose="020B0609020204030204" pitchFamily="49" charset="0"/>
+                <a:ea typeface="Times New Roman" panose="02020603050405020304" pitchFamily="18" charset="0"/>
+                <a:cs typeface="Times New Roman" panose="02020603050405020304" pitchFamily="18" charset="0"/>
+              </a:rPr>
+              <a:t>return</a:t>
+            </a:r>
+            <a:r>
+              <a:rPr lang="en-US" dirty="0">
+                <a:solidFill>
+                  <a:srgbClr val="000000"/>
+                </a:solidFill>
+                <a:latin typeface="Consolas" panose="020B0609020204030204" pitchFamily="49" charset="0"/>
+                <a:ea typeface="Times New Roman" panose="02020603050405020304" pitchFamily="18" charset="0"/>
+                <a:cs typeface="Times New Roman" panose="02020603050405020304" pitchFamily="18" charset="0"/>
+              </a:rPr>
+              <a:t> </a:t>
+            </a:r>
+            <a:r>
+              <a:rPr lang="en-US" dirty="0" err="1">
+                <a:solidFill>
+                  <a:srgbClr val="0000FF"/>
+                </a:solidFill>
+                <a:latin typeface="Consolas" panose="020B0609020204030204" pitchFamily="49" charset="0"/>
+                <a:ea typeface="Times New Roman" panose="02020603050405020304" pitchFamily="18" charset="0"/>
+                <a:cs typeface="Times New Roman" panose="02020603050405020304" pitchFamily="18" charset="0"/>
+              </a:rPr>
+              <a:t>super</a:t>
+            </a:r>
+            <a:r>
+              <a:rPr lang="en-US" dirty="0" err="1">
+                <a:solidFill>
+                  <a:srgbClr val="000000"/>
+                </a:solidFill>
+                <a:latin typeface="Consolas" panose="020B0609020204030204" pitchFamily="49" charset="0"/>
+                <a:ea typeface="Times New Roman" panose="02020603050405020304" pitchFamily="18" charset="0"/>
+                <a:cs typeface="Times New Roman" panose="02020603050405020304" pitchFamily="18" charset="0"/>
+              </a:rPr>
+              <a:t>.getValue</a:t>
+            </a:r>
+            <a:r>
+              <a:rPr lang="en-US" dirty="0">
+                <a:solidFill>
+                  <a:srgbClr val="000000"/>
+                </a:solidFill>
+                <a:latin typeface="Consolas" panose="020B0609020204030204" pitchFamily="49" charset="0"/>
+                <a:ea typeface="Times New Roman" panose="02020603050405020304" pitchFamily="18" charset="0"/>
+                <a:cs typeface="Times New Roman" panose="02020603050405020304" pitchFamily="18" charset="0"/>
+              </a:rPr>
+              <a:t>() + </a:t>
+            </a:r>
+            <a:r>
+              <a:rPr lang="en-US" dirty="0">
+                <a:solidFill>
+                  <a:srgbClr val="A31515"/>
+                </a:solidFill>
+                <a:latin typeface="Consolas" panose="020B0609020204030204" pitchFamily="49" charset="0"/>
+                <a:ea typeface="Times New Roman" panose="02020603050405020304" pitchFamily="18" charset="0"/>
+                <a:cs typeface="Times New Roman" panose="02020603050405020304" pitchFamily="18" charset="0"/>
+              </a:rPr>
+              <a:t>' Extended'</a:t>
+            </a:r>
+            <a:r>
+              <a:rPr lang="en-US" dirty="0">
+                <a:solidFill>
+                  <a:srgbClr val="000000"/>
+                </a:solidFill>
+                <a:latin typeface="Consolas" panose="020B0609020204030204" pitchFamily="49" charset="0"/>
+                <a:ea typeface="Times New Roman" panose="02020603050405020304" pitchFamily="18" charset="0"/>
+                <a:cs typeface="Times New Roman" panose="02020603050405020304" pitchFamily="18" charset="0"/>
+              </a:rPr>
+              <a:t>;</a:t>
+            </a:r>
+            <a:endParaRPr lang="en-US" sz="2400" dirty="0">
+              <a:latin typeface="Calibri" panose="020F0502020204030204" pitchFamily="34" charset="0"/>
+              <a:ea typeface="Calibri" panose="020F0502020204030204" pitchFamily="34" charset="0"/>
+              <a:cs typeface="Times New Roman" panose="02020603050405020304" pitchFamily="18" charset="0"/>
+            </a:endParaRPr>
+          </a:p>
+          <a:p>
+            <a:pPr>
+              <a:lnSpc>
+                <a:spcPct val="107000"/>
+              </a:lnSpc>
+              <a:tabLst>
+                <a:tab pos="581660" algn="l"/>
+                <a:tab pos="1163320" algn="l"/>
+                <a:tab pos="1744980" algn="l"/>
+                <a:tab pos="2326640" algn="l"/>
+                <a:tab pos="2908300" algn="l"/>
+                <a:tab pos="3489960" algn="l"/>
+                <a:tab pos="4071620" algn="l"/>
+                <a:tab pos="4653280" algn="l"/>
+                <a:tab pos="5234940" algn="l"/>
+                <a:tab pos="5816600" algn="l"/>
+                <a:tab pos="6398260" algn="l"/>
+                <a:tab pos="6979920" algn="l"/>
+                <a:tab pos="7561580" algn="l"/>
+                <a:tab pos="8143240" algn="l"/>
+                <a:tab pos="8724900" algn="l"/>
+                <a:tab pos="9306560" algn="l"/>
+              </a:tabLst>
+            </a:pPr>
+            <a:r>
+              <a:rPr lang="en-US" dirty="0">
+                <a:solidFill>
+                  <a:srgbClr val="000000"/>
+                </a:solidFill>
+                <a:latin typeface="Consolas" panose="020B0609020204030204" pitchFamily="49" charset="0"/>
+                <a:ea typeface="Times New Roman" panose="02020603050405020304" pitchFamily="18" charset="0"/>
+                <a:cs typeface="Times New Roman" panose="02020603050405020304" pitchFamily="18" charset="0"/>
+              </a:rPr>
+              <a:t>    }</a:t>
+            </a:r>
+            <a:endParaRPr lang="en-US" sz="2400" dirty="0">
+              <a:latin typeface="Calibri" panose="020F0502020204030204" pitchFamily="34" charset="0"/>
+              <a:ea typeface="Calibri" panose="020F0502020204030204" pitchFamily="34" charset="0"/>
+              <a:cs typeface="Times New Roman" panose="02020603050405020304" pitchFamily="18" charset="0"/>
+            </a:endParaRPr>
+          </a:p>
+          <a:p>
+            <a:pPr>
+              <a:lnSpc>
+                <a:spcPct val="107000"/>
+              </a:lnSpc>
+              <a:tabLst>
+                <a:tab pos="581660" algn="l"/>
+                <a:tab pos="1163320" algn="l"/>
+                <a:tab pos="1744980" algn="l"/>
+                <a:tab pos="2326640" algn="l"/>
+                <a:tab pos="2908300" algn="l"/>
+                <a:tab pos="3489960" algn="l"/>
+                <a:tab pos="4071620" algn="l"/>
+                <a:tab pos="4653280" algn="l"/>
+                <a:tab pos="5234940" algn="l"/>
+                <a:tab pos="5816600" algn="l"/>
+                <a:tab pos="6398260" algn="l"/>
+                <a:tab pos="6979920" algn="l"/>
+                <a:tab pos="7561580" algn="l"/>
+                <a:tab pos="8143240" algn="l"/>
+                <a:tab pos="8724900" algn="l"/>
+                <a:tab pos="9306560" algn="l"/>
+              </a:tabLst>
+            </a:pPr>
+            <a:r>
+              <a:rPr lang="en-US" dirty="0">
+                <a:solidFill>
+                  <a:srgbClr val="000000"/>
+                </a:solidFill>
+                <a:latin typeface="Consolas" panose="020B0609020204030204" pitchFamily="49" charset="0"/>
+                <a:ea typeface="Times New Roman" panose="02020603050405020304" pitchFamily="18" charset="0"/>
+                <a:cs typeface="Times New Roman" panose="02020603050405020304" pitchFamily="18" charset="0"/>
+              </a:rPr>
+              <a:t>}</a:t>
+            </a:r>
+            <a:endParaRPr lang="en-US" sz="2400" dirty="0">
+              <a:latin typeface="Calibri" panose="020F0502020204030204" pitchFamily="34" charset="0"/>
+              <a:ea typeface="Calibri" panose="020F0502020204030204" pitchFamily="34" charset="0"/>
+              <a:cs typeface="Times New Roman" panose="02020603050405020304" pitchFamily="18" charset="0"/>
+            </a:endParaRPr>
+          </a:p>
+          <a:p>
+            <a:pPr>
+              <a:lnSpc>
+                <a:spcPct val="107000"/>
+              </a:lnSpc>
+              <a:spcAft>
+                <a:spcPts val="800"/>
+              </a:spcAft>
+            </a:pPr>
+            <a:r>
+              <a:rPr lang="en-US" sz="2400" dirty="0">
+                <a:latin typeface="Calibri" panose="020F0502020204030204" pitchFamily="34" charset="0"/>
+                <a:ea typeface="Calibri" panose="020F0502020204030204" pitchFamily="34" charset="0"/>
+                <a:cs typeface="Times New Roman" panose="02020603050405020304" pitchFamily="18" charset="0"/>
+              </a:rPr>
+              <a:t> </a:t>
+            </a:r>
+            <a:endParaRPr lang="en-US" sz="2400" dirty="0">
+              <a:effectLst/>
+              <a:latin typeface="Calibri" panose="020F0502020204030204" pitchFamily="34" charset="0"/>
+              <a:ea typeface="Calibri" panose="020F0502020204030204" pitchFamily="34" charset="0"/>
+              <a:cs typeface="Times New Roman" panose="02020603050405020304" pitchFamily="18" charset="0"/>
+            </a:endParaRPr>
+          </a:p>
+        </p:txBody>
+      </p:sp>
+    </p:spTree>
+    <p:extLst>
+      <p:ext uri="{BB962C8B-B14F-4D97-AF65-F5344CB8AC3E}">
+        <p14:creationId xmlns:p14="http://schemas.microsoft.com/office/powerpoint/2010/main" val="828832119"/>
+      </p:ext>
+    </p:extLst>
+  </p:cSld>
+  <p:clrMapOvr>
+    <a:masterClrMapping/>
+  </p:clrMapOvr>
+</p:sld>
+</file>
+
+<file path=ppt/slides/slide28.xml><?xml version="1.0" encoding="utf-8"?>
+<p:sld xmlns:a="http://schemas.openxmlformats.org/drawingml/2006/main" xmlns:r="http://schemas.openxmlformats.org/officeDocument/2006/relationships" xmlns:p="http://schemas.openxmlformats.org/presentationml/2006/main">
+  <p:cSld>
+    <p:spTree>
+      <p:nvGrpSpPr>
+        <p:cNvPr id="1" name=""/>
+        <p:cNvGrpSpPr/>
+        <p:nvPr/>
+      </p:nvGrpSpPr>
+      <p:grpSpPr>
+        <a:xfrm>
+          <a:off x="0" y="0"/>
+          <a:ext cx="0" cy="0"/>
+          <a:chOff x="0" y="0"/>
+          <a:chExt cx="0" cy="0"/>
+        </a:xfrm>
+      </p:grpSpPr>
+      <p:sp>
+        <p:nvSpPr>
+          <p:cNvPr id="2" name="Title 1"/>
+          <p:cNvSpPr>
+            <a:spLocks noGrp="1"/>
+          </p:cNvSpPr>
+          <p:nvPr>
+            <p:ph type="title"/>
+          </p:nvPr>
+        </p:nvSpPr>
+        <p:spPr/>
+        <p:txBody>
+          <a:bodyPr/>
+          <a:lstStyle/>
+          <a:p>
+            <a:r>
+              <a:rPr lang="en-US" dirty="0"/>
+              <a:t>Inheritance</a:t>
+            </a:r>
+          </a:p>
+        </p:txBody>
+      </p:sp>
+      <p:sp>
+        <p:nvSpPr>
           <p:cNvPr id="3" name="Content Placeholder 2"/>
           <p:cNvSpPr>
             <a:spLocks noGrp="1"/>
@@ -12771,14 +14184,2180 @@
           <a:bodyPr/>
           <a:lstStyle/>
           <a:p>
-            <a:endParaRPr lang="en-US"/>
+            <a:r>
+              <a:rPr lang="en-US" dirty="0" smtClean="0"/>
+              <a:t>Generates short inheritance function</a:t>
+            </a:r>
+          </a:p>
+          <a:p>
+            <a:pPr lvl="1"/>
+            <a:r>
+              <a:rPr lang="en-US" dirty="0" smtClean="0"/>
+              <a:t>Sets up prototype chain</a:t>
+            </a:r>
+          </a:p>
+          <a:p>
+            <a:pPr lvl="1"/>
+            <a:endParaRPr lang="en-US" dirty="0"/>
+          </a:p>
+          <a:p>
+            <a:pPr lvl="1"/>
+            <a:endParaRPr lang="en-US" dirty="0" smtClean="0"/>
+          </a:p>
+          <a:p>
+            <a:pPr lvl="1"/>
+            <a:endParaRPr lang="en-US" dirty="0"/>
+          </a:p>
+          <a:p>
+            <a:pPr lvl="1"/>
+            <a:endParaRPr lang="en-US" dirty="0" smtClean="0"/>
+          </a:p>
+          <a:p>
+            <a:pPr lvl="1"/>
+            <a:endParaRPr lang="en-US" dirty="0"/>
+          </a:p>
+          <a:p>
+            <a:pPr lvl="1"/>
+            <a:endParaRPr lang="en-US" dirty="0" smtClean="0"/>
+          </a:p>
+          <a:p>
+            <a:r>
+              <a:rPr lang="en-US" dirty="0" smtClean="0"/>
+              <a:t>Then generates the following madness</a:t>
+            </a:r>
+            <a:endParaRPr lang="en-US" dirty="0"/>
+          </a:p>
+        </p:txBody>
+      </p:sp>
+      <p:sp>
+        <p:nvSpPr>
+          <p:cNvPr id="5" name="Rectangle 4"/>
+          <p:cNvSpPr/>
+          <p:nvPr/>
+        </p:nvSpPr>
+        <p:spPr>
+          <a:xfrm>
+            <a:off x="798384" y="3165719"/>
+            <a:ext cx="8354568" cy="1870512"/>
+          </a:xfrm>
+          <a:prstGeom prst="rect">
+            <a:avLst/>
+          </a:prstGeom>
+        </p:spPr>
+        <p:txBody>
+          <a:bodyPr wrap="square">
+            <a:spAutoFit/>
+          </a:bodyPr>
+          <a:lstStyle/>
+          <a:p>
+            <a:pPr>
+              <a:lnSpc>
+                <a:spcPct val="107000"/>
+              </a:lnSpc>
+              <a:tabLst>
+                <a:tab pos="581660" algn="l"/>
+                <a:tab pos="1163320" algn="l"/>
+                <a:tab pos="1744980" algn="l"/>
+                <a:tab pos="2326640" algn="l"/>
+                <a:tab pos="2908300" algn="l"/>
+                <a:tab pos="3489960" algn="l"/>
+                <a:tab pos="4071620" algn="l"/>
+                <a:tab pos="4653280" algn="l"/>
+                <a:tab pos="5234940" algn="l"/>
+                <a:tab pos="5816600" algn="l"/>
+                <a:tab pos="6398260" algn="l"/>
+                <a:tab pos="6979920" algn="l"/>
+                <a:tab pos="7561580" algn="l"/>
+                <a:tab pos="8143240" algn="l"/>
+                <a:tab pos="8724900" algn="l"/>
+                <a:tab pos="9306560" algn="l"/>
+              </a:tabLst>
+            </a:pPr>
+            <a:r>
+              <a:rPr lang="en-US" dirty="0" err="1">
+                <a:solidFill>
+                  <a:srgbClr val="0000FF"/>
+                </a:solidFill>
+                <a:latin typeface="Consolas" panose="020B0609020204030204" pitchFamily="49" charset="0"/>
+                <a:ea typeface="Times New Roman" panose="02020603050405020304" pitchFamily="18" charset="0"/>
+                <a:cs typeface="Times New Roman" panose="02020603050405020304" pitchFamily="18" charset="0"/>
+              </a:rPr>
+              <a:t>var</a:t>
+            </a:r>
+            <a:r>
+              <a:rPr lang="en-US" dirty="0">
+                <a:solidFill>
+                  <a:srgbClr val="000000"/>
+                </a:solidFill>
+                <a:latin typeface="Consolas" panose="020B0609020204030204" pitchFamily="49" charset="0"/>
+                <a:ea typeface="Times New Roman" panose="02020603050405020304" pitchFamily="18" charset="0"/>
+                <a:cs typeface="Times New Roman" panose="02020603050405020304" pitchFamily="18" charset="0"/>
+              </a:rPr>
+              <a:t> __extends = </a:t>
+            </a:r>
+            <a:r>
+              <a:rPr lang="en-US" dirty="0" err="1">
+                <a:solidFill>
+                  <a:srgbClr val="0000FF"/>
+                </a:solidFill>
+                <a:latin typeface="Consolas" panose="020B0609020204030204" pitchFamily="49" charset="0"/>
+                <a:ea typeface="Times New Roman" panose="02020603050405020304" pitchFamily="18" charset="0"/>
+                <a:cs typeface="Times New Roman" panose="02020603050405020304" pitchFamily="18" charset="0"/>
+              </a:rPr>
+              <a:t>this</a:t>
+            </a:r>
+            <a:r>
+              <a:rPr lang="en-US" dirty="0" err="1">
+                <a:solidFill>
+                  <a:srgbClr val="000000"/>
+                </a:solidFill>
+                <a:latin typeface="Consolas" panose="020B0609020204030204" pitchFamily="49" charset="0"/>
+                <a:ea typeface="Times New Roman" panose="02020603050405020304" pitchFamily="18" charset="0"/>
+                <a:cs typeface="Times New Roman" panose="02020603050405020304" pitchFamily="18" charset="0"/>
+              </a:rPr>
+              <a:t>.__extends</a:t>
+            </a:r>
+            <a:r>
+              <a:rPr lang="en-US" dirty="0">
+                <a:solidFill>
+                  <a:srgbClr val="000000"/>
+                </a:solidFill>
+                <a:latin typeface="Consolas" panose="020B0609020204030204" pitchFamily="49" charset="0"/>
+                <a:ea typeface="Times New Roman" panose="02020603050405020304" pitchFamily="18" charset="0"/>
+                <a:cs typeface="Times New Roman" panose="02020603050405020304" pitchFamily="18" charset="0"/>
+              </a:rPr>
+              <a:t> || </a:t>
+            </a:r>
+            <a:r>
+              <a:rPr lang="en-US" dirty="0">
+                <a:solidFill>
+                  <a:srgbClr val="0000FF"/>
+                </a:solidFill>
+                <a:latin typeface="Consolas" panose="020B0609020204030204" pitchFamily="49" charset="0"/>
+                <a:ea typeface="Times New Roman" panose="02020603050405020304" pitchFamily="18" charset="0"/>
+                <a:cs typeface="Times New Roman" panose="02020603050405020304" pitchFamily="18" charset="0"/>
+              </a:rPr>
+              <a:t>function</a:t>
+            </a:r>
+            <a:r>
+              <a:rPr lang="en-US" dirty="0">
+                <a:solidFill>
+                  <a:srgbClr val="000000"/>
+                </a:solidFill>
+                <a:latin typeface="Consolas" panose="020B0609020204030204" pitchFamily="49" charset="0"/>
+                <a:ea typeface="Times New Roman" panose="02020603050405020304" pitchFamily="18" charset="0"/>
+                <a:cs typeface="Times New Roman" panose="02020603050405020304" pitchFamily="18" charset="0"/>
+              </a:rPr>
+              <a:t> (d, b) {</a:t>
+            </a:r>
+            <a:endParaRPr lang="en-US" sz="2400" dirty="0">
+              <a:latin typeface="Calibri" panose="020F0502020204030204" pitchFamily="34" charset="0"/>
+              <a:ea typeface="Calibri" panose="020F0502020204030204" pitchFamily="34" charset="0"/>
+              <a:cs typeface="Times New Roman" panose="02020603050405020304" pitchFamily="18" charset="0"/>
+            </a:endParaRPr>
+          </a:p>
+          <a:p>
+            <a:pPr>
+              <a:lnSpc>
+                <a:spcPct val="107000"/>
+              </a:lnSpc>
+              <a:tabLst>
+                <a:tab pos="581660" algn="l"/>
+                <a:tab pos="1163320" algn="l"/>
+                <a:tab pos="1744980" algn="l"/>
+                <a:tab pos="2326640" algn="l"/>
+                <a:tab pos="2908300" algn="l"/>
+                <a:tab pos="3489960" algn="l"/>
+                <a:tab pos="4071620" algn="l"/>
+                <a:tab pos="4653280" algn="l"/>
+                <a:tab pos="5234940" algn="l"/>
+                <a:tab pos="5816600" algn="l"/>
+                <a:tab pos="6398260" algn="l"/>
+                <a:tab pos="6979920" algn="l"/>
+                <a:tab pos="7561580" algn="l"/>
+                <a:tab pos="8143240" algn="l"/>
+                <a:tab pos="8724900" algn="l"/>
+                <a:tab pos="9306560" algn="l"/>
+              </a:tabLst>
+            </a:pPr>
+            <a:r>
+              <a:rPr lang="en-US" dirty="0">
+                <a:solidFill>
+                  <a:srgbClr val="000000"/>
+                </a:solidFill>
+                <a:latin typeface="Consolas" panose="020B0609020204030204" pitchFamily="49" charset="0"/>
+                <a:ea typeface="Times New Roman" panose="02020603050405020304" pitchFamily="18" charset="0"/>
+                <a:cs typeface="Times New Roman" panose="02020603050405020304" pitchFamily="18" charset="0"/>
+              </a:rPr>
+              <a:t>    </a:t>
+            </a:r>
+            <a:r>
+              <a:rPr lang="en-US" dirty="0">
+                <a:solidFill>
+                  <a:srgbClr val="0000FF"/>
+                </a:solidFill>
+                <a:latin typeface="Consolas" panose="020B0609020204030204" pitchFamily="49" charset="0"/>
+                <a:ea typeface="Times New Roman" panose="02020603050405020304" pitchFamily="18" charset="0"/>
+                <a:cs typeface="Times New Roman" panose="02020603050405020304" pitchFamily="18" charset="0"/>
+              </a:rPr>
+              <a:t>for</a:t>
+            </a:r>
+            <a:r>
+              <a:rPr lang="en-US" dirty="0">
+                <a:solidFill>
+                  <a:srgbClr val="000000"/>
+                </a:solidFill>
+                <a:latin typeface="Consolas" panose="020B0609020204030204" pitchFamily="49" charset="0"/>
+                <a:ea typeface="Times New Roman" panose="02020603050405020304" pitchFamily="18" charset="0"/>
+                <a:cs typeface="Times New Roman" panose="02020603050405020304" pitchFamily="18" charset="0"/>
+              </a:rPr>
+              <a:t> (</a:t>
+            </a:r>
+            <a:r>
+              <a:rPr lang="en-US" dirty="0" err="1">
+                <a:solidFill>
+                  <a:srgbClr val="0000FF"/>
+                </a:solidFill>
+                <a:latin typeface="Consolas" panose="020B0609020204030204" pitchFamily="49" charset="0"/>
+                <a:ea typeface="Times New Roman" panose="02020603050405020304" pitchFamily="18" charset="0"/>
+                <a:cs typeface="Times New Roman" panose="02020603050405020304" pitchFamily="18" charset="0"/>
+              </a:rPr>
+              <a:t>var</a:t>
+            </a:r>
+            <a:r>
+              <a:rPr lang="en-US" dirty="0">
+                <a:solidFill>
+                  <a:srgbClr val="000000"/>
+                </a:solidFill>
+                <a:latin typeface="Consolas" panose="020B0609020204030204" pitchFamily="49" charset="0"/>
+                <a:ea typeface="Times New Roman" panose="02020603050405020304" pitchFamily="18" charset="0"/>
+                <a:cs typeface="Times New Roman" panose="02020603050405020304" pitchFamily="18" charset="0"/>
+              </a:rPr>
+              <a:t> p </a:t>
+            </a:r>
+            <a:r>
+              <a:rPr lang="en-US" dirty="0">
+                <a:solidFill>
+                  <a:srgbClr val="0000FF"/>
+                </a:solidFill>
+                <a:latin typeface="Consolas" panose="020B0609020204030204" pitchFamily="49" charset="0"/>
+                <a:ea typeface="Times New Roman" panose="02020603050405020304" pitchFamily="18" charset="0"/>
+                <a:cs typeface="Times New Roman" panose="02020603050405020304" pitchFamily="18" charset="0"/>
+              </a:rPr>
+              <a:t>in</a:t>
+            </a:r>
+            <a:r>
+              <a:rPr lang="en-US" dirty="0">
+                <a:solidFill>
+                  <a:srgbClr val="000000"/>
+                </a:solidFill>
+                <a:latin typeface="Consolas" panose="020B0609020204030204" pitchFamily="49" charset="0"/>
+                <a:ea typeface="Times New Roman" panose="02020603050405020304" pitchFamily="18" charset="0"/>
+                <a:cs typeface="Times New Roman" panose="02020603050405020304" pitchFamily="18" charset="0"/>
+              </a:rPr>
+              <a:t> b) </a:t>
+            </a:r>
+            <a:r>
+              <a:rPr lang="en-US" dirty="0">
+                <a:solidFill>
+                  <a:srgbClr val="0000FF"/>
+                </a:solidFill>
+                <a:latin typeface="Consolas" panose="020B0609020204030204" pitchFamily="49" charset="0"/>
+                <a:ea typeface="Times New Roman" panose="02020603050405020304" pitchFamily="18" charset="0"/>
+                <a:cs typeface="Times New Roman" panose="02020603050405020304" pitchFamily="18" charset="0"/>
+              </a:rPr>
+              <a:t>if</a:t>
+            </a:r>
+            <a:r>
+              <a:rPr lang="en-US" dirty="0">
+                <a:solidFill>
+                  <a:srgbClr val="000000"/>
+                </a:solidFill>
+                <a:latin typeface="Consolas" panose="020B0609020204030204" pitchFamily="49" charset="0"/>
+                <a:ea typeface="Times New Roman" panose="02020603050405020304" pitchFamily="18" charset="0"/>
+                <a:cs typeface="Times New Roman" panose="02020603050405020304" pitchFamily="18" charset="0"/>
+              </a:rPr>
+              <a:t> (</a:t>
+            </a:r>
+            <a:r>
+              <a:rPr lang="en-US" dirty="0" err="1">
+                <a:solidFill>
+                  <a:srgbClr val="000000"/>
+                </a:solidFill>
+                <a:latin typeface="Consolas" panose="020B0609020204030204" pitchFamily="49" charset="0"/>
+                <a:ea typeface="Times New Roman" panose="02020603050405020304" pitchFamily="18" charset="0"/>
+                <a:cs typeface="Times New Roman" panose="02020603050405020304" pitchFamily="18" charset="0"/>
+              </a:rPr>
+              <a:t>b.hasOwnProperty</a:t>
+            </a:r>
+            <a:r>
+              <a:rPr lang="en-US" dirty="0">
+                <a:solidFill>
+                  <a:srgbClr val="000000"/>
+                </a:solidFill>
+                <a:latin typeface="Consolas" panose="020B0609020204030204" pitchFamily="49" charset="0"/>
+                <a:ea typeface="Times New Roman" panose="02020603050405020304" pitchFamily="18" charset="0"/>
+                <a:cs typeface="Times New Roman" panose="02020603050405020304" pitchFamily="18" charset="0"/>
+              </a:rPr>
+              <a:t>(p)) d[p] = b[p];</a:t>
+            </a:r>
+            <a:endParaRPr lang="en-US" sz="2400" dirty="0">
+              <a:latin typeface="Calibri" panose="020F0502020204030204" pitchFamily="34" charset="0"/>
+              <a:ea typeface="Calibri" panose="020F0502020204030204" pitchFamily="34" charset="0"/>
+              <a:cs typeface="Times New Roman" panose="02020603050405020304" pitchFamily="18" charset="0"/>
+            </a:endParaRPr>
+          </a:p>
+          <a:p>
+            <a:pPr>
+              <a:lnSpc>
+                <a:spcPct val="107000"/>
+              </a:lnSpc>
+              <a:tabLst>
+                <a:tab pos="581660" algn="l"/>
+                <a:tab pos="1163320" algn="l"/>
+                <a:tab pos="1744980" algn="l"/>
+                <a:tab pos="2326640" algn="l"/>
+                <a:tab pos="2908300" algn="l"/>
+                <a:tab pos="3489960" algn="l"/>
+                <a:tab pos="4071620" algn="l"/>
+                <a:tab pos="4653280" algn="l"/>
+                <a:tab pos="5234940" algn="l"/>
+                <a:tab pos="5816600" algn="l"/>
+                <a:tab pos="6398260" algn="l"/>
+                <a:tab pos="6979920" algn="l"/>
+                <a:tab pos="7561580" algn="l"/>
+                <a:tab pos="8143240" algn="l"/>
+                <a:tab pos="8724900" algn="l"/>
+                <a:tab pos="9306560" algn="l"/>
+              </a:tabLst>
+            </a:pPr>
+            <a:r>
+              <a:rPr lang="en-US" dirty="0">
+                <a:solidFill>
+                  <a:srgbClr val="000000"/>
+                </a:solidFill>
+                <a:latin typeface="Consolas" panose="020B0609020204030204" pitchFamily="49" charset="0"/>
+                <a:ea typeface="Times New Roman" panose="02020603050405020304" pitchFamily="18" charset="0"/>
+                <a:cs typeface="Times New Roman" panose="02020603050405020304" pitchFamily="18" charset="0"/>
+              </a:rPr>
+              <a:t>    </a:t>
+            </a:r>
+            <a:r>
+              <a:rPr lang="en-US" dirty="0">
+                <a:solidFill>
+                  <a:srgbClr val="0000FF"/>
+                </a:solidFill>
+                <a:latin typeface="Consolas" panose="020B0609020204030204" pitchFamily="49" charset="0"/>
+                <a:ea typeface="Times New Roman" panose="02020603050405020304" pitchFamily="18" charset="0"/>
+                <a:cs typeface="Times New Roman" panose="02020603050405020304" pitchFamily="18" charset="0"/>
+              </a:rPr>
+              <a:t>function</a:t>
+            </a:r>
+            <a:r>
+              <a:rPr lang="en-US" dirty="0">
+                <a:solidFill>
+                  <a:srgbClr val="000000"/>
+                </a:solidFill>
+                <a:latin typeface="Consolas" panose="020B0609020204030204" pitchFamily="49" charset="0"/>
+                <a:ea typeface="Times New Roman" panose="02020603050405020304" pitchFamily="18" charset="0"/>
+                <a:cs typeface="Times New Roman" panose="02020603050405020304" pitchFamily="18" charset="0"/>
+              </a:rPr>
+              <a:t> __() { </a:t>
+            </a:r>
+            <a:r>
+              <a:rPr lang="en-US" dirty="0" err="1">
+                <a:solidFill>
+                  <a:srgbClr val="0000FF"/>
+                </a:solidFill>
+                <a:latin typeface="Consolas" panose="020B0609020204030204" pitchFamily="49" charset="0"/>
+                <a:ea typeface="Times New Roman" panose="02020603050405020304" pitchFamily="18" charset="0"/>
+                <a:cs typeface="Times New Roman" panose="02020603050405020304" pitchFamily="18" charset="0"/>
+              </a:rPr>
+              <a:t>this</a:t>
+            </a:r>
+            <a:r>
+              <a:rPr lang="en-US" dirty="0" err="1">
+                <a:solidFill>
+                  <a:srgbClr val="000000"/>
+                </a:solidFill>
+                <a:latin typeface="Consolas" panose="020B0609020204030204" pitchFamily="49" charset="0"/>
+                <a:ea typeface="Times New Roman" panose="02020603050405020304" pitchFamily="18" charset="0"/>
+                <a:cs typeface="Times New Roman" panose="02020603050405020304" pitchFamily="18" charset="0"/>
+              </a:rPr>
+              <a:t>.constructor</a:t>
+            </a:r>
+            <a:r>
+              <a:rPr lang="en-US" dirty="0">
+                <a:solidFill>
+                  <a:srgbClr val="000000"/>
+                </a:solidFill>
+                <a:latin typeface="Consolas" panose="020B0609020204030204" pitchFamily="49" charset="0"/>
+                <a:ea typeface="Times New Roman" panose="02020603050405020304" pitchFamily="18" charset="0"/>
+                <a:cs typeface="Times New Roman" panose="02020603050405020304" pitchFamily="18" charset="0"/>
+              </a:rPr>
+              <a:t> = d; }</a:t>
+            </a:r>
+            <a:endParaRPr lang="en-US" sz="2400" dirty="0">
+              <a:latin typeface="Calibri" panose="020F0502020204030204" pitchFamily="34" charset="0"/>
+              <a:ea typeface="Calibri" panose="020F0502020204030204" pitchFamily="34" charset="0"/>
+              <a:cs typeface="Times New Roman" panose="02020603050405020304" pitchFamily="18" charset="0"/>
+            </a:endParaRPr>
+          </a:p>
+          <a:p>
+            <a:pPr>
+              <a:lnSpc>
+                <a:spcPct val="107000"/>
+              </a:lnSpc>
+              <a:tabLst>
+                <a:tab pos="581660" algn="l"/>
+                <a:tab pos="1163320" algn="l"/>
+                <a:tab pos="1744980" algn="l"/>
+                <a:tab pos="2326640" algn="l"/>
+                <a:tab pos="2908300" algn="l"/>
+                <a:tab pos="3489960" algn="l"/>
+                <a:tab pos="4071620" algn="l"/>
+                <a:tab pos="4653280" algn="l"/>
+                <a:tab pos="5234940" algn="l"/>
+                <a:tab pos="5816600" algn="l"/>
+                <a:tab pos="6398260" algn="l"/>
+                <a:tab pos="6979920" algn="l"/>
+                <a:tab pos="7561580" algn="l"/>
+                <a:tab pos="8143240" algn="l"/>
+                <a:tab pos="8724900" algn="l"/>
+                <a:tab pos="9306560" algn="l"/>
+              </a:tabLst>
+            </a:pPr>
+            <a:r>
+              <a:rPr lang="en-US" dirty="0">
+                <a:solidFill>
+                  <a:srgbClr val="000000"/>
+                </a:solidFill>
+                <a:latin typeface="Consolas" panose="020B0609020204030204" pitchFamily="49" charset="0"/>
+                <a:ea typeface="Times New Roman" panose="02020603050405020304" pitchFamily="18" charset="0"/>
+                <a:cs typeface="Times New Roman" panose="02020603050405020304" pitchFamily="18" charset="0"/>
+              </a:rPr>
+              <a:t>    __.prototype = </a:t>
+            </a:r>
+            <a:r>
+              <a:rPr lang="en-US" dirty="0" err="1">
+                <a:solidFill>
+                  <a:srgbClr val="000000"/>
+                </a:solidFill>
+                <a:latin typeface="Consolas" panose="020B0609020204030204" pitchFamily="49" charset="0"/>
+                <a:ea typeface="Times New Roman" panose="02020603050405020304" pitchFamily="18" charset="0"/>
+                <a:cs typeface="Times New Roman" panose="02020603050405020304" pitchFamily="18" charset="0"/>
+              </a:rPr>
+              <a:t>b.prototype</a:t>
+            </a:r>
+            <a:r>
+              <a:rPr lang="en-US" dirty="0">
+                <a:solidFill>
+                  <a:srgbClr val="000000"/>
+                </a:solidFill>
+                <a:latin typeface="Consolas" panose="020B0609020204030204" pitchFamily="49" charset="0"/>
+                <a:ea typeface="Times New Roman" panose="02020603050405020304" pitchFamily="18" charset="0"/>
+                <a:cs typeface="Times New Roman" panose="02020603050405020304" pitchFamily="18" charset="0"/>
+              </a:rPr>
+              <a:t>;</a:t>
+            </a:r>
+            <a:endParaRPr lang="en-US" sz="2400" dirty="0">
+              <a:latin typeface="Calibri" panose="020F0502020204030204" pitchFamily="34" charset="0"/>
+              <a:ea typeface="Calibri" panose="020F0502020204030204" pitchFamily="34" charset="0"/>
+              <a:cs typeface="Times New Roman" panose="02020603050405020304" pitchFamily="18" charset="0"/>
+            </a:endParaRPr>
+          </a:p>
+          <a:p>
+            <a:pPr>
+              <a:lnSpc>
+                <a:spcPct val="107000"/>
+              </a:lnSpc>
+              <a:tabLst>
+                <a:tab pos="581660" algn="l"/>
+                <a:tab pos="1163320" algn="l"/>
+                <a:tab pos="1744980" algn="l"/>
+                <a:tab pos="2326640" algn="l"/>
+                <a:tab pos="2908300" algn="l"/>
+                <a:tab pos="3489960" algn="l"/>
+                <a:tab pos="4071620" algn="l"/>
+                <a:tab pos="4653280" algn="l"/>
+                <a:tab pos="5234940" algn="l"/>
+                <a:tab pos="5816600" algn="l"/>
+                <a:tab pos="6398260" algn="l"/>
+                <a:tab pos="6979920" algn="l"/>
+                <a:tab pos="7561580" algn="l"/>
+                <a:tab pos="8143240" algn="l"/>
+                <a:tab pos="8724900" algn="l"/>
+                <a:tab pos="9306560" algn="l"/>
+              </a:tabLst>
+            </a:pPr>
+            <a:r>
+              <a:rPr lang="en-US" dirty="0">
+                <a:solidFill>
+                  <a:srgbClr val="000000"/>
+                </a:solidFill>
+                <a:latin typeface="Consolas" panose="020B0609020204030204" pitchFamily="49" charset="0"/>
+                <a:ea typeface="Times New Roman" panose="02020603050405020304" pitchFamily="18" charset="0"/>
+                <a:cs typeface="Times New Roman" panose="02020603050405020304" pitchFamily="18" charset="0"/>
+              </a:rPr>
+              <a:t>    </a:t>
+            </a:r>
+            <a:r>
+              <a:rPr lang="en-US" dirty="0" err="1">
+                <a:solidFill>
+                  <a:srgbClr val="000000"/>
+                </a:solidFill>
+                <a:latin typeface="Consolas" panose="020B0609020204030204" pitchFamily="49" charset="0"/>
+                <a:ea typeface="Times New Roman" panose="02020603050405020304" pitchFamily="18" charset="0"/>
+                <a:cs typeface="Times New Roman" panose="02020603050405020304" pitchFamily="18" charset="0"/>
+              </a:rPr>
+              <a:t>d.prototype</a:t>
+            </a:r>
+            <a:r>
+              <a:rPr lang="en-US" dirty="0">
+                <a:solidFill>
+                  <a:srgbClr val="000000"/>
+                </a:solidFill>
+                <a:latin typeface="Consolas" panose="020B0609020204030204" pitchFamily="49" charset="0"/>
+                <a:ea typeface="Times New Roman" panose="02020603050405020304" pitchFamily="18" charset="0"/>
+                <a:cs typeface="Times New Roman" panose="02020603050405020304" pitchFamily="18" charset="0"/>
+              </a:rPr>
+              <a:t> = </a:t>
+            </a:r>
+            <a:r>
+              <a:rPr lang="en-US" dirty="0">
+                <a:solidFill>
+                  <a:srgbClr val="0000FF"/>
+                </a:solidFill>
+                <a:latin typeface="Consolas" panose="020B0609020204030204" pitchFamily="49" charset="0"/>
+                <a:ea typeface="Times New Roman" panose="02020603050405020304" pitchFamily="18" charset="0"/>
+                <a:cs typeface="Times New Roman" panose="02020603050405020304" pitchFamily="18" charset="0"/>
+              </a:rPr>
+              <a:t>new</a:t>
+            </a:r>
+            <a:r>
+              <a:rPr lang="en-US" dirty="0">
+                <a:solidFill>
+                  <a:srgbClr val="000000"/>
+                </a:solidFill>
+                <a:latin typeface="Consolas" panose="020B0609020204030204" pitchFamily="49" charset="0"/>
+                <a:ea typeface="Times New Roman" panose="02020603050405020304" pitchFamily="18" charset="0"/>
+                <a:cs typeface="Times New Roman" panose="02020603050405020304" pitchFamily="18" charset="0"/>
+              </a:rPr>
+              <a:t> __();</a:t>
+            </a:r>
+            <a:endParaRPr lang="en-US" sz="2400" dirty="0">
+              <a:latin typeface="Calibri" panose="020F0502020204030204" pitchFamily="34" charset="0"/>
+              <a:ea typeface="Calibri" panose="020F0502020204030204" pitchFamily="34" charset="0"/>
+              <a:cs typeface="Times New Roman" panose="02020603050405020304" pitchFamily="18" charset="0"/>
+            </a:endParaRPr>
+          </a:p>
+          <a:p>
+            <a:pPr>
+              <a:lnSpc>
+                <a:spcPct val="107000"/>
+              </a:lnSpc>
+              <a:tabLst>
+                <a:tab pos="581660" algn="l"/>
+                <a:tab pos="1163320" algn="l"/>
+                <a:tab pos="1744980" algn="l"/>
+                <a:tab pos="2326640" algn="l"/>
+                <a:tab pos="2908300" algn="l"/>
+                <a:tab pos="3489960" algn="l"/>
+                <a:tab pos="4071620" algn="l"/>
+                <a:tab pos="4653280" algn="l"/>
+                <a:tab pos="5234940" algn="l"/>
+                <a:tab pos="5816600" algn="l"/>
+                <a:tab pos="6398260" algn="l"/>
+                <a:tab pos="6979920" algn="l"/>
+                <a:tab pos="7561580" algn="l"/>
+                <a:tab pos="8143240" algn="l"/>
+                <a:tab pos="8724900" algn="l"/>
+                <a:tab pos="9306560" algn="l"/>
+              </a:tabLst>
+            </a:pPr>
+            <a:r>
+              <a:rPr lang="en-US" dirty="0">
+                <a:solidFill>
+                  <a:srgbClr val="000000"/>
+                </a:solidFill>
+                <a:latin typeface="Consolas" panose="020B0609020204030204" pitchFamily="49" charset="0"/>
+                <a:ea typeface="Times New Roman" panose="02020603050405020304" pitchFamily="18" charset="0"/>
+                <a:cs typeface="Times New Roman" panose="02020603050405020304" pitchFamily="18" charset="0"/>
+              </a:rPr>
+              <a:t>};</a:t>
+            </a:r>
+            <a:endParaRPr lang="en-US" dirty="0"/>
           </a:p>
         </p:txBody>
       </p:sp>
     </p:spTree>
     <p:extLst>
       <p:ext uri="{BB962C8B-B14F-4D97-AF65-F5344CB8AC3E}">
-        <p14:creationId xmlns:p14="http://schemas.microsoft.com/office/powerpoint/2010/main" val="828832119"/>
+        <p14:creationId xmlns:p14="http://schemas.microsoft.com/office/powerpoint/2010/main" val="2367603481"/>
+      </p:ext>
+    </p:extLst>
+  </p:cSld>
+  <p:clrMapOvr>
+    <a:masterClrMapping/>
+  </p:clrMapOvr>
+</p:sld>
+</file>
+
+<file path=ppt/slides/slide29.xml><?xml version="1.0" encoding="utf-8"?>
+<p:sld xmlns:a="http://schemas.openxmlformats.org/drawingml/2006/main" xmlns:r="http://schemas.openxmlformats.org/officeDocument/2006/relationships" xmlns:p="http://schemas.openxmlformats.org/presentationml/2006/main">
+  <p:cSld>
+    <p:spTree>
+      <p:nvGrpSpPr>
+        <p:cNvPr id="1" name=""/>
+        <p:cNvGrpSpPr/>
+        <p:nvPr/>
+      </p:nvGrpSpPr>
+      <p:grpSpPr>
+        <a:xfrm>
+          <a:off x="0" y="0"/>
+          <a:ext cx="0" cy="0"/>
+          <a:chOff x="0" y="0"/>
+          <a:chExt cx="0" cy="0"/>
+        </a:xfrm>
+      </p:grpSpPr>
+      <p:sp>
+        <p:nvSpPr>
+          <p:cNvPr id="4" name="Rectangle 3"/>
+          <p:cNvSpPr/>
+          <p:nvPr/>
+        </p:nvSpPr>
+        <p:spPr>
+          <a:xfrm>
+            <a:off x="505968" y="0"/>
+            <a:ext cx="9451848" cy="6809941"/>
+          </a:xfrm>
+          <a:prstGeom prst="rect">
+            <a:avLst/>
+          </a:prstGeom>
+        </p:spPr>
+        <p:txBody>
+          <a:bodyPr wrap="square">
+            <a:spAutoFit/>
+          </a:bodyPr>
+          <a:lstStyle/>
+          <a:p>
+            <a:pPr>
+              <a:lnSpc>
+                <a:spcPct val="107000"/>
+              </a:lnSpc>
+              <a:tabLst>
+                <a:tab pos="581660" algn="l"/>
+                <a:tab pos="1163320" algn="l"/>
+                <a:tab pos="1744980" algn="l"/>
+                <a:tab pos="2326640" algn="l"/>
+                <a:tab pos="2908300" algn="l"/>
+                <a:tab pos="3489960" algn="l"/>
+                <a:tab pos="4071620" algn="l"/>
+                <a:tab pos="4653280" algn="l"/>
+                <a:tab pos="5234940" algn="l"/>
+                <a:tab pos="5816600" algn="l"/>
+                <a:tab pos="6398260" algn="l"/>
+                <a:tab pos="6979920" algn="l"/>
+                <a:tab pos="7561580" algn="l"/>
+                <a:tab pos="8143240" algn="l"/>
+                <a:tab pos="8724900" algn="l"/>
+                <a:tab pos="9306560" algn="l"/>
+              </a:tabLst>
+            </a:pPr>
+            <a:endParaRPr lang="en-US" sz="2400" dirty="0">
+              <a:latin typeface="Calibri" panose="020F0502020204030204" pitchFamily="34" charset="0"/>
+              <a:ea typeface="Calibri" panose="020F0502020204030204" pitchFamily="34" charset="0"/>
+              <a:cs typeface="Times New Roman" panose="02020603050405020304" pitchFamily="18" charset="0"/>
+            </a:endParaRPr>
+          </a:p>
+          <a:p>
+            <a:pPr>
+              <a:lnSpc>
+                <a:spcPct val="107000"/>
+              </a:lnSpc>
+              <a:tabLst>
+                <a:tab pos="581660" algn="l"/>
+                <a:tab pos="1163320" algn="l"/>
+                <a:tab pos="1744980" algn="l"/>
+                <a:tab pos="2326640" algn="l"/>
+                <a:tab pos="2908300" algn="l"/>
+                <a:tab pos="3489960" algn="l"/>
+                <a:tab pos="4071620" algn="l"/>
+                <a:tab pos="4653280" algn="l"/>
+                <a:tab pos="5234940" algn="l"/>
+                <a:tab pos="5816600" algn="l"/>
+                <a:tab pos="6398260" algn="l"/>
+                <a:tab pos="6979920" algn="l"/>
+                <a:tab pos="7561580" algn="l"/>
+                <a:tab pos="8143240" algn="l"/>
+                <a:tab pos="8724900" algn="l"/>
+                <a:tab pos="9306560" algn="l"/>
+              </a:tabLst>
+            </a:pPr>
+            <a:r>
+              <a:rPr lang="en-US" dirty="0" err="1">
+                <a:solidFill>
+                  <a:srgbClr val="0000FF"/>
+                </a:solidFill>
+                <a:latin typeface="Consolas" panose="020B0609020204030204" pitchFamily="49" charset="0"/>
+                <a:ea typeface="Times New Roman" panose="02020603050405020304" pitchFamily="18" charset="0"/>
+                <a:cs typeface="Times New Roman" panose="02020603050405020304" pitchFamily="18" charset="0"/>
+              </a:rPr>
+              <a:t>var</a:t>
+            </a:r>
+            <a:r>
+              <a:rPr lang="en-US" dirty="0">
+                <a:solidFill>
+                  <a:srgbClr val="000000"/>
+                </a:solidFill>
+                <a:latin typeface="Consolas" panose="020B0609020204030204" pitchFamily="49" charset="0"/>
+                <a:ea typeface="Times New Roman" panose="02020603050405020304" pitchFamily="18" charset="0"/>
+                <a:cs typeface="Times New Roman" panose="02020603050405020304" pitchFamily="18" charset="0"/>
+              </a:rPr>
+              <a:t> </a:t>
+            </a:r>
+            <a:r>
+              <a:rPr lang="en-US" dirty="0" err="1">
+                <a:solidFill>
+                  <a:srgbClr val="000000"/>
+                </a:solidFill>
+                <a:latin typeface="Consolas" panose="020B0609020204030204" pitchFamily="49" charset="0"/>
+                <a:ea typeface="Times New Roman" panose="02020603050405020304" pitchFamily="18" charset="0"/>
+                <a:cs typeface="Times New Roman" panose="02020603050405020304" pitchFamily="18" charset="0"/>
+              </a:rPr>
+              <a:t>BaseClass</a:t>
+            </a:r>
+            <a:r>
+              <a:rPr lang="en-US" dirty="0">
+                <a:solidFill>
+                  <a:srgbClr val="000000"/>
+                </a:solidFill>
+                <a:latin typeface="Consolas" panose="020B0609020204030204" pitchFamily="49" charset="0"/>
+                <a:ea typeface="Times New Roman" panose="02020603050405020304" pitchFamily="18" charset="0"/>
+                <a:cs typeface="Times New Roman" panose="02020603050405020304" pitchFamily="18" charset="0"/>
+              </a:rPr>
+              <a:t> = (</a:t>
+            </a:r>
+            <a:r>
+              <a:rPr lang="en-US" dirty="0">
+                <a:solidFill>
+                  <a:srgbClr val="0000FF"/>
+                </a:solidFill>
+                <a:latin typeface="Consolas" panose="020B0609020204030204" pitchFamily="49" charset="0"/>
+                <a:ea typeface="Times New Roman" panose="02020603050405020304" pitchFamily="18" charset="0"/>
+                <a:cs typeface="Times New Roman" panose="02020603050405020304" pitchFamily="18" charset="0"/>
+              </a:rPr>
+              <a:t>function</a:t>
+            </a:r>
+            <a:r>
+              <a:rPr lang="en-US" dirty="0">
+                <a:solidFill>
+                  <a:srgbClr val="000000"/>
+                </a:solidFill>
+                <a:latin typeface="Consolas" panose="020B0609020204030204" pitchFamily="49" charset="0"/>
+                <a:ea typeface="Times New Roman" panose="02020603050405020304" pitchFamily="18" charset="0"/>
+                <a:cs typeface="Times New Roman" panose="02020603050405020304" pitchFamily="18" charset="0"/>
+              </a:rPr>
+              <a:t> () {</a:t>
+            </a:r>
+            <a:endParaRPr lang="en-US" sz="2400" dirty="0">
+              <a:latin typeface="Calibri" panose="020F0502020204030204" pitchFamily="34" charset="0"/>
+              <a:ea typeface="Calibri" panose="020F0502020204030204" pitchFamily="34" charset="0"/>
+              <a:cs typeface="Times New Roman" panose="02020603050405020304" pitchFamily="18" charset="0"/>
+            </a:endParaRPr>
+          </a:p>
+          <a:p>
+            <a:pPr>
+              <a:lnSpc>
+                <a:spcPct val="107000"/>
+              </a:lnSpc>
+              <a:tabLst>
+                <a:tab pos="581660" algn="l"/>
+                <a:tab pos="1163320" algn="l"/>
+                <a:tab pos="1744980" algn="l"/>
+                <a:tab pos="2326640" algn="l"/>
+                <a:tab pos="2908300" algn="l"/>
+                <a:tab pos="3489960" algn="l"/>
+                <a:tab pos="4071620" algn="l"/>
+                <a:tab pos="4653280" algn="l"/>
+                <a:tab pos="5234940" algn="l"/>
+                <a:tab pos="5816600" algn="l"/>
+                <a:tab pos="6398260" algn="l"/>
+                <a:tab pos="6979920" algn="l"/>
+                <a:tab pos="7561580" algn="l"/>
+                <a:tab pos="8143240" algn="l"/>
+                <a:tab pos="8724900" algn="l"/>
+                <a:tab pos="9306560" algn="l"/>
+              </a:tabLst>
+            </a:pPr>
+            <a:r>
+              <a:rPr lang="en-US" dirty="0">
+                <a:solidFill>
+                  <a:srgbClr val="000000"/>
+                </a:solidFill>
+                <a:latin typeface="Consolas" panose="020B0609020204030204" pitchFamily="49" charset="0"/>
+                <a:ea typeface="Times New Roman" panose="02020603050405020304" pitchFamily="18" charset="0"/>
+                <a:cs typeface="Times New Roman" panose="02020603050405020304" pitchFamily="18" charset="0"/>
+              </a:rPr>
+              <a:t>    </a:t>
+            </a:r>
+            <a:r>
+              <a:rPr lang="en-US" dirty="0">
+                <a:solidFill>
+                  <a:srgbClr val="0000FF"/>
+                </a:solidFill>
+                <a:latin typeface="Consolas" panose="020B0609020204030204" pitchFamily="49" charset="0"/>
+                <a:ea typeface="Times New Roman" panose="02020603050405020304" pitchFamily="18" charset="0"/>
+                <a:cs typeface="Times New Roman" panose="02020603050405020304" pitchFamily="18" charset="0"/>
+              </a:rPr>
+              <a:t>function</a:t>
+            </a:r>
+            <a:r>
+              <a:rPr lang="en-US" dirty="0">
+                <a:solidFill>
+                  <a:srgbClr val="000000"/>
+                </a:solidFill>
+                <a:latin typeface="Consolas" panose="020B0609020204030204" pitchFamily="49" charset="0"/>
+                <a:ea typeface="Times New Roman" panose="02020603050405020304" pitchFamily="18" charset="0"/>
+                <a:cs typeface="Times New Roman" panose="02020603050405020304" pitchFamily="18" charset="0"/>
+              </a:rPr>
+              <a:t> </a:t>
+            </a:r>
+            <a:r>
+              <a:rPr lang="en-US" dirty="0" err="1">
+                <a:solidFill>
+                  <a:srgbClr val="000000"/>
+                </a:solidFill>
+                <a:latin typeface="Consolas" panose="020B0609020204030204" pitchFamily="49" charset="0"/>
+                <a:ea typeface="Times New Roman" panose="02020603050405020304" pitchFamily="18" charset="0"/>
+                <a:cs typeface="Times New Roman" panose="02020603050405020304" pitchFamily="18" charset="0"/>
+              </a:rPr>
+              <a:t>BaseClass</a:t>
+            </a:r>
+            <a:r>
+              <a:rPr lang="en-US" dirty="0">
+                <a:solidFill>
+                  <a:srgbClr val="000000"/>
+                </a:solidFill>
+                <a:latin typeface="Consolas" panose="020B0609020204030204" pitchFamily="49" charset="0"/>
+                <a:ea typeface="Times New Roman" panose="02020603050405020304" pitchFamily="18" charset="0"/>
+                <a:cs typeface="Times New Roman" panose="02020603050405020304" pitchFamily="18" charset="0"/>
+              </a:rPr>
+              <a:t>(value) {</a:t>
+            </a:r>
+            <a:endParaRPr lang="en-US" sz="2400" dirty="0">
+              <a:latin typeface="Calibri" panose="020F0502020204030204" pitchFamily="34" charset="0"/>
+              <a:ea typeface="Calibri" panose="020F0502020204030204" pitchFamily="34" charset="0"/>
+              <a:cs typeface="Times New Roman" panose="02020603050405020304" pitchFamily="18" charset="0"/>
+            </a:endParaRPr>
+          </a:p>
+          <a:p>
+            <a:pPr>
+              <a:lnSpc>
+                <a:spcPct val="107000"/>
+              </a:lnSpc>
+              <a:tabLst>
+                <a:tab pos="581660" algn="l"/>
+                <a:tab pos="1163320" algn="l"/>
+                <a:tab pos="1744980" algn="l"/>
+                <a:tab pos="2326640" algn="l"/>
+                <a:tab pos="2908300" algn="l"/>
+                <a:tab pos="3489960" algn="l"/>
+                <a:tab pos="4071620" algn="l"/>
+                <a:tab pos="4653280" algn="l"/>
+                <a:tab pos="5234940" algn="l"/>
+                <a:tab pos="5816600" algn="l"/>
+                <a:tab pos="6398260" algn="l"/>
+                <a:tab pos="6979920" algn="l"/>
+                <a:tab pos="7561580" algn="l"/>
+                <a:tab pos="8143240" algn="l"/>
+                <a:tab pos="8724900" algn="l"/>
+                <a:tab pos="9306560" algn="l"/>
+              </a:tabLst>
+            </a:pPr>
+            <a:r>
+              <a:rPr lang="en-US" dirty="0">
+                <a:solidFill>
+                  <a:srgbClr val="000000"/>
+                </a:solidFill>
+                <a:latin typeface="Consolas" panose="020B0609020204030204" pitchFamily="49" charset="0"/>
+                <a:ea typeface="Times New Roman" panose="02020603050405020304" pitchFamily="18" charset="0"/>
+                <a:cs typeface="Times New Roman" panose="02020603050405020304" pitchFamily="18" charset="0"/>
+              </a:rPr>
+              <a:t>        </a:t>
+            </a:r>
+            <a:r>
+              <a:rPr lang="en-US" dirty="0" err="1">
+                <a:solidFill>
+                  <a:srgbClr val="0000FF"/>
+                </a:solidFill>
+                <a:latin typeface="Consolas" panose="020B0609020204030204" pitchFamily="49" charset="0"/>
+                <a:ea typeface="Times New Roman" panose="02020603050405020304" pitchFamily="18" charset="0"/>
+                <a:cs typeface="Times New Roman" panose="02020603050405020304" pitchFamily="18" charset="0"/>
+              </a:rPr>
+              <a:t>this</a:t>
+            </a:r>
+            <a:r>
+              <a:rPr lang="en-US" dirty="0" err="1">
+                <a:solidFill>
+                  <a:srgbClr val="000000"/>
+                </a:solidFill>
+                <a:latin typeface="Consolas" panose="020B0609020204030204" pitchFamily="49" charset="0"/>
+                <a:ea typeface="Times New Roman" panose="02020603050405020304" pitchFamily="18" charset="0"/>
+                <a:cs typeface="Times New Roman" panose="02020603050405020304" pitchFamily="18" charset="0"/>
+              </a:rPr>
+              <a:t>.value</a:t>
+            </a:r>
+            <a:r>
+              <a:rPr lang="en-US" dirty="0">
+                <a:solidFill>
+                  <a:srgbClr val="000000"/>
+                </a:solidFill>
+                <a:latin typeface="Consolas" panose="020B0609020204030204" pitchFamily="49" charset="0"/>
+                <a:ea typeface="Times New Roman" panose="02020603050405020304" pitchFamily="18" charset="0"/>
+                <a:cs typeface="Times New Roman" panose="02020603050405020304" pitchFamily="18" charset="0"/>
+              </a:rPr>
+              <a:t> = value;</a:t>
+            </a:r>
+            <a:endParaRPr lang="en-US" sz="2400" dirty="0">
+              <a:latin typeface="Calibri" panose="020F0502020204030204" pitchFamily="34" charset="0"/>
+              <a:ea typeface="Calibri" panose="020F0502020204030204" pitchFamily="34" charset="0"/>
+              <a:cs typeface="Times New Roman" panose="02020603050405020304" pitchFamily="18" charset="0"/>
+            </a:endParaRPr>
+          </a:p>
+          <a:p>
+            <a:pPr>
+              <a:lnSpc>
+                <a:spcPct val="107000"/>
+              </a:lnSpc>
+              <a:tabLst>
+                <a:tab pos="581660" algn="l"/>
+                <a:tab pos="1163320" algn="l"/>
+                <a:tab pos="1744980" algn="l"/>
+                <a:tab pos="2326640" algn="l"/>
+                <a:tab pos="2908300" algn="l"/>
+                <a:tab pos="3489960" algn="l"/>
+                <a:tab pos="4071620" algn="l"/>
+                <a:tab pos="4653280" algn="l"/>
+                <a:tab pos="5234940" algn="l"/>
+                <a:tab pos="5816600" algn="l"/>
+                <a:tab pos="6398260" algn="l"/>
+                <a:tab pos="6979920" algn="l"/>
+                <a:tab pos="7561580" algn="l"/>
+                <a:tab pos="8143240" algn="l"/>
+                <a:tab pos="8724900" algn="l"/>
+                <a:tab pos="9306560" algn="l"/>
+              </a:tabLst>
+            </a:pPr>
+            <a:r>
+              <a:rPr lang="en-US" dirty="0">
+                <a:solidFill>
+                  <a:srgbClr val="000000"/>
+                </a:solidFill>
+                <a:latin typeface="Consolas" panose="020B0609020204030204" pitchFamily="49" charset="0"/>
+                <a:ea typeface="Times New Roman" panose="02020603050405020304" pitchFamily="18" charset="0"/>
+                <a:cs typeface="Times New Roman" panose="02020603050405020304" pitchFamily="18" charset="0"/>
+              </a:rPr>
+              <a:t>    }</a:t>
+            </a:r>
+            <a:endParaRPr lang="en-US" sz="2400" dirty="0">
+              <a:latin typeface="Calibri" panose="020F0502020204030204" pitchFamily="34" charset="0"/>
+              <a:ea typeface="Calibri" panose="020F0502020204030204" pitchFamily="34" charset="0"/>
+              <a:cs typeface="Times New Roman" panose="02020603050405020304" pitchFamily="18" charset="0"/>
+            </a:endParaRPr>
+          </a:p>
+          <a:p>
+            <a:pPr>
+              <a:lnSpc>
+                <a:spcPct val="107000"/>
+              </a:lnSpc>
+              <a:tabLst>
+                <a:tab pos="581660" algn="l"/>
+                <a:tab pos="1163320" algn="l"/>
+                <a:tab pos="1744980" algn="l"/>
+                <a:tab pos="2326640" algn="l"/>
+                <a:tab pos="2908300" algn="l"/>
+                <a:tab pos="3489960" algn="l"/>
+                <a:tab pos="4071620" algn="l"/>
+                <a:tab pos="4653280" algn="l"/>
+                <a:tab pos="5234940" algn="l"/>
+                <a:tab pos="5816600" algn="l"/>
+                <a:tab pos="6398260" algn="l"/>
+                <a:tab pos="6979920" algn="l"/>
+                <a:tab pos="7561580" algn="l"/>
+                <a:tab pos="8143240" algn="l"/>
+                <a:tab pos="8724900" algn="l"/>
+                <a:tab pos="9306560" algn="l"/>
+              </a:tabLst>
+            </a:pPr>
+            <a:r>
+              <a:rPr lang="en-US" dirty="0">
+                <a:solidFill>
+                  <a:srgbClr val="000000"/>
+                </a:solidFill>
+                <a:latin typeface="Consolas" panose="020B0609020204030204" pitchFamily="49" charset="0"/>
+                <a:ea typeface="Times New Roman" panose="02020603050405020304" pitchFamily="18" charset="0"/>
+                <a:cs typeface="Times New Roman" panose="02020603050405020304" pitchFamily="18" charset="0"/>
+              </a:rPr>
+              <a:t>    </a:t>
+            </a:r>
+            <a:r>
+              <a:rPr lang="en-US" dirty="0" err="1">
+                <a:solidFill>
+                  <a:srgbClr val="000000"/>
+                </a:solidFill>
+                <a:latin typeface="Consolas" panose="020B0609020204030204" pitchFamily="49" charset="0"/>
+                <a:ea typeface="Times New Roman" panose="02020603050405020304" pitchFamily="18" charset="0"/>
+                <a:cs typeface="Times New Roman" panose="02020603050405020304" pitchFamily="18" charset="0"/>
+              </a:rPr>
+              <a:t>BaseClass.prototype.getValue</a:t>
+            </a:r>
+            <a:r>
+              <a:rPr lang="en-US" dirty="0">
+                <a:solidFill>
+                  <a:srgbClr val="000000"/>
+                </a:solidFill>
+                <a:latin typeface="Consolas" panose="020B0609020204030204" pitchFamily="49" charset="0"/>
+                <a:ea typeface="Times New Roman" panose="02020603050405020304" pitchFamily="18" charset="0"/>
+                <a:cs typeface="Times New Roman" panose="02020603050405020304" pitchFamily="18" charset="0"/>
+              </a:rPr>
+              <a:t> = </a:t>
+            </a:r>
+            <a:r>
+              <a:rPr lang="en-US" dirty="0">
+                <a:solidFill>
+                  <a:srgbClr val="0000FF"/>
+                </a:solidFill>
+                <a:latin typeface="Consolas" panose="020B0609020204030204" pitchFamily="49" charset="0"/>
+                <a:ea typeface="Times New Roman" panose="02020603050405020304" pitchFamily="18" charset="0"/>
+                <a:cs typeface="Times New Roman" panose="02020603050405020304" pitchFamily="18" charset="0"/>
+              </a:rPr>
+              <a:t>function</a:t>
+            </a:r>
+            <a:r>
+              <a:rPr lang="en-US" dirty="0">
+                <a:solidFill>
+                  <a:srgbClr val="000000"/>
+                </a:solidFill>
+                <a:latin typeface="Consolas" panose="020B0609020204030204" pitchFamily="49" charset="0"/>
+                <a:ea typeface="Times New Roman" panose="02020603050405020304" pitchFamily="18" charset="0"/>
+                <a:cs typeface="Times New Roman" panose="02020603050405020304" pitchFamily="18" charset="0"/>
+              </a:rPr>
+              <a:t> () {</a:t>
+            </a:r>
+            <a:endParaRPr lang="en-US" sz="2400" dirty="0">
+              <a:latin typeface="Calibri" panose="020F0502020204030204" pitchFamily="34" charset="0"/>
+              <a:ea typeface="Calibri" panose="020F0502020204030204" pitchFamily="34" charset="0"/>
+              <a:cs typeface="Times New Roman" panose="02020603050405020304" pitchFamily="18" charset="0"/>
+            </a:endParaRPr>
+          </a:p>
+          <a:p>
+            <a:pPr>
+              <a:lnSpc>
+                <a:spcPct val="107000"/>
+              </a:lnSpc>
+              <a:tabLst>
+                <a:tab pos="581660" algn="l"/>
+                <a:tab pos="1163320" algn="l"/>
+                <a:tab pos="1744980" algn="l"/>
+                <a:tab pos="2326640" algn="l"/>
+                <a:tab pos="2908300" algn="l"/>
+                <a:tab pos="3489960" algn="l"/>
+                <a:tab pos="4071620" algn="l"/>
+                <a:tab pos="4653280" algn="l"/>
+                <a:tab pos="5234940" algn="l"/>
+                <a:tab pos="5816600" algn="l"/>
+                <a:tab pos="6398260" algn="l"/>
+                <a:tab pos="6979920" algn="l"/>
+                <a:tab pos="7561580" algn="l"/>
+                <a:tab pos="8143240" algn="l"/>
+                <a:tab pos="8724900" algn="l"/>
+                <a:tab pos="9306560" algn="l"/>
+              </a:tabLst>
+            </a:pPr>
+            <a:r>
+              <a:rPr lang="en-US" dirty="0">
+                <a:solidFill>
+                  <a:srgbClr val="000000"/>
+                </a:solidFill>
+                <a:latin typeface="Consolas" panose="020B0609020204030204" pitchFamily="49" charset="0"/>
+                <a:ea typeface="Times New Roman" panose="02020603050405020304" pitchFamily="18" charset="0"/>
+                <a:cs typeface="Times New Roman" panose="02020603050405020304" pitchFamily="18" charset="0"/>
+              </a:rPr>
+              <a:t>        </a:t>
+            </a:r>
+            <a:r>
+              <a:rPr lang="en-US" dirty="0">
+                <a:solidFill>
+                  <a:srgbClr val="0000FF"/>
+                </a:solidFill>
+                <a:latin typeface="Consolas" panose="020B0609020204030204" pitchFamily="49" charset="0"/>
+                <a:ea typeface="Times New Roman" panose="02020603050405020304" pitchFamily="18" charset="0"/>
+                <a:cs typeface="Times New Roman" panose="02020603050405020304" pitchFamily="18" charset="0"/>
+              </a:rPr>
+              <a:t>return</a:t>
+            </a:r>
+            <a:r>
+              <a:rPr lang="en-US" dirty="0">
+                <a:solidFill>
+                  <a:srgbClr val="000000"/>
+                </a:solidFill>
+                <a:latin typeface="Consolas" panose="020B0609020204030204" pitchFamily="49" charset="0"/>
+                <a:ea typeface="Times New Roman" panose="02020603050405020304" pitchFamily="18" charset="0"/>
+                <a:cs typeface="Times New Roman" panose="02020603050405020304" pitchFamily="18" charset="0"/>
+              </a:rPr>
+              <a:t> </a:t>
+            </a:r>
+            <a:r>
+              <a:rPr lang="en-US" dirty="0" err="1">
+                <a:solidFill>
+                  <a:srgbClr val="0000FF"/>
+                </a:solidFill>
+                <a:latin typeface="Consolas" panose="020B0609020204030204" pitchFamily="49" charset="0"/>
+                <a:ea typeface="Times New Roman" panose="02020603050405020304" pitchFamily="18" charset="0"/>
+                <a:cs typeface="Times New Roman" panose="02020603050405020304" pitchFamily="18" charset="0"/>
+              </a:rPr>
+              <a:t>this</a:t>
+            </a:r>
+            <a:r>
+              <a:rPr lang="en-US" dirty="0" err="1">
+                <a:solidFill>
+                  <a:srgbClr val="000000"/>
+                </a:solidFill>
+                <a:latin typeface="Consolas" panose="020B0609020204030204" pitchFamily="49" charset="0"/>
+                <a:ea typeface="Times New Roman" panose="02020603050405020304" pitchFamily="18" charset="0"/>
+                <a:cs typeface="Times New Roman" panose="02020603050405020304" pitchFamily="18" charset="0"/>
+              </a:rPr>
+              <a:t>.value</a:t>
+            </a:r>
+            <a:r>
+              <a:rPr lang="en-US" dirty="0">
+                <a:solidFill>
+                  <a:srgbClr val="000000"/>
+                </a:solidFill>
+                <a:latin typeface="Consolas" panose="020B0609020204030204" pitchFamily="49" charset="0"/>
+                <a:ea typeface="Times New Roman" panose="02020603050405020304" pitchFamily="18" charset="0"/>
+                <a:cs typeface="Times New Roman" panose="02020603050405020304" pitchFamily="18" charset="0"/>
+              </a:rPr>
+              <a:t>;</a:t>
+            </a:r>
+            <a:endParaRPr lang="en-US" sz="2400" dirty="0">
+              <a:latin typeface="Calibri" panose="020F0502020204030204" pitchFamily="34" charset="0"/>
+              <a:ea typeface="Calibri" panose="020F0502020204030204" pitchFamily="34" charset="0"/>
+              <a:cs typeface="Times New Roman" panose="02020603050405020304" pitchFamily="18" charset="0"/>
+            </a:endParaRPr>
+          </a:p>
+          <a:p>
+            <a:pPr>
+              <a:lnSpc>
+                <a:spcPct val="107000"/>
+              </a:lnSpc>
+              <a:tabLst>
+                <a:tab pos="581660" algn="l"/>
+                <a:tab pos="1163320" algn="l"/>
+                <a:tab pos="1744980" algn="l"/>
+                <a:tab pos="2326640" algn="l"/>
+                <a:tab pos="2908300" algn="l"/>
+                <a:tab pos="3489960" algn="l"/>
+                <a:tab pos="4071620" algn="l"/>
+                <a:tab pos="4653280" algn="l"/>
+                <a:tab pos="5234940" algn="l"/>
+                <a:tab pos="5816600" algn="l"/>
+                <a:tab pos="6398260" algn="l"/>
+                <a:tab pos="6979920" algn="l"/>
+                <a:tab pos="7561580" algn="l"/>
+                <a:tab pos="8143240" algn="l"/>
+                <a:tab pos="8724900" algn="l"/>
+                <a:tab pos="9306560" algn="l"/>
+              </a:tabLst>
+            </a:pPr>
+            <a:r>
+              <a:rPr lang="en-US" dirty="0">
+                <a:solidFill>
+                  <a:srgbClr val="000000"/>
+                </a:solidFill>
+                <a:latin typeface="Consolas" panose="020B0609020204030204" pitchFamily="49" charset="0"/>
+                <a:ea typeface="Times New Roman" panose="02020603050405020304" pitchFamily="18" charset="0"/>
+                <a:cs typeface="Times New Roman" panose="02020603050405020304" pitchFamily="18" charset="0"/>
+              </a:rPr>
+              <a:t>    };</a:t>
+            </a:r>
+            <a:endParaRPr lang="en-US" sz="2400" dirty="0">
+              <a:latin typeface="Calibri" panose="020F0502020204030204" pitchFamily="34" charset="0"/>
+              <a:ea typeface="Calibri" panose="020F0502020204030204" pitchFamily="34" charset="0"/>
+              <a:cs typeface="Times New Roman" panose="02020603050405020304" pitchFamily="18" charset="0"/>
+            </a:endParaRPr>
+          </a:p>
+          <a:p>
+            <a:pPr>
+              <a:lnSpc>
+                <a:spcPct val="107000"/>
+              </a:lnSpc>
+              <a:tabLst>
+                <a:tab pos="581660" algn="l"/>
+                <a:tab pos="1163320" algn="l"/>
+                <a:tab pos="1744980" algn="l"/>
+                <a:tab pos="2326640" algn="l"/>
+                <a:tab pos="2908300" algn="l"/>
+                <a:tab pos="3489960" algn="l"/>
+                <a:tab pos="4071620" algn="l"/>
+                <a:tab pos="4653280" algn="l"/>
+                <a:tab pos="5234940" algn="l"/>
+                <a:tab pos="5816600" algn="l"/>
+                <a:tab pos="6398260" algn="l"/>
+                <a:tab pos="6979920" algn="l"/>
+                <a:tab pos="7561580" algn="l"/>
+                <a:tab pos="8143240" algn="l"/>
+                <a:tab pos="8724900" algn="l"/>
+                <a:tab pos="9306560" algn="l"/>
+              </a:tabLst>
+            </a:pPr>
+            <a:r>
+              <a:rPr lang="en-US" dirty="0">
+                <a:solidFill>
+                  <a:srgbClr val="000000"/>
+                </a:solidFill>
+                <a:latin typeface="Consolas" panose="020B0609020204030204" pitchFamily="49" charset="0"/>
+                <a:ea typeface="Times New Roman" panose="02020603050405020304" pitchFamily="18" charset="0"/>
+                <a:cs typeface="Times New Roman" panose="02020603050405020304" pitchFamily="18" charset="0"/>
+              </a:rPr>
+              <a:t>    </a:t>
+            </a:r>
+            <a:r>
+              <a:rPr lang="en-US" dirty="0">
+                <a:solidFill>
+                  <a:srgbClr val="0000FF"/>
+                </a:solidFill>
+                <a:latin typeface="Consolas" panose="020B0609020204030204" pitchFamily="49" charset="0"/>
+                <a:ea typeface="Times New Roman" panose="02020603050405020304" pitchFamily="18" charset="0"/>
+                <a:cs typeface="Times New Roman" panose="02020603050405020304" pitchFamily="18" charset="0"/>
+              </a:rPr>
+              <a:t>return</a:t>
+            </a:r>
+            <a:r>
+              <a:rPr lang="en-US" dirty="0">
+                <a:solidFill>
+                  <a:srgbClr val="000000"/>
+                </a:solidFill>
+                <a:latin typeface="Consolas" panose="020B0609020204030204" pitchFamily="49" charset="0"/>
+                <a:ea typeface="Times New Roman" panose="02020603050405020304" pitchFamily="18" charset="0"/>
+                <a:cs typeface="Times New Roman" panose="02020603050405020304" pitchFamily="18" charset="0"/>
+              </a:rPr>
+              <a:t> </a:t>
+            </a:r>
+            <a:r>
+              <a:rPr lang="en-US" dirty="0" err="1">
+                <a:solidFill>
+                  <a:srgbClr val="000000"/>
+                </a:solidFill>
+                <a:latin typeface="Consolas" panose="020B0609020204030204" pitchFamily="49" charset="0"/>
+                <a:ea typeface="Times New Roman" panose="02020603050405020304" pitchFamily="18" charset="0"/>
+                <a:cs typeface="Times New Roman" panose="02020603050405020304" pitchFamily="18" charset="0"/>
+              </a:rPr>
+              <a:t>BaseClass</a:t>
+            </a:r>
+            <a:r>
+              <a:rPr lang="en-US" dirty="0">
+                <a:solidFill>
+                  <a:srgbClr val="000000"/>
+                </a:solidFill>
+                <a:latin typeface="Consolas" panose="020B0609020204030204" pitchFamily="49" charset="0"/>
+                <a:ea typeface="Times New Roman" panose="02020603050405020304" pitchFamily="18" charset="0"/>
+                <a:cs typeface="Times New Roman" panose="02020603050405020304" pitchFamily="18" charset="0"/>
+              </a:rPr>
+              <a:t>;</a:t>
+            </a:r>
+            <a:endParaRPr lang="en-US" sz="2400" dirty="0">
+              <a:latin typeface="Calibri" panose="020F0502020204030204" pitchFamily="34" charset="0"/>
+              <a:ea typeface="Calibri" panose="020F0502020204030204" pitchFamily="34" charset="0"/>
+              <a:cs typeface="Times New Roman" panose="02020603050405020304" pitchFamily="18" charset="0"/>
+            </a:endParaRPr>
+          </a:p>
+          <a:p>
+            <a:pPr>
+              <a:lnSpc>
+                <a:spcPct val="107000"/>
+              </a:lnSpc>
+              <a:tabLst>
+                <a:tab pos="581660" algn="l"/>
+                <a:tab pos="1163320" algn="l"/>
+                <a:tab pos="1744980" algn="l"/>
+                <a:tab pos="2326640" algn="l"/>
+                <a:tab pos="2908300" algn="l"/>
+                <a:tab pos="3489960" algn="l"/>
+                <a:tab pos="4071620" algn="l"/>
+                <a:tab pos="4653280" algn="l"/>
+                <a:tab pos="5234940" algn="l"/>
+                <a:tab pos="5816600" algn="l"/>
+                <a:tab pos="6398260" algn="l"/>
+                <a:tab pos="6979920" algn="l"/>
+                <a:tab pos="7561580" algn="l"/>
+                <a:tab pos="8143240" algn="l"/>
+                <a:tab pos="8724900" algn="l"/>
+                <a:tab pos="9306560" algn="l"/>
+              </a:tabLst>
+            </a:pPr>
+            <a:r>
+              <a:rPr lang="en-US" dirty="0">
+                <a:solidFill>
+                  <a:srgbClr val="000000"/>
+                </a:solidFill>
+                <a:latin typeface="Consolas" panose="020B0609020204030204" pitchFamily="49" charset="0"/>
+                <a:ea typeface="Times New Roman" panose="02020603050405020304" pitchFamily="18" charset="0"/>
+                <a:cs typeface="Times New Roman" panose="02020603050405020304" pitchFamily="18" charset="0"/>
+              </a:rPr>
+              <a:t>})();</a:t>
+            </a:r>
+            <a:endParaRPr lang="en-US" sz="2400" dirty="0">
+              <a:latin typeface="Calibri" panose="020F0502020204030204" pitchFamily="34" charset="0"/>
+              <a:ea typeface="Calibri" panose="020F0502020204030204" pitchFamily="34" charset="0"/>
+              <a:cs typeface="Times New Roman" panose="02020603050405020304" pitchFamily="18" charset="0"/>
+            </a:endParaRPr>
+          </a:p>
+          <a:p>
+            <a:pPr>
+              <a:lnSpc>
+                <a:spcPct val="107000"/>
+              </a:lnSpc>
+              <a:tabLst>
+                <a:tab pos="581660" algn="l"/>
+                <a:tab pos="1163320" algn="l"/>
+                <a:tab pos="1744980" algn="l"/>
+                <a:tab pos="2326640" algn="l"/>
+                <a:tab pos="2908300" algn="l"/>
+                <a:tab pos="3489960" algn="l"/>
+                <a:tab pos="4071620" algn="l"/>
+                <a:tab pos="4653280" algn="l"/>
+                <a:tab pos="5234940" algn="l"/>
+                <a:tab pos="5816600" algn="l"/>
+                <a:tab pos="6398260" algn="l"/>
+                <a:tab pos="6979920" algn="l"/>
+                <a:tab pos="7561580" algn="l"/>
+                <a:tab pos="8143240" algn="l"/>
+                <a:tab pos="8724900" algn="l"/>
+                <a:tab pos="9306560" algn="l"/>
+              </a:tabLst>
+            </a:pPr>
+            <a:r>
+              <a:rPr lang="en-US" dirty="0">
+                <a:solidFill>
+                  <a:srgbClr val="000000"/>
+                </a:solidFill>
+                <a:latin typeface="Consolas" panose="020B0609020204030204" pitchFamily="49" charset="0"/>
+                <a:ea typeface="Times New Roman" panose="02020603050405020304" pitchFamily="18" charset="0"/>
+                <a:cs typeface="Times New Roman" panose="02020603050405020304" pitchFamily="18" charset="0"/>
+              </a:rPr>
+              <a:t> </a:t>
+            </a:r>
+            <a:endParaRPr lang="en-US" sz="2400" dirty="0">
+              <a:latin typeface="Calibri" panose="020F0502020204030204" pitchFamily="34" charset="0"/>
+              <a:ea typeface="Calibri" panose="020F0502020204030204" pitchFamily="34" charset="0"/>
+              <a:cs typeface="Times New Roman" panose="02020603050405020304" pitchFamily="18" charset="0"/>
+            </a:endParaRPr>
+          </a:p>
+          <a:p>
+            <a:pPr>
+              <a:lnSpc>
+                <a:spcPct val="107000"/>
+              </a:lnSpc>
+              <a:tabLst>
+                <a:tab pos="581660" algn="l"/>
+                <a:tab pos="1163320" algn="l"/>
+                <a:tab pos="1744980" algn="l"/>
+                <a:tab pos="2326640" algn="l"/>
+                <a:tab pos="2908300" algn="l"/>
+                <a:tab pos="3489960" algn="l"/>
+                <a:tab pos="4071620" algn="l"/>
+                <a:tab pos="4653280" algn="l"/>
+                <a:tab pos="5234940" algn="l"/>
+                <a:tab pos="5816600" algn="l"/>
+                <a:tab pos="6398260" algn="l"/>
+                <a:tab pos="6979920" algn="l"/>
+                <a:tab pos="7561580" algn="l"/>
+                <a:tab pos="8143240" algn="l"/>
+                <a:tab pos="8724900" algn="l"/>
+                <a:tab pos="9306560" algn="l"/>
+              </a:tabLst>
+            </a:pPr>
+            <a:r>
+              <a:rPr lang="en-US" dirty="0" err="1">
+                <a:solidFill>
+                  <a:srgbClr val="0000FF"/>
+                </a:solidFill>
+                <a:latin typeface="Consolas" panose="020B0609020204030204" pitchFamily="49" charset="0"/>
+                <a:ea typeface="Times New Roman" panose="02020603050405020304" pitchFamily="18" charset="0"/>
+                <a:cs typeface="Times New Roman" panose="02020603050405020304" pitchFamily="18" charset="0"/>
+              </a:rPr>
+              <a:t>var</a:t>
+            </a:r>
+            <a:r>
+              <a:rPr lang="en-US" dirty="0">
+                <a:solidFill>
+                  <a:srgbClr val="000000"/>
+                </a:solidFill>
+                <a:latin typeface="Consolas" panose="020B0609020204030204" pitchFamily="49" charset="0"/>
+                <a:ea typeface="Times New Roman" panose="02020603050405020304" pitchFamily="18" charset="0"/>
+                <a:cs typeface="Times New Roman" panose="02020603050405020304" pitchFamily="18" charset="0"/>
+              </a:rPr>
+              <a:t> </a:t>
+            </a:r>
+            <a:r>
+              <a:rPr lang="en-US" dirty="0" err="1">
+                <a:solidFill>
+                  <a:srgbClr val="000000"/>
+                </a:solidFill>
+                <a:latin typeface="Consolas" panose="020B0609020204030204" pitchFamily="49" charset="0"/>
+                <a:ea typeface="Times New Roman" panose="02020603050405020304" pitchFamily="18" charset="0"/>
+                <a:cs typeface="Times New Roman" panose="02020603050405020304" pitchFamily="18" charset="0"/>
+              </a:rPr>
+              <a:t>DerivedClass</a:t>
+            </a:r>
+            <a:r>
+              <a:rPr lang="en-US" dirty="0">
+                <a:solidFill>
+                  <a:srgbClr val="000000"/>
+                </a:solidFill>
+                <a:latin typeface="Consolas" panose="020B0609020204030204" pitchFamily="49" charset="0"/>
+                <a:ea typeface="Times New Roman" panose="02020603050405020304" pitchFamily="18" charset="0"/>
+                <a:cs typeface="Times New Roman" panose="02020603050405020304" pitchFamily="18" charset="0"/>
+              </a:rPr>
+              <a:t> = (</a:t>
+            </a:r>
+            <a:r>
+              <a:rPr lang="en-US" dirty="0">
+                <a:solidFill>
+                  <a:srgbClr val="0000FF"/>
+                </a:solidFill>
+                <a:latin typeface="Consolas" panose="020B0609020204030204" pitchFamily="49" charset="0"/>
+                <a:ea typeface="Times New Roman" panose="02020603050405020304" pitchFamily="18" charset="0"/>
+                <a:cs typeface="Times New Roman" panose="02020603050405020304" pitchFamily="18" charset="0"/>
+              </a:rPr>
+              <a:t>function</a:t>
+            </a:r>
+            <a:r>
+              <a:rPr lang="en-US" dirty="0">
+                <a:solidFill>
+                  <a:srgbClr val="000000"/>
+                </a:solidFill>
+                <a:latin typeface="Consolas" panose="020B0609020204030204" pitchFamily="49" charset="0"/>
+                <a:ea typeface="Times New Roman" panose="02020603050405020304" pitchFamily="18" charset="0"/>
+                <a:cs typeface="Times New Roman" panose="02020603050405020304" pitchFamily="18" charset="0"/>
+              </a:rPr>
+              <a:t> (_super) {</a:t>
+            </a:r>
+            <a:endParaRPr lang="en-US" sz="2400" dirty="0">
+              <a:latin typeface="Calibri" panose="020F0502020204030204" pitchFamily="34" charset="0"/>
+              <a:ea typeface="Calibri" panose="020F0502020204030204" pitchFamily="34" charset="0"/>
+              <a:cs typeface="Times New Roman" panose="02020603050405020304" pitchFamily="18" charset="0"/>
+            </a:endParaRPr>
+          </a:p>
+          <a:p>
+            <a:pPr>
+              <a:lnSpc>
+                <a:spcPct val="107000"/>
+              </a:lnSpc>
+              <a:tabLst>
+                <a:tab pos="581660" algn="l"/>
+                <a:tab pos="1163320" algn="l"/>
+                <a:tab pos="1744980" algn="l"/>
+                <a:tab pos="2326640" algn="l"/>
+                <a:tab pos="2908300" algn="l"/>
+                <a:tab pos="3489960" algn="l"/>
+                <a:tab pos="4071620" algn="l"/>
+                <a:tab pos="4653280" algn="l"/>
+                <a:tab pos="5234940" algn="l"/>
+                <a:tab pos="5816600" algn="l"/>
+                <a:tab pos="6398260" algn="l"/>
+                <a:tab pos="6979920" algn="l"/>
+                <a:tab pos="7561580" algn="l"/>
+                <a:tab pos="8143240" algn="l"/>
+                <a:tab pos="8724900" algn="l"/>
+                <a:tab pos="9306560" algn="l"/>
+              </a:tabLst>
+            </a:pPr>
+            <a:r>
+              <a:rPr lang="en-US" dirty="0">
+                <a:solidFill>
+                  <a:srgbClr val="000000"/>
+                </a:solidFill>
+                <a:latin typeface="Consolas" panose="020B0609020204030204" pitchFamily="49" charset="0"/>
+                <a:ea typeface="Times New Roman" panose="02020603050405020304" pitchFamily="18" charset="0"/>
+                <a:cs typeface="Times New Roman" panose="02020603050405020304" pitchFamily="18" charset="0"/>
+              </a:rPr>
+              <a:t>    __extends(</a:t>
+            </a:r>
+            <a:r>
+              <a:rPr lang="en-US" dirty="0" err="1">
+                <a:solidFill>
+                  <a:srgbClr val="000000"/>
+                </a:solidFill>
+                <a:latin typeface="Consolas" panose="020B0609020204030204" pitchFamily="49" charset="0"/>
+                <a:ea typeface="Times New Roman" panose="02020603050405020304" pitchFamily="18" charset="0"/>
+                <a:cs typeface="Times New Roman" panose="02020603050405020304" pitchFamily="18" charset="0"/>
+              </a:rPr>
+              <a:t>DerivedClass</a:t>
+            </a:r>
+            <a:r>
+              <a:rPr lang="en-US" dirty="0">
+                <a:solidFill>
+                  <a:srgbClr val="000000"/>
+                </a:solidFill>
+                <a:latin typeface="Consolas" panose="020B0609020204030204" pitchFamily="49" charset="0"/>
+                <a:ea typeface="Times New Roman" panose="02020603050405020304" pitchFamily="18" charset="0"/>
+                <a:cs typeface="Times New Roman" panose="02020603050405020304" pitchFamily="18" charset="0"/>
+              </a:rPr>
+              <a:t>, _super);</a:t>
+            </a:r>
+            <a:endParaRPr lang="en-US" sz="2400" dirty="0">
+              <a:latin typeface="Calibri" panose="020F0502020204030204" pitchFamily="34" charset="0"/>
+              <a:ea typeface="Calibri" panose="020F0502020204030204" pitchFamily="34" charset="0"/>
+              <a:cs typeface="Times New Roman" panose="02020603050405020304" pitchFamily="18" charset="0"/>
+            </a:endParaRPr>
+          </a:p>
+          <a:p>
+            <a:pPr>
+              <a:lnSpc>
+                <a:spcPct val="107000"/>
+              </a:lnSpc>
+              <a:tabLst>
+                <a:tab pos="581660" algn="l"/>
+                <a:tab pos="1163320" algn="l"/>
+                <a:tab pos="1744980" algn="l"/>
+                <a:tab pos="2326640" algn="l"/>
+                <a:tab pos="2908300" algn="l"/>
+                <a:tab pos="3489960" algn="l"/>
+                <a:tab pos="4071620" algn="l"/>
+                <a:tab pos="4653280" algn="l"/>
+                <a:tab pos="5234940" algn="l"/>
+                <a:tab pos="5816600" algn="l"/>
+                <a:tab pos="6398260" algn="l"/>
+                <a:tab pos="6979920" algn="l"/>
+                <a:tab pos="7561580" algn="l"/>
+                <a:tab pos="8143240" algn="l"/>
+                <a:tab pos="8724900" algn="l"/>
+                <a:tab pos="9306560" algn="l"/>
+              </a:tabLst>
+            </a:pPr>
+            <a:r>
+              <a:rPr lang="en-US" dirty="0">
+                <a:solidFill>
+                  <a:srgbClr val="000000"/>
+                </a:solidFill>
+                <a:latin typeface="Consolas" panose="020B0609020204030204" pitchFamily="49" charset="0"/>
+                <a:ea typeface="Times New Roman" panose="02020603050405020304" pitchFamily="18" charset="0"/>
+                <a:cs typeface="Times New Roman" panose="02020603050405020304" pitchFamily="18" charset="0"/>
+              </a:rPr>
+              <a:t>    </a:t>
+            </a:r>
+            <a:r>
+              <a:rPr lang="en-US" dirty="0">
+                <a:solidFill>
+                  <a:srgbClr val="0000FF"/>
+                </a:solidFill>
+                <a:latin typeface="Consolas" panose="020B0609020204030204" pitchFamily="49" charset="0"/>
+                <a:ea typeface="Times New Roman" panose="02020603050405020304" pitchFamily="18" charset="0"/>
+                <a:cs typeface="Times New Roman" panose="02020603050405020304" pitchFamily="18" charset="0"/>
+              </a:rPr>
+              <a:t>function</a:t>
+            </a:r>
+            <a:r>
+              <a:rPr lang="en-US" dirty="0">
+                <a:solidFill>
+                  <a:srgbClr val="000000"/>
+                </a:solidFill>
+                <a:latin typeface="Consolas" panose="020B0609020204030204" pitchFamily="49" charset="0"/>
+                <a:ea typeface="Times New Roman" panose="02020603050405020304" pitchFamily="18" charset="0"/>
+                <a:cs typeface="Times New Roman" panose="02020603050405020304" pitchFamily="18" charset="0"/>
+              </a:rPr>
+              <a:t> </a:t>
+            </a:r>
+            <a:r>
+              <a:rPr lang="en-US" dirty="0" err="1">
+                <a:solidFill>
+                  <a:srgbClr val="000000"/>
+                </a:solidFill>
+                <a:latin typeface="Consolas" panose="020B0609020204030204" pitchFamily="49" charset="0"/>
+                <a:ea typeface="Times New Roman" panose="02020603050405020304" pitchFamily="18" charset="0"/>
+                <a:cs typeface="Times New Roman" panose="02020603050405020304" pitchFamily="18" charset="0"/>
+              </a:rPr>
+              <a:t>DerivedClass</a:t>
+            </a:r>
+            <a:r>
+              <a:rPr lang="en-US" dirty="0">
+                <a:solidFill>
+                  <a:srgbClr val="000000"/>
+                </a:solidFill>
+                <a:latin typeface="Consolas" panose="020B0609020204030204" pitchFamily="49" charset="0"/>
+                <a:ea typeface="Times New Roman" panose="02020603050405020304" pitchFamily="18" charset="0"/>
+                <a:cs typeface="Times New Roman" panose="02020603050405020304" pitchFamily="18" charset="0"/>
+              </a:rPr>
+              <a:t>(value) {</a:t>
+            </a:r>
+            <a:endParaRPr lang="en-US" sz="2400" dirty="0">
+              <a:latin typeface="Calibri" panose="020F0502020204030204" pitchFamily="34" charset="0"/>
+              <a:ea typeface="Calibri" panose="020F0502020204030204" pitchFamily="34" charset="0"/>
+              <a:cs typeface="Times New Roman" panose="02020603050405020304" pitchFamily="18" charset="0"/>
+            </a:endParaRPr>
+          </a:p>
+          <a:p>
+            <a:pPr>
+              <a:lnSpc>
+                <a:spcPct val="107000"/>
+              </a:lnSpc>
+              <a:tabLst>
+                <a:tab pos="581660" algn="l"/>
+                <a:tab pos="1163320" algn="l"/>
+                <a:tab pos="1744980" algn="l"/>
+                <a:tab pos="2326640" algn="l"/>
+                <a:tab pos="2908300" algn="l"/>
+                <a:tab pos="3489960" algn="l"/>
+                <a:tab pos="4071620" algn="l"/>
+                <a:tab pos="4653280" algn="l"/>
+                <a:tab pos="5234940" algn="l"/>
+                <a:tab pos="5816600" algn="l"/>
+                <a:tab pos="6398260" algn="l"/>
+                <a:tab pos="6979920" algn="l"/>
+                <a:tab pos="7561580" algn="l"/>
+                <a:tab pos="8143240" algn="l"/>
+                <a:tab pos="8724900" algn="l"/>
+                <a:tab pos="9306560" algn="l"/>
+              </a:tabLst>
+            </a:pPr>
+            <a:r>
+              <a:rPr lang="en-US" dirty="0">
+                <a:solidFill>
+                  <a:srgbClr val="000000"/>
+                </a:solidFill>
+                <a:latin typeface="Consolas" panose="020B0609020204030204" pitchFamily="49" charset="0"/>
+                <a:ea typeface="Times New Roman" panose="02020603050405020304" pitchFamily="18" charset="0"/>
+                <a:cs typeface="Times New Roman" panose="02020603050405020304" pitchFamily="18" charset="0"/>
+              </a:rPr>
+              <a:t>        _</a:t>
+            </a:r>
+            <a:r>
+              <a:rPr lang="en-US" dirty="0" err="1">
+                <a:solidFill>
+                  <a:srgbClr val="000000"/>
+                </a:solidFill>
+                <a:latin typeface="Consolas" panose="020B0609020204030204" pitchFamily="49" charset="0"/>
+                <a:ea typeface="Times New Roman" panose="02020603050405020304" pitchFamily="18" charset="0"/>
+                <a:cs typeface="Times New Roman" panose="02020603050405020304" pitchFamily="18" charset="0"/>
+              </a:rPr>
+              <a:t>super.call</a:t>
+            </a:r>
+            <a:r>
+              <a:rPr lang="en-US" dirty="0">
+                <a:solidFill>
+                  <a:srgbClr val="000000"/>
+                </a:solidFill>
+                <a:latin typeface="Consolas" panose="020B0609020204030204" pitchFamily="49" charset="0"/>
+                <a:ea typeface="Times New Roman" panose="02020603050405020304" pitchFamily="18" charset="0"/>
+                <a:cs typeface="Times New Roman" panose="02020603050405020304" pitchFamily="18" charset="0"/>
+              </a:rPr>
+              <a:t>(</a:t>
+            </a:r>
+            <a:r>
+              <a:rPr lang="en-US" dirty="0">
+                <a:solidFill>
+                  <a:srgbClr val="0000FF"/>
+                </a:solidFill>
+                <a:latin typeface="Consolas" panose="020B0609020204030204" pitchFamily="49" charset="0"/>
+                <a:ea typeface="Times New Roman" panose="02020603050405020304" pitchFamily="18" charset="0"/>
+                <a:cs typeface="Times New Roman" panose="02020603050405020304" pitchFamily="18" charset="0"/>
+              </a:rPr>
+              <a:t>this</a:t>
+            </a:r>
+            <a:r>
+              <a:rPr lang="en-US" dirty="0">
+                <a:solidFill>
+                  <a:srgbClr val="000000"/>
+                </a:solidFill>
+                <a:latin typeface="Consolas" panose="020B0609020204030204" pitchFamily="49" charset="0"/>
+                <a:ea typeface="Times New Roman" panose="02020603050405020304" pitchFamily="18" charset="0"/>
+                <a:cs typeface="Times New Roman" panose="02020603050405020304" pitchFamily="18" charset="0"/>
+              </a:rPr>
+              <a:t>, value);</a:t>
+            </a:r>
+            <a:endParaRPr lang="en-US" sz="2400" dirty="0">
+              <a:latin typeface="Calibri" panose="020F0502020204030204" pitchFamily="34" charset="0"/>
+              <a:ea typeface="Calibri" panose="020F0502020204030204" pitchFamily="34" charset="0"/>
+              <a:cs typeface="Times New Roman" panose="02020603050405020304" pitchFamily="18" charset="0"/>
+            </a:endParaRPr>
+          </a:p>
+          <a:p>
+            <a:pPr>
+              <a:lnSpc>
+                <a:spcPct val="107000"/>
+              </a:lnSpc>
+              <a:tabLst>
+                <a:tab pos="581660" algn="l"/>
+                <a:tab pos="1163320" algn="l"/>
+                <a:tab pos="1744980" algn="l"/>
+                <a:tab pos="2326640" algn="l"/>
+                <a:tab pos="2908300" algn="l"/>
+                <a:tab pos="3489960" algn="l"/>
+                <a:tab pos="4071620" algn="l"/>
+                <a:tab pos="4653280" algn="l"/>
+                <a:tab pos="5234940" algn="l"/>
+                <a:tab pos="5816600" algn="l"/>
+                <a:tab pos="6398260" algn="l"/>
+                <a:tab pos="6979920" algn="l"/>
+                <a:tab pos="7561580" algn="l"/>
+                <a:tab pos="8143240" algn="l"/>
+                <a:tab pos="8724900" algn="l"/>
+                <a:tab pos="9306560" algn="l"/>
+              </a:tabLst>
+            </a:pPr>
+            <a:r>
+              <a:rPr lang="en-US" dirty="0">
+                <a:solidFill>
+                  <a:srgbClr val="000000"/>
+                </a:solidFill>
+                <a:latin typeface="Consolas" panose="020B0609020204030204" pitchFamily="49" charset="0"/>
+                <a:ea typeface="Times New Roman" panose="02020603050405020304" pitchFamily="18" charset="0"/>
+                <a:cs typeface="Times New Roman" panose="02020603050405020304" pitchFamily="18" charset="0"/>
+              </a:rPr>
+              <a:t>    }</a:t>
+            </a:r>
+            <a:endParaRPr lang="en-US" sz="2400" dirty="0">
+              <a:latin typeface="Calibri" panose="020F0502020204030204" pitchFamily="34" charset="0"/>
+              <a:ea typeface="Calibri" panose="020F0502020204030204" pitchFamily="34" charset="0"/>
+              <a:cs typeface="Times New Roman" panose="02020603050405020304" pitchFamily="18" charset="0"/>
+            </a:endParaRPr>
+          </a:p>
+          <a:p>
+            <a:pPr>
+              <a:lnSpc>
+                <a:spcPct val="107000"/>
+              </a:lnSpc>
+              <a:tabLst>
+                <a:tab pos="581660" algn="l"/>
+                <a:tab pos="1163320" algn="l"/>
+                <a:tab pos="1744980" algn="l"/>
+                <a:tab pos="2326640" algn="l"/>
+                <a:tab pos="2908300" algn="l"/>
+                <a:tab pos="3489960" algn="l"/>
+                <a:tab pos="4071620" algn="l"/>
+                <a:tab pos="4653280" algn="l"/>
+                <a:tab pos="5234940" algn="l"/>
+                <a:tab pos="5816600" algn="l"/>
+                <a:tab pos="6398260" algn="l"/>
+                <a:tab pos="6979920" algn="l"/>
+                <a:tab pos="7561580" algn="l"/>
+                <a:tab pos="8143240" algn="l"/>
+                <a:tab pos="8724900" algn="l"/>
+                <a:tab pos="9306560" algn="l"/>
+              </a:tabLst>
+            </a:pPr>
+            <a:r>
+              <a:rPr lang="en-US" dirty="0">
+                <a:solidFill>
+                  <a:srgbClr val="000000"/>
+                </a:solidFill>
+                <a:latin typeface="Consolas" panose="020B0609020204030204" pitchFamily="49" charset="0"/>
+                <a:ea typeface="Times New Roman" panose="02020603050405020304" pitchFamily="18" charset="0"/>
+                <a:cs typeface="Times New Roman" panose="02020603050405020304" pitchFamily="18" charset="0"/>
+              </a:rPr>
+              <a:t>    </a:t>
+            </a:r>
+            <a:r>
+              <a:rPr lang="en-US" dirty="0" err="1">
+                <a:solidFill>
+                  <a:srgbClr val="000000"/>
+                </a:solidFill>
+                <a:latin typeface="Consolas" panose="020B0609020204030204" pitchFamily="49" charset="0"/>
+                <a:ea typeface="Times New Roman" panose="02020603050405020304" pitchFamily="18" charset="0"/>
+                <a:cs typeface="Times New Roman" panose="02020603050405020304" pitchFamily="18" charset="0"/>
+              </a:rPr>
+              <a:t>DerivedClass.prototype.getValue</a:t>
+            </a:r>
+            <a:r>
+              <a:rPr lang="en-US" dirty="0">
+                <a:solidFill>
+                  <a:srgbClr val="000000"/>
+                </a:solidFill>
+                <a:latin typeface="Consolas" panose="020B0609020204030204" pitchFamily="49" charset="0"/>
+                <a:ea typeface="Times New Roman" panose="02020603050405020304" pitchFamily="18" charset="0"/>
+                <a:cs typeface="Times New Roman" panose="02020603050405020304" pitchFamily="18" charset="0"/>
+              </a:rPr>
+              <a:t> = </a:t>
+            </a:r>
+            <a:r>
+              <a:rPr lang="en-US" dirty="0">
+                <a:solidFill>
+                  <a:srgbClr val="0000FF"/>
+                </a:solidFill>
+                <a:latin typeface="Consolas" panose="020B0609020204030204" pitchFamily="49" charset="0"/>
+                <a:ea typeface="Times New Roman" panose="02020603050405020304" pitchFamily="18" charset="0"/>
+                <a:cs typeface="Times New Roman" panose="02020603050405020304" pitchFamily="18" charset="0"/>
+              </a:rPr>
+              <a:t>function</a:t>
+            </a:r>
+            <a:r>
+              <a:rPr lang="en-US" dirty="0">
+                <a:solidFill>
+                  <a:srgbClr val="000000"/>
+                </a:solidFill>
+                <a:latin typeface="Consolas" panose="020B0609020204030204" pitchFamily="49" charset="0"/>
+                <a:ea typeface="Times New Roman" panose="02020603050405020304" pitchFamily="18" charset="0"/>
+                <a:cs typeface="Times New Roman" panose="02020603050405020304" pitchFamily="18" charset="0"/>
+              </a:rPr>
+              <a:t> () {</a:t>
+            </a:r>
+            <a:endParaRPr lang="en-US" sz="2400" dirty="0">
+              <a:latin typeface="Calibri" panose="020F0502020204030204" pitchFamily="34" charset="0"/>
+              <a:ea typeface="Calibri" panose="020F0502020204030204" pitchFamily="34" charset="0"/>
+              <a:cs typeface="Times New Roman" panose="02020603050405020304" pitchFamily="18" charset="0"/>
+            </a:endParaRPr>
+          </a:p>
+          <a:p>
+            <a:pPr>
+              <a:lnSpc>
+                <a:spcPct val="107000"/>
+              </a:lnSpc>
+              <a:tabLst>
+                <a:tab pos="581660" algn="l"/>
+                <a:tab pos="1163320" algn="l"/>
+                <a:tab pos="1744980" algn="l"/>
+                <a:tab pos="2326640" algn="l"/>
+                <a:tab pos="2908300" algn="l"/>
+                <a:tab pos="3489960" algn="l"/>
+                <a:tab pos="4071620" algn="l"/>
+                <a:tab pos="4653280" algn="l"/>
+                <a:tab pos="5234940" algn="l"/>
+                <a:tab pos="5816600" algn="l"/>
+                <a:tab pos="6398260" algn="l"/>
+                <a:tab pos="6979920" algn="l"/>
+                <a:tab pos="7561580" algn="l"/>
+                <a:tab pos="8143240" algn="l"/>
+                <a:tab pos="8724900" algn="l"/>
+                <a:tab pos="9306560" algn="l"/>
+              </a:tabLst>
+            </a:pPr>
+            <a:r>
+              <a:rPr lang="en-US" dirty="0">
+                <a:solidFill>
+                  <a:srgbClr val="000000"/>
+                </a:solidFill>
+                <a:latin typeface="Consolas" panose="020B0609020204030204" pitchFamily="49" charset="0"/>
+                <a:ea typeface="Times New Roman" panose="02020603050405020304" pitchFamily="18" charset="0"/>
+                <a:cs typeface="Times New Roman" panose="02020603050405020304" pitchFamily="18" charset="0"/>
+              </a:rPr>
+              <a:t>        </a:t>
+            </a:r>
+            <a:r>
+              <a:rPr lang="en-US" dirty="0">
+                <a:solidFill>
+                  <a:srgbClr val="0000FF"/>
+                </a:solidFill>
+                <a:latin typeface="Consolas" panose="020B0609020204030204" pitchFamily="49" charset="0"/>
+                <a:ea typeface="Times New Roman" panose="02020603050405020304" pitchFamily="18" charset="0"/>
+                <a:cs typeface="Times New Roman" panose="02020603050405020304" pitchFamily="18" charset="0"/>
+              </a:rPr>
+              <a:t>return</a:t>
+            </a:r>
+            <a:r>
+              <a:rPr lang="en-US" dirty="0">
+                <a:solidFill>
+                  <a:srgbClr val="000000"/>
+                </a:solidFill>
+                <a:latin typeface="Consolas" panose="020B0609020204030204" pitchFamily="49" charset="0"/>
+                <a:ea typeface="Times New Roman" panose="02020603050405020304" pitchFamily="18" charset="0"/>
+                <a:cs typeface="Times New Roman" panose="02020603050405020304" pitchFamily="18" charset="0"/>
+              </a:rPr>
+              <a:t> _</a:t>
+            </a:r>
+            <a:r>
+              <a:rPr lang="en-US" dirty="0" err="1">
+                <a:solidFill>
+                  <a:srgbClr val="000000"/>
+                </a:solidFill>
+                <a:latin typeface="Consolas" panose="020B0609020204030204" pitchFamily="49" charset="0"/>
+                <a:ea typeface="Times New Roman" panose="02020603050405020304" pitchFamily="18" charset="0"/>
+                <a:cs typeface="Times New Roman" panose="02020603050405020304" pitchFamily="18" charset="0"/>
+              </a:rPr>
+              <a:t>super.prototype.getValue.call</a:t>
+            </a:r>
+            <a:r>
+              <a:rPr lang="en-US" dirty="0">
+                <a:solidFill>
+                  <a:srgbClr val="000000"/>
+                </a:solidFill>
+                <a:latin typeface="Consolas" panose="020B0609020204030204" pitchFamily="49" charset="0"/>
+                <a:ea typeface="Times New Roman" panose="02020603050405020304" pitchFamily="18" charset="0"/>
+                <a:cs typeface="Times New Roman" panose="02020603050405020304" pitchFamily="18" charset="0"/>
+              </a:rPr>
+              <a:t>(</a:t>
+            </a:r>
+            <a:r>
+              <a:rPr lang="en-US" dirty="0">
+                <a:solidFill>
+                  <a:srgbClr val="0000FF"/>
+                </a:solidFill>
+                <a:latin typeface="Consolas" panose="020B0609020204030204" pitchFamily="49" charset="0"/>
+                <a:ea typeface="Times New Roman" panose="02020603050405020304" pitchFamily="18" charset="0"/>
+                <a:cs typeface="Times New Roman" panose="02020603050405020304" pitchFamily="18" charset="0"/>
+              </a:rPr>
+              <a:t>this</a:t>
+            </a:r>
+            <a:r>
+              <a:rPr lang="en-US" dirty="0">
+                <a:solidFill>
+                  <a:srgbClr val="000000"/>
+                </a:solidFill>
+                <a:latin typeface="Consolas" panose="020B0609020204030204" pitchFamily="49" charset="0"/>
+                <a:ea typeface="Times New Roman" panose="02020603050405020304" pitchFamily="18" charset="0"/>
+                <a:cs typeface="Times New Roman" panose="02020603050405020304" pitchFamily="18" charset="0"/>
+              </a:rPr>
+              <a:t>) + </a:t>
+            </a:r>
+            <a:r>
+              <a:rPr lang="en-US" dirty="0">
+                <a:solidFill>
+                  <a:srgbClr val="A31515"/>
+                </a:solidFill>
+                <a:latin typeface="Consolas" panose="020B0609020204030204" pitchFamily="49" charset="0"/>
+                <a:ea typeface="Times New Roman" panose="02020603050405020304" pitchFamily="18" charset="0"/>
+                <a:cs typeface="Times New Roman" panose="02020603050405020304" pitchFamily="18" charset="0"/>
+              </a:rPr>
+              <a:t>' Extended'</a:t>
+            </a:r>
+            <a:r>
+              <a:rPr lang="en-US" dirty="0">
+                <a:solidFill>
+                  <a:srgbClr val="000000"/>
+                </a:solidFill>
+                <a:latin typeface="Consolas" panose="020B0609020204030204" pitchFamily="49" charset="0"/>
+                <a:ea typeface="Times New Roman" panose="02020603050405020304" pitchFamily="18" charset="0"/>
+                <a:cs typeface="Times New Roman" panose="02020603050405020304" pitchFamily="18" charset="0"/>
+              </a:rPr>
+              <a:t>;</a:t>
+            </a:r>
+            <a:endParaRPr lang="en-US" sz="2400" dirty="0">
+              <a:latin typeface="Calibri" panose="020F0502020204030204" pitchFamily="34" charset="0"/>
+              <a:ea typeface="Calibri" panose="020F0502020204030204" pitchFamily="34" charset="0"/>
+              <a:cs typeface="Times New Roman" panose="02020603050405020304" pitchFamily="18" charset="0"/>
+            </a:endParaRPr>
+          </a:p>
+          <a:p>
+            <a:pPr>
+              <a:lnSpc>
+                <a:spcPct val="107000"/>
+              </a:lnSpc>
+              <a:tabLst>
+                <a:tab pos="581660" algn="l"/>
+                <a:tab pos="1163320" algn="l"/>
+                <a:tab pos="1744980" algn="l"/>
+                <a:tab pos="2326640" algn="l"/>
+                <a:tab pos="2908300" algn="l"/>
+                <a:tab pos="3489960" algn="l"/>
+                <a:tab pos="4071620" algn="l"/>
+                <a:tab pos="4653280" algn="l"/>
+                <a:tab pos="5234940" algn="l"/>
+                <a:tab pos="5816600" algn="l"/>
+                <a:tab pos="6398260" algn="l"/>
+                <a:tab pos="6979920" algn="l"/>
+                <a:tab pos="7561580" algn="l"/>
+                <a:tab pos="8143240" algn="l"/>
+                <a:tab pos="8724900" algn="l"/>
+                <a:tab pos="9306560" algn="l"/>
+              </a:tabLst>
+            </a:pPr>
+            <a:r>
+              <a:rPr lang="en-US" dirty="0">
+                <a:solidFill>
+                  <a:srgbClr val="000000"/>
+                </a:solidFill>
+                <a:latin typeface="Consolas" panose="020B0609020204030204" pitchFamily="49" charset="0"/>
+                <a:ea typeface="Times New Roman" panose="02020603050405020304" pitchFamily="18" charset="0"/>
+                <a:cs typeface="Times New Roman" panose="02020603050405020304" pitchFamily="18" charset="0"/>
+              </a:rPr>
+              <a:t>    };</a:t>
+            </a:r>
+            <a:endParaRPr lang="en-US" sz="2400" dirty="0">
+              <a:latin typeface="Calibri" panose="020F0502020204030204" pitchFamily="34" charset="0"/>
+              <a:ea typeface="Calibri" panose="020F0502020204030204" pitchFamily="34" charset="0"/>
+              <a:cs typeface="Times New Roman" panose="02020603050405020304" pitchFamily="18" charset="0"/>
+            </a:endParaRPr>
+          </a:p>
+          <a:p>
+            <a:pPr>
+              <a:lnSpc>
+                <a:spcPct val="107000"/>
+              </a:lnSpc>
+              <a:tabLst>
+                <a:tab pos="581660" algn="l"/>
+                <a:tab pos="1163320" algn="l"/>
+                <a:tab pos="1744980" algn="l"/>
+                <a:tab pos="2326640" algn="l"/>
+                <a:tab pos="2908300" algn="l"/>
+                <a:tab pos="3489960" algn="l"/>
+                <a:tab pos="4071620" algn="l"/>
+                <a:tab pos="4653280" algn="l"/>
+                <a:tab pos="5234940" algn="l"/>
+                <a:tab pos="5816600" algn="l"/>
+                <a:tab pos="6398260" algn="l"/>
+                <a:tab pos="6979920" algn="l"/>
+                <a:tab pos="7561580" algn="l"/>
+                <a:tab pos="8143240" algn="l"/>
+                <a:tab pos="8724900" algn="l"/>
+                <a:tab pos="9306560" algn="l"/>
+              </a:tabLst>
+            </a:pPr>
+            <a:r>
+              <a:rPr lang="en-US" dirty="0">
+                <a:solidFill>
+                  <a:srgbClr val="000000"/>
+                </a:solidFill>
+                <a:latin typeface="Consolas" panose="020B0609020204030204" pitchFamily="49" charset="0"/>
+                <a:ea typeface="Times New Roman" panose="02020603050405020304" pitchFamily="18" charset="0"/>
+                <a:cs typeface="Times New Roman" panose="02020603050405020304" pitchFamily="18" charset="0"/>
+              </a:rPr>
+              <a:t>    </a:t>
+            </a:r>
+            <a:r>
+              <a:rPr lang="en-US" dirty="0">
+                <a:solidFill>
+                  <a:srgbClr val="0000FF"/>
+                </a:solidFill>
+                <a:latin typeface="Consolas" panose="020B0609020204030204" pitchFamily="49" charset="0"/>
+                <a:ea typeface="Times New Roman" panose="02020603050405020304" pitchFamily="18" charset="0"/>
+                <a:cs typeface="Times New Roman" panose="02020603050405020304" pitchFamily="18" charset="0"/>
+              </a:rPr>
+              <a:t>return</a:t>
+            </a:r>
+            <a:r>
+              <a:rPr lang="en-US" dirty="0">
+                <a:solidFill>
+                  <a:srgbClr val="000000"/>
+                </a:solidFill>
+                <a:latin typeface="Consolas" panose="020B0609020204030204" pitchFamily="49" charset="0"/>
+                <a:ea typeface="Times New Roman" panose="02020603050405020304" pitchFamily="18" charset="0"/>
+                <a:cs typeface="Times New Roman" panose="02020603050405020304" pitchFamily="18" charset="0"/>
+              </a:rPr>
+              <a:t> </a:t>
+            </a:r>
+            <a:r>
+              <a:rPr lang="en-US" dirty="0" err="1">
+                <a:solidFill>
+                  <a:srgbClr val="000000"/>
+                </a:solidFill>
+                <a:latin typeface="Consolas" panose="020B0609020204030204" pitchFamily="49" charset="0"/>
+                <a:ea typeface="Times New Roman" panose="02020603050405020304" pitchFamily="18" charset="0"/>
+                <a:cs typeface="Times New Roman" panose="02020603050405020304" pitchFamily="18" charset="0"/>
+              </a:rPr>
+              <a:t>DerivedClass</a:t>
+            </a:r>
+            <a:r>
+              <a:rPr lang="en-US" dirty="0">
+                <a:solidFill>
+                  <a:srgbClr val="000000"/>
+                </a:solidFill>
+                <a:latin typeface="Consolas" panose="020B0609020204030204" pitchFamily="49" charset="0"/>
+                <a:ea typeface="Times New Roman" panose="02020603050405020304" pitchFamily="18" charset="0"/>
+                <a:cs typeface="Times New Roman" panose="02020603050405020304" pitchFamily="18" charset="0"/>
+              </a:rPr>
+              <a:t>;</a:t>
+            </a:r>
+            <a:endParaRPr lang="en-US" sz="2400" dirty="0">
+              <a:latin typeface="Calibri" panose="020F0502020204030204" pitchFamily="34" charset="0"/>
+              <a:ea typeface="Calibri" panose="020F0502020204030204" pitchFamily="34" charset="0"/>
+              <a:cs typeface="Times New Roman" panose="02020603050405020304" pitchFamily="18" charset="0"/>
+            </a:endParaRPr>
+          </a:p>
+          <a:p>
+            <a:pPr>
+              <a:lnSpc>
+                <a:spcPct val="107000"/>
+              </a:lnSpc>
+              <a:tabLst>
+                <a:tab pos="581660" algn="l"/>
+                <a:tab pos="1163320" algn="l"/>
+                <a:tab pos="1744980" algn="l"/>
+                <a:tab pos="2326640" algn="l"/>
+                <a:tab pos="2908300" algn="l"/>
+                <a:tab pos="3489960" algn="l"/>
+                <a:tab pos="4071620" algn="l"/>
+                <a:tab pos="4653280" algn="l"/>
+                <a:tab pos="5234940" algn="l"/>
+                <a:tab pos="5816600" algn="l"/>
+                <a:tab pos="6398260" algn="l"/>
+                <a:tab pos="6979920" algn="l"/>
+                <a:tab pos="7561580" algn="l"/>
+                <a:tab pos="8143240" algn="l"/>
+                <a:tab pos="8724900" algn="l"/>
+                <a:tab pos="9306560" algn="l"/>
+              </a:tabLst>
+            </a:pPr>
+            <a:r>
+              <a:rPr lang="en-US" dirty="0">
+                <a:solidFill>
+                  <a:srgbClr val="000000"/>
+                </a:solidFill>
+                <a:latin typeface="Consolas" panose="020B0609020204030204" pitchFamily="49" charset="0"/>
+                <a:ea typeface="Times New Roman" panose="02020603050405020304" pitchFamily="18" charset="0"/>
+                <a:cs typeface="Times New Roman" panose="02020603050405020304" pitchFamily="18" charset="0"/>
+              </a:rPr>
+              <a:t>})(</a:t>
+            </a:r>
+            <a:r>
+              <a:rPr lang="en-US" dirty="0" err="1">
+                <a:solidFill>
+                  <a:srgbClr val="000000"/>
+                </a:solidFill>
+                <a:latin typeface="Consolas" panose="020B0609020204030204" pitchFamily="49" charset="0"/>
+                <a:ea typeface="Times New Roman" panose="02020603050405020304" pitchFamily="18" charset="0"/>
+                <a:cs typeface="Times New Roman" panose="02020603050405020304" pitchFamily="18" charset="0"/>
+              </a:rPr>
+              <a:t>BaseClass</a:t>
+            </a:r>
+            <a:r>
+              <a:rPr lang="en-US" dirty="0">
+                <a:solidFill>
+                  <a:srgbClr val="000000"/>
+                </a:solidFill>
+                <a:latin typeface="Consolas" panose="020B0609020204030204" pitchFamily="49" charset="0"/>
+                <a:ea typeface="Times New Roman" panose="02020603050405020304" pitchFamily="18" charset="0"/>
+                <a:cs typeface="Times New Roman" panose="02020603050405020304" pitchFamily="18" charset="0"/>
+              </a:rPr>
+              <a:t>);</a:t>
+            </a:r>
+            <a:endParaRPr lang="en-US" sz="2400" dirty="0">
+              <a:latin typeface="Calibri" panose="020F0502020204030204" pitchFamily="34" charset="0"/>
+              <a:ea typeface="Calibri" panose="020F0502020204030204" pitchFamily="34" charset="0"/>
+              <a:cs typeface="Times New Roman" panose="02020603050405020304" pitchFamily="18" charset="0"/>
+            </a:endParaRPr>
+          </a:p>
+          <a:p>
+            <a:pPr>
+              <a:lnSpc>
+                <a:spcPct val="107000"/>
+              </a:lnSpc>
+              <a:spcAft>
+                <a:spcPts val="800"/>
+              </a:spcAft>
+            </a:pPr>
+            <a:r>
+              <a:rPr lang="en-US" sz="2400" dirty="0">
+                <a:latin typeface="Calibri" panose="020F0502020204030204" pitchFamily="34" charset="0"/>
+                <a:ea typeface="Calibri" panose="020F0502020204030204" pitchFamily="34" charset="0"/>
+                <a:cs typeface="Times New Roman" panose="02020603050405020304" pitchFamily="18" charset="0"/>
+              </a:rPr>
+              <a:t> </a:t>
+            </a:r>
+            <a:endParaRPr lang="en-US" sz="2400" dirty="0">
+              <a:effectLst/>
+              <a:latin typeface="Calibri" panose="020F0502020204030204" pitchFamily="34" charset="0"/>
+              <a:ea typeface="Calibri" panose="020F0502020204030204" pitchFamily="34" charset="0"/>
+              <a:cs typeface="Times New Roman" panose="02020603050405020304" pitchFamily="18" charset="0"/>
+            </a:endParaRPr>
+          </a:p>
+        </p:txBody>
+      </p:sp>
+    </p:spTree>
+    <p:extLst>
+      <p:ext uri="{BB962C8B-B14F-4D97-AF65-F5344CB8AC3E}">
+        <p14:creationId xmlns:p14="http://schemas.microsoft.com/office/powerpoint/2010/main" val="1142371539"/>
       </p:ext>
     </p:extLst>
   </p:cSld>
@@ -12992,6 +16571,243 @@
       </p:par>
     </p:tnLst>
   </p:timing>
+</p:sld>
+</file>
+
+<file path=ppt/slides/slide30.xml><?xml version="1.0" encoding="utf-8"?>
+<p:sld xmlns:a="http://schemas.openxmlformats.org/drawingml/2006/main" xmlns:r="http://schemas.openxmlformats.org/officeDocument/2006/relationships" xmlns:p="http://schemas.openxmlformats.org/presentationml/2006/main">
+  <p:cSld>
+    <p:spTree>
+      <p:nvGrpSpPr>
+        <p:cNvPr id="1" name=""/>
+        <p:cNvGrpSpPr/>
+        <p:nvPr/>
+      </p:nvGrpSpPr>
+      <p:grpSpPr>
+        <a:xfrm>
+          <a:off x="0" y="0"/>
+          <a:ext cx="0" cy="0"/>
+          <a:chOff x="0" y="0"/>
+          <a:chExt cx="0" cy="0"/>
+        </a:xfrm>
+      </p:grpSpPr>
+      <p:sp>
+        <p:nvSpPr>
+          <p:cNvPr id="2" name="Title 1"/>
+          <p:cNvSpPr>
+            <a:spLocks noGrp="1"/>
+          </p:cNvSpPr>
+          <p:nvPr>
+            <p:ph type="title"/>
+          </p:nvPr>
+        </p:nvSpPr>
+        <p:spPr/>
+        <p:txBody>
+          <a:bodyPr/>
+          <a:lstStyle/>
+          <a:p>
+            <a:r>
+              <a:rPr lang="en-US" dirty="0" smtClean="0"/>
+              <a:t>Inheritance</a:t>
+            </a:r>
+            <a:endParaRPr lang="en-US" dirty="0"/>
+          </a:p>
+        </p:txBody>
+      </p:sp>
+      <p:sp>
+        <p:nvSpPr>
+          <p:cNvPr id="3" name="Content Placeholder 2"/>
+          <p:cNvSpPr>
+            <a:spLocks noGrp="1"/>
+          </p:cNvSpPr>
+          <p:nvPr>
+            <p:ph idx="1"/>
+          </p:nvPr>
+        </p:nvSpPr>
+        <p:spPr>
+          <a:xfrm>
+            <a:off x="677334" y="2160589"/>
+            <a:ext cx="8596668" cy="4560251"/>
+          </a:xfrm>
+        </p:spPr>
+        <p:txBody>
+          <a:bodyPr/>
+          <a:lstStyle/>
+          <a:p>
+            <a:r>
+              <a:rPr lang="en-US" dirty="0" smtClean="0"/>
+              <a:t>Which would you rather write?</a:t>
+            </a:r>
+          </a:p>
+          <a:p>
+            <a:endParaRPr lang="en-US" dirty="0"/>
+          </a:p>
+          <a:p>
+            <a:r>
+              <a:rPr lang="en-US" dirty="0" smtClean="0"/>
+              <a:t>Benefits:</a:t>
+            </a:r>
+          </a:p>
+          <a:p>
+            <a:pPr lvl="1"/>
+            <a:r>
+              <a:rPr lang="en-US" dirty="0" smtClean="0"/>
+              <a:t>Simple</a:t>
+            </a:r>
+          </a:p>
+          <a:p>
+            <a:pPr lvl="1"/>
+            <a:r>
+              <a:rPr lang="en-US" dirty="0" smtClean="0"/>
+              <a:t>Debugger support</a:t>
+            </a:r>
+          </a:p>
+          <a:p>
+            <a:pPr lvl="1"/>
+            <a:r>
+              <a:rPr lang="en-US" altLang="en-US" dirty="0" err="1">
+                <a:solidFill>
+                  <a:srgbClr val="0000FF"/>
+                </a:solidFill>
+                <a:latin typeface="Consolas" panose="020B0609020204030204" pitchFamily="49" charset="0"/>
+                <a:cs typeface="Consolas" panose="020B0609020204030204" pitchFamily="49" charset="0"/>
+              </a:rPr>
+              <a:t>instanceof</a:t>
+            </a:r>
+            <a:r>
+              <a:rPr lang="en-US" altLang="en-US" dirty="0">
+                <a:solidFill>
+                  <a:srgbClr val="000000"/>
+                </a:solidFill>
+                <a:latin typeface="Consolas" panose="020B0609020204030204" pitchFamily="49" charset="0"/>
+                <a:cs typeface="Consolas" panose="020B0609020204030204" pitchFamily="49" charset="0"/>
+              </a:rPr>
+              <a:t> </a:t>
+            </a:r>
+            <a:r>
+              <a:rPr lang="en-US" dirty="0" smtClean="0"/>
+              <a:t>support</a:t>
+            </a:r>
+          </a:p>
+          <a:p>
+            <a:pPr lvl="1"/>
+            <a:r>
+              <a:rPr lang="en-US" dirty="0" smtClean="0"/>
+              <a:t>Performant</a:t>
+            </a:r>
+          </a:p>
+          <a:p>
+            <a:pPr lvl="1"/>
+            <a:endParaRPr lang="en-US" dirty="0"/>
+          </a:p>
+          <a:p>
+            <a:r>
+              <a:rPr lang="en-US" dirty="0" smtClean="0"/>
+              <a:t>Not supported (yet):</a:t>
+            </a:r>
+          </a:p>
+          <a:p>
+            <a:pPr lvl="1"/>
+            <a:r>
+              <a:rPr lang="en-US" dirty="0" smtClean="0"/>
+              <a:t>Protected modifier</a:t>
+            </a:r>
+          </a:p>
+          <a:p>
+            <a:pPr lvl="1"/>
+            <a:r>
+              <a:rPr lang="en-US" dirty="0" smtClean="0"/>
+              <a:t>Abstract classes</a:t>
+            </a:r>
+          </a:p>
+        </p:txBody>
+      </p:sp>
+    </p:spTree>
+    <p:extLst>
+      <p:ext uri="{BB962C8B-B14F-4D97-AF65-F5344CB8AC3E}">
+        <p14:creationId xmlns:p14="http://schemas.microsoft.com/office/powerpoint/2010/main" val="4029897002"/>
+      </p:ext>
+    </p:extLst>
+  </p:cSld>
+  <p:clrMapOvr>
+    <a:masterClrMapping/>
+  </p:clrMapOvr>
+</p:sld>
+</file>
+
+<file path=ppt/slides/slide31.xml><?xml version="1.0" encoding="utf-8"?>
+<p:sld xmlns:a="http://schemas.openxmlformats.org/drawingml/2006/main" xmlns:r="http://schemas.openxmlformats.org/officeDocument/2006/relationships" xmlns:p="http://schemas.openxmlformats.org/presentationml/2006/main">
+  <p:cSld>
+    <p:spTree>
+      <p:nvGrpSpPr>
+        <p:cNvPr id="1" name=""/>
+        <p:cNvGrpSpPr/>
+        <p:nvPr/>
+      </p:nvGrpSpPr>
+      <p:grpSpPr>
+        <a:xfrm>
+          <a:off x="0" y="0"/>
+          <a:ext cx="0" cy="0"/>
+          <a:chOff x="0" y="0"/>
+          <a:chExt cx="0" cy="0"/>
+        </a:xfrm>
+      </p:grpSpPr>
+      <p:sp>
+        <p:nvSpPr>
+          <p:cNvPr id="2" name="Title 1"/>
+          <p:cNvSpPr>
+            <a:spLocks noGrp="1"/>
+          </p:cNvSpPr>
+          <p:nvPr>
+            <p:ph type="title"/>
+          </p:nvPr>
+        </p:nvSpPr>
+        <p:spPr/>
+        <p:txBody>
+          <a:bodyPr/>
+          <a:lstStyle/>
+          <a:p>
+            <a:r>
+              <a:rPr lang="en-US" dirty="0" smtClean="0"/>
+              <a:t>Inheritance – Demo	</a:t>
+            </a:r>
+            <a:endParaRPr lang="en-US" dirty="0"/>
+          </a:p>
+        </p:txBody>
+      </p:sp>
+      <p:sp>
+        <p:nvSpPr>
+          <p:cNvPr id="3" name="Content Placeholder 2"/>
+          <p:cNvSpPr>
+            <a:spLocks noGrp="1"/>
+          </p:cNvSpPr>
+          <p:nvPr>
+            <p:ph idx="1"/>
+          </p:nvPr>
+        </p:nvSpPr>
+        <p:spPr/>
+        <p:txBody>
+          <a:bodyPr/>
+          <a:lstStyle/>
+          <a:p>
+            <a:r>
+              <a:rPr lang="en-US" dirty="0" smtClean="0"/>
+              <a:t>Section 2 / 4-inheritance.ts</a:t>
+            </a:r>
+            <a:endParaRPr lang="en-US" dirty="0"/>
+          </a:p>
+        </p:txBody>
+      </p:sp>
+    </p:spTree>
+    <p:extLst>
+      <p:ext uri="{BB962C8B-B14F-4D97-AF65-F5344CB8AC3E}">
+        <p14:creationId xmlns:p14="http://schemas.microsoft.com/office/powerpoint/2010/main" val="1083575690"/>
+      </p:ext>
+    </p:extLst>
+  </p:cSld>
+  <p:clrMapOvr>
+    <a:masterClrMapping/>
+  </p:clrMapOvr>
 </p:sld>
 </file>
 
@@ -14362,7 +18178,7 @@
   <a:extraClrSchemeLst/>
   <a:extLst>
     <a:ext uri="{05A4C25C-085E-4340-85A3-A5531E510DB2}">
-      <thm15:themeFamily xmlns:thm15="http://schemas.microsoft.com/office/thememl/2012/main" xmlns="" name="Facet" id="{C0C680CD-088A-49FC-A102-D699147F32B2}" vid="{CFBC31BA-B70F-4F30-BCAA-4F3011E16C4D}"/>
+      <thm15:themeFamily xmlns:thm15="http://schemas.microsoft.com/office/thememl/2012/main" name="Facet" id="{C0C680CD-088A-49FC-A102-D699147F32B2}" vid="{CFBC31BA-B70F-4F30-BCAA-4F3011E16C4D}"/>
     </a:ext>
   </a:extLst>
 </a:theme>

</xml_diff>

<commit_message>
DanilF: Added to interfaces section. Added slides and examples for lambdas, generics, and definition files.
</commit_message>
<xml_diff>
--- a/Presentation/TypeScriptFundamentals.pptx
+++ b/Presentation/TypeScriptFundamentals.pptx
@@ -36,6 +36,20 @@
     <p:sldId id="285" r:id="rId30"/>
     <p:sldId id="286" r:id="rId31"/>
     <p:sldId id="287" r:id="rId32"/>
+    <p:sldId id="288" r:id="rId33"/>
+    <p:sldId id="289" r:id="rId34"/>
+    <p:sldId id="290" r:id="rId35"/>
+    <p:sldId id="292" r:id="rId36"/>
+    <p:sldId id="293" r:id="rId37"/>
+    <p:sldId id="291" r:id="rId38"/>
+    <p:sldId id="294" r:id="rId39"/>
+    <p:sldId id="295" r:id="rId40"/>
+    <p:sldId id="296" r:id="rId41"/>
+    <p:sldId id="297" r:id="rId42"/>
+    <p:sldId id="298" r:id="rId43"/>
+    <p:sldId id="299" r:id="rId44"/>
+    <p:sldId id="300" r:id="rId45"/>
+    <p:sldId id="301" r:id="rId46"/>
   </p:sldIdLst>
   <p:sldSz cx="12192000" cy="6858000"/>
   <p:notesSz cx="6858000" cy="9144000"/>
@@ -178,6 +192,24 @@
             <p14:sldId id="285"/>
             <p14:sldId id="286"/>
             <p14:sldId id="287"/>
+            <p14:sldId id="288"/>
+            <p14:sldId id="289"/>
+            <p14:sldId id="290"/>
+            <p14:sldId id="292"/>
+            <p14:sldId id="293"/>
+            <p14:sldId id="291"/>
+            <p14:sldId id="294"/>
+            <p14:sldId id="295"/>
+            <p14:sldId id="296"/>
+          </p14:sldIdLst>
+        </p14:section>
+        <p14:section name="Definition Files" id="{00371E5A-3F58-4477-98C7-6B4A61DE8EDE}">
+          <p14:sldIdLst>
+            <p14:sldId id="297"/>
+            <p14:sldId id="298"/>
+            <p14:sldId id="299"/>
+            <p14:sldId id="300"/>
+            <p14:sldId id="301"/>
           </p14:sldIdLst>
         </p14:section>
       </p14:sectionLst>
@@ -16811,6 +16843,3096 @@
 </p:sld>
 </file>
 
+<file path=ppt/slides/slide32.xml><?xml version="1.0" encoding="utf-8"?>
+<p:sld xmlns:a="http://schemas.openxmlformats.org/drawingml/2006/main" xmlns:r="http://schemas.openxmlformats.org/officeDocument/2006/relationships" xmlns:p="http://schemas.openxmlformats.org/presentationml/2006/main">
+  <p:cSld>
+    <p:spTree>
+      <p:nvGrpSpPr>
+        <p:cNvPr id="1" name=""/>
+        <p:cNvGrpSpPr/>
+        <p:nvPr/>
+      </p:nvGrpSpPr>
+      <p:grpSpPr>
+        <a:xfrm>
+          <a:off x="0" y="0"/>
+          <a:ext cx="0" cy="0"/>
+          <a:chOff x="0" y="0"/>
+          <a:chExt cx="0" cy="0"/>
+        </a:xfrm>
+      </p:grpSpPr>
+      <p:sp>
+        <p:nvSpPr>
+          <p:cNvPr id="2" name="Title 1"/>
+          <p:cNvSpPr>
+            <a:spLocks noGrp="1"/>
+          </p:cNvSpPr>
+          <p:nvPr>
+            <p:ph type="title"/>
+          </p:nvPr>
+        </p:nvSpPr>
+        <p:spPr/>
+        <p:txBody>
+          <a:bodyPr/>
+          <a:lstStyle/>
+          <a:p>
+            <a:r>
+              <a:rPr lang="en-US" dirty="0" smtClean="0"/>
+              <a:t>Functions</a:t>
+            </a:r>
+            <a:endParaRPr lang="en-US" dirty="0"/>
+          </a:p>
+        </p:txBody>
+      </p:sp>
+      <p:sp>
+        <p:nvSpPr>
+          <p:cNvPr id="3" name="Content Placeholder 2"/>
+          <p:cNvSpPr>
+            <a:spLocks noGrp="1"/>
+          </p:cNvSpPr>
+          <p:nvPr>
+            <p:ph idx="1"/>
+          </p:nvPr>
+        </p:nvSpPr>
+        <p:spPr/>
+        <p:txBody>
+          <a:bodyPr/>
+          <a:lstStyle/>
+          <a:p>
+            <a:r>
+              <a:rPr lang="en-US" dirty="0" smtClean="0"/>
+              <a:t>Standard functions just work</a:t>
+            </a:r>
+          </a:p>
+          <a:p>
+            <a:endParaRPr lang="en-US" dirty="0"/>
+          </a:p>
+          <a:p>
+            <a:r>
+              <a:rPr lang="en-US" dirty="0" smtClean="0"/>
+              <a:t>Full support for lambda expressions</a:t>
+            </a:r>
+          </a:p>
+          <a:p>
+            <a:endParaRPr lang="en-US" dirty="0"/>
+          </a:p>
+          <a:p>
+            <a:r>
+              <a:rPr lang="en-US" dirty="0" smtClean="0"/>
+              <a:t>Almost identical to functions with some “magic”</a:t>
+            </a:r>
+          </a:p>
+          <a:p>
+            <a:endParaRPr lang="en-US" dirty="0"/>
+          </a:p>
+          <a:p>
+            <a:r>
+              <a:rPr lang="en-US" dirty="0" smtClean="0"/>
+              <a:t>Opt for lambdas unless reason not to</a:t>
+            </a:r>
+          </a:p>
+        </p:txBody>
+      </p:sp>
+    </p:spTree>
+    <p:extLst>
+      <p:ext uri="{BB962C8B-B14F-4D97-AF65-F5344CB8AC3E}">
+        <p14:creationId xmlns:p14="http://schemas.microsoft.com/office/powerpoint/2010/main" val="2207548839"/>
+      </p:ext>
+    </p:extLst>
+  </p:cSld>
+  <p:clrMapOvr>
+    <a:masterClrMapping/>
+  </p:clrMapOvr>
+</p:sld>
+</file>
+
+<file path=ppt/slides/slide33.xml><?xml version="1.0" encoding="utf-8"?>
+<p:sld xmlns:a="http://schemas.openxmlformats.org/drawingml/2006/main" xmlns:r="http://schemas.openxmlformats.org/officeDocument/2006/relationships" xmlns:p="http://schemas.openxmlformats.org/presentationml/2006/main">
+  <p:cSld>
+    <p:spTree>
+      <p:nvGrpSpPr>
+        <p:cNvPr id="1" name=""/>
+        <p:cNvGrpSpPr/>
+        <p:nvPr/>
+      </p:nvGrpSpPr>
+      <p:grpSpPr>
+        <a:xfrm>
+          <a:off x="0" y="0"/>
+          <a:ext cx="0" cy="0"/>
+          <a:chOff x="0" y="0"/>
+          <a:chExt cx="0" cy="0"/>
+        </a:xfrm>
+      </p:grpSpPr>
+      <p:sp>
+        <p:nvSpPr>
+          <p:cNvPr id="2" name="Title 1"/>
+          <p:cNvSpPr>
+            <a:spLocks noGrp="1"/>
+          </p:cNvSpPr>
+          <p:nvPr>
+            <p:ph type="title"/>
+          </p:nvPr>
+        </p:nvSpPr>
+        <p:spPr/>
+        <p:txBody>
+          <a:bodyPr/>
+          <a:lstStyle/>
+          <a:p>
+            <a:r>
+              <a:rPr lang="en-US" dirty="0" smtClean="0"/>
+              <a:t>Functions</a:t>
+            </a:r>
+            <a:endParaRPr lang="en-US" dirty="0"/>
+          </a:p>
+        </p:txBody>
+      </p:sp>
+      <p:sp>
+        <p:nvSpPr>
+          <p:cNvPr id="3" name="Content Placeholder 2"/>
+          <p:cNvSpPr>
+            <a:spLocks noGrp="1"/>
+          </p:cNvSpPr>
+          <p:nvPr>
+            <p:ph idx="1"/>
+          </p:nvPr>
+        </p:nvSpPr>
+        <p:spPr/>
+        <p:txBody>
+          <a:bodyPr/>
+          <a:lstStyle/>
+          <a:p>
+            <a:r>
+              <a:rPr lang="en-US" dirty="0" smtClean="0"/>
+              <a:t>Declared as follows:</a:t>
+            </a:r>
+          </a:p>
+          <a:p>
+            <a:endParaRPr lang="en-US" dirty="0"/>
+          </a:p>
+          <a:p>
+            <a:endParaRPr lang="en-US" dirty="0" smtClean="0"/>
+          </a:p>
+          <a:p>
+            <a:r>
+              <a:rPr lang="en-US" dirty="0" smtClean="0"/>
+              <a:t>Compiles to:</a:t>
+            </a:r>
+            <a:endParaRPr lang="en-US" dirty="0"/>
+          </a:p>
+        </p:txBody>
+      </p:sp>
+      <p:sp>
+        <p:nvSpPr>
+          <p:cNvPr id="4" name="Rectangle 3"/>
+          <p:cNvSpPr/>
+          <p:nvPr/>
+        </p:nvSpPr>
+        <p:spPr>
+          <a:xfrm>
+            <a:off x="1202575" y="2531437"/>
+            <a:ext cx="6096000" cy="1080232"/>
+          </a:xfrm>
+          <a:prstGeom prst="rect">
+            <a:avLst/>
+          </a:prstGeom>
+        </p:spPr>
+        <p:txBody>
+          <a:bodyPr>
+            <a:spAutoFit/>
+          </a:bodyPr>
+          <a:lstStyle/>
+          <a:p>
+            <a:pPr>
+              <a:lnSpc>
+                <a:spcPct val="107000"/>
+              </a:lnSpc>
+              <a:tabLst>
+                <a:tab pos="581660" algn="l"/>
+                <a:tab pos="1163320" algn="l"/>
+                <a:tab pos="1744980" algn="l"/>
+                <a:tab pos="2326640" algn="l"/>
+                <a:tab pos="2908300" algn="l"/>
+                <a:tab pos="3489960" algn="l"/>
+                <a:tab pos="4071620" algn="l"/>
+                <a:tab pos="4653280" algn="l"/>
+                <a:tab pos="5234940" algn="l"/>
+                <a:tab pos="5816600" algn="l"/>
+                <a:tab pos="6398260" algn="l"/>
+                <a:tab pos="6979920" algn="l"/>
+                <a:tab pos="7561580" algn="l"/>
+                <a:tab pos="8143240" algn="l"/>
+                <a:tab pos="8724900" algn="l"/>
+                <a:tab pos="9306560" algn="l"/>
+              </a:tabLst>
+            </a:pPr>
+            <a:r>
+              <a:rPr lang="en-US" dirty="0" err="1">
+                <a:solidFill>
+                  <a:srgbClr val="0000FF"/>
+                </a:solidFill>
+                <a:latin typeface="Consolas" panose="020B0609020204030204" pitchFamily="49" charset="0"/>
+                <a:ea typeface="Times New Roman" panose="02020603050405020304" pitchFamily="18" charset="0"/>
+                <a:cs typeface="Times New Roman" panose="02020603050405020304" pitchFamily="18" charset="0"/>
+              </a:rPr>
+              <a:t>var</a:t>
+            </a:r>
+            <a:r>
+              <a:rPr lang="en-US" dirty="0">
+                <a:solidFill>
+                  <a:srgbClr val="000000"/>
+                </a:solidFill>
+                <a:latin typeface="Consolas" panose="020B0609020204030204" pitchFamily="49" charset="0"/>
+                <a:ea typeface="Times New Roman" panose="02020603050405020304" pitchFamily="18" charset="0"/>
+                <a:cs typeface="Times New Roman" panose="02020603050405020304" pitchFamily="18" charset="0"/>
+              </a:rPr>
+              <a:t> div = (a: </a:t>
+            </a:r>
+            <a:r>
+              <a:rPr lang="en-US" dirty="0">
+                <a:solidFill>
+                  <a:srgbClr val="0000FF"/>
+                </a:solidFill>
+                <a:latin typeface="Consolas" panose="020B0609020204030204" pitchFamily="49" charset="0"/>
+                <a:ea typeface="Times New Roman" panose="02020603050405020304" pitchFamily="18" charset="0"/>
+                <a:cs typeface="Times New Roman" panose="02020603050405020304" pitchFamily="18" charset="0"/>
+              </a:rPr>
+              <a:t>number</a:t>
+            </a:r>
+            <a:r>
+              <a:rPr lang="en-US" dirty="0">
+                <a:solidFill>
+                  <a:srgbClr val="000000"/>
+                </a:solidFill>
+                <a:latin typeface="Consolas" panose="020B0609020204030204" pitchFamily="49" charset="0"/>
+                <a:ea typeface="Times New Roman" panose="02020603050405020304" pitchFamily="18" charset="0"/>
+                <a:cs typeface="Times New Roman" panose="02020603050405020304" pitchFamily="18" charset="0"/>
+              </a:rPr>
+              <a:t>, b: </a:t>
+            </a:r>
+            <a:r>
+              <a:rPr lang="en-US" dirty="0">
+                <a:solidFill>
+                  <a:srgbClr val="0000FF"/>
+                </a:solidFill>
+                <a:latin typeface="Consolas" panose="020B0609020204030204" pitchFamily="49" charset="0"/>
+                <a:ea typeface="Times New Roman" panose="02020603050405020304" pitchFamily="18" charset="0"/>
+                <a:cs typeface="Times New Roman" panose="02020603050405020304" pitchFamily="18" charset="0"/>
+              </a:rPr>
+              <a:t>number</a:t>
+            </a:r>
+            <a:r>
+              <a:rPr lang="en-US" dirty="0">
+                <a:solidFill>
+                  <a:srgbClr val="000000"/>
+                </a:solidFill>
+                <a:latin typeface="Consolas" panose="020B0609020204030204" pitchFamily="49" charset="0"/>
+                <a:ea typeface="Times New Roman" panose="02020603050405020304" pitchFamily="18" charset="0"/>
+                <a:cs typeface="Times New Roman" panose="02020603050405020304" pitchFamily="18" charset="0"/>
+              </a:rPr>
+              <a:t>) =&gt; a / b;</a:t>
+            </a:r>
+            <a:endParaRPr lang="en-US" sz="2400" dirty="0">
+              <a:latin typeface="Calibri" panose="020F0502020204030204" pitchFamily="34" charset="0"/>
+              <a:ea typeface="Calibri" panose="020F0502020204030204" pitchFamily="34" charset="0"/>
+              <a:cs typeface="Times New Roman" panose="02020603050405020304" pitchFamily="18" charset="0"/>
+            </a:endParaRPr>
+          </a:p>
+          <a:p>
+            <a:pPr>
+              <a:lnSpc>
+                <a:spcPct val="107000"/>
+              </a:lnSpc>
+              <a:tabLst>
+                <a:tab pos="581660" algn="l"/>
+                <a:tab pos="1163320" algn="l"/>
+                <a:tab pos="1744980" algn="l"/>
+                <a:tab pos="2326640" algn="l"/>
+                <a:tab pos="2908300" algn="l"/>
+                <a:tab pos="3489960" algn="l"/>
+                <a:tab pos="4071620" algn="l"/>
+                <a:tab pos="4653280" algn="l"/>
+                <a:tab pos="5234940" algn="l"/>
+                <a:tab pos="5816600" algn="l"/>
+                <a:tab pos="6398260" algn="l"/>
+                <a:tab pos="6979920" algn="l"/>
+                <a:tab pos="7561580" algn="l"/>
+                <a:tab pos="8143240" algn="l"/>
+                <a:tab pos="8724900" algn="l"/>
+                <a:tab pos="9306560" algn="l"/>
+              </a:tabLst>
+            </a:pPr>
+            <a:r>
+              <a:rPr lang="en-US" dirty="0" smtClean="0">
+                <a:solidFill>
+                  <a:srgbClr val="000000"/>
+                </a:solidFill>
+                <a:latin typeface="Consolas" panose="020B0609020204030204" pitchFamily="49" charset="0"/>
+                <a:ea typeface="Times New Roman" panose="02020603050405020304" pitchFamily="18" charset="0"/>
+                <a:cs typeface="Times New Roman" panose="02020603050405020304" pitchFamily="18" charset="0"/>
+              </a:rPr>
+              <a:t>div(10</a:t>
+            </a:r>
+            <a:r>
+              <a:rPr lang="en-US" dirty="0">
+                <a:solidFill>
+                  <a:srgbClr val="000000"/>
+                </a:solidFill>
+                <a:latin typeface="Consolas" panose="020B0609020204030204" pitchFamily="49" charset="0"/>
+                <a:ea typeface="Times New Roman" panose="02020603050405020304" pitchFamily="18" charset="0"/>
+                <a:cs typeface="Times New Roman" panose="02020603050405020304" pitchFamily="18" charset="0"/>
+              </a:rPr>
+              <a:t>, 2);</a:t>
+            </a:r>
+            <a:endParaRPr lang="en-US" sz="2400" dirty="0">
+              <a:latin typeface="Calibri" panose="020F0502020204030204" pitchFamily="34" charset="0"/>
+              <a:ea typeface="Calibri" panose="020F0502020204030204" pitchFamily="34" charset="0"/>
+              <a:cs typeface="Times New Roman" panose="02020603050405020304" pitchFamily="18" charset="0"/>
+            </a:endParaRPr>
+          </a:p>
+          <a:p>
+            <a:pPr>
+              <a:lnSpc>
+                <a:spcPct val="107000"/>
+              </a:lnSpc>
+              <a:spcAft>
+                <a:spcPts val="800"/>
+              </a:spcAft>
+            </a:pPr>
+            <a:r>
+              <a:rPr lang="en-US" sz="2400" dirty="0">
+                <a:latin typeface="Calibri" panose="020F0502020204030204" pitchFamily="34" charset="0"/>
+                <a:ea typeface="Calibri" panose="020F0502020204030204" pitchFamily="34" charset="0"/>
+                <a:cs typeface="Times New Roman" panose="02020603050405020304" pitchFamily="18" charset="0"/>
+              </a:rPr>
+              <a:t> </a:t>
+            </a:r>
+            <a:endParaRPr lang="en-US" sz="2400" dirty="0">
+              <a:effectLst/>
+              <a:latin typeface="Calibri" panose="020F0502020204030204" pitchFamily="34" charset="0"/>
+              <a:ea typeface="Calibri" panose="020F0502020204030204" pitchFamily="34" charset="0"/>
+              <a:cs typeface="Times New Roman" panose="02020603050405020304" pitchFamily="18" charset="0"/>
+            </a:endParaRPr>
+          </a:p>
+        </p:txBody>
+      </p:sp>
+      <p:sp>
+        <p:nvSpPr>
+          <p:cNvPr id="5" name="Rectangle 4"/>
+          <p:cNvSpPr/>
+          <p:nvPr/>
+        </p:nvSpPr>
+        <p:spPr>
+          <a:xfrm>
+            <a:off x="1202575" y="3982517"/>
+            <a:ext cx="6096000" cy="1672958"/>
+          </a:xfrm>
+          <a:prstGeom prst="rect">
+            <a:avLst/>
+          </a:prstGeom>
+        </p:spPr>
+        <p:txBody>
+          <a:bodyPr>
+            <a:spAutoFit/>
+          </a:bodyPr>
+          <a:lstStyle/>
+          <a:p>
+            <a:pPr>
+              <a:lnSpc>
+                <a:spcPct val="107000"/>
+              </a:lnSpc>
+              <a:tabLst>
+                <a:tab pos="581660" algn="l"/>
+                <a:tab pos="1163320" algn="l"/>
+                <a:tab pos="1744980" algn="l"/>
+                <a:tab pos="2326640" algn="l"/>
+                <a:tab pos="2908300" algn="l"/>
+                <a:tab pos="3489960" algn="l"/>
+                <a:tab pos="4071620" algn="l"/>
+                <a:tab pos="4653280" algn="l"/>
+                <a:tab pos="5234940" algn="l"/>
+                <a:tab pos="5816600" algn="l"/>
+                <a:tab pos="6398260" algn="l"/>
+                <a:tab pos="6979920" algn="l"/>
+                <a:tab pos="7561580" algn="l"/>
+                <a:tab pos="8143240" algn="l"/>
+                <a:tab pos="8724900" algn="l"/>
+                <a:tab pos="9306560" algn="l"/>
+              </a:tabLst>
+            </a:pPr>
+            <a:r>
+              <a:rPr lang="en-US" dirty="0" err="1">
+                <a:solidFill>
+                  <a:srgbClr val="0000FF"/>
+                </a:solidFill>
+                <a:latin typeface="Consolas" panose="020B0609020204030204" pitchFamily="49" charset="0"/>
+                <a:ea typeface="Times New Roman" panose="02020603050405020304" pitchFamily="18" charset="0"/>
+                <a:cs typeface="Times New Roman" panose="02020603050405020304" pitchFamily="18" charset="0"/>
+              </a:rPr>
+              <a:t>var</a:t>
+            </a:r>
+            <a:r>
+              <a:rPr lang="en-US" dirty="0">
+                <a:solidFill>
+                  <a:srgbClr val="000000"/>
+                </a:solidFill>
+                <a:latin typeface="Consolas" panose="020B0609020204030204" pitchFamily="49" charset="0"/>
+                <a:ea typeface="Times New Roman" panose="02020603050405020304" pitchFamily="18" charset="0"/>
+                <a:cs typeface="Times New Roman" panose="02020603050405020304" pitchFamily="18" charset="0"/>
+              </a:rPr>
+              <a:t> div = </a:t>
+            </a:r>
+            <a:r>
+              <a:rPr lang="en-US" dirty="0">
+                <a:solidFill>
+                  <a:srgbClr val="0000FF"/>
+                </a:solidFill>
+                <a:latin typeface="Consolas" panose="020B0609020204030204" pitchFamily="49" charset="0"/>
+                <a:ea typeface="Times New Roman" panose="02020603050405020304" pitchFamily="18" charset="0"/>
+                <a:cs typeface="Times New Roman" panose="02020603050405020304" pitchFamily="18" charset="0"/>
+              </a:rPr>
+              <a:t>function</a:t>
+            </a:r>
+            <a:r>
+              <a:rPr lang="en-US" dirty="0">
+                <a:solidFill>
+                  <a:srgbClr val="000000"/>
+                </a:solidFill>
+                <a:latin typeface="Consolas" panose="020B0609020204030204" pitchFamily="49" charset="0"/>
+                <a:ea typeface="Times New Roman" panose="02020603050405020304" pitchFamily="18" charset="0"/>
+                <a:cs typeface="Times New Roman" panose="02020603050405020304" pitchFamily="18" charset="0"/>
+              </a:rPr>
+              <a:t> (a, b) {</a:t>
+            </a:r>
+            <a:endParaRPr lang="en-US" sz="2400" dirty="0">
+              <a:latin typeface="Calibri" panose="020F0502020204030204" pitchFamily="34" charset="0"/>
+              <a:ea typeface="Calibri" panose="020F0502020204030204" pitchFamily="34" charset="0"/>
+              <a:cs typeface="Times New Roman" panose="02020603050405020304" pitchFamily="18" charset="0"/>
+            </a:endParaRPr>
+          </a:p>
+          <a:p>
+            <a:pPr>
+              <a:lnSpc>
+                <a:spcPct val="107000"/>
+              </a:lnSpc>
+              <a:tabLst>
+                <a:tab pos="581660" algn="l"/>
+                <a:tab pos="1163320" algn="l"/>
+                <a:tab pos="1744980" algn="l"/>
+                <a:tab pos="2326640" algn="l"/>
+                <a:tab pos="2908300" algn="l"/>
+                <a:tab pos="3489960" algn="l"/>
+                <a:tab pos="4071620" algn="l"/>
+                <a:tab pos="4653280" algn="l"/>
+                <a:tab pos="5234940" algn="l"/>
+                <a:tab pos="5816600" algn="l"/>
+                <a:tab pos="6398260" algn="l"/>
+                <a:tab pos="6979920" algn="l"/>
+                <a:tab pos="7561580" algn="l"/>
+                <a:tab pos="8143240" algn="l"/>
+                <a:tab pos="8724900" algn="l"/>
+                <a:tab pos="9306560" algn="l"/>
+              </a:tabLst>
+            </a:pPr>
+            <a:r>
+              <a:rPr lang="en-US" dirty="0" smtClean="0">
+                <a:solidFill>
+                  <a:srgbClr val="000000"/>
+                </a:solidFill>
+                <a:latin typeface="Consolas" panose="020B0609020204030204" pitchFamily="49" charset="0"/>
+                <a:ea typeface="Times New Roman" panose="02020603050405020304" pitchFamily="18" charset="0"/>
+                <a:cs typeface="Times New Roman" panose="02020603050405020304" pitchFamily="18" charset="0"/>
+              </a:rPr>
+              <a:t>              </a:t>
+            </a:r>
+            <a:r>
+              <a:rPr lang="en-US" dirty="0" smtClean="0">
+                <a:solidFill>
+                  <a:srgbClr val="0000FF"/>
+                </a:solidFill>
+                <a:latin typeface="Consolas" panose="020B0609020204030204" pitchFamily="49" charset="0"/>
+                <a:ea typeface="Times New Roman" panose="02020603050405020304" pitchFamily="18" charset="0"/>
+                <a:cs typeface="Times New Roman" panose="02020603050405020304" pitchFamily="18" charset="0"/>
+              </a:rPr>
+              <a:t>return</a:t>
+            </a:r>
+            <a:r>
+              <a:rPr lang="en-US" dirty="0">
+                <a:solidFill>
+                  <a:srgbClr val="000000"/>
+                </a:solidFill>
+                <a:latin typeface="Consolas" panose="020B0609020204030204" pitchFamily="49" charset="0"/>
+                <a:ea typeface="Times New Roman" panose="02020603050405020304" pitchFamily="18" charset="0"/>
+                <a:cs typeface="Times New Roman" panose="02020603050405020304" pitchFamily="18" charset="0"/>
+              </a:rPr>
+              <a:t> a / b;</a:t>
+            </a:r>
+            <a:endParaRPr lang="en-US" sz="2400" dirty="0">
+              <a:latin typeface="Calibri" panose="020F0502020204030204" pitchFamily="34" charset="0"/>
+              <a:ea typeface="Calibri" panose="020F0502020204030204" pitchFamily="34" charset="0"/>
+              <a:cs typeface="Times New Roman" panose="02020603050405020304" pitchFamily="18" charset="0"/>
+            </a:endParaRPr>
+          </a:p>
+          <a:p>
+            <a:pPr>
+              <a:lnSpc>
+                <a:spcPct val="107000"/>
+              </a:lnSpc>
+              <a:tabLst>
+                <a:tab pos="581660" algn="l"/>
+                <a:tab pos="1163320" algn="l"/>
+                <a:tab pos="1744980" algn="l"/>
+                <a:tab pos="2326640" algn="l"/>
+                <a:tab pos="2908300" algn="l"/>
+                <a:tab pos="3489960" algn="l"/>
+                <a:tab pos="4071620" algn="l"/>
+                <a:tab pos="4653280" algn="l"/>
+                <a:tab pos="5234940" algn="l"/>
+                <a:tab pos="5816600" algn="l"/>
+                <a:tab pos="6398260" algn="l"/>
+                <a:tab pos="6979920" algn="l"/>
+                <a:tab pos="7561580" algn="l"/>
+                <a:tab pos="8143240" algn="l"/>
+                <a:tab pos="8724900" algn="l"/>
+                <a:tab pos="9306560" algn="l"/>
+              </a:tabLst>
+            </a:pPr>
+            <a:r>
+              <a:rPr lang="en-US" dirty="0">
+                <a:solidFill>
+                  <a:srgbClr val="000000"/>
+                </a:solidFill>
+                <a:latin typeface="Consolas" panose="020B0609020204030204" pitchFamily="49" charset="0"/>
+                <a:ea typeface="Times New Roman" panose="02020603050405020304" pitchFamily="18" charset="0"/>
+                <a:cs typeface="Times New Roman" panose="02020603050405020304" pitchFamily="18" charset="0"/>
+              </a:rPr>
+              <a:t>        </a:t>
+            </a:r>
+            <a:r>
+              <a:rPr lang="en-US" dirty="0" smtClean="0">
+                <a:solidFill>
+                  <a:srgbClr val="000000"/>
+                </a:solidFill>
+                <a:latin typeface="Consolas" panose="020B0609020204030204" pitchFamily="49" charset="0"/>
+                <a:ea typeface="Times New Roman" panose="02020603050405020304" pitchFamily="18" charset="0"/>
+                <a:cs typeface="Times New Roman" panose="02020603050405020304" pitchFamily="18" charset="0"/>
+              </a:rPr>
+              <a:t>  };</a:t>
+            </a:r>
+            <a:endParaRPr lang="en-US" sz="2400" dirty="0">
+              <a:latin typeface="Calibri" panose="020F0502020204030204" pitchFamily="34" charset="0"/>
+              <a:ea typeface="Calibri" panose="020F0502020204030204" pitchFamily="34" charset="0"/>
+              <a:cs typeface="Times New Roman" panose="02020603050405020304" pitchFamily="18" charset="0"/>
+            </a:endParaRPr>
+          </a:p>
+          <a:p>
+            <a:pPr>
+              <a:lnSpc>
+                <a:spcPct val="107000"/>
+              </a:lnSpc>
+              <a:tabLst>
+                <a:tab pos="581660" algn="l"/>
+                <a:tab pos="1163320" algn="l"/>
+                <a:tab pos="1744980" algn="l"/>
+                <a:tab pos="2326640" algn="l"/>
+                <a:tab pos="2908300" algn="l"/>
+                <a:tab pos="3489960" algn="l"/>
+                <a:tab pos="4071620" algn="l"/>
+                <a:tab pos="4653280" algn="l"/>
+                <a:tab pos="5234940" algn="l"/>
+                <a:tab pos="5816600" algn="l"/>
+                <a:tab pos="6398260" algn="l"/>
+                <a:tab pos="6979920" algn="l"/>
+                <a:tab pos="7561580" algn="l"/>
+                <a:tab pos="8143240" algn="l"/>
+                <a:tab pos="8724900" algn="l"/>
+                <a:tab pos="9306560" algn="l"/>
+              </a:tabLst>
+            </a:pPr>
+            <a:r>
+              <a:rPr lang="en-US" dirty="0" smtClean="0">
+                <a:solidFill>
+                  <a:srgbClr val="000000"/>
+                </a:solidFill>
+                <a:latin typeface="Consolas" panose="020B0609020204030204" pitchFamily="49" charset="0"/>
+                <a:ea typeface="Times New Roman" panose="02020603050405020304" pitchFamily="18" charset="0"/>
+                <a:cs typeface="Times New Roman" panose="02020603050405020304" pitchFamily="18" charset="0"/>
+              </a:rPr>
+              <a:t>div(10</a:t>
+            </a:r>
+            <a:r>
+              <a:rPr lang="en-US" dirty="0">
+                <a:solidFill>
+                  <a:srgbClr val="000000"/>
+                </a:solidFill>
+                <a:latin typeface="Consolas" panose="020B0609020204030204" pitchFamily="49" charset="0"/>
+                <a:ea typeface="Times New Roman" panose="02020603050405020304" pitchFamily="18" charset="0"/>
+                <a:cs typeface="Times New Roman" panose="02020603050405020304" pitchFamily="18" charset="0"/>
+              </a:rPr>
+              <a:t>, 2);</a:t>
+            </a:r>
+            <a:endParaRPr lang="en-US" sz="2400" dirty="0">
+              <a:latin typeface="Calibri" panose="020F0502020204030204" pitchFamily="34" charset="0"/>
+              <a:ea typeface="Calibri" panose="020F0502020204030204" pitchFamily="34" charset="0"/>
+              <a:cs typeface="Times New Roman" panose="02020603050405020304" pitchFamily="18" charset="0"/>
+            </a:endParaRPr>
+          </a:p>
+          <a:p>
+            <a:pPr>
+              <a:lnSpc>
+                <a:spcPct val="107000"/>
+              </a:lnSpc>
+              <a:spcAft>
+                <a:spcPts val="800"/>
+              </a:spcAft>
+            </a:pPr>
+            <a:r>
+              <a:rPr lang="en-US" sz="2400" dirty="0">
+                <a:latin typeface="Calibri" panose="020F0502020204030204" pitchFamily="34" charset="0"/>
+                <a:ea typeface="Calibri" panose="020F0502020204030204" pitchFamily="34" charset="0"/>
+                <a:cs typeface="Times New Roman" panose="02020603050405020304" pitchFamily="18" charset="0"/>
+              </a:rPr>
+              <a:t> </a:t>
+            </a:r>
+            <a:endParaRPr lang="en-US" sz="2400" dirty="0">
+              <a:effectLst/>
+              <a:latin typeface="Calibri" panose="020F0502020204030204" pitchFamily="34" charset="0"/>
+              <a:ea typeface="Calibri" panose="020F0502020204030204" pitchFamily="34" charset="0"/>
+              <a:cs typeface="Times New Roman" panose="02020603050405020304" pitchFamily="18" charset="0"/>
+            </a:endParaRPr>
+          </a:p>
+        </p:txBody>
+      </p:sp>
+    </p:spTree>
+    <p:extLst>
+      <p:ext uri="{BB962C8B-B14F-4D97-AF65-F5344CB8AC3E}">
+        <p14:creationId xmlns:p14="http://schemas.microsoft.com/office/powerpoint/2010/main" val="58436854"/>
+      </p:ext>
+    </p:extLst>
+  </p:cSld>
+  <p:clrMapOvr>
+    <a:masterClrMapping/>
+  </p:clrMapOvr>
+</p:sld>
+</file>
+
+<file path=ppt/slides/slide34.xml><?xml version="1.0" encoding="utf-8"?>
+<p:sld xmlns:a="http://schemas.openxmlformats.org/drawingml/2006/main" xmlns:r="http://schemas.openxmlformats.org/officeDocument/2006/relationships" xmlns:p="http://schemas.openxmlformats.org/presentationml/2006/main">
+  <p:cSld>
+    <p:spTree>
+      <p:nvGrpSpPr>
+        <p:cNvPr id="1" name=""/>
+        <p:cNvGrpSpPr/>
+        <p:nvPr/>
+      </p:nvGrpSpPr>
+      <p:grpSpPr>
+        <a:xfrm>
+          <a:off x="0" y="0"/>
+          <a:ext cx="0" cy="0"/>
+          <a:chOff x="0" y="0"/>
+          <a:chExt cx="0" cy="0"/>
+        </a:xfrm>
+      </p:grpSpPr>
+      <p:sp>
+        <p:nvSpPr>
+          <p:cNvPr id="2" name="Title 1"/>
+          <p:cNvSpPr>
+            <a:spLocks noGrp="1"/>
+          </p:cNvSpPr>
+          <p:nvPr>
+            <p:ph type="title"/>
+          </p:nvPr>
+        </p:nvSpPr>
+        <p:spPr/>
+        <p:txBody>
+          <a:bodyPr/>
+          <a:lstStyle/>
+          <a:p>
+            <a:r>
+              <a:rPr lang="en-US" dirty="0" smtClean="0"/>
+              <a:t>Functions</a:t>
+            </a:r>
+            <a:endParaRPr lang="en-US" dirty="0"/>
+          </a:p>
+        </p:txBody>
+      </p:sp>
+      <p:sp>
+        <p:nvSpPr>
+          <p:cNvPr id="3" name="Content Placeholder 2"/>
+          <p:cNvSpPr>
+            <a:spLocks noGrp="1"/>
+          </p:cNvSpPr>
+          <p:nvPr>
+            <p:ph idx="1"/>
+          </p:nvPr>
+        </p:nvSpPr>
+        <p:spPr/>
+        <p:txBody>
+          <a:bodyPr/>
+          <a:lstStyle/>
+          <a:p>
+            <a:r>
+              <a:rPr lang="en-US" dirty="0" smtClean="0"/>
+              <a:t>Can be nested</a:t>
+            </a:r>
+          </a:p>
+          <a:p>
+            <a:endParaRPr lang="en-US" dirty="0"/>
+          </a:p>
+          <a:p>
+            <a:r>
+              <a:rPr lang="en-US" dirty="0" smtClean="0"/>
+              <a:t>Supports type inference</a:t>
+            </a:r>
+          </a:p>
+          <a:p>
+            <a:endParaRPr lang="en-US" dirty="0"/>
+          </a:p>
+          <a:p>
+            <a:r>
+              <a:rPr lang="en-US" dirty="0" smtClean="0"/>
+              <a:t>Can be passed as parameters to functions</a:t>
+            </a:r>
+            <a:endParaRPr lang="en-US" dirty="0"/>
+          </a:p>
+          <a:p>
+            <a:endParaRPr lang="en-US" dirty="0" smtClean="0"/>
+          </a:p>
+          <a:p>
+            <a:endParaRPr lang="en-US" dirty="0"/>
+          </a:p>
+        </p:txBody>
+      </p:sp>
+    </p:spTree>
+    <p:extLst>
+      <p:ext uri="{BB962C8B-B14F-4D97-AF65-F5344CB8AC3E}">
+        <p14:creationId xmlns:p14="http://schemas.microsoft.com/office/powerpoint/2010/main" val="2890865740"/>
+      </p:ext>
+    </p:extLst>
+  </p:cSld>
+  <p:clrMapOvr>
+    <a:masterClrMapping/>
+  </p:clrMapOvr>
+</p:sld>
+</file>
+
+<file path=ppt/slides/slide35.xml><?xml version="1.0" encoding="utf-8"?>
+<p:sld xmlns:a="http://schemas.openxmlformats.org/drawingml/2006/main" xmlns:r="http://schemas.openxmlformats.org/officeDocument/2006/relationships" xmlns:p="http://schemas.openxmlformats.org/presentationml/2006/main">
+  <p:cSld>
+    <p:spTree>
+      <p:nvGrpSpPr>
+        <p:cNvPr id="1" name=""/>
+        <p:cNvGrpSpPr/>
+        <p:nvPr/>
+      </p:nvGrpSpPr>
+      <p:grpSpPr>
+        <a:xfrm>
+          <a:off x="0" y="0"/>
+          <a:ext cx="0" cy="0"/>
+          <a:chOff x="0" y="0"/>
+          <a:chExt cx="0" cy="0"/>
+        </a:xfrm>
+      </p:grpSpPr>
+      <p:sp>
+        <p:nvSpPr>
+          <p:cNvPr id="2" name="Title 1"/>
+          <p:cNvSpPr>
+            <a:spLocks noGrp="1"/>
+          </p:cNvSpPr>
+          <p:nvPr>
+            <p:ph type="title"/>
+          </p:nvPr>
+        </p:nvSpPr>
+        <p:spPr/>
+        <p:txBody>
+          <a:bodyPr/>
+          <a:lstStyle/>
+          <a:p>
+            <a:r>
+              <a:rPr lang="en-US" dirty="0" smtClean="0"/>
+              <a:t>Functions</a:t>
+            </a:r>
+            <a:endParaRPr lang="en-US" dirty="0"/>
+          </a:p>
+        </p:txBody>
+      </p:sp>
+      <p:sp>
+        <p:nvSpPr>
+          <p:cNvPr id="3" name="Content Placeholder 2"/>
+          <p:cNvSpPr>
+            <a:spLocks noGrp="1"/>
+          </p:cNvSpPr>
+          <p:nvPr>
+            <p:ph idx="1"/>
+          </p:nvPr>
+        </p:nvSpPr>
+        <p:spPr/>
+        <p:txBody>
+          <a:bodyPr/>
+          <a:lstStyle/>
+          <a:p>
+            <a:r>
+              <a:rPr lang="en-US" dirty="0" smtClean="0"/>
+              <a:t>Captures outer-most scope when in class</a:t>
+            </a:r>
+          </a:p>
+          <a:p>
+            <a:pPr lvl="1"/>
+            <a:r>
+              <a:rPr lang="en-US" dirty="0" smtClean="0"/>
+              <a:t>No need to user “self” alias</a:t>
+            </a:r>
+            <a:endParaRPr lang="en-US" dirty="0"/>
+          </a:p>
+        </p:txBody>
+      </p:sp>
+      <p:sp>
+        <p:nvSpPr>
+          <p:cNvPr id="5" name="Rectangle 4"/>
+          <p:cNvSpPr/>
+          <p:nvPr/>
+        </p:nvSpPr>
+        <p:spPr>
+          <a:xfrm>
+            <a:off x="117380" y="3182951"/>
+            <a:ext cx="9156622" cy="2858411"/>
+          </a:xfrm>
+          <a:prstGeom prst="rect">
+            <a:avLst/>
+          </a:prstGeom>
+        </p:spPr>
+        <p:txBody>
+          <a:bodyPr wrap="square">
+            <a:spAutoFit/>
+          </a:bodyPr>
+          <a:lstStyle/>
+          <a:p>
+            <a:pPr>
+              <a:lnSpc>
+                <a:spcPct val="107000"/>
+              </a:lnSpc>
+              <a:tabLst>
+                <a:tab pos="581660" algn="l"/>
+                <a:tab pos="1163320" algn="l"/>
+                <a:tab pos="1744980" algn="l"/>
+                <a:tab pos="2326640" algn="l"/>
+                <a:tab pos="2908300" algn="l"/>
+                <a:tab pos="3489960" algn="l"/>
+                <a:tab pos="4071620" algn="l"/>
+                <a:tab pos="4653280" algn="l"/>
+                <a:tab pos="5234940" algn="l"/>
+                <a:tab pos="5816600" algn="l"/>
+                <a:tab pos="6398260" algn="l"/>
+                <a:tab pos="6979920" algn="l"/>
+                <a:tab pos="7561580" algn="l"/>
+                <a:tab pos="8143240" algn="l"/>
+                <a:tab pos="8724900" algn="l"/>
+                <a:tab pos="9306560" algn="l"/>
+              </a:tabLst>
+            </a:pPr>
+            <a:r>
+              <a:rPr lang="en-US" dirty="0" smtClean="0">
+                <a:solidFill>
+                  <a:srgbClr val="0000FF"/>
+                </a:solidFill>
+                <a:latin typeface="Consolas" panose="020B0609020204030204" pitchFamily="49" charset="0"/>
+                <a:ea typeface="Times New Roman" panose="02020603050405020304" pitchFamily="18" charset="0"/>
+                <a:cs typeface="Times New Roman" panose="02020603050405020304" pitchFamily="18" charset="0"/>
+              </a:rPr>
+              <a:t>    class</a:t>
+            </a:r>
+            <a:r>
+              <a:rPr lang="en-US" dirty="0">
+                <a:solidFill>
+                  <a:srgbClr val="000000"/>
+                </a:solidFill>
+                <a:latin typeface="Consolas" panose="020B0609020204030204" pitchFamily="49" charset="0"/>
+                <a:ea typeface="Times New Roman" panose="02020603050405020304" pitchFamily="18" charset="0"/>
+                <a:cs typeface="Times New Roman" panose="02020603050405020304" pitchFamily="18" charset="0"/>
+              </a:rPr>
+              <a:t> </a:t>
+            </a:r>
+            <a:r>
+              <a:rPr lang="en-US" dirty="0" err="1">
+                <a:solidFill>
+                  <a:srgbClr val="000000"/>
+                </a:solidFill>
+                <a:latin typeface="Consolas" panose="020B0609020204030204" pitchFamily="49" charset="0"/>
+                <a:ea typeface="Times New Roman" panose="02020603050405020304" pitchFamily="18" charset="0"/>
+                <a:cs typeface="Times New Roman" panose="02020603050405020304" pitchFamily="18" charset="0"/>
+              </a:rPr>
+              <a:t>MyClass</a:t>
+            </a:r>
+            <a:r>
+              <a:rPr lang="en-US" dirty="0">
+                <a:solidFill>
+                  <a:srgbClr val="000000"/>
+                </a:solidFill>
+                <a:latin typeface="Consolas" panose="020B0609020204030204" pitchFamily="49" charset="0"/>
+                <a:ea typeface="Times New Roman" panose="02020603050405020304" pitchFamily="18" charset="0"/>
+                <a:cs typeface="Times New Roman" panose="02020603050405020304" pitchFamily="18" charset="0"/>
+              </a:rPr>
+              <a:t> {</a:t>
+            </a:r>
+            <a:endParaRPr lang="en-US" sz="2400" dirty="0">
+              <a:latin typeface="Calibri" panose="020F0502020204030204" pitchFamily="34" charset="0"/>
+              <a:ea typeface="Calibri" panose="020F0502020204030204" pitchFamily="34" charset="0"/>
+              <a:cs typeface="Times New Roman" panose="02020603050405020304" pitchFamily="18" charset="0"/>
+            </a:endParaRPr>
+          </a:p>
+          <a:p>
+            <a:pPr>
+              <a:lnSpc>
+                <a:spcPct val="107000"/>
+              </a:lnSpc>
+              <a:tabLst>
+                <a:tab pos="581660" algn="l"/>
+                <a:tab pos="1163320" algn="l"/>
+                <a:tab pos="1744980" algn="l"/>
+                <a:tab pos="2326640" algn="l"/>
+                <a:tab pos="2908300" algn="l"/>
+                <a:tab pos="3489960" algn="l"/>
+                <a:tab pos="4071620" algn="l"/>
+                <a:tab pos="4653280" algn="l"/>
+                <a:tab pos="5234940" algn="l"/>
+                <a:tab pos="5816600" algn="l"/>
+                <a:tab pos="6398260" algn="l"/>
+                <a:tab pos="6979920" algn="l"/>
+                <a:tab pos="7561580" algn="l"/>
+                <a:tab pos="8143240" algn="l"/>
+                <a:tab pos="8724900" algn="l"/>
+                <a:tab pos="9306560" algn="l"/>
+              </a:tabLst>
+            </a:pPr>
+            <a:r>
+              <a:rPr lang="en-US" dirty="0">
+                <a:solidFill>
+                  <a:srgbClr val="000000"/>
+                </a:solidFill>
+                <a:latin typeface="Consolas" panose="020B0609020204030204" pitchFamily="49" charset="0"/>
+                <a:ea typeface="Times New Roman" panose="02020603050405020304" pitchFamily="18" charset="0"/>
+                <a:cs typeface="Times New Roman" panose="02020603050405020304" pitchFamily="18" charset="0"/>
+              </a:rPr>
+              <a:t>        </a:t>
+            </a:r>
+            <a:r>
+              <a:rPr lang="en-US" dirty="0" err="1">
+                <a:solidFill>
+                  <a:srgbClr val="000000"/>
+                </a:solidFill>
+                <a:latin typeface="Consolas" panose="020B0609020204030204" pitchFamily="49" charset="0"/>
+                <a:ea typeface="Times New Roman" panose="02020603050405020304" pitchFamily="18" charset="0"/>
+                <a:cs typeface="Times New Roman" panose="02020603050405020304" pitchFamily="18" charset="0"/>
+              </a:rPr>
+              <a:t>myData</a:t>
+            </a:r>
+            <a:r>
+              <a:rPr lang="en-US" dirty="0">
+                <a:solidFill>
+                  <a:srgbClr val="000000"/>
+                </a:solidFill>
+                <a:latin typeface="Consolas" panose="020B0609020204030204" pitchFamily="49" charset="0"/>
+                <a:ea typeface="Times New Roman" panose="02020603050405020304" pitchFamily="18" charset="0"/>
+                <a:cs typeface="Times New Roman" panose="02020603050405020304" pitchFamily="18" charset="0"/>
+              </a:rPr>
+              <a:t>: Object = </a:t>
+            </a:r>
+            <a:r>
+              <a:rPr lang="en-US" dirty="0">
+                <a:solidFill>
+                  <a:srgbClr val="0000FF"/>
+                </a:solidFill>
+                <a:latin typeface="Consolas" panose="020B0609020204030204" pitchFamily="49" charset="0"/>
+                <a:ea typeface="Times New Roman" panose="02020603050405020304" pitchFamily="18" charset="0"/>
+                <a:cs typeface="Times New Roman" panose="02020603050405020304" pitchFamily="18" charset="0"/>
+              </a:rPr>
+              <a:t>null</a:t>
+            </a:r>
+            <a:r>
+              <a:rPr lang="en-US" dirty="0">
+                <a:solidFill>
+                  <a:srgbClr val="000000"/>
+                </a:solidFill>
+                <a:latin typeface="Consolas" panose="020B0609020204030204" pitchFamily="49" charset="0"/>
+                <a:ea typeface="Times New Roman" panose="02020603050405020304" pitchFamily="18" charset="0"/>
+                <a:cs typeface="Times New Roman" panose="02020603050405020304" pitchFamily="18" charset="0"/>
+              </a:rPr>
+              <a:t>;</a:t>
+            </a:r>
+            <a:endParaRPr lang="en-US" sz="2400" dirty="0">
+              <a:latin typeface="Calibri" panose="020F0502020204030204" pitchFamily="34" charset="0"/>
+              <a:ea typeface="Calibri" panose="020F0502020204030204" pitchFamily="34" charset="0"/>
+              <a:cs typeface="Times New Roman" panose="02020603050405020304" pitchFamily="18" charset="0"/>
+            </a:endParaRPr>
+          </a:p>
+          <a:p>
+            <a:pPr>
+              <a:lnSpc>
+                <a:spcPct val="107000"/>
+              </a:lnSpc>
+              <a:tabLst>
+                <a:tab pos="581660" algn="l"/>
+                <a:tab pos="1163320" algn="l"/>
+                <a:tab pos="1744980" algn="l"/>
+                <a:tab pos="2326640" algn="l"/>
+                <a:tab pos="2908300" algn="l"/>
+                <a:tab pos="3489960" algn="l"/>
+                <a:tab pos="4071620" algn="l"/>
+                <a:tab pos="4653280" algn="l"/>
+                <a:tab pos="5234940" algn="l"/>
+                <a:tab pos="5816600" algn="l"/>
+                <a:tab pos="6398260" algn="l"/>
+                <a:tab pos="6979920" algn="l"/>
+                <a:tab pos="7561580" algn="l"/>
+                <a:tab pos="8143240" algn="l"/>
+                <a:tab pos="8724900" algn="l"/>
+                <a:tab pos="9306560" algn="l"/>
+              </a:tabLst>
+            </a:pPr>
+            <a:r>
+              <a:rPr lang="en-US" dirty="0">
+                <a:solidFill>
+                  <a:srgbClr val="000000"/>
+                </a:solidFill>
+                <a:latin typeface="Consolas" panose="020B0609020204030204" pitchFamily="49" charset="0"/>
+                <a:ea typeface="Times New Roman" panose="02020603050405020304" pitchFamily="18" charset="0"/>
+                <a:cs typeface="Times New Roman" panose="02020603050405020304" pitchFamily="18" charset="0"/>
+              </a:rPr>
+              <a:t> </a:t>
+            </a:r>
+            <a:endParaRPr lang="en-US" sz="2400" dirty="0">
+              <a:latin typeface="Calibri" panose="020F0502020204030204" pitchFamily="34" charset="0"/>
+              <a:ea typeface="Calibri" panose="020F0502020204030204" pitchFamily="34" charset="0"/>
+              <a:cs typeface="Times New Roman" panose="02020603050405020304" pitchFamily="18" charset="0"/>
+            </a:endParaRPr>
+          </a:p>
+          <a:p>
+            <a:pPr>
+              <a:lnSpc>
+                <a:spcPct val="107000"/>
+              </a:lnSpc>
+              <a:tabLst>
+                <a:tab pos="581660" algn="l"/>
+                <a:tab pos="1163320" algn="l"/>
+                <a:tab pos="1744980" algn="l"/>
+                <a:tab pos="2326640" algn="l"/>
+                <a:tab pos="2908300" algn="l"/>
+                <a:tab pos="3489960" algn="l"/>
+                <a:tab pos="4071620" algn="l"/>
+                <a:tab pos="4653280" algn="l"/>
+                <a:tab pos="5234940" algn="l"/>
+                <a:tab pos="5816600" algn="l"/>
+                <a:tab pos="6398260" algn="l"/>
+                <a:tab pos="6979920" algn="l"/>
+                <a:tab pos="7561580" algn="l"/>
+                <a:tab pos="8143240" algn="l"/>
+                <a:tab pos="8724900" algn="l"/>
+                <a:tab pos="9306560" algn="l"/>
+              </a:tabLst>
+            </a:pPr>
+            <a:r>
+              <a:rPr lang="en-US" dirty="0">
+                <a:solidFill>
+                  <a:srgbClr val="000000"/>
+                </a:solidFill>
+                <a:latin typeface="Consolas" panose="020B0609020204030204" pitchFamily="49" charset="0"/>
+                <a:ea typeface="Times New Roman" panose="02020603050405020304" pitchFamily="18" charset="0"/>
+                <a:cs typeface="Times New Roman" panose="02020603050405020304" pitchFamily="18" charset="0"/>
+              </a:rPr>
+              <a:t>        </a:t>
+            </a:r>
+            <a:r>
+              <a:rPr lang="en-US" dirty="0" err="1">
+                <a:solidFill>
+                  <a:srgbClr val="000000"/>
+                </a:solidFill>
+                <a:latin typeface="Consolas" panose="020B0609020204030204" pitchFamily="49" charset="0"/>
+                <a:ea typeface="Times New Roman" panose="02020603050405020304" pitchFamily="18" charset="0"/>
+                <a:cs typeface="Times New Roman" panose="02020603050405020304" pitchFamily="18" charset="0"/>
+              </a:rPr>
+              <a:t>makeRequest</a:t>
+            </a:r>
+            <a:r>
+              <a:rPr lang="en-US" dirty="0">
+                <a:solidFill>
+                  <a:srgbClr val="000000"/>
+                </a:solidFill>
+                <a:latin typeface="Consolas" panose="020B0609020204030204" pitchFamily="49" charset="0"/>
+                <a:ea typeface="Times New Roman" panose="02020603050405020304" pitchFamily="18" charset="0"/>
+                <a:cs typeface="Times New Roman" panose="02020603050405020304" pitchFamily="18" charset="0"/>
+              </a:rPr>
+              <a:t>(): </a:t>
+            </a:r>
+            <a:r>
+              <a:rPr lang="en-US" dirty="0" err="1">
+                <a:solidFill>
+                  <a:srgbClr val="000000"/>
+                </a:solidFill>
+                <a:latin typeface="Consolas" panose="020B0609020204030204" pitchFamily="49" charset="0"/>
+                <a:ea typeface="Times New Roman" panose="02020603050405020304" pitchFamily="18" charset="0"/>
+                <a:cs typeface="Times New Roman" panose="02020603050405020304" pitchFamily="18" charset="0"/>
+              </a:rPr>
+              <a:t>JQueryDeferred</a:t>
+            </a:r>
+            <a:r>
+              <a:rPr lang="en-US" dirty="0">
+                <a:solidFill>
+                  <a:srgbClr val="000000"/>
+                </a:solidFill>
+                <a:latin typeface="Consolas" panose="020B0609020204030204" pitchFamily="49" charset="0"/>
+                <a:ea typeface="Times New Roman" panose="02020603050405020304" pitchFamily="18" charset="0"/>
+                <a:cs typeface="Times New Roman" panose="02020603050405020304" pitchFamily="18" charset="0"/>
+              </a:rPr>
+              <a:t>&lt;</a:t>
+            </a:r>
+            <a:r>
+              <a:rPr lang="en-US" dirty="0">
+                <a:solidFill>
+                  <a:srgbClr val="0000FF"/>
+                </a:solidFill>
+                <a:latin typeface="Consolas" panose="020B0609020204030204" pitchFamily="49" charset="0"/>
+                <a:ea typeface="Times New Roman" panose="02020603050405020304" pitchFamily="18" charset="0"/>
+                <a:cs typeface="Times New Roman" panose="02020603050405020304" pitchFamily="18" charset="0"/>
+              </a:rPr>
+              <a:t>any</a:t>
+            </a:r>
+            <a:r>
+              <a:rPr lang="en-US" dirty="0">
+                <a:solidFill>
+                  <a:srgbClr val="000000"/>
+                </a:solidFill>
+                <a:latin typeface="Consolas" panose="020B0609020204030204" pitchFamily="49" charset="0"/>
+                <a:ea typeface="Times New Roman" panose="02020603050405020304" pitchFamily="18" charset="0"/>
+                <a:cs typeface="Times New Roman" panose="02020603050405020304" pitchFamily="18" charset="0"/>
+              </a:rPr>
+              <a:t>&gt; {</a:t>
+            </a:r>
+            <a:endParaRPr lang="en-US" sz="2400" dirty="0">
+              <a:latin typeface="Calibri" panose="020F0502020204030204" pitchFamily="34" charset="0"/>
+              <a:ea typeface="Calibri" panose="020F0502020204030204" pitchFamily="34" charset="0"/>
+              <a:cs typeface="Times New Roman" panose="02020603050405020304" pitchFamily="18" charset="0"/>
+            </a:endParaRPr>
+          </a:p>
+          <a:p>
+            <a:pPr>
+              <a:lnSpc>
+                <a:spcPct val="107000"/>
+              </a:lnSpc>
+              <a:tabLst>
+                <a:tab pos="581660" algn="l"/>
+                <a:tab pos="1163320" algn="l"/>
+                <a:tab pos="1744980" algn="l"/>
+                <a:tab pos="2326640" algn="l"/>
+                <a:tab pos="2908300" algn="l"/>
+                <a:tab pos="3489960" algn="l"/>
+                <a:tab pos="4071620" algn="l"/>
+                <a:tab pos="4653280" algn="l"/>
+                <a:tab pos="5234940" algn="l"/>
+                <a:tab pos="5816600" algn="l"/>
+                <a:tab pos="6398260" algn="l"/>
+                <a:tab pos="6979920" algn="l"/>
+                <a:tab pos="7561580" algn="l"/>
+                <a:tab pos="8143240" algn="l"/>
+                <a:tab pos="8724900" algn="l"/>
+                <a:tab pos="9306560" algn="l"/>
+              </a:tabLst>
+            </a:pPr>
+            <a:r>
+              <a:rPr lang="en-US" dirty="0">
+                <a:solidFill>
+                  <a:srgbClr val="000000"/>
+                </a:solidFill>
+                <a:latin typeface="Consolas" panose="020B0609020204030204" pitchFamily="49" charset="0"/>
+                <a:ea typeface="Times New Roman" panose="02020603050405020304" pitchFamily="18" charset="0"/>
+                <a:cs typeface="Times New Roman" panose="02020603050405020304" pitchFamily="18" charset="0"/>
+              </a:rPr>
+              <a:t>            </a:t>
+            </a:r>
+            <a:r>
+              <a:rPr lang="en-US" dirty="0">
+                <a:solidFill>
+                  <a:srgbClr val="0000FF"/>
+                </a:solidFill>
+                <a:latin typeface="Consolas" panose="020B0609020204030204" pitchFamily="49" charset="0"/>
+                <a:ea typeface="Times New Roman" panose="02020603050405020304" pitchFamily="18" charset="0"/>
+                <a:cs typeface="Times New Roman" panose="02020603050405020304" pitchFamily="18" charset="0"/>
+              </a:rPr>
+              <a:t>return</a:t>
+            </a:r>
+            <a:r>
+              <a:rPr lang="en-US" dirty="0">
+                <a:solidFill>
+                  <a:srgbClr val="000000"/>
+                </a:solidFill>
+                <a:latin typeface="Consolas" panose="020B0609020204030204" pitchFamily="49" charset="0"/>
+                <a:ea typeface="Times New Roman" panose="02020603050405020304" pitchFamily="18" charset="0"/>
+                <a:cs typeface="Times New Roman" panose="02020603050405020304" pitchFamily="18" charset="0"/>
+              </a:rPr>
+              <a:t> $.</a:t>
+            </a:r>
+            <a:r>
+              <a:rPr lang="en-US" dirty="0">
+                <a:solidFill>
+                  <a:srgbClr val="0000FF"/>
+                </a:solidFill>
+                <a:latin typeface="Consolas" panose="020B0609020204030204" pitchFamily="49" charset="0"/>
+                <a:ea typeface="Times New Roman" panose="02020603050405020304" pitchFamily="18" charset="0"/>
+                <a:cs typeface="Times New Roman" panose="02020603050405020304" pitchFamily="18" charset="0"/>
+              </a:rPr>
+              <a:t>get</a:t>
+            </a:r>
+            <a:r>
+              <a:rPr lang="en-US" dirty="0">
+                <a:solidFill>
+                  <a:srgbClr val="000000"/>
+                </a:solidFill>
+                <a:latin typeface="Consolas" panose="020B0609020204030204" pitchFamily="49" charset="0"/>
+                <a:ea typeface="Times New Roman" panose="02020603050405020304" pitchFamily="18" charset="0"/>
+                <a:cs typeface="Times New Roman" panose="02020603050405020304" pitchFamily="18" charset="0"/>
+              </a:rPr>
+              <a:t>(</a:t>
+            </a:r>
+            <a:r>
+              <a:rPr lang="en-US" dirty="0">
+                <a:solidFill>
+                  <a:srgbClr val="A31515"/>
+                </a:solidFill>
+                <a:latin typeface="Consolas" panose="020B0609020204030204" pitchFamily="49" charset="0"/>
+                <a:ea typeface="Times New Roman" panose="02020603050405020304" pitchFamily="18" charset="0"/>
+                <a:cs typeface="Times New Roman" panose="02020603050405020304" pitchFamily="18" charset="0"/>
+              </a:rPr>
+              <a:t>'~/</a:t>
+            </a:r>
+            <a:r>
+              <a:rPr lang="en-US" dirty="0" err="1">
+                <a:solidFill>
+                  <a:srgbClr val="A31515"/>
+                </a:solidFill>
+                <a:latin typeface="Consolas" panose="020B0609020204030204" pitchFamily="49" charset="0"/>
+                <a:ea typeface="Times New Roman" panose="02020603050405020304" pitchFamily="18" charset="0"/>
+                <a:cs typeface="Times New Roman" panose="02020603050405020304" pitchFamily="18" charset="0"/>
+              </a:rPr>
+              <a:t>api</a:t>
+            </a:r>
+            <a:r>
+              <a:rPr lang="en-US" dirty="0">
+                <a:solidFill>
+                  <a:srgbClr val="A31515"/>
+                </a:solidFill>
+                <a:latin typeface="Consolas" panose="020B0609020204030204" pitchFamily="49" charset="0"/>
+                <a:ea typeface="Times New Roman" panose="02020603050405020304" pitchFamily="18" charset="0"/>
+                <a:cs typeface="Times New Roman" panose="02020603050405020304" pitchFamily="18" charset="0"/>
+              </a:rPr>
+              <a:t>/stuff'</a:t>
+            </a:r>
+            <a:r>
+              <a:rPr lang="en-US" dirty="0">
+                <a:solidFill>
+                  <a:srgbClr val="000000"/>
+                </a:solidFill>
+                <a:latin typeface="Consolas" panose="020B0609020204030204" pitchFamily="49" charset="0"/>
+                <a:ea typeface="Times New Roman" panose="02020603050405020304" pitchFamily="18" charset="0"/>
+                <a:cs typeface="Times New Roman" panose="02020603050405020304" pitchFamily="18" charset="0"/>
+              </a:rPr>
+              <a:t>)</a:t>
+            </a:r>
+            <a:endParaRPr lang="en-US" sz="2400" dirty="0">
+              <a:latin typeface="Calibri" panose="020F0502020204030204" pitchFamily="34" charset="0"/>
+              <a:ea typeface="Calibri" panose="020F0502020204030204" pitchFamily="34" charset="0"/>
+              <a:cs typeface="Times New Roman" panose="02020603050405020304" pitchFamily="18" charset="0"/>
+            </a:endParaRPr>
+          </a:p>
+          <a:p>
+            <a:pPr>
+              <a:lnSpc>
+                <a:spcPct val="107000"/>
+              </a:lnSpc>
+              <a:tabLst>
+                <a:tab pos="581660" algn="l"/>
+                <a:tab pos="1163320" algn="l"/>
+                <a:tab pos="1744980" algn="l"/>
+                <a:tab pos="2326640" algn="l"/>
+                <a:tab pos="2908300" algn="l"/>
+                <a:tab pos="3489960" algn="l"/>
+                <a:tab pos="4071620" algn="l"/>
+                <a:tab pos="4653280" algn="l"/>
+                <a:tab pos="5234940" algn="l"/>
+                <a:tab pos="5816600" algn="l"/>
+                <a:tab pos="6398260" algn="l"/>
+                <a:tab pos="6979920" algn="l"/>
+                <a:tab pos="7561580" algn="l"/>
+                <a:tab pos="8143240" algn="l"/>
+                <a:tab pos="8724900" algn="l"/>
+                <a:tab pos="9306560" algn="l"/>
+              </a:tabLst>
+            </a:pPr>
+            <a:r>
+              <a:rPr lang="en-US" dirty="0">
+                <a:solidFill>
+                  <a:srgbClr val="000000"/>
+                </a:solidFill>
+                <a:latin typeface="Consolas" panose="020B0609020204030204" pitchFamily="49" charset="0"/>
+                <a:ea typeface="Times New Roman" panose="02020603050405020304" pitchFamily="18" charset="0"/>
+                <a:cs typeface="Times New Roman" panose="02020603050405020304" pitchFamily="18" charset="0"/>
+              </a:rPr>
+              <a:t>                .done((response: </a:t>
+            </a:r>
+            <a:r>
+              <a:rPr lang="en-US" dirty="0">
+                <a:solidFill>
+                  <a:srgbClr val="0000FF"/>
+                </a:solidFill>
+                <a:latin typeface="Consolas" panose="020B0609020204030204" pitchFamily="49" charset="0"/>
+                <a:ea typeface="Times New Roman" panose="02020603050405020304" pitchFamily="18" charset="0"/>
+                <a:cs typeface="Times New Roman" panose="02020603050405020304" pitchFamily="18" charset="0"/>
+              </a:rPr>
+              <a:t>any</a:t>
+            </a:r>
+            <a:r>
+              <a:rPr lang="en-US" dirty="0">
+                <a:solidFill>
+                  <a:srgbClr val="000000"/>
+                </a:solidFill>
+                <a:latin typeface="Consolas" panose="020B0609020204030204" pitchFamily="49" charset="0"/>
+                <a:ea typeface="Times New Roman" panose="02020603050405020304" pitchFamily="18" charset="0"/>
+                <a:cs typeface="Times New Roman" panose="02020603050405020304" pitchFamily="18" charset="0"/>
+              </a:rPr>
+              <a:t>) =&gt; </a:t>
+            </a:r>
+            <a:r>
+              <a:rPr lang="en-US" dirty="0" err="1">
+                <a:solidFill>
+                  <a:srgbClr val="0000FF"/>
+                </a:solidFill>
+                <a:latin typeface="Consolas" panose="020B0609020204030204" pitchFamily="49" charset="0"/>
+                <a:ea typeface="Times New Roman" panose="02020603050405020304" pitchFamily="18" charset="0"/>
+                <a:cs typeface="Times New Roman" panose="02020603050405020304" pitchFamily="18" charset="0"/>
+              </a:rPr>
+              <a:t>this</a:t>
+            </a:r>
+            <a:r>
+              <a:rPr lang="en-US" dirty="0" err="1">
+                <a:solidFill>
+                  <a:srgbClr val="000000"/>
+                </a:solidFill>
+                <a:latin typeface="Consolas" panose="020B0609020204030204" pitchFamily="49" charset="0"/>
+                <a:ea typeface="Times New Roman" panose="02020603050405020304" pitchFamily="18" charset="0"/>
+                <a:cs typeface="Times New Roman" panose="02020603050405020304" pitchFamily="18" charset="0"/>
+              </a:rPr>
+              <a:t>.myData</a:t>
+            </a:r>
+            <a:r>
+              <a:rPr lang="en-US" dirty="0">
+                <a:solidFill>
+                  <a:srgbClr val="000000"/>
+                </a:solidFill>
+                <a:latin typeface="Consolas" panose="020B0609020204030204" pitchFamily="49" charset="0"/>
+                <a:ea typeface="Times New Roman" panose="02020603050405020304" pitchFamily="18" charset="0"/>
+                <a:cs typeface="Times New Roman" panose="02020603050405020304" pitchFamily="18" charset="0"/>
+              </a:rPr>
+              <a:t> = response);</a:t>
+            </a:r>
+            <a:endParaRPr lang="en-US" sz="2400" dirty="0">
+              <a:latin typeface="Calibri" panose="020F0502020204030204" pitchFamily="34" charset="0"/>
+              <a:ea typeface="Calibri" panose="020F0502020204030204" pitchFamily="34" charset="0"/>
+              <a:cs typeface="Times New Roman" panose="02020603050405020304" pitchFamily="18" charset="0"/>
+            </a:endParaRPr>
+          </a:p>
+          <a:p>
+            <a:pPr>
+              <a:lnSpc>
+                <a:spcPct val="107000"/>
+              </a:lnSpc>
+              <a:tabLst>
+                <a:tab pos="581660" algn="l"/>
+                <a:tab pos="1163320" algn="l"/>
+                <a:tab pos="1744980" algn="l"/>
+                <a:tab pos="2326640" algn="l"/>
+                <a:tab pos="2908300" algn="l"/>
+                <a:tab pos="3489960" algn="l"/>
+                <a:tab pos="4071620" algn="l"/>
+                <a:tab pos="4653280" algn="l"/>
+                <a:tab pos="5234940" algn="l"/>
+                <a:tab pos="5816600" algn="l"/>
+                <a:tab pos="6398260" algn="l"/>
+                <a:tab pos="6979920" algn="l"/>
+                <a:tab pos="7561580" algn="l"/>
+                <a:tab pos="8143240" algn="l"/>
+                <a:tab pos="8724900" algn="l"/>
+                <a:tab pos="9306560" algn="l"/>
+              </a:tabLst>
+            </a:pPr>
+            <a:r>
+              <a:rPr lang="en-US" dirty="0">
+                <a:solidFill>
+                  <a:srgbClr val="000000"/>
+                </a:solidFill>
+                <a:latin typeface="Consolas" panose="020B0609020204030204" pitchFamily="49" charset="0"/>
+                <a:ea typeface="Times New Roman" panose="02020603050405020304" pitchFamily="18" charset="0"/>
+                <a:cs typeface="Times New Roman" panose="02020603050405020304" pitchFamily="18" charset="0"/>
+              </a:rPr>
+              <a:t>        }</a:t>
+            </a:r>
+            <a:endParaRPr lang="en-US" sz="2400" dirty="0">
+              <a:latin typeface="Calibri" panose="020F0502020204030204" pitchFamily="34" charset="0"/>
+              <a:ea typeface="Calibri" panose="020F0502020204030204" pitchFamily="34" charset="0"/>
+              <a:cs typeface="Times New Roman" panose="02020603050405020304" pitchFamily="18" charset="0"/>
+            </a:endParaRPr>
+          </a:p>
+          <a:p>
+            <a:pPr>
+              <a:lnSpc>
+                <a:spcPct val="107000"/>
+              </a:lnSpc>
+              <a:tabLst>
+                <a:tab pos="581660" algn="l"/>
+                <a:tab pos="1163320" algn="l"/>
+                <a:tab pos="1744980" algn="l"/>
+                <a:tab pos="2326640" algn="l"/>
+                <a:tab pos="2908300" algn="l"/>
+                <a:tab pos="3489960" algn="l"/>
+                <a:tab pos="4071620" algn="l"/>
+                <a:tab pos="4653280" algn="l"/>
+                <a:tab pos="5234940" algn="l"/>
+                <a:tab pos="5816600" algn="l"/>
+                <a:tab pos="6398260" algn="l"/>
+                <a:tab pos="6979920" algn="l"/>
+                <a:tab pos="7561580" algn="l"/>
+                <a:tab pos="8143240" algn="l"/>
+                <a:tab pos="8724900" algn="l"/>
+                <a:tab pos="9306560" algn="l"/>
+              </a:tabLst>
+            </a:pPr>
+            <a:r>
+              <a:rPr lang="en-US" dirty="0">
+                <a:solidFill>
+                  <a:srgbClr val="000000"/>
+                </a:solidFill>
+                <a:latin typeface="Consolas" panose="020B0609020204030204" pitchFamily="49" charset="0"/>
+                <a:ea typeface="Times New Roman" panose="02020603050405020304" pitchFamily="18" charset="0"/>
+                <a:cs typeface="Times New Roman" panose="02020603050405020304" pitchFamily="18" charset="0"/>
+              </a:rPr>
+              <a:t>    }</a:t>
+            </a:r>
+            <a:endParaRPr lang="en-US" sz="2400" dirty="0">
+              <a:latin typeface="Calibri" panose="020F0502020204030204" pitchFamily="34" charset="0"/>
+              <a:ea typeface="Calibri" panose="020F0502020204030204" pitchFamily="34" charset="0"/>
+              <a:cs typeface="Times New Roman" panose="02020603050405020304" pitchFamily="18" charset="0"/>
+            </a:endParaRPr>
+          </a:p>
+          <a:p>
+            <a:pPr>
+              <a:lnSpc>
+                <a:spcPct val="107000"/>
+              </a:lnSpc>
+              <a:spcAft>
+                <a:spcPts val="800"/>
+              </a:spcAft>
+            </a:pPr>
+            <a:r>
+              <a:rPr lang="en-US" sz="2400" dirty="0">
+                <a:latin typeface="Calibri" panose="020F0502020204030204" pitchFamily="34" charset="0"/>
+                <a:ea typeface="Calibri" panose="020F0502020204030204" pitchFamily="34" charset="0"/>
+                <a:cs typeface="Times New Roman" panose="02020603050405020304" pitchFamily="18" charset="0"/>
+              </a:rPr>
+              <a:t> </a:t>
+            </a:r>
+            <a:endParaRPr lang="en-US" sz="2400" dirty="0">
+              <a:effectLst/>
+              <a:latin typeface="Calibri" panose="020F0502020204030204" pitchFamily="34" charset="0"/>
+              <a:ea typeface="Calibri" panose="020F0502020204030204" pitchFamily="34" charset="0"/>
+              <a:cs typeface="Times New Roman" panose="02020603050405020304" pitchFamily="18" charset="0"/>
+            </a:endParaRPr>
+          </a:p>
+        </p:txBody>
+      </p:sp>
+    </p:spTree>
+    <p:extLst>
+      <p:ext uri="{BB962C8B-B14F-4D97-AF65-F5344CB8AC3E}">
+        <p14:creationId xmlns:p14="http://schemas.microsoft.com/office/powerpoint/2010/main" val="1784088866"/>
+      </p:ext>
+    </p:extLst>
+  </p:cSld>
+  <p:clrMapOvr>
+    <a:masterClrMapping/>
+  </p:clrMapOvr>
+</p:sld>
+</file>
+
+<file path=ppt/slides/slide36.xml><?xml version="1.0" encoding="utf-8"?>
+<p:sld xmlns:a="http://schemas.openxmlformats.org/drawingml/2006/main" xmlns:r="http://schemas.openxmlformats.org/officeDocument/2006/relationships" xmlns:p="http://schemas.openxmlformats.org/presentationml/2006/main">
+  <p:cSld>
+    <p:spTree>
+      <p:nvGrpSpPr>
+        <p:cNvPr id="1" name=""/>
+        <p:cNvGrpSpPr/>
+        <p:nvPr/>
+      </p:nvGrpSpPr>
+      <p:grpSpPr>
+        <a:xfrm>
+          <a:off x="0" y="0"/>
+          <a:ext cx="0" cy="0"/>
+          <a:chOff x="0" y="0"/>
+          <a:chExt cx="0" cy="0"/>
+        </a:xfrm>
+      </p:grpSpPr>
+      <p:sp>
+        <p:nvSpPr>
+          <p:cNvPr id="2" name="Title 1"/>
+          <p:cNvSpPr>
+            <a:spLocks noGrp="1"/>
+          </p:cNvSpPr>
+          <p:nvPr>
+            <p:ph type="title"/>
+          </p:nvPr>
+        </p:nvSpPr>
+        <p:spPr/>
+        <p:txBody>
+          <a:bodyPr/>
+          <a:lstStyle/>
+          <a:p>
+            <a:r>
+              <a:rPr lang="en-US" dirty="0" smtClean="0"/>
+              <a:t>Functions</a:t>
+            </a:r>
+            <a:endParaRPr lang="en-US" dirty="0"/>
+          </a:p>
+        </p:txBody>
+      </p:sp>
+      <p:sp>
+        <p:nvSpPr>
+          <p:cNvPr id="3" name="Content Placeholder 2"/>
+          <p:cNvSpPr>
+            <a:spLocks noGrp="1"/>
+          </p:cNvSpPr>
+          <p:nvPr>
+            <p:ph idx="1"/>
+          </p:nvPr>
+        </p:nvSpPr>
+        <p:spPr/>
+        <p:txBody>
+          <a:bodyPr/>
+          <a:lstStyle/>
+          <a:p>
+            <a:r>
+              <a:rPr lang="en-US" dirty="0" smtClean="0"/>
+              <a:t>Compiles to:</a:t>
+            </a:r>
+            <a:endParaRPr lang="en-US" dirty="0"/>
+          </a:p>
+        </p:txBody>
+      </p:sp>
+      <p:sp>
+        <p:nvSpPr>
+          <p:cNvPr id="4" name="Rectangle 3"/>
+          <p:cNvSpPr/>
+          <p:nvPr/>
+        </p:nvSpPr>
+        <p:spPr>
+          <a:xfrm>
+            <a:off x="495993" y="2465680"/>
+            <a:ext cx="9229898" cy="4043864"/>
+          </a:xfrm>
+          <a:prstGeom prst="rect">
+            <a:avLst/>
+          </a:prstGeom>
+        </p:spPr>
+        <p:txBody>
+          <a:bodyPr wrap="square">
+            <a:spAutoFit/>
+          </a:bodyPr>
+          <a:lstStyle/>
+          <a:p>
+            <a:pPr>
+              <a:lnSpc>
+                <a:spcPct val="107000"/>
+              </a:lnSpc>
+              <a:tabLst>
+                <a:tab pos="581660" algn="l"/>
+                <a:tab pos="1163320" algn="l"/>
+                <a:tab pos="1744980" algn="l"/>
+                <a:tab pos="2326640" algn="l"/>
+                <a:tab pos="2908300" algn="l"/>
+                <a:tab pos="3489960" algn="l"/>
+                <a:tab pos="4071620" algn="l"/>
+                <a:tab pos="4653280" algn="l"/>
+                <a:tab pos="5234940" algn="l"/>
+                <a:tab pos="5816600" algn="l"/>
+                <a:tab pos="6398260" algn="l"/>
+                <a:tab pos="6979920" algn="l"/>
+                <a:tab pos="7561580" algn="l"/>
+                <a:tab pos="8143240" algn="l"/>
+                <a:tab pos="8724900" algn="l"/>
+                <a:tab pos="9306560" algn="l"/>
+              </a:tabLst>
+            </a:pPr>
+            <a:r>
+              <a:rPr lang="en-US" dirty="0" err="1">
+                <a:solidFill>
+                  <a:srgbClr val="0000FF"/>
+                </a:solidFill>
+                <a:latin typeface="Consolas" panose="020B0609020204030204" pitchFamily="49" charset="0"/>
+                <a:ea typeface="Times New Roman" panose="02020603050405020304" pitchFamily="18" charset="0"/>
+                <a:cs typeface="Times New Roman" panose="02020603050405020304" pitchFamily="18" charset="0"/>
+              </a:rPr>
+              <a:t>var</a:t>
+            </a:r>
+            <a:r>
+              <a:rPr lang="en-US" dirty="0">
+                <a:solidFill>
+                  <a:srgbClr val="000000"/>
+                </a:solidFill>
+                <a:latin typeface="Consolas" panose="020B0609020204030204" pitchFamily="49" charset="0"/>
+                <a:ea typeface="Times New Roman" panose="02020603050405020304" pitchFamily="18" charset="0"/>
+                <a:cs typeface="Times New Roman" panose="02020603050405020304" pitchFamily="18" charset="0"/>
+              </a:rPr>
+              <a:t> </a:t>
+            </a:r>
+            <a:r>
+              <a:rPr lang="en-US" dirty="0" err="1">
+                <a:solidFill>
+                  <a:srgbClr val="000000"/>
+                </a:solidFill>
+                <a:latin typeface="Consolas" panose="020B0609020204030204" pitchFamily="49" charset="0"/>
+                <a:ea typeface="Times New Roman" panose="02020603050405020304" pitchFamily="18" charset="0"/>
+                <a:cs typeface="Times New Roman" panose="02020603050405020304" pitchFamily="18" charset="0"/>
+              </a:rPr>
+              <a:t>MyClass</a:t>
+            </a:r>
+            <a:r>
+              <a:rPr lang="en-US" dirty="0">
+                <a:solidFill>
+                  <a:srgbClr val="000000"/>
+                </a:solidFill>
+                <a:latin typeface="Consolas" panose="020B0609020204030204" pitchFamily="49" charset="0"/>
+                <a:ea typeface="Times New Roman" panose="02020603050405020304" pitchFamily="18" charset="0"/>
+                <a:cs typeface="Times New Roman" panose="02020603050405020304" pitchFamily="18" charset="0"/>
+              </a:rPr>
+              <a:t> = (</a:t>
+            </a:r>
+            <a:r>
+              <a:rPr lang="en-US" dirty="0">
+                <a:solidFill>
+                  <a:srgbClr val="0000FF"/>
+                </a:solidFill>
+                <a:latin typeface="Consolas" panose="020B0609020204030204" pitchFamily="49" charset="0"/>
+                <a:ea typeface="Times New Roman" panose="02020603050405020304" pitchFamily="18" charset="0"/>
+                <a:cs typeface="Times New Roman" panose="02020603050405020304" pitchFamily="18" charset="0"/>
+              </a:rPr>
+              <a:t>function</a:t>
+            </a:r>
+            <a:r>
+              <a:rPr lang="en-US" dirty="0">
+                <a:solidFill>
+                  <a:srgbClr val="000000"/>
+                </a:solidFill>
+                <a:latin typeface="Consolas" panose="020B0609020204030204" pitchFamily="49" charset="0"/>
+                <a:ea typeface="Times New Roman" panose="02020603050405020304" pitchFamily="18" charset="0"/>
+                <a:cs typeface="Times New Roman" panose="02020603050405020304" pitchFamily="18" charset="0"/>
+              </a:rPr>
+              <a:t> () {</a:t>
+            </a:r>
+            <a:endParaRPr lang="en-US" sz="2400" dirty="0">
+              <a:latin typeface="Calibri" panose="020F0502020204030204" pitchFamily="34" charset="0"/>
+              <a:ea typeface="Calibri" panose="020F0502020204030204" pitchFamily="34" charset="0"/>
+              <a:cs typeface="Times New Roman" panose="02020603050405020304" pitchFamily="18" charset="0"/>
+            </a:endParaRPr>
+          </a:p>
+          <a:p>
+            <a:pPr>
+              <a:lnSpc>
+                <a:spcPct val="107000"/>
+              </a:lnSpc>
+              <a:tabLst>
+                <a:tab pos="581660" algn="l"/>
+                <a:tab pos="1163320" algn="l"/>
+                <a:tab pos="1744980" algn="l"/>
+                <a:tab pos="2326640" algn="l"/>
+                <a:tab pos="2908300" algn="l"/>
+                <a:tab pos="3489960" algn="l"/>
+                <a:tab pos="4071620" algn="l"/>
+                <a:tab pos="4653280" algn="l"/>
+                <a:tab pos="5234940" algn="l"/>
+                <a:tab pos="5816600" algn="l"/>
+                <a:tab pos="6398260" algn="l"/>
+                <a:tab pos="6979920" algn="l"/>
+                <a:tab pos="7561580" algn="l"/>
+                <a:tab pos="8143240" algn="l"/>
+                <a:tab pos="8724900" algn="l"/>
+                <a:tab pos="9306560" algn="l"/>
+              </a:tabLst>
+            </a:pPr>
+            <a:r>
+              <a:rPr lang="en-US" dirty="0">
+                <a:solidFill>
+                  <a:srgbClr val="000000"/>
+                </a:solidFill>
+                <a:latin typeface="Consolas" panose="020B0609020204030204" pitchFamily="49" charset="0"/>
+                <a:ea typeface="Times New Roman" panose="02020603050405020304" pitchFamily="18" charset="0"/>
+                <a:cs typeface="Times New Roman" panose="02020603050405020304" pitchFamily="18" charset="0"/>
+              </a:rPr>
+              <a:t>    </a:t>
+            </a:r>
+            <a:r>
+              <a:rPr lang="en-US" dirty="0">
+                <a:solidFill>
+                  <a:srgbClr val="0000FF"/>
+                </a:solidFill>
+                <a:latin typeface="Consolas" panose="020B0609020204030204" pitchFamily="49" charset="0"/>
+                <a:ea typeface="Times New Roman" panose="02020603050405020304" pitchFamily="18" charset="0"/>
+                <a:cs typeface="Times New Roman" panose="02020603050405020304" pitchFamily="18" charset="0"/>
+              </a:rPr>
+              <a:t>function</a:t>
+            </a:r>
+            <a:r>
+              <a:rPr lang="en-US" dirty="0">
+                <a:solidFill>
+                  <a:srgbClr val="000000"/>
+                </a:solidFill>
+                <a:latin typeface="Consolas" panose="020B0609020204030204" pitchFamily="49" charset="0"/>
+                <a:ea typeface="Times New Roman" panose="02020603050405020304" pitchFamily="18" charset="0"/>
+                <a:cs typeface="Times New Roman" panose="02020603050405020304" pitchFamily="18" charset="0"/>
+              </a:rPr>
+              <a:t> </a:t>
+            </a:r>
+            <a:r>
+              <a:rPr lang="en-US" dirty="0" err="1">
+                <a:solidFill>
+                  <a:srgbClr val="000000"/>
+                </a:solidFill>
+                <a:latin typeface="Consolas" panose="020B0609020204030204" pitchFamily="49" charset="0"/>
+                <a:ea typeface="Times New Roman" panose="02020603050405020304" pitchFamily="18" charset="0"/>
+                <a:cs typeface="Times New Roman" panose="02020603050405020304" pitchFamily="18" charset="0"/>
+              </a:rPr>
+              <a:t>MyClass</a:t>
+            </a:r>
+            <a:r>
+              <a:rPr lang="en-US" dirty="0">
+                <a:solidFill>
+                  <a:srgbClr val="000000"/>
+                </a:solidFill>
+                <a:latin typeface="Consolas" panose="020B0609020204030204" pitchFamily="49" charset="0"/>
+                <a:ea typeface="Times New Roman" panose="02020603050405020304" pitchFamily="18" charset="0"/>
+                <a:cs typeface="Times New Roman" panose="02020603050405020304" pitchFamily="18" charset="0"/>
+              </a:rPr>
+              <a:t>() {</a:t>
+            </a:r>
+            <a:endParaRPr lang="en-US" sz="2400" dirty="0">
+              <a:latin typeface="Calibri" panose="020F0502020204030204" pitchFamily="34" charset="0"/>
+              <a:ea typeface="Calibri" panose="020F0502020204030204" pitchFamily="34" charset="0"/>
+              <a:cs typeface="Times New Roman" panose="02020603050405020304" pitchFamily="18" charset="0"/>
+            </a:endParaRPr>
+          </a:p>
+          <a:p>
+            <a:pPr>
+              <a:lnSpc>
+                <a:spcPct val="107000"/>
+              </a:lnSpc>
+              <a:tabLst>
+                <a:tab pos="581660" algn="l"/>
+                <a:tab pos="1163320" algn="l"/>
+                <a:tab pos="1744980" algn="l"/>
+                <a:tab pos="2326640" algn="l"/>
+                <a:tab pos="2908300" algn="l"/>
+                <a:tab pos="3489960" algn="l"/>
+                <a:tab pos="4071620" algn="l"/>
+                <a:tab pos="4653280" algn="l"/>
+                <a:tab pos="5234940" algn="l"/>
+                <a:tab pos="5816600" algn="l"/>
+                <a:tab pos="6398260" algn="l"/>
+                <a:tab pos="6979920" algn="l"/>
+                <a:tab pos="7561580" algn="l"/>
+                <a:tab pos="8143240" algn="l"/>
+                <a:tab pos="8724900" algn="l"/>
+                <a:tab pos="9306560" algn="l"/>
+              </a:tabLst>
+            </a:pPr>
+            <a:r>
+              <a:rPr lang="en-US" dirty="0">
+                <a:solidFill>
+                  <a:srgbClr val="000000"/>
+                </a:solidFill>
+                <a:latin typeface="Consolas" panose="020B0609020204030204" pitchFamily="49" charset="0"/>
+                <a:ea typeface="Times New Roman" panose="02020603050405020304" pitchFamily="18" charset="0"/>
+                <a:cs typeface="Times New Roman" panose="02020603050405020304" pitchFamily="18" charset="0"/>
+              </a:rPr>
+              <a:t>        </a:t>
+            </a:r>
+            <a:r>
+              <a:rPr lang="en-US" dirty="0" err="1">
+                <a:solidFill>
+                  <a:srgbClr val="0000FF"/>
+                </a:solidFill>
+                <a:latin typeface="Consolas" panose="020B0609020204030204" pitchFamily="49" charset="0"/>
+                <a:ea typeface="Times New Roman" panose="02020603050405020304" pitchFamily="18" charset="0"/>
+                <a:cs typeface="Times New Roman" panose="02020603050405020304" pitchFamily="18" charset="0"/>
+              </a:rPr>
+              <a:t>this</a:t>
+            </a:r>
+            <a:r>
+              <a:rPr lang="en-US" dirty="0" err="1">
+                <a:solidFill>
+                  <a:srgbClr val="000000"/>
+                </a:solidFill>
+                <a:latin typeface="Consolas" panose="020B0609020204030204" pitchFamily="49" charset="0"/>
+                <a:ea typeface="Times New Roman" panose="02020603050405020304" pitchFamily="18" charset="0"/>
+                <a:cs typeface="Times New Roman" panose="02020603050405020304" pitchFamily="18" charset="0"/>
+              </a:rPr>
+              <a:t>.myData</a:t>
+            </a:r>
+            <a:r>
+              <a:rPr lang="en-US" dirty="0">
+                <a:solidFill>
+                  <a:srgbClr val="000000"/>
+                </a:solidFill>
+                <a:latin typeface="Consolas" panose="020B0609020204030204" pitchFamily="49" charset="0"/>
+                <a:ea typeface="Times New Roman" panose="02020603050405020304" pitchFamily="18" charset="0"/>
+                <a:cs typeface="Times New Roman" panose="02020603050405020304" pitchFamily="18" charset="0"/>
+              </a:rPr>
+              <a:t> = </a:t>
+            </a:r>
+            <a:r>
+              <a:rPr lang="en-US" dirty="0">
+                <a:solidFill>
+                  <a:srgbClr val="0000FF"/>
+                </a:solidFill>
+                <a:latin typeface="Consolas" panose="020B0609020204030204" pitchFamily="49" charset="0"/>
+                <a:ea typeface="Times New Roman" panose="02020603050405020304" pitchFamily="18" charset="0"/>
+                <a:cs typeface="Times New Roman" panose="02020603050405020304" pitchFamily="18" charset="0"/>
+              </a:rPr>
+              <a:t>null</a:t>
+            </a:r>
+            <a:r>
+              <a:rPr lang="en-US" dirty="0">
+                <a:solidFill>
+                  <a:srgbClr val="000000"/>
+                </a:solidFill>
+                <a:latin typeface="Consolas" panose="020B0609020204030204" pitchFamily="49" charset="0"/>
+                <a:ea typeface="Times New Roman" panose="02020603050405020304" pitchFamily="18" charset="0"/>
+                <a:cs typeface="Times New Roman" panose="02020603050405020304" pitchFamily="18" charset="0"/>
+              </a:rPr>
+              <a:t>;</a:t>
+            </a:r>
+            <a:endParaRPr lang="en-US" sz="2400" dirty="0">
+              <a:latin typeface="Calibri" panose="020F0502020204030204" pitchFamily="34" charset="0"/>
+              <a:ea typeface="Calibri" panose="020F0502020204030204" pitchFamily="34" charset="0"/>
+              <a:cs typeface="Times New Roman" panose="02020603050405020304" pitchFamily="18" charset="0"/>
+            </a:endParaRPr>
+          </a:p>
+          <a:p>
+            <a:pPr>
+              <a:lnSpc>
+                <a:spcPct val="107000"/>
+              </a:lnSpc>
+              <a:tabLst>
+                <a:tab pos="581660" algn="l"/>
+                <a:tab pos="1163320" algn="l"/>
+                <a:tab pos="1744980" algn="l"/>
+                <a:tab pos="2326640" algn="l"/>
+                <a:tab pos="2908300" algn="l"/>
+                <a:tab pos="3489960" algn="l"/>
+                <a:tab pos="4071620" algn="l"/>
+                <a:tab pos="4653280" algn="l"/>
+                <a:tab pos="5234940" algn="l"/>
+                <a:tab pos="5816600" algn="l"/>
+                <a:tab pos="6398260" algn="l"/>
+                <a:tab pos="6979920" algn="l"/>
+                <a:tab pos="7561580" algn="l"/>
+                <a:tab pos="8143240" algn="l"/>
+                <a:tab pos="8724900" algn="l"/>
+                <a:tab pos="9306560" algn="l"/>
+              </a:tabLst>
+            </a:pPr>
+            <a:r>
+              <a:rPr lang="en-US" dirty="0">
+                <a:solidFill>
+                  <a:srgbClr val="000000"/>
+                </a:solidFill>
+                <a:latin typeface="Consolas" panose="020B0609020204030204" pitchFamily="49" charset="0"/>
+                <a:ea typeface="Times New Roman" panose="02020603050405020304" pitchFamily="18" charset="0"/>
+                <a:cs typeface="Times New Roman" panose="02020603050405020304" pitchFamily="18" charset="0"/>
+              </a:rPr>
+              <a:t>    }</a:t>
+            </a:r>
+            <a:endParaRPr lang="en-US" sz="2400" dirty="0">
+              <a:latin typeface="Calibri" panose="020F0502020204030204" pitchFamily="34" charset="0"/>
+              <a:ea typeface="Calibri" panose="020F0502020204030204" pitchFamily="34" charset="0"/>
+              <a:cs typeface="Times New Roman" panose="02020603050405020304" pitchFamily="18" charset="0"/>
+            </a:endParaRPr>
+          </a:p>
+          <a:p>
+            <a:pPr>
+              <a:lnSpc>
+                <a:spcPct val="107000"/>
+              </a:lnSpc>
+              <a:tabLst>
+                <a:tab pos="581660" algn="l"/>
+                <a:tab pos="1163320" algn="l"/>
+                <a:tab pos="1744980" algn="l"/>
+                <a:tab pos="2326640" algn="l"/>
+                <a:tab pos="2908300" algn="l"/>
+                <a:tab pos="3489960" algn="l"/>
+                <a:tab pos="4071620" algn="l"/>
+                <a:tab pos="4653280" algn="l"/>
+                <a:tab pos="5234940" algn="l"/>
+                <a:tab pos="5816600" algn="l"/>
+                <a:tab pos="6398260" algn="l"/>
+                <a:tab pos="6979920" algn="l"/>
+                <a:tab pos="7561580" algn="l"/>
+                <a:tab pos="8143240" algn="l"/>
+                <a:tab pos="8724900" algn="l"/>
+                <a:tab pos="9306560" algn="l"/>
+              </a:tabLst>
+            </a:pPr>
+            <a:r>
+              <a:rPr lang="en-US" dirty="0">
+                <a:solidFill>
+                  <a:srgbClr val="000000"/>
+                </a:solidFill>
+                <a:latin typeface="Consolas" panose="020B0609020204030204" pitchFamily="49" charset="0"/>
+                <a:ea typeface="Times New Roman" panose="02020603050405020304" pitchFamily="18" charset="0"/>
+                <a:cs typeface="Times New Roman" panose="02020603050405020304" pitchFamily="18" charset="0"/>
+              </a:rPr>
+              <a:t>    </a:t>
+            </a:r>
+            <a:r>
+              <a:rPr lang="en-US" dirty="0" err="1">
+                <a:solidFill>
+                  <a:srgbClr val="000000"/>
+                </a:solidFill>
+                <a:latin typeface="Consolas" panose="020B0609020204030204" pitchFamily="49" charset="0"/>
+                <a:ea typeface="Times New Roman" panose="02020603050405020304" pitchFamily="18" charset="0"/>
+                <a:cs typeface="Times New Roman" panose="02020603050405020304" pitchFamily="18" charset="0"/>
+              </a:rPr>
+              <a:t>MyClass.prototype.makeRequest</a:t>
+            </a:r>
+            <a:r>
+              <a:rPr lang="en-US" dirty="0">
+                <a:solidFill>
+                  <a:srgbClr val="000000"/>
+                </a:solidFill>
+                <a:latin typeface="Consolas" panose="020B0609020204030204" pitchFamily="49" charset="0"/>
+                <a:ea typeface="Times New Roman" panose="02020603050405020304" pitchFamily="18" charset="0"/>
+                <a:cs typeface="Times New Roman" panose="02020603050405020304" pitchFamily="18" charset="0"/>
+              </a:rPr>
+              <a:t> = </a:t>
+            </a:r>
+            <a:r>
+              <a:rPr lang="en-US" dirty="0">
+                <a:solidFill>
+                  <a:srgbClr val="0000FF"/>
+                </a:solidFill>
+                <a:latin typeface="Consolas" panose="020B0609020204030204" pitchFamily="49" charset="0"/>
+                <a:ea typeface="Times New Roman" panose="02020603050405020304" pitchFamily="18" charset="0"/>
+                <a:cs typeface="Times New Roman" panose="02020603050405020304" pitchFamily="18" charset="0"/>
+              </a:rPr>
+              <a:t>function</a:t>
+            </a:r>
+            <a:r>
+              <a:rPr lang="en-US" dirty="0">
+                <a:solidFill>
+                  <a:srgbClr val="000000"/>
+                </a:solidFill>
+                <a:latin typeface="Consolas" panose="020B0609020204030204" pitchFamily="49" charset="0"/>
+                <a:ea typeface="Times New Roman" panose="02020603050405020304" pitchFamily="18" charset="0"/>
+                <a:cs typeface="Times New Roman" panose="02020603050405020304" pitchFamily="18" charset="0"/>
+              </a:rPr>
+              <a:t> () {</a:t>
+            </a:r>
+            <a:endParaRPr lang="en-US" sz="2400" dirty="0">
+              <a:latin typeface="Calibri" panose="020F0502020204030204" pitchFamily="34" charset="0"/>
+              <a:ea typeface="Calibri" panose="020F0502020204030204" pitchFamily="34" charset="0"/>
+              <a:cs typeface="Times New Roman" panose="02020603050405020304" pitchFamily="18" charset="0"/>
+            </a:endParaRPr>
+          </a:p>
+          <a:p>
+            <a:pPr>
+              <a:lnSpc>
+                <a:spcPct val="107000"/>
+              </a:lnSpc>
+              <a:tabLst>
+                <a:tab pos="581660" algn="l"/>
+                <a:tab pos="1163320" algn="l"/>
+                <a:tab pos="1744980" algn="l"/>
+                <a:tab pos="2326640" algn="l"/>
+                <a:tab pos="2908300" algn="l"/>
+                <a:tab pos="3489960" algn="l"/>
+                <a:tab pos="4071620" algn="l"/>
+                <a:tab pos="4653280" algn="l"/>
+                <a:tab pos="5234940" algn="l"/>
+                <a:tab pos="5816600" algn="l"/>
+                <a:tab pos="6398260" algn="l"/>
+                <a:tab pos="6979920" algn="l"/>
+                <a:tab pos="7561580" algn="l"/>
+                <a:tab pos="8143240" algn="l"/>
+                <a:tab pos="8724900" algn="l"/>
+                <a:tab pos="9306560" algn="l"/>
+              </a:tabLst>
+            </a:pPr>
+            <a:r>
+              <a:rPr lang="en-US" dirty="0">
+                <a:solidFill>
+                  <a:srgbClr val="000000"/>
+                </a:solidFill>
+                <a:latin typeface="Consolas" panose="020B0609020204030204" pitchFamily="49" charset="0"/>
+                <a:ea typeface="Times New Roman" panose="02020603050405020304" pitchFamily="18" charset="0"/>
+                <a:cs typeface="Times New Roman" panose="02020603050405020304" pitchFamily="18" charset="0"/>
+              </a:rPr>
+              <a:t>        </a:t>
+            </a:r>
+            <a:r>
+              <a:rPr lang="en-US" dirty="0" err="1">
+                <a:solidFill>
+                  <a:srgbClr val="0000FF"/>
+                </a:solidFill>
+                <a:latin typeface="Consolas" panose="020B0609020204030204" pitchFamily="49" charset="0"/>
+                <a:ea typeface="Times New Roman" panose="02020603050405020304" pitchFamily="18" charset="0"/>
+                <a:cs typeface="Times New Roman" panose="02020603050405020304" pitchFamily="18" charset="0"/>
+              </a:rPr>
+              <a:t>var</a:t>
+            </a:r>
+            <a:r>
+              <a:rPr lang="en-US" dirty="0">
+                <a:solidFill>
+                  <a:srgbClr val="000000"/>
+                </a:solidFill>
+                <a:latin typeface="Consolas" panose="020B0609020204030204" pitchFamily="49" charset="0"/>
+                <a:ea typeface="Times New Roman" panose="02020603050405020304" pitchFamily="18" charset="0"/>
+                <a:cs typeface="Times New Roman" panose="02020603050405020304" pitchFamily="18" charset="0"/>
+              </a:rPr>
+              <a:t> _this = </a:t>
+            </a:r>
+            <a:r>
+              <a:rPr lang="en-US" dirty="0">
+                <a:solidFill>
+                  <a:srgbClr val="0000FF"/>
+                </a:solidFill>
+                <a:latin typeface="Consolas" panose="020B0609020204030204" pitchFamily="49" charset="0"/>
+                <a:ea typeface="Times New Roman" panose="02020603050405020304" pitchFamily="18" charset="0"/>
+                <a:cs typeface="Times New Roman" panose="02020603050405020304" pitchFamily="18" charset="0"/>
+              </a:rPr>
+              <a:t>this</a:t>
+            </a:r>
+            <a:r>
+              <a:rPr lang="en-US" dirty="0">
+                <a:solidFill>
+                  <a:srgbClr val="000000"/>
+                </a:solidFill>
+                <a:latin typeface="Consolas" panose="020B0609020204030204" pitchFamily="49" charset="0"/>
+                <a:ea typeface="Times New Roman" panose="02020603050405020304" pitchFamily="18" charset="0"/>
+                <a:cs typeface="Times New Roman" panose="02020603050405020304" pitchFamily="18" charset="0"/>
+              </a:rPr>
+              <a:t>;</a:t>
+            </a:r>
+            <a:endParaRPr lang="en-US" sz="2400" dirty="0">
+              <a:latin typeface="Calibri" panose="020F0502020204030204" pitchFamily="34" charset="0"/>
+              <a:ea typeface="Calibri" panose="020F0502020204030204" pitchFamily="34" charset="0"/>
+              <a:cs typeface="Times New Roman" panose="02020603050405020304" pitchFamily="18" charset="0"/>
+            </a:endParaRPr>
+          </a:p>
+          <a:p>
+            <a:pPr>
+              <a:lnSpc>
+                <a:spcPct val="107000"/>
+              </a:lnSpc>
+              <a:tabLst>
+                <a:tab pos="581660" algn="l"/>
+                <a:tab pos="1163320" algn="l"/>
+                <a:tab pos="1744980" algn="l"/>
+                <a:tab pos="2326640" algn="l"/>
+                <a:tab pos="2908300" algn="l"/>
+                <a:tab pos="3489960" algn="l"/>
+                <a:tab pos="4071620" algn="l"/>
+                <a:tab pos="4653280" algn="l"/>
+                <a:tab pos="5234940" algn="l"/>
+                <a:tab pos="5816600" algn="l"/>
+                <a:tab pos="6398260" algn="l"/>
+                <a:tab pos="6979920" algn="l"/>
+                <a:tab pos="7561580" algn="l"/>
+                <a:tab pos="8143240" algn="l"/>
+                <a:tab pos="8724900" algn="l"/>
+                <a:tab pos="9306560" algn="l"/>
+              </a:tabLst>
+            </a:pPr>
+            <a:r>
+              <a:rPr lang="en-US" dirty="0">
+                <a:solidFill>
+                  <a:srgbClr val="000000"/>
+                </a:solidFill>
+                <a:latin typeface="Consolas" panose="020B0609020204030204" pitchFamily="49" charset="0"/>
+                <a:ea typeface="Times New Roman" panose="02020603050405020304" pitchFamily="18" charset="0"/>
+                <a:cs typeface="Times New Roman" panose="02020603050405020304" pitchFamily="18" charset="0"/>
+              </a:rPr>
+              <a:t>        </a:t>
+            </a:r>
+            <a:r>
+              <a:rPr lang="en-US" dirty="0">
+                <a:solidFill>
+                  <a:srgbClr val="0000FF"/>
+                </a:solidFill>
+                <a:latin typeface="Consolas" panose="020B0609020204030204" pitchFamily="49" charset="0"/>
+                <a:ea typeface="Times New Roman" panose="02020603050405020304" pitchFamily="18" charset="0"/>
+                <a:cs typeface="Times New Roman" panose="02020603050405020304" pitchFamily="18" charset="0"/>
+              </a:rPr>
+              <a:t>return</a:t>
+            </a:r>
+            <a:r>
+              <a:rPr lang="en-US" dirty="0">
+                <a:solidFill>
+                  <a:srgbClr val="000000"/>
+                </a:solidFill>
+                <a:latin typeface="Consolas" panose="020B0609020204030204" pitchFamily="49" charset="0"/>
+                <a:ea typeface="Times New Roman" panose="02020603050405020304" pitchFamily="18" charset="0"/>
+                <a:cs typeface="Times New Roman" panose="02020603050405020304" pitchFamily="18" charset="0"/>
+              </a:rPr>
+              <a:t> $.get(</a:t>
+            </a:r>
+            <a:r>
+              <a:rPr lang="en-US" dirty="0">
+                <a:solidFill>
+                  <a:srgbClr val="A31515"/>
+                </a:solidFill>
+                <a:latin typeface="Consolas" panose="020B0609020204030204" pitchFamily="49" charset="0"/>
+                <a:ea typeface="Times New Roman" panose="02020603050405020304" pitchFamily="18" charset="0"/>
+                <a:cs typeface="Times New Roman" panose="02020603050405020304" pitchFamily="18" charset="0"/>
+              </a:rPr>
+              <a:t>'~/</a:t>
+            </a:r>
+            <a:r>
+              <a:rPr lang="en-US" dirty="0" err="1">
+                <a:solidFill>
+                  <a:srgbClr val="A31515"/>
+                </a:solidFill>
+                <a:latin typeface="Consolas" panose="020B0609020204030204" pitchFamily="49" charset="0"/>
+                <a:ea typeface="Times New Roman" panose="02020603050405020304" pitchFamily="18" charset="0"/>
+                <a:cs typeface="Times New Roman" panose="02020603050405020304" pitchFamily="18" charset="0"/>
+              </a:rPr>
+              <a:t>api</a:t>
+            </a:r>
+            <a:r>
+              <a:rPr lang="en-US" dirty="0">
+                <a:solidFill>
+                  <a:srgbClr val="A31515"/>
+                </a:solidFill>
+                <a:latin typeface="Consolas" panose="020B0609020204030204" pitchFamily="49" charset="0"/>
+                <a:ea typeface="Times New Roman" panose="02020603050405020304" pitchFamily="18" charset="0"/>
+                <a:cs typeface="Times New Roman" panose="02020603050405020304" pitchFamily="18" charset="0"/>
+              </a:rPr>
+              <a:t>/stuff'</a:t>
+            </a:r>
+            <a:r>
+              <a:rPr lang="en-US" dirty="0">
+                <a:solidFill>
+                  <a:srgbClr val="000000"/>
+                </a:solidFill>
+                <a:latin typeface="Consolas" panose="020B0609020204030204" pitchFamily="49" charset="0"/>
+                <a:ea typeface="Times New Roman" panose="02020603050405020304" pitchFamily="18" charset="0"/>
+                <a:cs typeface="Times New Roman" panose="02020603050405020304" pitchFamily="18" charset="0"/>
+              </a:rPr>
+              <a:t>).done(</a:t>
+            </a:r>
+            <a:r>
+              <a:rPr lang="en-US" dirty="0">
+                <a:solidFill>
+                  <a:srgbClr val="0000FF"/>
+                </a:solidFill>
+                <a:latin typeface="Consolas" panose="020B0609020204030204" pitchFamily="49" charset="0"/>
+                <a:ea typeface="Times New Roman" panose="02020603050405020304" pitchFamily="18" charset="0"/>
+                <a:cs typeface="Times New Roman" panose="02020603050405020304" pitchFamily="18" charset="0"/>
+              </a:rPr>
+              <a:t>function</a:t>
+            </a:r>
+            <a:r>
+              <a:rPr lang="en-US" dirty="0">
+                <a:solidFill>
+                  <a:srgbClr val="000000"/>
+                </a:solidFill>
+                <a:latin typeface="Consolas" panose="020B0609020204030204" pitchFamily="49" charset="0"/>
+                <a:ea typeface="Times New Roman" panose="02020603050405020304" pitchFamily="18" charset="0"/>
+                <a:cs typeface="Times New Roman" panose="02020603050405020304" pitchFamily="18" charset="0"/>
+              </a:rPr>
+              <a:t> (response) {</a:t>
+            </a:r>
+            <a:endParaRPr lang="en-US" sz="2400" dirty="0">
+              <a:latin typeface="Calibri" panose="020F0502020204030204" pitchFamily="34" charset="0"/>
+              <a:ea typeface="Calibri" panose="020F0502020204030204" pitchFamily="34" charset="0"/>
+              <a:cs typeface="Times New Roman" panose="02020603050405020304" pitchFamily="18" charset="0"/>
+            </a:endParaRPr>
+          </a:p>
+          <a:p>
+            <a:pPr>
+              <a:lnSpc>
+                <a:spcPct val="107000"/>
+              </a:lnSpc>
+              <a:tabLst>
+                <a:tab pos="581660" algn="l"/>
+                <a:tab pos="1163320" algn="l"/>
+                <a:tab pos="1744980" algn="l"/>
+                <a:tab pos="2326640" algn="l"/>
+                <a:tab pos="2908300" algn="l"/>
+                <a:tab pos="3489960" algn="l"/>
+                <a:tab pos="4071620" algn="l"/>
+                <a:tab pos="4653280" algn="l"/>
+                <a:tab pos="5234940" algn="l"/>
+                <a:tab pos="5816600" algn="l"/>
+                <a:tab pos="6398260" algn="l"/>
+                <a:tab pos="6979920" algn="l"/>
+                <a:tab pos="7561580" algn="l"/>
+                <a:tab pos="8143240" algn="l"/>
+                <a:tab pos="8724900" algn="l"/>
+                <a:tab pos="9306560" algn="l"/>
+              </a:tabLst>
+            </a:pPr>
+            <a:r>
+              <a:rPr lang="en-US" dirty="0">
+                <a:solidFill>
+                  <a:srgbClr val="000000"/>
+                </a:solidFill>
+                <a:latin typeface="Consolas" panose="020B0609020204030204" pitchFamily="49" charset="0"/>
+                <a:ea typeface="Times New Roman" panose="02020603050405020304" pitchFamily="18" charset="0"/>
+                <a:cs typeface="Times New Roman" panose="02020603050405020304" pitchFamily="18" charset="0"/>
+              </a:rPr>
+              <a:t>            </a:t>
+            </a:r>
+            <a:r>
+              <a:rPr lang="en-US" dirty="0">
+                <a:solidFill>
+                  <a:srgbClr val="0000FF"/>
+                </a:solidFill>
+                <a:latin typeface="Consolas" panose="020B0609020204030204" pitchFamily="49" charset="0"/>
+                <a:ea typeface="Times New Roman" panose="02020603050405020304" pitchFamily="18" charset="0"/>
+                <a:cs typeface="Times New Roman" panose="02020603050405020304" pitchFamily="18" charset="0"/>
+              </a:rPr>
+              <a:t>return</a:t>
+            </a:r>
+            <a:r>
+              <a:rPr lang="en-US" dirty="0">
+                <a:solidFill>
+                  <a:srgbClr val="000000"/>
+                </a:solidFill>
+                <a:latin typeface="Consolas" panose="020B0609020204030204" pitchFamily="49" charset="0"/>
+                <a:ea typeface="Times New Roman" panose="02020603050405020304" pitchFamily="18" charset="0"/>
+                <a:cs typeface="Times New Roman" panose="02020603050405020304" pitchFamily="18" charset="0"/>
+              </a:rPr>
+              <a:t> _</a:t>
+            </a:r>
+            <a:r>
+              <a:rPr lang="en-US" dirty="0" err="1">
+                <a:solidFill>
+                  <a:srgbClr val="000000"/>
+                </a:solidFill>
+                <a:latin typeface="Consolas" panose="020B0609020204030204" pitchFamily="49" charset="0"/>
+                <a:ea typeface="Times New Roman" panose="02020603050405020304" pitchFamily="18" charset="0"/>
+                <a:cs typeface="Times New Roman" panose="02020603050405020304" pitchFamily="18" charset="0"/>
+              </a:rPr>
+              <a:t>this.myData</a:t>
+            </a:r>
+            <a:r>
+              <a:rPr lang="en-US" dirty="0">
+                <a:solidFill>
+                  <a:srgbClr val="000000"/>
+                </a:solidFill>
+                <a:latin typeface="Consolas" panose="020B0609020204030204" pitchFamily="49" charset="0"/>
+                <a:ea typeface="Times New Roman" panose="02020603050405020304" pitchFamily="18" charset="0"/>
+                <a:cs typeface="Times New Roman" panose="02020603050405020304" pitchFamily="18" charset="0"/>
+              </a:rPr>
+              <a:t> = response;</a:t>
+            </a:r>
+            <a:endParaRPr lang="en-US" sz="2400" dirty="0">
+              <a:latin typeface="Calibri" panose="020F0502020204030204" pitchFamily="34" charset="0"/>
+              <a:ea typeface="Calibri" panose="020F0502020204030204" pitchFamily="34" charset="0"/>
+              <a:cs typeface="Times New Roman" panose="02020603050405020304" pitchFamily="18" charset="0"/>
+            </a:endParaRPr>
+          </a:p>
+          <a:p>
+            <a:pPr>
+              <a:lnSpc>
+                <a:spcPct val="107000"/>
+              </a:lnSpc>
+              <a:tabLst>
+                <a:tab pos="581660" algn="l"/>
+                <a:tab pos="1163320" algn="l"/>
+                <a:tab pos="1744980" algn="l"/>
+                <a:tab pos="2326640" algn="l"/>
+                <a:tab pos="2908300" algn="l"/>
+                <a:tab pos="3489960" algn="l"/>
+                <a:tab pos="4071620" algn="l"/>
+                <a:tab pos="4653280" algn="l"/>
+                <a:tab pos="5234940" algn="l"/>
+                <a:tab pos="5816600" algn="l"/>
+                <a:tab pos="6398260" algn="l"/>
+                <a:tab pos="6979920" algn="l"/>
+                <a:tab pos="7561580" algn="l"/>
+                <a:tab pos="8143240" algn="l"/>
+                <a:tab pos="8724900" algn="l"/>
+                <a:tab pos="9306560" algn="l"/>
+              </a:tabLst>
+            </a:pPr>
+            <a:r>
+              <a:rPr lang="en-US" dirty="0">
+                <a:solidFill>
+                  <a:srgbClr val="000000"/>
+                </a:solidFill>
+                <a:latin typeface="Consolas" panose="020B0609020204030204" pitchFamily="49" charset="0"/>
+                <a:ea typeface="Times New Roman" panose="02020603050405020304" pitchFamily="18" charset="0"/>
+                <a:cs typeface="Times New Roman" panose="02020603050405020304" pitchFamily="18" charset="0"/>
+              </a:rPr>
+              <a:t>        });</a:t>
+            </a:r>
+            <a:endParaRPr lang="en-US" sz="2400" dirty="0">
+              <a:latin typeface="Calibri" panose="020F0502020204030204" pitchFamily="34" charset="0"/>
+              <a:ea typeface="Calibri" panose="020F0502020204030204" pitchFamily="34" charset="0"/>
+              <a:cs typeface="Times New Roman" panose="02020603050405020304" pitchFamily="18" charset="0"/>
+            </a:endParaRPr>
+          </a:p>
+          <a:p>
+            <a:pPr>
+              <a:lnSpc>
+                <a:spcPct val="107000"/>
+              </a:lnSpc>
+              <a:tabLst>
+                <a:tab pos="581660" algn="l"/>
+                <a:tab pos="1163320" algn="l"/>
+                <a:tab pos="1744980" algn="l"/>
+                <a:tab pos="2326640" algn="l"/>
+                <a:tab pos="2908300" algn="l"/>
+                <a:tab pos="3489960" algn="l"/>
+                <a:tab pos="4071620" algn="l"/>
+                <a:tab pos="4653280" algn="l"/>
+                <a:tab pos="5234940" algn="l"/>
+                <a:tab pos="5816600" algn="l"/>
+                <a:tab pos="6398260" algn="l"/>
+                <a:tab pos="6979920" algn="l"/>
+                <a:tab pos="7561580" algn="l"/>
+                <a:tab pos="8143240" algn="l"/>
+                <a:tab pos="8724900" algn="l"/>
+                <a:tab pos="9306560" algn="l"/>
+              </a:tabLst>
+            </a:pPr>
+            <a:r>
+              <a:rPr lang="en-US" dirty="0">
+                <a:solidFill>
+                  <a:srgbClr val="000000"/>
+                </a:solidFill>
+                <a:latin typeface="Consolas" panose="020B0609020204030204" pitchFamily="49" charset="0"/>
+                <a:ea typeface="Times New Roman" panose="02020603050405020304" pitchFamily="18" charset="0"/>
+                <a:cs typeface="Times New Roman" panose="02020603050405020304" pitchFamily="18" charset="0"/>
+              </a:rPr>
+              <a:t>    };</a:t>
+            </a:r>
+            <a:endParaRPr lang="en-US" sz="2400" dirty="0">
+              <a:latin typeface="Calibri" panose="020F0502020204030204" pitchFamily="34" charset="0"/>
+              <a:ea typeface="Calibri" panose="020F0502020204030204" pitchFamily="34" charset="0"/>
+              <a:cs typeface="Times New Roman" panose="02020603050405020304" pitchFamily="18" charset="0"/>
+            </a:endParaRPr>
+          </a:p>
+          <a:p>
+            <a:pPr>
+              <a:lnSpc>
+                <a:spcPct val="107000"/>
+              </a:lnSpc>
+              <a:tabLst>
+                <a:tab pos="581660" algn="l"/>
+                <a:tab pos="1163320" algn="l"/>
+                <a:tab pos="1744980" algn="l"/>
+                <a:tab pos="2326640" algn="l"/>
+                <a:tab pos="2908300" algn="l"/>
+                <a:tab pos="3489960" algn="l"/>
+                <a:tab pos="4071620" algn="l"/>
+                <a:tab pos="4653280" algn="l"/>
+                <a:tab pos="5234940" algn="l"/>
+                <a:tab pos="5816600" algn="l"/>
+                <a:tab pos="6398260" algn="l"/>
+                <a:tab pos="6979920" algn="l"/>
+                <a:tab pos="7561580" algn="l"/>
+                <a:tab pos="8143240" algn="l"/>
+                <a:tab pos="8724900" algn="l"/>
+                <a:tab pos="9306560" algn="l"/>
+              </a:tabLst>
+            </a:pPr>
+            <a:r>
+              <a:rPr lang="en-US" dirty="0">
+                <a:solidFill>
+                  <a:srgbClr val="000000"/>
+                </a:solidFill>
+                <a:latin typeface="Consolas" panose="020B0609020204030204" pitchFamily="49" charset="0"/>
+                <a:ea typeface="Times New Roman" panose="02020603050405020304" pitchFamily="18" charset="0"/>
+                <a:cs typeface="Times New Roman" panose="02020603050405020304" pitchFamily="18" charset="0"/>
+              </a:rPr>
+              <a:t>    </a:t>
+            </a:r>
+            <a:r>
+              <a:rPr lang="en-US" dirty="0">
+                <a:solidFill>
+                  <a:srgbClr val="0000FF"/>
+                </a:solidFill>
+                <a:latin typeface="Consolas" panose="020B0609020204030204" pitchFamily="49" charset="0"/>
+                <a:ea typeface="Times New Roman" panose="02020603050405020304" pitchFamily="18" charset="0"/>
+                <a:cs typeface="Times New Roman" panose="02020603050405020304" pitchFamily="18" charset="0"/>
+              </a:rPr>
+              <a:t>return</a:t>
+            </a:r>
+            <a:r>
+              <a:rPr lang="en-US" dirty="0">
+                <a:solidFill>
+                  <a:srgbClr val="000000"/>
+                </a:solidFill>
+                <a:latin typeface="Consolas" panose="020B0609020204030204" pitchFamily="49" charset="0"/>
+                <a:ea typeface="Times New Roman" panose="02020603050405020304" pitchFamily="18" charset="0"/>
+                <a:cs typeface="Times New Roman" panose="02020603050405020304" pitchFamily="18" charset="0"/>
+              </a:rPr>
+              <a:t> </a:t>
+            </a:r>
+            <a:r>
+              <a:rPr lang="en-US" dirty="0" err="1">
+                <a:solidFill>
+                  <a:srgbClr val="000000"/>
+                </a:solidFill>
+                <a:latin typeface="Consolas" panose="020B0609020204030204" pitchFamily="49" charset="0"/>
+                <a:ea typeface="Times New Roman" panose="02020603050405020304" pitchFamily="18" charset="0"/>
+                <a:cs typeface="Times New Roman" panose="02020603050405020304" pitchFamily="18" charset="0"/>
+              </a:rPr>
+              <a:t>MyClass</a:t>
+            </a:r>
+            <a:r>
+              <a:rPr lang="en-US" dirty="0">
+                <a:solidFill>
+                  <a:srgbClr val="000000"/>
+                </a:solidFill>
+                <a:latin typeface="Consolas" panose="020B0609020204030204" pitchFamily="49" charset="0"/>
+                <a:ea typeface="Times New Roman" panose="02020603050405020304" pitchFamily="18" charset="0"/>
+                <a:cs typeface="Times New Roman" panose="02020603050405020304" pitchFamily="18" charset="0"/>
+              </a:rPr>
+              <a:t>;</a:t>
+            </a:r>
+            <a:endParaRPr lang="en-US" sz="2400" dirty="0">
+              <a:latin typeface="Calibri" panose="020F0502020204030204" pitchFamily="34" charset="0"/>
+              <a:ea typeface="Calibri" panose="020F0502020204030204" pitchFamily="34" charset="0"/>
+              <a:cs typeface="Times New Roman" panose="02020603050405020304" pitchFamily="18" charset="0"/>
+            </a:endParaRPr>
+          </a:p>
+          <a:p>
+            <a:pPr>
+              <a:lnSpc>
+                <a:spcPct val="107000"/>
+              </a:lnSpc>
+              <a:tabLst>
+                <a:tab pos="581660" algn="l"/>
+                <a:tab pos="1163320" algn="l"/>
+                <a:tab pos="1744980" algn="l"/>
+                <a:tab pos="2326640" algn="l"/>
+                <a:tab pos="2908300" algn="l"/>
+                <a:tab pos="3489960" algn="l"/>
+                <a:tab pos="4071620" algn="l"/>
+                <a:tab pos="4653280" algn="l"/>
+                <a:tab pos="5234940" algn="l"/>
+                <a:tab pos="5816600" algn="l"/>
+                <a:tab pos="6398260" algn="l"/>
+                <a:tab pos="6979920" algn="l"/>
+                <a:tab pos="7561580" algn="l"/>
+                <a:tab pos="8143240" algn="l"/>
+                <a:tab pos="8724900" algn="l"/>
+                <a:tab pos="9306560" algn="l"/>
+              </a:tabLst>
+            </a:pPr>
+            <a:r>
+              <a:rPr lang="en-US" dirty="0">
+                <a:solidFill>
+                  <a:srgbClr val="000000"/>
+                </a:solidFill>
+                <a:latin typeface="Consolas" panose="020B0609020204030204" pitchFamily="49" charset="0"/>
+                <a:ea typeface="Times New Roman" panose="02020603050405020304" pitchFamily="18" charset="0"/>
+                <a:cs typeface="Times New Roman" panose="02020603050405020304" pitchFamily="18" charset="0"/>
+              </a:rPr>
+              <a:t>})();</a:t>
+            </a:r>
+            <a:endParaRPr lang="en-US" sz="2400" dirty="0">
+              <a:latin typeface="Calibri" panose="020F0502020204030204" pitchFamily="34" charset="0"/>
+              <a:ea typeface="Calibri" panose="020F0502020204030204" pitchFamily="34" charset="0"/>
+              <a:cs typeface="Times New Roman" panose="02020603050405020304" pitchFamily="18" charset="0"/>
+            </a:endParaRPr>
+          </a:p>
+          <a:p>
+            <a:pPr>
+              <a:lnSpc>
+                <a:spcPct val="107000"/>
+              </a:lnSpc>
+              <a:spcAft>
+                <a:spcPts val="800"/>
+              </a:spcAft>
+            </a:pPr>
+            <a:r>
+              <a:rPr lang="en-US" sz="2400" dirty="0">
+                <a:latin typeface="Calibri" panose="020F0502020204030204" pitchFamily="34" charset="0"/>
+                <a:ea typeface="Calibri" panose="020F0502020204030204" pitchFamily="34" charset="0"/>
+                <a:cs typeface="Times New Roman" panose="02020603050405020304" pitchFamily="18" charset="0"/>
+              </a:rPr>
+              <a:t> </a:t>
+            </a:r>
+            <a:endParaRPr lang="en-US" sz="2400" dirty="0">
+              <a:effectLst/>
+              <a:latin typeface="Calibri" panose="020F0502020204030204" pitchFamily="34" charset="0"/>
+              <a:ea typeface="Calibri" panose="020F0502020204030204" pitchFamily="34" charset="0"/>
+              <a:cs typeface="Times New Roman" panose="02020603050405020304" pitchFamily="18" charset="0"/>
+            </a:endParaRPr>
+          </a:p>
+        </p:txBody>
+      </p:sp>
+    </p:spTree>
+    <p:extLst>
+      <p:ext uri="{BB962C8B-B14F-4D97-AF65-F5344CB8AC3E}">
+        <p14:creationId xmlns:p14="http://schemas.microsoft.com/office/powerpoint/2010/main" val="3232192227"/>
+      </p:ext>
+    </p:extLst>
+  </p:cSld>
+  <p:clrMapOvr>
+    <a:masterClrMapping/>
+  </p:clrMapOvr>
+</p:sld>
+</file>
+
+<file path=ppt/slides/slide37.xml><?xml version="1.0" encoding="utf-8"?>
+<p:sld xmlns:a="http://schemas.openxmlformats.org/drawingml/2006/main" xmlns:r="http://schemas.openxmlformats.org/officeDocument/2006/relationships" xmlns:p="http://schemas.openxmlformats.org/presentationml/2006/main">
+  <p:cSld>
+    <p:spTree>
+      <p:nvGrpSpPr>
+        <p:cNvPr id="1" name=""/>
+        <p:cNvGrpSpPr/>
+        <p:nvPr/>
+      </p:nvGrpSpPr>
+      <p:grpSpPr>
+        <a:xfrm>
+          <a:off x="0" y="0"/>
+          <a:ext cx="0" cy="0"/>
+          <a:chOff x="0" y="0"/>
+          <a:chExt cx="0" cy="0"/>
+        </a:xfrm>
+      </p:grpSpPr>
+      <p:sp>
+        <p:nvSpPr>
+          <p:cNvPr id="2" name="Title 1"/>
+          <p:cNvSpPr>
+            <a:spLocks noGrp="1"/>
+          </p:cNvSpPr>
+          <p:nvPr>
+            <p:ph type="title"/>
+          </p:nvPr>
+        </p:nvSpPr>
+        <p:spPr/>
+        <p:txBody>
+          <a:bodyPr/>
+          <a:lstStyle/>
+          <a:p>
+            <a:r>
+              <a:rPr lang="en-US" dirty="0" smtClean="0"/>
+              <a:t>Functions – Demo</a:t>
+            </a:r>
+            <a:endParaRPr lang="en-US" dirty="0"/>
+          </a:p>
+        </p:txBody>
+      </p:sp>
+      <p:sp>
+        <p:nvSpPr>
+          <p:cNvPr id="3" name="Content Placeholder 2"/>
+          <p:cNvSpPr>
+            <a:spLocks noGrp="1"/>
+          </p:cNvSpPr>
+          <p:nvPr>
+            <p:ph idx="1"/>
+          </p:nvPr>
+        </p:nvSpPr>
+        <p:spPr/>
+        <p:txBody>
+          <a:bodyPr/>
+          <a:lstStyle/>
+          <a:p>
+            <a:r>
+              <a:rPr lang="en-US" dirty="0" smtClean="0"/>
+              <a:t>Section 2 / 5-lambdas.ts</a:t>
+            </a:r>
+            <a:endParaRPr lang="en-US" dirty="0"/>
+          </a:p>
+        </p:txBody>
+      </p:sp>
+    </p:spTree>
+    <p:extLst>
+      <p:ext uri="{BB962C8B-B14F-4D97-AF65-F5344CB8AC3E}">
+        <p14:creationId xmlns:p14="http://schemas.microsoft.com/office/powerpoint/2010/main" val="3391733156"/>
+      </p:ext>
+    </p:extLst>
+  </p:cSld>
+  <p:clrMapOvr>
+    <a:masterClrMapping/>
+  </p:clrMapOvr>
+</p:sld>
+</file>
+
+<file path=ppt/slides/slide38.xml><?xml version="1.0" encoding="utf-8"?>
+<p:sld xmlns:a="http://schemas.openxmlformats.org/drawingml/2006/main" xmlns:r="http://schemas.openxmlformats.org/officeDocument/2006/relationships" xmlns:p="http://schemas.openxmlformats.org/presentationml/2006/main">
+  <p:cSld>
+    <p:spTree>
+      <p:nvGrpSpPr>
+        <p:cNvPr id="1" name=""/>
+        <p:cNvGrpSpPr/>
+        <p:nvPr/>
+      </p:nvGrpSpPr>
+      <p:grpSpPr>
+        <a:xfrm>
+          <a:off x="0" y="0"/>
+          <a:ext cx="0" cy="0"/>
+          <a:chOff x="0" y="0"/>
+          <a:chExt cx="0" cy="0"/>
+        </a:xfrm>
+      </p:grpSpPr>
+      <p:sp>
+        <p:nvSpPr>
+          <p:cNvPr id="2" name="Title 1"/>
+          <p:cNvSpPr>
+            <a:spLocks noGrp="1"/>
+          </p:cNvSpPr>
+          <p:nvPr>
+            <p:ph type="title"/>
+          </p:nvPr>
+        </p:nvSpPr>
+        <p:spPr/>
+        <p:txBody>
+          <a:bodyPr/>
+          <a:lstStyle/>
+          <a:p>
+            <a:r>
+              <a:rPr lang="en-US" dirty="0" smtClean="0"/>
+              <a:t>Generics</a:t>
+            </a:r>
+            <a:endParaRPr lang="en-US" dirty="0"/>
+          </a:p>
+        </p:txBody>
+      </p:sp>
+      <p:sp>
+        <p:nvSpPr>
+          <p:cNvPr id="3" name="Content Placeholder 2"/>
+          <p:cNvSpPr>
+            <a:spLocks noGrp="1"/>
+          </p:cNvSpPr>
+          <p:nvPr>
+            <p:ph idx="1"/>
+          </p:nvPr>
+        </p:nvSpPr>
+        <p:spPr/>
+        <p:txBody>
+          <a:bodyPr>
+            <a:normAutofit/>
+          </a:bodyPr>
+          <a:lstStyle/>
+          <a:p>
+            <a:r>
+              <a:rPr lang="en-US" dirty="0" smtClean="0"/>
+              <a:t>Full support for generics</a:t>
+            </a:r>
+          </a:p>
+          <a:p>
+            <a:endParaRPr lang="en-US" dirty="0"/>
+          </a:p>
+          <a:p>
+            <a:r>
+              <a:rPr lang="en-US" dirty="0" smtClean="0"/>
+              <a:t>Simple type constraint syntax</a:t>
+            </a:r>
+          </a:p>
+          <a:p>
+            <a:endParaRPr lang="en-US" dirty="0"/>
+          </a:p>
+          <a:p>
+            <a:r>
+              <a:rPr lang="en-US" dirty="0" smtClean="0"/>
+              <a:t>Works well with type inference</a:t>
+            </a:r>
+          </a:p>
+          <a:p>
+            <a:endParaRPr lang="en-US" dirty="0"/>
+          </a:p>
+          <a:p>
+            <a:r>
+              <a:rPr lang="en-US" dirty="0" smtClean="0"/>
+              <a:t>Syntax similar to Java generics</a:t>
+            </a:r>
+          </a:p>
+          <a:p>
+            <a:endParaRPr lang="en-US" dirty="0"/>
+          </a:p>
+          <a:p>
+            <a:r>
+              <a:rPr lang="en-US" dirty="0" smtClean="0"/>
+              <a:t>Supported on: class, interface, function</a:t>
+            </a:r>
+          </a:p>
+        </p:txBody>
+      </p:sp>
+    </p:spTree>
+    <p:extLst>
+      <p:ext uri="{BB962C8B-B14F-4D97-AF65-F5344CB8AC3E}">
+        <p14:creationId xmlns:p14="http://schemas.microsoft.com/office/powerpoint/2010/main" val="2142430396"/>
+      </p:ext>
+    </p:extLst>
+  </p:cSld>
+  <p:clrMapOvr>
+    <a:masterClrMapping/>
+  </p:clrMapOvr>
+</p:sld>
+</file>
+
+<file path=ppt/slides/slide39.xml><?xml version="1.0" encoding="utf-8"?>
+<p:sld xmlns:a="http://schemas.openxmlformats.org/drawingml/2006/main" xmlns:r="http://schemas.openxmlformats.org/officeDocument/2006/relationships" xmlns:p="http://schemas.openxmlformats.org/presentationml/2006/main">
+  <p:cSld>
+    <p:spTree>
+      <p:nvGrpSpPr>
+        <p:cNvPr id="1" name=""/>
+        <p:cNvGrpSpPr/>
+        <p:nvPr/>
+      </p:nvGrpSpPr>
+      <p:grpSpPr>
+        <a:xfrm>
+          <a:off x="0" y="0"/>
+          <a:ext cx="0" cy="0"/>
+          <a:chOff x="0" y="0"/>
+          <a:chExt cx="0" cy="0"/>
+        </a:xfrm>
+      </p:grpSpPr>
+      <p:sp>
+        <p:nvSpPr>
+          <p:cNvPr id="2" name="Title 1"/>
+          <p:cNvSpPr>
+            <a:spLocks noGrp="1"/>
+          </p:cNvSpPr>
+          <p:nvPr>
+            <p:ph type="title"/>
+          </p:nvPr>
+        </p:nvSpPr>
+        <p:spPr/>
+        <p:txBody>
+          <a:bodyPr/>
+          <a:lstStyle/>
+          <a:p>
+            <a:r>
+              <a:rPr lang="en-US" dirty="0" smtClean="0"/>
+              <a:t>Generics</a:t>
+            </a:r>
+            <a:endParaRPr lang="en-US" dirty="0"/>
+          </a:p>
+        </p:txBody>
+      </p:sp>
+      <p:sp>
+        <p:nvSpPr>
+          <p:cNvPr id="3" name="Content Placeholder 2"/>
+          <p:cNvSpPr>
+            <a:spLocks noGrp="1"/>
+          </p:cNvSpPr>
+          <p:nvPr>
+            <p:ph idx="1"/>
+          </p:nvPr>
+        </p:nvSpPr>
+        <p:spPr/>
+        <p:txBody>
+          <a:bodyPr/>
+          <a:lstStyle/>
+          <a:p>
+            <a:r>
+              <a:rPr lang="en-US" dirty="0" smtClean="0"/>
+              <a:t>Declared as follows:</a:t>
+            </a:r>
+            <a:endParaRPr lang="en-US" dirty="0"/>
+          </a:p>
+        </p:txBody>
+      </p:sp>
+      <p:sp>
+        <p:nvSpPr>
+          <p:cNvPr id="4" name="Rectangle 3"/>
+          <p:cNvSpPr/>
+          <p:nvPr/>
+        </p:nvSpPr>
+        <p:spPr>
+          <a:xfrm>
+            <a:off x="253384" y="2866840"/>
+            <a:ext cx="10561473" cy="1376595"/>
+          </a:xfrm>
+          <a:prstGeom prst="rect">
+            <a:avLst/>
+          </a:prstGeom>
+        </p:spPr>
+        <p:txBody>
+          <a:bodyPr wrap="square">
+            <a:spAutoFit/>
+          </a:bodyPr>
+          <a:lstStyle/>
+          <a:p>
+            <a:pPr>
+              <a:lnSpc>
+                <a:spcPct val="107000"/>
+              </a:lnSpc>
+              <a:tabLst>
+                <a:tab pos="581660" algn="l"/>
+                <a:tab pos="1163320" algn="l"/>
+                <a:tab pos="1744980" algn="l"/>
+                <a:tab pos="2326640" algn="l"/>
+                <a:tab pos="2908300" algn="l"/>
+                <a:tab pos="3489960" algn="l"/>
+                <a:tab pos="4071620" algn="l"/>
+                <a:tab pos="4653280" algn="l"/>
+                <a:tab pos="5234940" algn="l"/>
+                <a:tab pos="5816600" algn="l"/>
+                <a:tab pos="6398260" algn="l"/>
+                <a:tab pos="6979920" algn="l"/>
+                <a:tab pos="7561580" algn="l"/>
+                <a:tab pos="8143240" algn="l"/>
+                <a:tab pos="8724900" algn="l"/>
+                <a:tab pos="9306560" algn="l"/>
+              </a:tabLst>
+            </a:pPr>
+            <a:r>
+              <a:rPr lang="en-US" dirty="0">
+                <a:solidFill>
+                  <a:srgbClr val="0000FF"/>
+                </a:solidFill>
+                <a:latin typeface="Consolas" panose="020B0609020204030204" pitchFamily="49" charset="0"/>
+                <a:ea typeface="Times New Roman" panose="02020603050405020304" pitchFamily="18" charset="0"/>
+                <a:cs typeface="Times New Roman" panose="02020603050405020304" pitchFamily="18" charset="0"/>
+              </a:rPr>
+              <a:t>function</a:t>
+            </a:r>
+            <a:r>
+              <a:rPr lang="en-US" dirty="0">
+                <a:solidFill>
+                  <a:srgbClr val="000000"/>
+                </a:solidFill>
+                <a:latin typeface="Consolas" panose="020B0609020204030204" pitchFamily="49" charset="0"/>
+                <a:ea typeface="Times New Roman" panose="02020603050405020304" pitchFamily="18" charset="0"/>
+                <a:cs typeface="Times New Roman" panose="02020603050405020304" pitchFamily="18" charset="0"/>
+              </a:rPr>
+              <a:t> </a:t>
+            </a:r>
+            <a:r>
+              <a:rPr lang="en-US" dirty="0" err="1">
+                <a:solidFill>
+                  <a:srgbClr val="000000"/>
+                </a:solidFill>
+                <a:latin typeface="Consolas" panose="020B0609020204030204" pitchFamily="49" charset="0"/>
+                <a:ea typeface="Times New Roman" panose="02020603050405020304" pitchFamily="18" charset="0"/>
+                <a:cs typeface="Times New Roman" panose="02020603050405020304" pitchFamily="18" charset="0"/>
+              </a:rPr>
+              <a:t>doStuffToSomething</a:t>
+            </a:r>
+            <a:r>
+              <a:rPr lang="en-US" dirty="0">
+                <a:solidFill>
+                  <a:srgbClr val="000000"/>
+                </a:solidFill>
+                <a:latin typeface="Consolas" panose="020B0609020204030204" pitchFamily="49" charset="0"/>
+                <a:ea typeface="Times New Roman" panose="02020603050405020304" pitchFamily="18" charset="0"/>
+                <a:cs typeface="Times New Roman" panose="02020603050405020304" pitchFamily="18" charset="0"/>
+              </a:rPr>
+              <a:t>&lt;</a:t>
+            </a:r>
+            <a:r>
+              <a:rPr lang="en-US" dirty="0" err="1">
+                <a:solidFill>
+                  <a:srgbClr val="000000"/>
+                </a:solidFill>
+                <a:latin typeface="Consolas" panose="020B0609020204030204" pitchFamily="49" charset="0"/>
+                <a:ea typeface="Times New Roman" panose="02020603050405020304" pitchFamily="18" charset="0"/>
+                <a:cs typeface="Times New Roman" panose="02020603050405020304" pitchFamily="18" charset="0"/>
+              </a:rPr>
+              <a:t>TSomething</a:t>
+            </a:r>
+            <a:r>
+              <a:rPr lang="en-US" dirty="0">
+                <a:solidFill>
+                  <a:srgbClr val="000000"/>
+                </a:solidFill>
+                <a:latin typeface="Consolas" panose="020B0609020204030204" pitchFamily="49" charset="0"/>
+                <a:ea typeface="Times New Roman" panose="02020603050405020304" pitchFamily="18" charset="0"/>
+                <a:cs typeface="Times New Roman" panose="02020603050405020304" pitchFamily="18" charset="0"/>
+              </a:rPr>
+              <a:t>&gt;(something: </a:t>
+            </a:r>
+            <a:r>
+              <a:rPr lang="en-US" dirty="0" err="1">
+                <a:solidFill>
+                  <a:srgbClr val="000000"/>
+                </a:solidFill>
+                <a:latin typeface="Consolas" panose="020B0609020204030204" pitchFamily="49" charset="0"/>
+                <a:ea typeface="Times New Roman" panose="02020603050405020304" pitchFamily="18" charset="0"/>
+                <a:cs typeface="Times New Roman" panose="02020603050405020304" pitchFamily="18" charset="0"/>
+              </a:rPr>
+              <a:t>TSomething</a:t>
+            </a:r>
+            <a:r>
+              <a:rPr lang="en-US" dirty="0">
+                <a:solidFill>
+                  <a:srgbClr val="000000"/>
+                </a:solidFill>
+                <a:latin typeface="Consolas" panose="020B0609020204030204" pitchFamily="49" charset="0"/>
+                <a:ea typeface="Times New Roman" panose="02020603050405020304" pitchFamily="18" charset="0"/>
+                <a:cs typeface="Times New Roman" panose="02020603050405020304" pitchFamily="18" charset="0"/>
+              </a:rPr>
+              <a:t>): </a:t>
+            </a:r>
+            <a:r>
+              <a:rPr lang="en-US" dirty="0" err="1">
+                <a:solidFill>
+                  <a:srgbClr val="000000"/>
+                </a:solidFill>
+                <a:latin typeface="Consolas" panose="020B0609020204030204" pitchFamily="49" charset="0"/>
+                <a:ea typeface="Times New Roman" panose="02020603050405020304" pitchFamily="18" charset="0"/>
+                <a:cs typeface="Times New Roman" panose="02020603050405020304" pitchFamily="18" charset="0"/>
+              </a:rPr>
+              <a:t>TSomething</a:t>
+            </a:r>
+            <a:r>
+              <a:rPr lang="en-US" dirty="0">
+                <a:solidFill>
+                  <a:srgbClr val="000000"/>
+                </a:solidFill>
+                <a:latin typeface="Consolas" panose="020B0609020204030204" pitchFamily="49" charset="0"/>
+                <a:ea typeface="Times New Roman" panose="02020603050405020304" pitchFamily="18" charset="0"/>
+                <a:cs typeface="Times New Roman" panose="02020603050405020304" pitchFamily="18" charset="0"/>
+              </a:rPr>
+              <a:t> {</a:t>
+            </a:r>
+            <a:endParaRPr lang="en-US" sz="2400" dirty="0">
+              <a:latin typeface="Calibri" panose="020F0502020204030204" pitchFamily="34" charset="0"/>
+              <a:ea typeface="Calibri" panose="020F0502020204030204" pitchFamily="34" charset="0"/>
+              <a:cs typeface="Times New Roman" panose="02020603050405020304" pitchFamily="18" charset="0"/>
+            </a:endParaRPr>
+          </a:p>
+          <a:p>
+            <a:pPr>
+              <a:lnSpc>
+                <a:spcPct val="107000"/>
+              </a:lnSpc>
+              <a:tabLst>
+                <a:tab pos="581660" algn="l"/>
+                <a:tab pos="1163320" algn="l"/>
+                <a:tab pos="1744980" algn="l"/>
+                <a:tab pos="2326640" algn="l"/>
+                <a:tab pos="2908300" algn="l"/>
+                <a:tab pos="3489960" algn="l"/>
+                <a:tab pos="4071620" algn="l"/>
+                <a:tab pos="4653280" algn="l"/>
+                <a:tab pos="5234940" algn="l"/>
+                <a:tab pos="5816600" algn="l"/>
+                <a:tab pos="6398260" algn="l"/>
+                <a:tab pos="6979920" algn="l"/>
+                <a:tab pos="7561580" algn="l"/>
+                <a:tab pos="8143240" algn="l"/>
+                <a:tab pos="8724900" algn="l"/>
+                <a:tab pos="9306560" algn="l"/>
+              </a:tabLst>
+            </a:pPr>
+            <a:r>
+              <a:rPr lang="en-US" dirty="0" smtClean="0">
+                <a:solidFill>
+                  <a:srgbClr val="008000"/>
+                </a:solidFill>
+                <a:latin typeface="Consolas" panose="020B0609020204030204" pitchFamily="49" charset="0"/>
+                <a:ea typeface="Times New Roman" panose="02020603050405020304" pitchFamily="18" charset="0"/>
+                <a:cs typeface="Times New Roman" panose="02020603050405020304" pitchFamily="18" charset="0"/>
+              </a:rPr>
+              <a:t>    //</a:t>
+            </a:r>
+            <a:r>
+              <a:rPr lang="en-US" dirty="0">
+                <a:solidFill>
+                  <a:srgbClr val="008000"/>
+                </a:solidFill>
+                <a:latin typeface="Consolas" panose="020B0609020204030204" pitchFamily="49" charset="0"/>
+                <a:ea typeface="Times New Roman" panose="02020603050405020304" pitchFamily="18" charset="0"/>
+                <a:cs typeface="Times New Roman" panose="02020603050405020304" pitchFamily="18" charset="0"/>
+              </a:rPr>
+              <a:t> Stuff</a:t>
+            </a:r>
+            <a:endParaRPr lang="en-US" sz="2400" dirty="0">
+              <a:latin typeface="Calibri" panose="020F0502020204030204" pitchFamily="34" charset="0"/>
+              <a:ea typeface="Calibri" panose="020F0502020204030204" pitchFamily="34" charset="0"/>
+              <a:cs typeface="Times New Roman" panose="02020603050405020304" pitchFamily="18" charset="0"/>
+            </a:endParaRPr>
+          </a:p>
+          <a:p>
+            <a:pPr>
+              <a:lnSpc>
+                <a:spcPct val="107000"/>
+              </a:lnSpc>
+              <a:tabLst>
+                <a:tab pos="581660" algn="l"/>
+                <a:tab pos="1163320" algn="l"/>
+                <a:tab pos="1744980" algn="l"/>
+                <a:tab pos="2326640" algn="l"/>
+                <a:tab pos="2908300" algn="l"/>
+                <a:tab pos="3489960" algn="l"/>
+                <a:tab pos="4071620" algn="l"/>
+                <a:tab pos="4653280" algn="l"/>
+                <a:tab pos="5234940" algn="l"/>
+                <a:tab pos="5816600" algn="l"/>
+                <a:tab pos="6398260" algn="l"/>
+                <a:tab pos="6979920" algn="l"/>
+                <a:tab pos="7561580" algn="l"/>
+                <a:tab pos="8143240" algn="l"/>
+                <a:tab pos="8724900" algn="l"/>
+                <a:tab pos="9306560" algn="l"/>
+              </a:tabLst>
+            </a:pPr>
+            <a:r>
+              <a:rPr lang="en-US" dirty="0" smtClean="0">
+                <a:solidFill>
+                  <a:srgbClr val="000000"/>
+                </a:solidFill>
+                <a:latin typeface="Consolas" panose="020B0609020204030204" pitchFamily="49" charset="0"/>
+                <a:ea typeface="Times New Roman" panose="02020603050405020304" pitchFamily="18" charset="0"/>
+                <a:cs typeface="Times New Roman" panose="02020603050405020304" pitchFamily="18" charset="0"/>
+              </a:rPr>
+              <a:t>}</a:t>
+            </a:r>
+            <a:endParaRPr lang="en-US" sz="2400" dirty="0">
+              <a:latin typeface="Calibri" panose="020F0502020204030204" pitchFamily="34" charset="0"/>
+              <a:ea typeface="Calibri" panose="020F0502020204030204" pitchFamily="34" charset="0"/>
+              <a:cs typeface="Times New Roman" panose="02020603050405020304" pitchFamily="18" charset="0"/>
+            </a:endParaRPr>
+          </a:p>
+          <a:p>
+            <a:pPr>
+              <a:lnSpc>
+                <a:spcPct val="107000"/>
+              </a:lnSpc>
+              <a:spcAft>
+                <a:spcPts val="800"/>
+              </a:spcAft>
+            </a:pPr>
+            <a:r>
+              <a:rPr lang="en-US" sz="2400" dirty="0">
+                <a:latin typeface="Calibri" panose="020F0502020204030204" pitchFamily="34" charset="0"/>
+                <a:ea typeface="Calibri" panose="020F0502020204030204" pitchFamily="34" charset="0"/>
+                <a:cs typeface="Times New Roman" panose="02020603050405020304" pitchFamily="18" charset="0"/>
+              </a:rPr>
+              <a:t> </a:t>
+            </a:r>
+            <a:endParaRPr lang="en-US" sz="2400" dirty="0">
+              <a:effectLst/>
+              <a:latin typeface="Calibri" panose="020F0502020204030204" pitchFamily="34" charset="0"/>
+              <a:ea typeface="Calibri" panose="020F0502020204030204" pitchFamily="34" charset="0"/>
+              <a:cs typeface="Times New Roman" panose="02020603050405020304" pitchFamily="18" charset="0"/>
+            </a:endParaRPr>
+          </a:p>
+        </p:txBody>
+      </p:sp>
+    </p:spTree>
+    <p:extLst>
+      <p:ext uri="{BB962C8B-B14F-4D97-AF65-F5344CB8AC3E}">
+        <p14:creationId xmlns:p14="http://schemas.microsoft.com/office/powerpoint/2010/main" val="987762087"/>
+      </p:ext>
+    </p:extLst>
+  </p:cSld>
+  <p:clrMapOvr>
+    <a:masterClrMapping/>
+  </p:clrMapOvr>
+</p:sld>
+</file>
+
 <file path=ppt/slides/slide4.xml><?xml version="1.0" encoding="utf-8"?>
 <p:sld xmlns:a="http://schemas.openxmlformats.org/drawingml/2006/main" xmlns:r="http://schemas.openxmlformats.org/officeDocument/2006/relationships" xmlns:p="http://schemas.openxmlformats.org/presentationml/2006/main">
   <p:cSld>
@@ -17032,6 +20154,928 @@
     <p:extLst>
       <p:ext uri="{BB962C8B-B14F-4D97-AF65-F5344CB8AC3E}">
         <p14:creationId xmlns:p14="http://schemas.microsoft.com/office/powerpoint/2010/main" val="2041213752"/>
+      </p:ext>
+    </p:extLst>
+  </p:cSld>
+  <p:clrMapOvr>
+    <a:masterClrMapping/>
+  </p:clrMapOvr>
+</p:sld>
+</file>
+
+<file path=ppt/slides/slide40.xml><?xml version="1.0" encoding="utf-8"?>
+<p:sld xmlns:a="http://schemas.openxmlformats.org/drawingml/2006/main" xmlns:r="http://schemas.openxmlformats.org/officeDocument/2006/relationships" xmlns:p="http://schemas.openxmlformats.org/presentationml/2006/main">
+  <p:cSld>
+    <p:spTree>
+      <p:nvGrpSpPr>
+        <p:cNvPr id="1" name=""/>
+        <p:cNvGrpSpPr/>
+        <p:nvPr/>
+      </p:nvGrpSpPr>
+      <p:grpSpPr>
+        <a:xfrm>
+          <a:off x="0" y="0"/>
+          <a:ext cx="0" cy="0"/>
+          <a:chOff x="0" y="0"/>
+          <a:chExt cx="0" cy="0"/>
+        </a:xfrm>
+      </p:grpSpPr>
+      <p:sp>
+        <p:nvSpPr>
+          <p:cNvPr id="2" name="Title 1"/>
+          <p:cNvSpPr>
+            <a:spLocks noGrp="1"/>
+          </p:cNvSpPr>
+          <p:nvPr>
+            <p:ph type="title"/>
+          </p:nvPr>
+        </p:nvSpPr>
+        <p:spPr/>
+        <p:txBody>
+          <a:bodyPr/>
+          <a:lstStyle/>
+          <a:p>
+            <a:r>
+              <a:rPr lang="en-US" dirty="0" smtClean="0"/>
+              <a:t>Generics – Demo </a:t>
+            </a:r>
+            <a:endParaRPr lang="en-US" dirty="0"/>
+          </a:p>
+        </p:txBody>
+      </p:sp>
+      <p:sp>
+        <p:nvSpPr>
+          <p:cNvPr id="3" name="Content Placeholder 2"/>
+          <p:cNvSpPr>
+            <a:spLocks noGrp="1"/>
+          </p:cNvSpPr>
+          <p:nvPr>
+            <p:ph idx="1"/>
+          </p:nvPr>
+        </p:nvSpPr>
+        <p:spPr/>
+        <p:txBody>
+          <a:bodyPr/>
+          <a:lstStyle/>
+          <a:p>
+            <a:r>
+              <a:rPr lang="en-US" dirty="0" smtClean="0"/>
+              <a:t>Section 2 / 6-generics.ts</a:t>
+            </a:r>
+            <a:endParaRPr lang="en-US" dirty="0"/>
+          </a:p>
+        </p:txBody>
+      </p:sp>
+    </p:spTree>
+    <p:extLst>
+      <p:ext uri="{BB962C8B-B14F-4D97-AF65-F5344CB8AC3E}">
+        <p14:creationId xmlns:p14="http://schemas.microsoft.com/office/powerpoint/2010/main" val="3206280047"/>
+      </p:ext>
+    </p:extLst>
+  </p:cSld>
+  <p:clrMapOvr>
+    <a:masterClrMapping/>
+  </p:clrMapOvr>
+</p:sld>
+</file>
+
+<file path=ppt/slides/slide41.xml><?xml version="1.0" encoding="utf-8"?>
+<p:sld xmlns:a="http://schemas.openxmlformats.org/drawingml/2006/main" xmlns:r="http://schemas.openxmlformats.org/officeDocument/2006/relationships" xmlns:p="http://schemas.openxmlformats.org/presentationml/2006/main">
+  <p:cSld>
+    <p:spTree>
+      <p:nvGrpSpPr>
+        <p:cNvPr id="1" name=""/>
+        <p:cNvGrpSpPr/>
+        <p:nvPr/>
+      </p:nvGrpSpPr>
+      <p:grpSpPr>
+        <a:xfrm>
+          <a:off x="0" y="0"/>
+          <a:ext cx="0" cy="0"/>
+          <a:chOff x="0" y="0"/>
+          <a:chExt cx="0" cy="0"/>
+        </a:xfrm>
+      </p:grpSpPr>
+      <p:sp>
+        <p:nvSpPr>
+          <p:cNvPr id="4" name="Title 3"/>
+          <p:cNvSpPr>
+            <a:spLocks noGrp="1"/>
+          </p:cNvSpPr>
+          <p:nvPr>
+            <p:ph type="title"/>
+          </p:nvPr>
+        </p:nvSpPr>
+        <p:spPr/>
+        <p:txBody>
+          <a:bodyPr/>
+          <a:lstStyle/>
+          <a:p>
+            <a:r>
+              <a:rPr lang="en-US" dirty="0" smtClean="0"/>
+              <a:t>Library Definition Files</a:t>
+            </a:r>
+            <a:endParaRPr lang="en-US" dirty="0"/>
+          </a:p>
+        </p:txBody>
+      </p:sp>
+      <p:sp>
+        <p:nvSpPr>
+          <p:cNvPr id="5" name="Text Placeholder 4"/>
+          <p:cNvSpPr>
+            <a:spLocks noGrp="1"/>
+          </p:cNvSpPr>
+          <p:nvPr>
+            <p:ph type="body" idx="1"/>
+          </p:nvPr>
+        </p:nvSpPr>
+        <p:spPr/>
+        <p:txBody>
+          <a:bodyPr/>
+          <a:lstStyle/>
+          <a:p>
+            <a:endParaRPr lang="en-US"/>
+          </a:p>
+        </p:txBody>
+      </p:sp>
+    </p:spTree>
+    <p:extLst>
+      <p:ext uri="{BB962C8B-B14F-4D97-AF65-F5344CB8AC3E}">
+        <p14:creationId xmlns:p14="http://schemas.microsoft.com/office/powerpoint/2010/main" val="3651755122"/>
+      </p:ext>
+    </p:extLst>
+  </p:cSld>
+  <p:clrMapOvr>
+    <a:masterClrMapping/>
+  </p:clrMapOvr>
+</p:sld>
+</file>
+
+<file path=ppt/slides/slide42.xml><?xml version="1.0" encoding="utf-8"?>
+<p:sld xmlns:a="http://schemas.openxmlformats.org/drawingml/2006/main" xmlns:r="http://schemas.openxmlformats.org/officeDocument/2006/relationships" xmlns:p="http://schemas.openxmlformats.org/presentationml/2006/main">
+  <p:cSld>
+    <p:spTree>
+      <p:nvGrpSpPr>
+        <p:cNvPr id="1" name=""/>
+        <p:cNvGrpSpPr/>
+        <p:nvPr/>
+      </p:nvGrpSpPr>
+      <p:grpSpPr>
+        <a:xfrm>
+          <a:off x="0" y="0"/>
+          <a:ext cx="0" cy="0"/>
+          <a:chOff x="0" y="0"/>
+          <a:chExt cx="0" cy="0"/>
+        </a:xfrm>
+      </p:grpSpPr>
+      <p:sp>
+        <p:nvSpPr>
+          <p:cNvPr id="4" name="Title 3"/>
+          <p:cNvSpPr>
+            <a:spLocks noGrp="1"/>
+          </p:cNvSpPr>
+          <p:nvPr>
+            <p:ph type="title"/>
+          </p:nvPr>
+        </p:nvSpPr>
+        <p:spPr/>
+        <p:txBody>
+          <a:bodyPr/>
+          <a:lstStyle/>
+          <a:p>
+            <a:r>
+              <a:rPr lang="en-US" dirty="0" smtClean="0"/>
+              <a:t>Definition Files</a:t>
+            </a:r>
+            <a:endParaRPr lang="en-US" dirty="0"/>
+          </a:p>
+        </p:txBody>
+      </p:sp>
+      <p:sp>
+        <p:nvSpPr>
+          <p:cNvPr id="5" name="Content Placeholder 4"/>
+          <p:cNvSpPr>
+            <a:spLocks noGrp="1"/>
+          </p:cNvSpPr>
+          <p:nvPr>
+            <p:ph idx="1"/>
+          </p:nvPr>
+        </p:nvSpPr>
+        <p:spPr/>
+        <p:txBody>
+          <a:bodyPr>
+            <a:normAutofit/>
+          </a:bodyPr>
+          <a:lstStyle/>
+          <a:p>
+            <a:r>
+              <a:rPr lang="en-US" dirty="0" smtClean="0"/>
+              <a:t>“Header files” for 3</a:t>
+            </a:r>
+            <a:r>
+              <a:rPr lang="en-US" baseline="30000" dirty="0" smtClean="0"/>
+              <a:t>rd</a:t>
+            </a:r>
+            <a:r>
+              <a:rPr lang="en-US" dirty="0" smtClean="0"/>
+              <a:t> party libraries</a:t>
+            </a:r>
+          </a:p>
+          <a:p>
+            <a:pPr lvl="1"/>
+            <a:r>
+              <a:rPr lang="en-US" dirty="0" smtClean="0"/>
+              <a:t>Provides static typing support</a:t>
+            </a:r>
+          </a:p>
+          <a:p>
+            <a:endParaRPr lang="en-US" dirty="0"/>
+          </a:p>
+          <a:p>
+            <a:r>
+              <a:rPr lang="en-US" dirty="0" smtClean="0"/>
+              <a:t>Definitely Typed repository:</a:t>
+            </a:r>
+          </a:p>
+          <a:p>
+            <a:pPr lvl="1"/>
+            <a:r>
+              <a:rPr lang="en-US" dirty="0">
+                <a:hlinkClick r:id="rId2"/>
+              </a:rPr>
+              <a:t>https://</a:t>
+            </a:r>
+            <a:r>
+              <a:rPr lang="en-US" dirty="0" smtClean="0">
+                <a:hlinkClick r:id="rId2"/>
+              </a:rPr>
+              <a:t>github.com/borisyankov/DefinitelyTyped</a:t>
+            </a:r>
+            <a:endParaRPr lang="en-US" dirty="0" smtClean="0"/>
+          </a:p>
+          <a:p>
+            <a:pPr lvl="1"/>
+            <a:endParaRPr lang="en-US" dirty="0"/>
+          </a:p>
+          <a:p>
+            <a:r>
+              <a:rPr lang="en-US" dirty="0" smtClean="0"/>
+              <a:t>Add to VS project via </a:t>
+            </a:r>
+            <a:r>
+              <a:rPr lang="en-US" dirty="0" err="1" smtClean="0"/>
+              <a:t>Nuget</a:t>
+            </a:r>
+            <a:endParaRPr lang="en-US" dirty="0" smtClean="0"/>
+          </a:p>
+          <a:p>
+            <a:endParaRPr lang="en-US" dirty="0" smtClean="0"/>
+          </a:p>
+          <a:p>
+            <a:r>
+              <a:rPr lang="en-US" dirty="0" smtClean="0"/>
+              <a:t>Add to Node project via </a:t>
+            </a:r>
+            <a:r>
+              <a:rPr lang="en-US" dirty="0" err="1" smtClean="0"/>
+              <a:t>tsd</a:t>
+            </a:r>
+            <a:endParaRPr lang="en-US" dirty="0" smtClean="0"/>
+          </a:p>
+          <a:p>
+            <a:pPr lvl="1"/>
+            <a:r>
+              <a:rPr lang="en-US" altLang="en-US" dirty="0">
+                <a:solidFill>
+                  <a:srgbClr val="666666"/>
+                </a:solidFill>
+                <a:latin typeface="Courier New" panose="02070309020205020404" pitchFamily="49" charset="0"/>
+                <a:cs typeface="Courier New" panose="02070309020205020404" pitchFamily="49" charset="0"/>
+              </a:rPr>
+              <a:t>$ </a:t>
+            </a:r>
+            <a:r>
+              <a:rPr lang="en-US" altLang="en-US" dirty="0" err="1">
+                <a:solidFill>
+                  <a:srgbClr val="666666"/>
+                </a:solidFill>
+                <a:latin typeface="Courier New" panose="02070309020205020404" pitchFamily="49" charset="0"/>
+                <a:cs typeface="Courier New" panose="02070309020205020404" pitchFamily="49" charset="0"/>
+              </a:rPr>
+              <a:t>npm</a:t>
+            </a:r>
+            <a:r>
+              <a:rPr lang="en-US" altLang="en-US" dirty="0">
+                <a:solidFill>
+                  <a:srgbClr val="666666"/>
+                </a:solidFill>
+                <a:latin typeface="Courier New" panose="02070309020205020404" pitchFamily="49" charset="0"/>
+                <a:cs typeface="Courier New" panose="02070309020205020404" pitchFamily="49" charset="0"/>
+              </a:rPr>
+              <a:t> install </a:t>
+            </a:r>
+            <a:r>
+              <a:rPr lang="en-US" altLang="en-US" dirty="0" err="1">
+                <a:solidFill>
+                  <a:srgbClr val="666666"/>
+                </a:solidFill>
+                <a:latin typeface="Courier New" panose="02070309020205020404" pitchFamily="49" charset="0"/>
+                <a:cs typeface="Courier New" panose="02070309020205020404" pitchFamily="49" charset="0"/>
+              </a:rPr>
+              <a:t>tsd</a:t>
+            </a:r>
+            <a:r>
+              <a:rPr lang="en-US" altLang="en-US" dirty="0">
+                <a:solidFill>
+                  <a:srgbClr val="666666"/>
+                </a:solidFill>
+                <a:latin typeface="Courier New" panose="02070309020205020404" pitchFamily="49" charset="0"/>
+                <a:cs typeface="Courier New" panose="02070309020205020404" pitchFamily="49" charset="0"/>
+              </a:rPr>
+              <a:t> </a:t>
+            </a:r>
+            <a:r>
+              <a:rPr lang="en-US" altLang="en-US" dirty="0">
+                <a:solidFill>
+                  <a:srgbClr val="333333"/>
+                </a:solidFill>
+                <a:latin typeface="Courier New" panose="02070309020205020404" pitchFamily="49" charset="0"/>
+                <a:cs typeface="Courier New" panose="02070309020205020404" pitchFamily="49" charset="0"/>
+              </a:rPr>
+              <a:t>-</a:t>
+            </a:r>
+            <a:r>
+              <a:rPr lang="en-US" altLang="en-US" dirty="0">
+                <a:solidFill>
+                  <a:srgbClr val="666666"/>
+                </a:solidFill>
+                <a:latin typeface="Courier New" panose="02070309020205020404" pitchFamily="49" charset="0"/>
+                <a:cs typeface="Courier New" panose="02070309020205020404" pitchFamily="49" charset="0"/>
+              </a:rPr>
+              <a:t>g</a:t>
+            </a:r>
+            <a:r>
+              <a:rPr lang="en-US" altLang="en-US" sz="1200" dirty="0">
+                <a:solidFill>
+                  <a:schemeClr val="tx1"/>
+                </a:solidFill>
+              </a:rPr>
+              <a:t> </a:t>
+            </a:r>
+            <a:endParaRPr lang="en-US" altLang="en-US" sz="3600" dirty="0">
+              <a:solidFill>
+                <a:schemeClr val="tx1"/>
+              </a:solidFill>
+              <a:latin typeface="Arial" panose="020B0604020202020204" pitchFamily="34" charset="0"/>
+            </a:endParaRPr>
+          </a:p>
+          <a:p>
+            <a:pPr lvl="1"/>
+            <a:endParaRPr lang="en-US" dirty="0" smtClean="0"/>
+          </a:p>
+          <a:p>
+            <a:endParaRPr lang="en-US" dirty="0"/>
+          </a:p>
+        </p:txBody>
+      </p:sp>
+      <p:sp>
+        <p:nvSpPr>
+          <p:cNvPr id="6" name="Rectangle 1"/>
+          <p:cNvSpPr>
+            <a:spLocks noChangeArrowheads="1"/>
+          </p:cNvSpPr>
+          <p:nvPr/>
+        </p:nvSpPr>
+        <p:spPr bwMode="auto">
+          <a:xfrm>
+            <a:off x="0" y="-70149"/>
+            <a:ext cx="65" cy="597499"/>
+          </a:xfrm>
+          <a:prstGeom prst="rect">
+            <a:avLst/>
+          </a:prstGeom>
+          <a:solidFill>
+            <a:srgbClr val="F9F9F8"/>
+          </a:solidFill>
+          <a:ln>
+            <a:noFill/>
+          </a:ln>
+          <a:effectLst/>
+          <a:extLst>
+            <a:ext uri="{91240B29-F687-4F45-9708-019B960494DF}">
+              <a14:hiddenLine xmlns:a14="http://schemas.microsoft.com/office/drawing/2010/main" w="9525">
+                <a:solidFill>
+                  <a:schemeClr val="tx1"/>
+                </a:solidFill>
+                <a:miter lim="800000"/>
+                <a:headEnd/>
+                <a:tailEnd/>
+              </a14:hiddenLine>
+            </a:ext>
+            <a:ext uri="{AF507438-7753-43E0-B8FC-AC1667EBCBE1}">
+              <a14:hiddenEffects xmlns:a14="http://schemas.microsoft.com/office/drawing/2010/main">
+                <a:effectLst>
+                  <a:outerShdw dist="35921" dir="2700000" algn="ctr" rotWithShape="0">
+                    <a:schemeClr val="bg2"/>
+                  </a:outerShdw>
+                </a:effectLst>
+              </a14:hiddenEffects>
+            </a:ext>
+          </a:extLst>
+        </p:spPr>
+        <p:txBody>
+          <a:bodyPr vert="horz" wrap="none" lIns="0" tIns="158700" rIns="0" bIns="158700" numCol="1" anchor="ctr" anchorCtr="0" compatLnSpc="1">
+            <a:prstTxWarp prst="textNoShape">
+              <a:avLst/>
+            </a:prstTxWarp>
+            <a:spAutoFit/>
+          </a:bodyPr>
+          <a:lstStyle/>
+          <a:p>
+            <a:pPr marL="0" marR="0" lvl="0" indent="0" algn="l" defTabSz="914400" rtl="0" eaLnBrk="0" fontAlgn="base" latinLnBrk="0" hangingPunct="0">
+              <a:lnSpc>
+                <a:spcPct val="100000"/>
+              </a:lnSpc>
+              <a:spcBef>
+                <a:spcPct val="0"/>
+              </a:spcBef>
+              <a:spcAft>
+                <a:spcPct val="0"/>
+              </a:spcAft>
+              <a:buClrTx/>
+              <a:buSzTx/>
+              <a:buFontTx/>
+              <a:buNone/>
+              <a:tabLst/>
+            </a:pPr>
+            <a:endParaRPr kumimoji="0" lang="en-US" altLang="en-US" sz="1800" b="0" i="0" u="none" strike="noStrike" cap="none" normalizeH="0" baseline="0" dirty="0" smtClean="0">
+              <a:ln>
+                <a:noFill/>
+              </a:ln>
+              <a:solidFill>
+                <a:schemeClr val="tx1"/>
+              </a:solidFill>
+              <a:effectLst/>
+              <a:latin typeface="Arial" panose="020B0604020202020204" pitchFamily="34" charset="0"/>
+            </a:endParaRPr>
+          </a:p>
+        </p:txBody>
+      </p:sp>
+    </p:spTree>
+    <p:extLst>
+      <p:ext uri="{BB962C8B-B14F-4D97-AF65-F5344CB8AC3E}">
+        <p14:creationId xmlns:p14="http://schemas.microsoft.com/office/powerpoint/2010/main" val="1710356774"/>
+      </p:ext>
+    </p:extLst>
+  </p:cSld>
+  <p:clrMapOvr>
+    <a:masterClrMapping/>
+  </p:clrMapOvr>
+</p:sld>
+</file>
+
+<file path=ppt/slides/slide43.xml><?xml version="1.0" encoding="utf-8"?>
+<p:sld xmlns:a="http://schemas.openxmlformats.org/drawingml/2006/main" xmlns:r="http://schemas.openxmlformats.org/officeDocument/2006/relationships" xmlns:p="http://schemas.openxmlformats.org/presentationml/2006/main">
+  <p:cSld>
+    <p:spTree>
+      <p:nvGrpSpPr>
+        <p:cNvPr id="1" name=""/>
+        <p:cNvGrpSpPr/>
+        <p:nvPr/>
+      </p:nvGrpSpPr>
+      <p:grpSpPr>
+        <a:xfrm>
+          <a:off x="0" y="0"/>
+          <a:ext cx="0" cy="0"/>
+          <a:chOff x="0" y="0"/>
+          <a:chExt cx="0" cy="0"/>
+        </a:xfrm>
+      </p:grpSpPr>
+      <p:sp>
+        <p:nvSpPr>
+          <p:cNvPr id="2" name="Title 1"/>
+          <p:cNvSpPr>
+            <a:spLocks noGrp="1"/>
+          </p:cNvSpPr>
+          <p:nvPr>
+            <p:ph type="title"/>
+          </p:nvPr>
+        </p:nvSpPr>
+        <p:spPr/>
+        <p:txBody>
+          <a:bodyPr/>
+          <a:lstStyle/>
+          <a:p>
+            <a:r>
+              <a:rPr lang="en-US" dirty="0"/>
+              <a:t>Definition Files</a:t>
+            </a:r>
+          </a:p>
+        </p:txBody>
+      </p:sp>
+      <p:sp>
+        <p:nvSpPr>
+          <p:cNvPr id="3" name="Content Placeholder 2"/>
+          <p:cNvSpPr>
+            <a:spLocks noGrp="1"/>
+          </p:cNvSpPr>
+          <p:nvPr>
+            <p:ph idx="1"/>
+          </p:nvPr>
+        </p:nvSpPr>
+        <p:spPr/>
+        <p:txBody>
+          <a:bodyPr/>
+          <a:lstStyle/>
+          <a:p>
+            <a:r>
+              <a:rPr lang="en-US" dirty="0" smtClean="0"/>
+              <a:t>Include as references via comment</a:t>
+            </a:r>
+          </a:p>
+          <a:p>
+            <a:pPr lvl="1"/>
+            <a:r>
+              <a:rPr lang="en-US" altLang="en-US" dirty="0">
+                <a:solidFill>
+                  <a:srgbClr val="808080"/>
+                </a:solidFill>
+                <a:latin typeface="Consolas" panose="020B0609020204030204" pitchFamily="49" charset="0"/>
+                <a:cs typeface="Consolas" panose="020B0609020204030204" pitchFamily="49" charset="0"/>
+              </a:rPr>
+              <a:t>///</a:t>
+            </a:r>
+            <a:r>
+              <a:rPr lang="en-US" altLang="en-US" dirty="0">
+                <a:solidFill>
+                  <a:srgbClr val="008000"/>
+                </a:solidFill>
+                <a:latin typeface="Consolas" panose="020B0609020204030204" pitchFamily="49" charset="0"/>
+                <a:cs typeface="Consolas" panose="020B0609020204030204" pitchFamily="49" charset="0"/>
+              </a:rPr>
+              <a:t> </a:t>
+            </a:r>
+            <a:r>
+              <a:rPr lang="en-US" altLang="en-US" dirty="0">
+                <a:solidFill>
+                  <a:srgbClr val="808080"/>
+                </a:solidFill>
+                <a:latin typeface="Consolas" panose="020B0609020204030204" pitchFamily="49" charset="0"/>
+                <a:cs typeface="Consolas" panose="020B0609020204030204" pitchFamily="49" charset="0"/>
+              </a:rPr>
+              <a:t>&lt;reference path="/scripts/</a:t>
+            </a:r>
+            <a:r>
+              <a:rPr lang="en-US" altLang="en-US" dirty="0" err="1">
+                <a:solidFill>
+                  <a:srgbClr val="808080"/>
+                </a:solidFill>
+                <a:latin typeface="Consolas" panose="020B0609020204030204" pitchFamily="49" charset="0"/>
+                <a:cs typeface="Consolas" panose="020B0609020204030204" pitchFamily="49" charset="0"/>
+              </a:rPr>
+              <a:t>typings</a:t>
+            </a:r>
+            <a:r>
+              <a:rPr lang="en-US" altLang="en-US" dirty="0">
+                <a:solidFill>
+                  <a:srgbClr val="808080"/>
+                </a:solidFill>
+                <a:latin typeface="Consolas" panose="020B0609020204030204" pitchFamily="49" charset="0"/>
+                <a:cs typeface="Consolas" panose="020B0609020204030204" pitchFamily="49" charset="0"/>
+              </a:rPr>
+              <a:t>/some-lib/some-</a:t>
+            </a:r>
+            <a:r>
+              <a:rPr lang="en-US" altLang="en-US" dirty="0" err="1">
+                <a:solidFill>
+                  <a:srgbClr val="808080"/>
+                </a:solidFill>
+                <a:latin typeface="Consolas" panose="020B0609020204030204" pitchFamily="49" charset="0"/>
+                <a:cs typeface="Consolas" panose="020B0609020204030204" pitchFamily="49" charset="0"/>
+              </a:rPr>
+              <a:t>lib.d.ts</a:t>
+            </a:r>
+            <a:r>
+              <a:rPr lang="en-US" altLang="en-US" dirty="0">
+                <a:solidFill>
+                  <a:srgbClr val="808080"/>
+                </a:solidFill>
+                <a:latin typeface="Consolas" panose="020B0609020204030204" pitchFamily="49" charset="0"/>
+                <a:cs typeface="Consolas" panose="020B0609020204030204" pitchFamily="49" charset="0"/>
+              </a:rPr>
+              <a:t>"/&gt;</a:t>
+            </a:r>
+            <a:r>
+              <a:rPr lang="en-US" altLang="en-US" dirty="0">
+                <a:solidFill>
+                  <a:srgbClr val="000000"/>
+                </a:solidFill>
+                <a:latin typeface="Consolas" panose="020B0609020204030204" pitchFamily="49" charset="0"/>
+                <a:cs typeface="Consolas" panose="020B0609020204030204" pitchFamily="49" charset="0"/>
+              </a:rPr>
+              <a:t> </a:t>
+            </a:r>
+            <a:endParaRPr lang="en-US" dirty="0" smtClean="0"/>
+          </a:p>
+          <a:p>
+            <a:endParaRPr lang="en-US" dirty="0"/>
+          </a:p>
+          <a:p>
+            <a:r>
+              <a:rPr lang="en-US" dirty="0" smtClean="0"/>
+              <a:t>Include batch of references via _</a:t>
+            </a:r>
+            <a:r>
+              <a:rPr lang="en-US" dirty="0" err="1" smtClean="0"/>
+              <a:t>reference.ts</a:t>
+            </a:r>
+            <a:r>
+              <a:rPr lang="en-US" dirty="0" smtClean="0"/>
+              <a:t> file</a:t>
+            </a:r>
+          </a:p>
+          <a:p>
+            <a:endParaRPr lang="en-US" dirty="0"/>
+          </a:p>
+          <a:p>
+            <a:r>
+              <a:rPr lang="en-US" dirty="0" smtClean="0"/>
+              <a:t>Can drag .</a:t>
+            </a:r>
+            <a:r>
+              <a:rPr lang="en-US" dirty="0" err="1" smtClean="0"/>
+              <a:t>ts</a:t>
+            </a:r>
+            <a:r>
+              <a:rPr lang="en-US" dirty="0" smtClean="0"/>
+              <a:t> OR .</a:t>
+            </a:r>
+            <a:r>
+              <a:rPr lang="en-US" dirty="0" err="1" smtClean="0"/>
+              <a:t>d.ts</a:t>
+            </a:r>
+            <a:r>
+              <a:rPr lang="en-US" dirty="0" smtClean="0"/>
+              <a:t> file into TS file to auto-add reference</a:t>
+            </a:r>
+          </a:p>
+          <a:p>
+            <a:pPr lvl="1"/>
+            <a:r>
+              <a:rPr lang="en-US" dirty="0" smtClean="0"/>
+              <a:t>Paths are relative</a:t>
+            </a:r>
+          </a:p>
+        </p:txBody>
+      </p:sp>
+    </p:spTree>
+    <p:extLst>
+      <p:ext uri="{BB962C8B-B14F-4D97-AF65-F5344CB8AC3E}">
+        <p14:creationId xmlns:p14="http://schemas.microsoft.com/office/powerpoint/2010/main" val="1625565308"/>
+      </p:ext>
+    </p:extLst>
+  </p:cSld>
+  <p:clrMapOvr>
+    <a:masterClrMapping/>
+  </p:clrMapOvr>
+</p:sld>
+</file>
+
+<file path=ppt/slides/slide44.xml><?xml version="1.0" encoding="utf-8"?>
+<p:sld xmlns:a="http://schemas.openxmlformats.org/drawingml/2006/main" xmlns:r="http://schemas.openxmlformats.org/officeDocument/2006/relationships" xmlns:p="http://schemas.openxmlformats.org/presentationml/2006/main">
+  <p:cSld>
+    <p:spTree>
+      <p:nvGrpSpPr>
+        <p:cNvPr id="1" name=""/>
+        <p:cNvGrpSpPr/>
+        <p:nvPr/>
+      </p:nvGrpSpPr>
+      <p:grpSpPr>
+        <a:xfrm>
+          <a:off x="0" y="0"/>
+          <a:ext cx="0" cy="0"/>
+          <a:chOff x="0" y="0"/>
+          <a:chExt cx="0" cy="0"/>
+        </a:xfrm>
+      </p:grpSpPr>
+      <p:sp>
+        <p:nvSpPr>
+          <p:cNvPr id="2" name="Title 1"/>
+          <p:cNvSpPr>
+            <a:spLocks noGrp="1"/>
+          </p:cNvSpPr>
+          <p:nvPr>
+            <p:ph type="title"/>
+          </p:nvPr>
+        </p:nvSpPr>
+        <p:spPr/>
+        <p:txBody>
+          <a:bodyPr/>
+          <a:lstStyle/>
+          <a:p>
+            <a:r>
+              <a:rPr lang="en-US" dirty="0" smtClean="0"/>
+              <a:t>Definition Files</a:t>
+            </a:r>
+            <a:endParaRPr lang="en-US" dirty="0"/>
+          </a:p>
+        </p:txBody>
+      </p:sp>
+      <p:sp>
+        <p:nvSpPr>
+          <p:cNvPr id="3" name="Content Placeholder 2"/>
+          <p:cNvSpPr>
+            <a:spLocks noGrp="1"/>
+          </p:cNvSpPr>
+          <p:nvPr>
+            <p:ph idx="1"/>
+          </p:nvPr>
+        </p:nvSpPr>
+        <p:spPr/>
+        <p:txBody>
+          <a:bodyPr/>
+          <a:lstStyle/>
+          <a:p>
+            <a:r>
+              <a:rPr lang="en-US" dirty="0" smtClean="0"/>
+              <a:t>When no </a:t>
+            </a:r>
+            <a:r>
+              <a:rPr lang="en-US" dirty="0" err="1" smtClean="0"/>
+              <a:t>typings</a:t>
+            </a:r>
+            <a:r>
+              <a:rPr lang="en-US" dirty="0" smtClean="0"/>
+              <a:t> available, build your own!</a:t>
+            </a:r>
+          </a:p>
+          <a:p>
+            <a:endParaRPr lang="en-US" dirty="0"/>
+          </a:p>
+          <a:p>
+            <a:r>
+              <a:rPr lang="en-US" dirty="0" smtClean="0"/>
+              <a:t>Use declare keyword</a:t>
+            </a:r>
+          </a:p>
+          <a:p>
+            <a:endParaRPr lang="en-US" dirty="0"/>
+          </a:p>
+          <a:p>
+            <a:r>
+              <a:rPr lang="en-US" dirty="0" smtClean="0"/>
+              <a:t>Model </a:t>
+            </a:r>
+            <a:r>
+              <a:rPr lang="en-US" dirty="0" err="1" smtClean="0"/>
+              <a:t>api</a:t>
+            </a:r>
+            <a:r>
+              <a:rPr lang="en-US" dirty="0" smtClean="0"/>
+              <a:t> with interfaces</a:t>
+            </a:r>
+          </a:p>
+          <a:p>
+            <a:endParaRPr lang="en-US" dirty="0"/>
+          </a:p>
+          <a:p>
+            <a:r>
+              <a:rPr lang="en-US" dirty="0" smtClean="0"/>
+              <a:t>Follow guidelines at:</a:t>
+            </a:r>
+          </a:p>
+          <a:p>
+            <a:pPr lvl="1"/>
+            <a:r>
+              <a:rPr lang="en-US" dirty="0">
+                <a:hlinkClick r:id="rId2"/>
+              </a:rPr>
+              <a:t>http://</a:t>
+            </a:r>
+            <a:r>
+              <a:rPr lang="en-US" dirty="0" smtClean="0">
+                <a:hlinkClick r:id="rId2"/>
+              </a:rPr>
+              <a:t>definitelytyped.org/guides/contributing.html</a:t>
+            </a:r>
+            <a:endParaRPr lang="en-US" dirty="0" smtClean="0"/>
+          </a:p>
+          <a:p>
+            <a:pPr lvl="1"/>
+            <a:endParaRPr lang="en-US" dirty="0"/>
+          </a:p>
+        </p:txBody>
+      </p:sp>
+    </p:spTree>
+    <p:extLst>
+      <p:ext uri="{BB962C8B-B14F-4D97-AF65-F5344CB8AC3E}">
+        <p14:creationId xmlns:p14="http://schemas.microsoft.com/office/powerpoint/2010/main" val="3096779517"/>
+      </p:ext>
+    </p:extLst>
+  </p:cSld>
+  <p:clrMapOvr>
+    <a:masterClrMapping/>
+  </p:clrMapOvr>
+</p:sld>
+</file>
+
+<file path=ppt/slides/slide45.xml><?xml version="1.0" encoding="utf-8"?>
+<p:sld xmlns:a="http://schemas.openxmlformats.org/drawingml/2006/main" xmlns:r="http://schemas.openxmlformats.org/officeDocument/2006/relationships" xmlns:p="http://schemas.openxmlformats.org/presentationml/2006/main">
+  <p:cSld>
+    <p:spTree>
+      <p:nvGrpSpPr>
+        <p:cNvPr id="1" name=""/>
+        <p:cNvGrpSpPr/>
+        <p:nvPr/>
+      </p:nvGrpSpPr>
+      <p:grpSpPr>
+        <a:xfrm>
+          <a:off x="0" y="0"/>
+          <a:ext cx="0" cy="0"/>
+          <a:chOff x="0" y="0"/>
+          <a:chExt cx="0" cy="0"/>
+        </a:xfrm>
+      </p:grpSpPr>
+      <p:sp>
+        <p:nvSpPr>
+          <p:cNvPr id="2" name="Title 1"/>
+          <p:cNvSpPr>
+            <a:spLocks noGrp="1"/>
+          </p:cNvSpPr>
+          <p:nvPr>
+            <p:ph type="title"/>
+          </p:nvPr>
+        </p:nvSpPr>
+        <p:spPr/>
+        <p:txBody>
+          <a:bodyPr/>
+          <a:lstStyle/>
+          <a:p>
+            <a:r>
+              <a:rPr lang="en-US" dirty="0" smtClean="0"/>
+              <a:t>Definition Files – Demo</a:t>
+            </a:r>
+            <a:endParaRPr lang="en-US" dirty="0"/>
+          </a:p>
+        </p:txBody>
+      </p:sp>
+      <p:sp>
+        <p:nvSpPr>
+          <p:cNvPr id="3" name="Content Placeholder 2"/>
+          <p:cNvSpPr>
+            <a:spLocks noGrp="1"/>
+          </p:cNvSpPr>
+          <p:nvPr>
+            <p:ph idx="1"/>
+          </p:nvPr>
+        </p:nvSpPr>
+        <p:spPr/>
+        <p:txBody>
+          <a:bodyPr/>
+          <a:lstStyle/>
+          <a:p>
+            <a:r>
+              <a:rPr lang="en-US" dirty="0" smtClean="0"/>
+              <a:t>Let’s make a definition file</a:t>
+            </a:r>
+          </a:p>
+          <a:p>
+            <a:pPr lvl="1"/>
+            <a:r>
+              <a:rPr lang="en-US" dirty="0">
+                <a:hlinkClick r:id="rId2"/>
+              </a:rPr>
+              <a:t>http://www.jstorage.info/#</a:t>
+            </a:r>
+            <a:r>
+              <a:rPr lang="en-US" dirty="0" smtClean="0">
+                <a:hlinkClick r:id="rId2"/>
+              </a:rPr>
+              <a:t>reference</a:t>
+            </a:r>
+            <a:endParaRPr lang="en-US" dirty="0" smtClean="0"/>
+          </a:p>
+          <a:p>
+            <a:pPr lvl="1"/>
+            <a:endParaRPr lang="en-US" dirty="0"/>
+          </a:p>
+          <a:p>
+            <a:r>
+              <a:rPr lang="en-US" dirty="0" smtClean="0"/>
+              <a:t>Section 3 / </a:t>
+            </a:r>
+            <a:r>
+              <a:rPr lang="en-US" dirty="0" err="1" smtClean="0"/>
+              <a:t>jstorage.d.ts</a:t>
+            </a:r>
+            <a:endParaRPr lang="en-US" dirty="0"/>
+          </a:p>
+        </p:txBody>
+      </p:sp>
+    </p:spTree>
+    <p:extLst>
+      <p:ext uri="{BB962C8B-B14F-4D97-AF65-F5344CB8AC3E}">
+        <p14:creationId xmlns:p14="http://schemas.microsoft.com/office/powerpoint/2010/main" val="3204082864"/>
       </p:ext>
     </p:extLst>
   </p:cSld>

</xml_diff>

<commit_message>
Danilf : More work on tslint.
</commit_message>
<xml_diff>
--- a/Presentation/TypeScriptFundamentals.pptx
+++ b/Presentation/TypeScriptFundamentals.pptx
@@ -50,6 +50,10 @@
     <p:sldId id="299" r:id="rId44"/>
     <p:sldId id="300" r:id="rId45"/>
     <p:sldId id="301" r:id="rId46"/>
+    <p:sldId id="302" r:id="rId47"/>
+    <p:sldId id="303" r:id="rId48"/>
+    <p:sldId id="304" r:id="rId49"/>
+    <p:sldId id="305" r:id="rId50"/>
   </p:sldIdLst>
   <p:sldSz cx="12192000" cy="6858000"/>
   <p:notesSz cx="6858000" cy="9144000"/>
@@ -210,6 +214,14 @@
             <p14:sldId id="299"/>
             <p14:sldId id="300"/>
             <p14:sldId id="301"/>
+          </p14:sldIdLst>
+        </p14:section>
+        <p14:section name="Advanced Concepts" id="{599BE12E-E5D1-4E45-A2BA-DEE43F16887E}">
+          <p14:sldIdLst>
+            <p14:sldId id="302"/>
+            <p14:sldId id="303"/>
+            <p14:sldId id="304"/>
+            <p14:sldId id="305"/>
           </p14:sldIdLst>
         </p14:section>
       </p14:sectionLst>
@@ -21085,6 +21097,525 @@
 </p:sld>
 </file>
 
+<file path=ppt/slides/slide46.xml><?xml version="1.0" encoding="utf-8"?>
+<p:sld xmlns:a="http://schemas.openxmlformats.org/drawingml/2006/main" xmlns:r="http://schemas.openxmlformats.org/officeDocument/2006/relationships" xmlns:p="http://schemas.openxmlformats.org/presentationml/2006/main">
+  <p:cSld>
+    <p:spTree>
+      <p:nvGrpSpPr>
+        <p:cNvPr id="1" name=""/>
+        <p:cNvGrpSpPr/>
+        <p:nvPr/>
+      </p:nvGrpSpPr>
+      <p:grpSpPr>
+        <a:xfrm>
+          <a:off x="0" y="0"/>
+          <a:ext cx="0" cy="0"/>
+          <a:chOff x="0" y="0"/>
+          <a:chExt cx="0" cy="0"/>
+        </a:xfrm>
+      </p:grpSpPr>
+      <p:sp>
+        <p:nvSpPr>
+          <p:cNvPr id="2" name="Title 1"/>
+          <p:cNvSpPr>
+            <a:spLocks noGrp="1"/>
+          </p:cNvSpPr>
+          <p:nvPr>
+            <p:ph type="title"/>
+          </p:nvPr>
+        </p:nvSpPr>
+        <p:spPr/>
+        <p:txBody>
+          <a:bodyPr/>
+          <a:lstStyle/>
+          <a:p>
+            <a:r>
+              <a:rPr lang="en-US" dirty="0" smtClean="0"/>
+              <a:t>Advanced Concepts</a:t>
+            </a:r>
+            <a:endParaRPr lang="en-US" dirty="0"/>
+          </a:p>
+        </p:txBody>
+      </p:sp>
+      <p:sp>
+        <p:nvSpPr>
+          <p:cNvPr id="4" name="Text Placeholder 3"/>
+          <p:cNvSpPr>
+            <a:spLocks noGrp="1"/>
+          </p:cNvSpPr>
+          <p:nvPr>
+            <p:ph type="body" idx="1"/>
+          </p:nvPr>
+        </p:nvSpPr>
+        <p:spPr/>
+        <p:txBody>
+          <a:bodyPr/>
+          <a:lstStyle/>
+          <a:p>
+            <a:endParaRPr lang="en-US"/>
+          </a:p>
+        </p:txBody>
+      </p:sp>
+    </p:spTree>
+    <p:extLst>
+      <p:ext uri="{BB962C8B-B14F-4D97-AF65-F5344CB8AC3E}">
+        <p14:creationId xmlns:p14="http://schemas.microsoft.com/office/powerpoint/2010/main" val="2300722377"/>
+      </p:ext>
+    </p:extLst>
+  </p:cSld>
+  <p:clrMapOvr>
+    <a:masterClrMapping/>
+  </p:clrMapOvr>
+</p:sld>
+</file>
+
+<file path=ppt/slides/slide47.xml><?xml version="1.0" encoding="utf-8"?>
+<p:sld xmlns:a="http://schemas.openxmlformats.org/drawingml/2006/main" xmlns:r="http://schemas.openxmlformats.org/officeDocument/2006/relationships" xmlns:p="http://schemas.openxmlformats.org/presentationml/2006/main">
+  <p:cSld>
+    <p:spTree>
+      <p:nvGrpSpPr>
+        <p:cNvPr id="1" name=""/>
+        <p:cNvGrpSpPr/>
+        <p:nvPr/>
+      </p:nvGrpSpPr>
+      <p:grpSpPr>
+        <a:xfrm>
+          <a:off x="0" y="0"/>
+          <a:ext cx="0" cy="0"/>
+          <a:chOff x="0" y="0"/>
+          <a:chExt cx="0" cy="0"/>
+        </a:xfrm>
+      </p:grpSpPr>
+      <p:sp>
+        <p:nvSpPr>
+          <p:cNvPr id="4" name="Title 3"/>
+          <p:cNvSpPr>
+            <a:spLocks noGrp="1"/>
+          </p:cNvSpPr>
+          <p:nvPr>
+            <p:ph type="title"/>
+          </p:nvPr>
+        </p:nvSpPr>
+        <p:spPr/>
+        <p:txBody>
+          <a:bodyPr/>
+          <a:lstStyle/>
+          <a:p>
+            <a:r>
+              <a:rPr lang="en-US" dirty="0" smtClean="0"/>
+              <a:t>Best Practices</a:t>
+            </a:r>
+            <a:endParaRPr lang="en-US" dirty="0"/>
+          </a:p>
+        </p:txBody>
+      </p:sp>
+      <p:sp>
+        <p:nvSpPr>
+          <p:cNvPr id="5" name="Content Placeholder 4"/>
+          <p:cNvSpPr>
+            <a:spLocks noGrp="1"/>
+          </p:cNvSpPr>
+          <p:nvPr>
+            <p:ph idx="1"/>
+          </p:nvPr>
+        </p:nvSpPr>
+        <p:spPr/>
+        <p:txBody>
+          <a:bodyPr/>
+          <a:lstStyle/>
+          <a:p>
+            <a:r>
+              <a:rPr lang="en-US" dirty="0" smtClean="0"/>
+              <a:t>Do: Use namespace imports to avoid having to fully qualify paths</a:t>
+            </a:r>
+          </a:p>
+          <a:p>
+            <a:pPr lvl="1"/>
+            <a:r>
+              <a:rPr lang="en-US" dirty="0" smtClean="0"/>
+              <a:t>Make sure files are declared in dependency order</a:t>
+            </a:r>
+          </a:p>
+          <a:p>
+            <a:pPr lvl="1"/>
+            <a:endParaRPr lang="en-US" dirty="0" smtClean="0"/>
+          </a:p>
+          <a:p>
+            <a:r>
+              <a:rPr lang="en-US" dirty="0" smtClean="0"/>
+              <a:t>Do: Separate classes into multiple file</a:t>
+            </a:r>
+          </a:p>
+          <a:p>
+            <a:pPr lvl="1"/>
+            <a:r>
+              <a:rPr lang="en-US" dirty="0" smtClean="0"/>
+              <a:t>1 class per file</a:t>
+            </a:r>
+          </a:p>
+          <a:p>
+            <a:pPr lvl="1"/>
+            <a:r>
+              <a:rPr lang="en-US" dirty="0" smtClean="0"/>
+              <a:t>Use logical folder structure</a:t>
+            </a:r>
+          </a:p>
+          <a:p>
+            <a:pPr lvl="1"/>
+            <a:endParaRPr lang="en-US" dirty="0"/>
+          </a:p>
+          <a:p>
+            <a:r>
+              <a:rPr lang="en-US" dirty="0" smtClean="0"/>
+              <a:t>Do: Include _</a:t>
+            </a:r>
+            <a:r>
+              <a:rPr lang="en-US" dirty="0" err="1" smtClean="0"/>
+              <a:t>references.ts</a:t>
+            </a:r>
+            <a:r>
+              <a:rPr lang="en-US" dirty="0" smtClean="0"/>
+              <a:t> file with references to all libraries</a:t>
+            </a:r>
+          </a:p>
+          <a:p>
+            <a:pPr lvl="1"/>
+            <a:r>
+              <a:rPr lang="en-US" dirty="0" smtClean="0"/>
+              <a:t>Don’t manually specify &lt;reference&gt; tags</a:t>
+            </a:r>
+            <a:endParaRPr lang="en-US" dirty="0"/>
+          </a:p>
+          <a:p>
+            <a:endParaRPr lang="en-US" dirty="0" smtClean="0"/>
+          </a:p>
+        </p:txBody>
+      </p:sp>
+    </p:spTree>
+    <p:extLst>
+      <p:ext uri="{BB962C8B-B14F-4D97-AF65-F5344CB8AC3E}">
+        <p14:creationId xmlns:p14="http://schemas.microsoft.com/office/powerpoint/2010/main" val="533197008"/>
+      </p:ext>
+    </p:extLst>
+  </p:cSld>
+  <p:clrMapOvr>
+    <a:masterClrMapping/>
+  </p:clrMapOvr>
+</p:sld>
+</file>
+
+<file path=ppt/slides/slide48.xml><?xml version="1.0" encoding="utf-8"?>
+<p:sld xmlns:a="http://schemas.openxmlformats.org/drawingml/2006/main" xmlns:r="http://schemas.openxmlformats.org/officeDocument/2006/relationships" xmlns:p="http://schemas.openxmlformats.org/presentationml/2006/main">
+  <p:cSld>
+    <p:spTree>
+      <p:nvGrpSpPr>
+        <p:cNvPr id="1" name=""/>
+        <p:cNvGrpSpPr/>
+        <p:nvPr/>
+      </p:nvGrpSpPr>
+      <p:grpSpPr>
+        <a:xfrm>
+          <a:off x="0" y="0"/>
+          <a:ext cx="0" cy="0"/>
+          <a:chOff x="0" y="0"/>
+          <a:chExt cx="0" cy="0"/>
+        </a:xfrm>
+      </p:grpSpPr>
+      <p:sp>
+        <p:nvSpPr>
+          <p:cNvPr id="2" name="Title 1"/>
+          <p:cNvSpPr>
+            <a:spLocks noGrp="1"/>
+          </p:cNvSpPr>
+          <p:nvPr>
+            <p:ph type="title"/>
+          </p:nvPr>
+        </p:nvSpPr>
+        <p:spPr/>
+        <p:txBody>
+          <a:bodyPr/>
+          <a:lstStyle/>
+          <a:p>
+            <a:r>
+              <a:rPr lang="en-US" dirty="0" smtClean="0"/>
+              <a:t>Best Practices</a:t>
+            </a:r>
+            <a:endParaRPr lang="en-US" dirty="0"/>
+          </a:p>
+        </p:txBody>
+      </p:sp>
+      <p:sp>
+        <p:nvSpPr>
+          <p:cNvPr id="3" name="Content Placeholder 2"/>
+          <p:cNvSpPr>
+            <a:spLocks noGrp="1"/>
+          </p:cNvSpPr>
+          <p:nvPr>
+            <p:ph idx="1"/>
+          </p:nvPr>
+        </p:nvSpPr>
+        <p:spPr/>
+        <p:txBody>
+          <a:bodyPr>
+            <a:normAutofit fontScale="92500" lnSpcReduction="10000"/>
+          </a:bodyPr>
+          <a:lstStyle/>
+          <a:p>
+            <a:pPr lvl="0"/>
+            <a:r>
+              <a:rPr lang="en-US" dirty="0" smtClean="0"/>
+              <a:t>Don’t: Use </a:t>
+            </a:r>
+            <a:r>
+              <a:rPr lang="en-US" altLang="en-US" dirty="0" smtClean="0">
+                <a:solidFill>
+                  <a:srgbClr val="0000FF"/>
+                </a:solidFill>
+                <a:latin typeface="Consolas" panose="020B0609020204030204" pitchFamily="49" charset="0"/>
+                <a:cs typeface="Consolas" panose="020B0609020204030204" pitchFamily="49" charset="0"/>
+              </a:rPr>
+              <a:t>any</a:t>
+            </a:r>
+            <a:r>
+              <a:rPr lang="en-US" dirty="0" smtClean="0"/>
+              <a:t> type too much</a:t>
+            </a:r>
+          </a:p>
+          <a:p>
+            <a:pPr lvl="0"/>
+            <a:endParaRPr lang="en-US" dirty="0"/>
+          </a:p>
+          <a:p>
+            <a:pPr lvl="0"/>
+            <a:r>
+              <a:rPr lang="en-US" dirty="0" smtClean="0"/>
+              <a:t>Do: Use modules for logical namespace groupings</a:t>
+            </a:r>
+          </a:p>
+          <a:p>
+            <a:pPr lvl="1"/>
+            <a:r>
+              <a:rPr lang="en-US" dirty="0" smtClean="0"/>
+              <a:t>Match folder structure</a:t>
+            </a:r>
+          </a:p>
+          <a:p>
+            <a:pPr lvl="1"/>
+            <a:endParaRPr lang="en-US" dirty="0"/>
+          </a:p>
+          <a:p>
+            <a:r>
+              <a:rPr lang="en-US" dirty="0" smtClean="0"/>
+              <a:t>Do: Follow JS style guidelines</a:t>
+            </a:r>
+          </a:p>
+          <a:p>
+            <a:pPr lvl="1"/>
+            <a:r>
+              <a:rPr lang="en-US" dirty="0">
+                <a:hlinkClick r:id="rId2"/>
+              </a:rPr>
+              <a:t>https://</a:t>
+            </a:r>
+            <a:r>
+              <a:rPr lang="en-US" dirty="0" smtClean="0">
+                <a:hlinkClick r:id="rId2"/>
+              </a:rPr>
+              <a:t>github.com/airbnb/javascript</a:t>
+            </a:r>
+            <a:endParaRPr lang="en-US" dirty="0" smtClean="0"/>
+          </a:p>
+          <a:p>
+            <a:pPr lvl="1"/>
+            <a:endParaRPr lang="en-US" dirty="0"/>
+          </a:p>
+          <a:p>
+            <a:r>
+              <a:rPr lang="en-US" dirty="0" smtClean="0"/>
+              <a:t>Do: Use </a:t>
+            </a:r>
+            <a:r>
+              <a:rPr lang="en-US" dirty="0" err="1" smtClean="0"/>
+              <a:t>TSLint</a:t>
+            </a:r>
+            <a:endParaRPr lang="en-US" dirty="0" smtClean="0"/>
+          </a:p>
+          <a:p>
+            <a:pPr lvl="1"/>
+            <a:r>
+              <a:rPr lang="en-US" dirty="0">
+                <a:hlinkClick r:id="rId3"/>
+              </a:rPr>
+              <a:t>http://</a:t>
+            </a:r>
+            <a:r>
+              <a:rPr lang="en-US" dirty="0" smtClean="0">
+                <a:hlinkClick r:id="rId3"/>
+              </a:rPr>
+              <a:t>vswebessentials.com/features/typescript</a:t>
+            </a:r>
+            <a:endParaRPr lang="en-US" dirty="0" smtClean="0"/>
+          </a:p>
+          <a:p>
+            <a:pPr lvl="1"/>
+            <a:r>
+              <a:rPr lang="en-US" dirty="0" smtClean="0"/>
+              <a:t>Note: Do not lint </a:t>
+            </a:r>
+            <a:r>
+              <a:rPr lang="en-US" dirty="0" err="1" smtClean="0"/>
+              <a:t>typings</a:t>
+            </a:r>
+            <a:endParaRPr lang="en-US" dirty="0"/>
+          </a:p>
+        </p:txBody>
+      </p:sp>
+    </p:spTree>
+    <p:extLst>
+      <p:ext uri="{BB962C8B-B14F-4D97-AF65-F5344CB8AC3E}">
+        <p14:creationId xmlns:p14="http://schemas.microsoft.com/office/powerpoint/2010/main" val="439267084"/>
+      </p:ext>
+    </p:extLst>
+  </p:cSld>
+  <p:clrMapOvr>
+    <a:masterClrMapping/>
+  </p:clrMapOvr>
+</p:sld>
+</file>
+
+<file path=ppt/slides/slide49.xml><?xml version="1.0" encoding="utf-8"?>
+<p:sld xmlns:a="http://schemas.openxmlformats.org/drawingml/2006/main" xmlns:r="http://schemas.openxmlformats.org/officeDocument/2006/relationships" xmlns:p="http://schemas.openxmlformats.org/presentationml/2006/main">
+  <p:cSld>
+    <p:spTree>
+      <p:nvGrpSpPr>
+        <p:cNvPr id="1" name=""/>
+        <p:cNvGrpSpPr/>
+        <p:nvPr/>
+      </p:nvGrpSpPr>
+      <p:grpSpPr>
+        <a:xfrm>
+          <a:off x="0" y="0"/>
+          <a:ext cx="0" cy="0"/>
+          <a:chOff x="0" y="0"/>
+          <a:chExt cx="0" cy="0"/>
+        </a:xfrm>
+      </p:grpSpPr>
+      <p:sp>
+        <p:nvSpPr>
+          <p:cNvPr id="2" name="Title 1"/>
+          <p:cNvSpPr>
+            <a:spLocks noGrp="1"/>
+          </p:cNvSpPr>
+          <p:nvPr>
+            <p:ph type="title"/>
+          </p:nvPr>
+        </p:nvSpPr>
+        <p:spPr/>
+        <p:txBody>
+          <a:bodyPr/>
+          <a:lstStyle/>
+          <a:p>
+            <a:r>
+              <a:rPr lang="en-US" dirty="0" smtClean="0"/>
+              <a:t>Best Practices</a:t>
+            </a:r>
+            <a:endParaRPr lang="en-US" dirty="0"/>
+          </a:p>
+        </p:txBody>
+      </p:sp>
+      <p:sp>
+        <p:nvSpPr>
+          <p:cNvPr id="3" name="Content Placeholder 2"/>
+          <p:cNvSpPr>
+            <a:spLocks noGrp="1"/>
+          </p:cNvSpPr>
+          <p:nvPr>
+            <p:ph idx="1"/>
+          </p:nvPr>
+        </p:nvSpPr>
+        <p:spPr/>
+        <p:txBody>
+          <a:bodyPr/>
+          <a:lstStyle/>
+          <a:p>
+            <a:r>
+              <a:rPr lang="en-US" dirty="0" smtClean="0"/>
+              <a:t>Do: Check in typing files into source control</a:t>
+            </a:r>
+          </a:p>
+          <a:p>
+            <a:pPr lvl="1"/>
+            <a:r>
+              <a:rPr lang="en-US" dirty="0" smtClean="0"/>
+              <a:t>Not restored on </a:t>
+            </a:r>
+            <a:r>
+              <a:rPr lang="en-US" dirty="0" err="1" smtClean="0"/>
+              <a:t>Nuget</a:t>
+            </a:r>
+            <a:r>
+              <a:rPr lang="en-US" dirty="0" smtClean="0"/>
+              <a:t> package restore</a:t>
+            </a:r>
+          </a:p>
+          <a:p>
+            <a:pPr lvl="1"/>
+            <a:endParaRPr lang="en-US" dirty="0"/>
+          </a:p>
+          <a:p>
+            <a:r>
+              <a:rPr lang="en-US" dirty="0" smtClean="0"/>
+              <a:t>Do: Submit pull requests for new/fixed </a:t>
+            </a:r>
+            <a:r>
+              <a:rPr lang="en-US" dirty="0" err="1" smtClean="0"/>
+              <a:t>typings</a:t>
+            </a:r>
+            <a:r>
+              <a:rPr lang="en-US" dirty="0" smtClean="0"/>
+              <a:t> to </a:t>
+            </a:r>
+            <a:r>
+              <a:rPr lang="en-US" dirty="0" err="1" smtClean="0"/>
+              <a:t>DefinitelyTyped</a:t>
+            </a:r>
+            <a:endParaRPr lang="en-US" dirty="0" smtClean="0"/>
+          </a:p>
+          <a:p>
+            <a:endParaRPr lang="en-US" dirty="0"/>
+          </a:p>
+          <a:p>
+            <a:r>
+              <a:rPr lang="en-US" dirty="0" smtClean="0"/>
+              <a:t>Don’t: Check in files that </a:t>
+            </a:r>
+            <a:r>
+              <a:rPr lang="en-US" smtClean="0"/>
+              <a:t>don’t compile</a:t>
+            </a:r>
+            <a:endParaRPr lang="en-US" dirty="0" smtClean="0"/>
+          </a:p>
+          <a:p>
+            <a:endParaRPr lang="en-US" dirty="0"/>
+          </a:p>
+          <a:p>
+            <a:endParaRPr lang="en-US" dirty="0"/>
+          </a:p>
+        </p:txBody>
+      </p:sp>
+    </p:spTree>
+    <p:extLst>
+      <p:ext uri="{BB962C8B-B14F-4D97-AF65-F5344CB8AC3E}">
+        <p14:creationId xmlns:p14="http://schemas.microsoft.com/office/powerpoint/2010/main" val="2375747027"/>
+      </p:ext>
+    </p:extLst>
+  </p:cSld>
+  <p:clrMapOvr>
+    <a:masterClrMapping/>
+  </p:clrMapOvr>
+</p:sld>
+</file>
+
 <file path=ppt/slides/slide5.xml><?xml version="1.0" encoding="utf-8"?>
 <p:sld xmlns:a="http://schemas.openxmlformats.org/drawingml/2006/main" xmlns:r="http://schemas.openxmlformats.org/officeDocument/2006/relationships" xmlns:p="http://schemas.openxmlformats.org/presentationml/2006/main">
   <p:cSld>

</xml_diff>

<commit_message>
DanilF: Added sample todo app. Added info on getters/setters.
</commit_message>
<xml_diff>
--- a/Presentation/TypeScriptFundamentals.pptx
+++ b/Presentation/TypeScriptFundamentals.pptx
@@ -51,9 +51,18 @@
     <p:sldId id="300" r:id="rId45"/>
     <p:sldId id="301" r:id="rId46"/>
     <p:sldId id="302" r:id="rId47"/>
-    <p:sldId id="303" r:id="rId48"/>
-    <p:sldId id="304" r:id="rId49"/>
-    <p:sldId id="305" r:id="rId50"/>
+    <p:sldId id="306" r:id="rId48"/>
+    <p:sldId id="307" r:id="rId49"/>
+    <p:sldId id="308" r:id="rId50"/>
+    <p:sldId id="309" r:id="rId51"/>
+    <p:sldId id="310" r:id="rId52"/>
+    <p:sldId id="312" r:id="rId53"/>
+    <p:sldId id="313" r:id="rId54"/>
+    <p:sldId id="311" r:id="rId55"/>
+    <p:sldId id="303" r:id="rId56"/>
+    <p:sldId id="304" r:id="rId57"/>
+    <p:sldId id="305" r:id="rId58"/>
+    <p:sldId id="314" r:id="rId59"/>
   </p:sldIdLst>
   <p:sldSz cx="12192000" cy="6858000"/>
   <p:notesSz cx="6858000" cy="9144000"/>
@@ -219,9 +228,30 @@
         <p14:section name="Advanced Concepts" id="{599BE12E-E5D1-4E45-A2BA-DEE43F16887E}">
           <p14:sldIdLst>
             <p14:sldId id="302"/>
+            <p14:sldId id="306"/>
+            <p14:sldId id="307"/>
+            <p14:sldId id="308"/>
+            <p14:sldId id="309"/>
+            <p14:sldId id="310"/>
+          </p14:sldIdLst>
+        </p14:section>
+        <p14:section name="Todo Demos" id="{9E0C56E7-4A72-40D5-942C-56BE39007C31}">
+          <p14:sldIdLst>
+            <p14:sldId id="312"/>
+            <p14:sldId id="313"/>
+          </p14:sldIdLst>
+        </p14:section>
+        <p14:section name="Best Practices" id="{D655AA8A-73FF-4BC3-B24C-2A42728AAA8C}">
+          <p14:sldIdLst>
+            <p14:sldId id="311"/>
             <p14:sldId id="303"/>
             <p14:sldId id="304"/>
             <p14:sldId id="305"/>
+          </p14:sldIdLst>
+        </p14:section>
+        <p14:section name="Conclusion" id="{E240FE6F-BAA6-4501-BD73-66D409C9AB59}">
+          <p14:sldIdLst>
+            <p14:sldId id="314"/>
           </p14:sldIdLst>
         </p14:section>
       </p14:sectionLst>
@@ -966,7 +996,7 @@
           <a:p>
             <a:fld id="{974B815D-6AFA-4040-8EC9-7F4094DEB064}" type="datetimeFigureOut">
               <a:rPr lang="en-US" smtClean="0"/>
-              <a:t>10/8/2014</a:t>
+              <a:t>10/9/2014</a:t>
             </a:fld>
             <a:endParaRPr lang="en-US"/>
           </a:p>
@@ -1217,7 +1247,7 @@
           <a:p>
             <a:fld id="{974B815D-6AFA-4040-8EC9-7F4094DEB064}" type="datetimeFigureOut">
               <a:rPr lang="en-US" smtClean="0"/>
-              <a:t>10/8/2014</a:t>
+              <a:t>10/9/2014</a:t>
             </a:fld>
             <a:endParaRPr lang="en-US"/>
           </a:p>
@@ -1531,7 +1561,7 @@
           <a:p>
             <a:fld id="{974B815D-6AFA-4040-8EC9-7F4094DEB064}" type="datetimeFigureOut">
               <a:rPr lang="en-US" smtClean="0"/>
-              <a:t>10/8/2014</a:t>
+              <a:t>10/9/2014</a:t>
             </a:fld>
             <a:endParaRPr lang="en-US"/>
           </a:p>
@@ -1872,7 +1902,7 @@
           <a:p>
             <a:fld id="{974B815D-6AFA-4040-8EC9-7F4094DEB064}" type="datetimeFigureOut">
               <a:rPr lang="en-US" smtClean="0"/>
-              <a:t>10/8/2014</a:t>
+              <a:t>10/9/2014</a:t>
             </a:fld>
             <a:endParaRPr lang="en-US"/>
           </a:p>
@@ -2186,7 +2216,7 @@
           <a:p>
             <a:fld id="{974B815D-6AFA-4040-8EC9-7F4094DEB064}" type="datetimeFigureOut">
               <a:rPr lang="en-US" smtClean="0"/>
-              <a:t>10/8/2014</a:t>
+              <a:t>10/9/2014</a:t>
             </a:fld>
             <a:endParaRPr lang="en-US"/>
           </a:p>
@@ -2579,7 +2609,7 @@
           <a:p>
             <a:fld id="{974B815D-6AFA-4040-8EC9-7F4094DEB064}" type="datetimeFigureOut">
               <a:rPr lang="en-US" smtClean="0"/>
-              <a:t>10/8/2014</a:t>
+              <a:t>10/9/2014</a:t>
             </a:fld>
             <a:endParaRPr lang="en-US"/>
           </a:p>
@@ -2749,7 +2779,7 @@
           <a:p>
             <a:fld id="{974B815D-6AFA-4040-8EC9-7F4094DEB064}" type="datetimeFigureOut">
               <a:rPr lang="en-US" smtClean="0"/>
-              <a:t>10/8/2014</a:t>
+              <a:t>10/9/2014</a:t>
             </a:fld>
             <a:endParaRPr lang="en-US"/>
           </a:p>
@@ -2929,7 +2959,7 @@
           <a:p>
             <a:fld id="{974B815D-6AFA-4040-8EC9-7F4094DEB064}" type="datetimeFigureOut">
               <a:rPr lang="en-US" smtClean="0"/>
-              <a:t>10/8/2014</a:t>
+              <a:t>10/9/2014</a:t>
             </a:fld>
             <a:endParaRPr lang="en-US"/>
           </a:p>
@@ -3105,7 +3135,7 @@
           <a:p>
             <a:fld id="{974B815D-6AFA-4040-8EC9-7F4094DEB064}" type="datetimeFigureOut">
               <a:rPr lang="en-US" smtClean="0"/>
-              <a:t>10/8/2014</a:t>
+              <a:t>10/9/2014</a:t>
             </a:fld>
             <a:endParaRPr lang="en-US"/>
           </a:p>
@@ -3352,7 +3382,7 @@
           <a:p>
             <a:fld id="{974B815D-6AFA-4040-8EC9-7F4094DEB064}" type="datetimeFigureOut">
               <a:rPr lang="en-US" smtClean="0"/>
-              <a:t>10/8/2014</a:t>
+              <a:t>10/9/2014</a:t>
             </a:fld>
             <a:endParaRPr lang="en-US"/>
           </a:p>
@@ -3584,7 +3614,7 @@
           <a:p>
             <a:fld id="{974B815D-6AFA-4040-8EC9-7F4094DEB064}" type="datetimeFigureOut">
               <a:rPr lang="en-US" smtClean="0"/>
-              <a:t>10/8/2014</a:t>
+              <a:t>10/9/2014</a:t>
             </a:fld>
             <a:endParaRPr lang="en-US"/>
           </a:p>
@@ -3958,7 +3988,7 @@
           <a:p>
             <a:fld id="{974B815D-6AFA-4040-8EC9-7F4094DEB064}" type="datetimeFigureOut">
               <a:rPr lang="en-US" smtClean="0"/>
-              <a:t>10/8/2014</a:t>
+              <a:t>10/9/2014</a:t>
             </a:fld>
             <a:endParaRPr lang="en-US"/>
           </a:p>
@@ -4081,7 +4111,7 @@
           <a:p>
             <a:fld id="{974B815D-6AFA-4040-8EC9-7F4094DEB064}" type="datetimeFigureOut">
               <a:rPr lang="en-US" smtClean="0"/>
-              <a:t>10/8/2014</a:t>
+              <a:t>10/9/2014</a:t>
             </a:fld>
             <a:endParaRPr lang="en-US"/>
           </a:p>
@@ -4176,7 +4206,7 @@
           <a:p>
             <a:fld id="{974B815D-6AFA-4040-8EC9-7F4094DEB064}" type="datetimeFigureOut">
               <a:rPr lang="en-US" smtClean="0"/>
-              <a:t>10/8/2014</a:t>
+              <a:t>10/9/2014</a:t>
             </a:fld>
             <a:endParaRPr lang="en-US"/>
           </a:p>
@@ -4431,7 +4461,7 @@
           <a:p>
             <a:fld id="{974B815D-6AFA-4040-8EC9-7F4094DEB064}" type="datetimeFigureOut">
               <a:rPr lang="en-US" smtClean="0"/>
-              <a:t>10/8/2014</a:t>
+              <a:t>10/9/2014</a:t>
             </a:fld>
             <a:endParaRPr lang="en-US"/>
           </a:p>
@@ -4694,7 +4724,7 @@
           <a:p>
             <a:fld id="{974B815D-6AFA-4040-8EC9-7F4094DEB064}" type="datetimeFigureOut">
               <a:rPr lang="en-US" smtClean="0"/>
-              <a:t>10/8/2014</a:t>
+              <a:t>10/9/2014</a:t>
             </a:fld>
             <a:endParaRPr lang="en-US"/>
           </a:p>
@@ -5437,7 +5467,7 @@
           <a:p>
             <a:fld id="{974B815D-6AFA-4040-8EC9-7F4094DEB064}" type="datetimeFigureOut">
               <a:rPr lang="en-US" smtClean="0"/>
-              <a:t>10/8/2014</a:t>
+              <a:t>10/9/2014</a:t>
             </a:fld>
             <a:endParaRPr lang="en-US"/>
           </a:p>
@@ -21203,7 +21233,7 @@
           <a:p>
             <a:r>
               <a:rPr lang="en-US" dirty="0" smtClean="0"/>
-              <a:t>Best Practices</a:t>
+              <a:t>ECMAScript 5 Properties</a:t>
             </a:r>
             <a:endParaRPr lang="en-US" dirty="0"/>
           </a:p>
@@ -21226,75 +21256,780 @@
           <a:p>
             <a:r>
               <a:rPr lang="en-US" dirty="0" smtClean="0"/>
-              <a:t>Do: Use namespace imports to avoid having to fully qualify paths</a:t>
-            </a:r>
-          </a:p>
-          <a:p>
-            <a:pPr lvl="1"/>
+              <a:t>ECMAScript 5 introduced concept of “properties”</a:t>
+            </a:r>
+          </a:p>
+          <a:p>
+            <a:endParaRPr lang="en-US" dirty="0"/>
+          </a:p>
+          <a:p>
             <a:r>
               <a:rPr lang="en-US" dirty="0" smtClean="0"/>
-              <a:t>Make sure files are declared in dependency order</a:t>
-            </a:r>
-          </a:p>
-          <a:p>
-            <a:pPr lvl="1"/>
-            <a:endParaRPr lang="en-US" dirty="0" smtClean="0"/>
-          </a:p>
-          <a:p>
-            <a:r>
-              <a:rPr lang="en-US" dirty="0" smtClean="0"/>
-              <a:t>Do: Separate classes into multiple file</a:t>
-            </a:r>
-          </a:p>
-          <a:p>
-            <a:pPr lvl="1"/>
-            <a:r>
-              <a:rPr lang="en-US" dirty="0" smtClean="0"/>
-              <a:t>1 class per file</a:t>
-            </a:r>
-          </a:p>
-          <a:p>
-            <a:pPr lvl="1"/>
-            <a:r>
-              <a:rPr lang="en-US" dirty="0" smtClean="0"/>
-              <a:t>Use logical folder structure</a:t>
-            </a:r>
-          </a:p>
-          <a:p>
-            <a:pPr lvl="1"/>
+              <a:t>JS Syntax:</a:t>
+            </a:r>
+          </a:p>
+          <a:p>
             <a:endParaRPr lang="en-US" dirty="0"/>
           </a:p>
-          <a:p>
-            <a:r>
-              <a:rPr lang="en-US" dirty="0" smtClean="0"/>
-              <a:t>Do: Include _</a:t>
-            </a:r>
-            <a:r>
-              <a:rPr lang="en-US" dirty="0" err="1" smtClean="0"/>
-              <a:t>references.ts</a:t>
-            </a:r>
-            <a:r>
-              <a:rPr lang="en-US" dirty="0" smtClean="0"/>
-              <a:t> file with references to all libraries</a:t>
-            </a:r>
-          </a:p>
-          <a:p>
-            <a:pPr lvl="1"/>
-            <a:r>
-              <a:rPr lang="en-US" dirty="0" smtClean="0"/>
-              <a:t>Don’t manually specify &lt;reference&gt; tags</a:t>
-            </a:r>
-            <a:endParaRPr lang="en-US" dirty="0"/>
-          </a:p>
-          <a:p>
-            <a:endParaRPr lang="en-US" dirty="0" smtClean="0"/>
+        </p:txBody>
+      </p:sp>
+      <p:sp>
+        <p:nvSpPr>
+          <p:cNvPr id="8" name="Rectangle 7"/>
+          <p:cNvSpPr/>
+          <p:nvPr/>
+        </p:nvSpPr>
+        <p:spPr>
+          <a:xfrm>
+            <a:off x="880680" y="3510188"/>
+            <a:ext cx="8189976" cy="3451138"/>
+          </a:xfrm>
+          <a:prstGeom prst="rect">
+            <a:avLst/>
+          </a:prstGeom>
+        </p:spPr>
+        <p:txBody>
+          <a:bodyPr wrap="square">
+            <a:spAutoFit/>
+          </a:bodyPr>
+          <a:lstStyle/>
+          <a:p>
+            <a:pPr>
+              <a:lnSpc>
+                <a:spcPct val="107000"/>
+              </a:lnSpc>
+              <a:tabLst>
+                <a:tab pos="581660" algn="l"/>
+                <a:tab pos="1163320" algn="l"/>
+                <a:tab pos="1744980" algn="l"/>
+                <a:tab pos="2326640" algn="l"/>
+                <a:tab pos="2908300" algn="l"/>
+                <a:tab pos="3489960" algn="l"/>
+                <a:tab pos="4071620" algn="l"/>
+                <a:tab pos="4653280" algn="l"/>
+                <a:tab pos="5234940" algn="l"/>
+                <a:tab pos="5816600" algn="l"/>
+                <a:tab pos="6398260" algn="l"/>
+                <a:tab pos="6979920" algn="l"/>
+                <a:tab pos="7561580" algn="l"/>
+                <a:tab pos="8143240" algn="l"/>
+                <a:tab pos="8724900" algn="l"/>
+                <a:tab pos="9306560" algn="l"/>
+              </a:tabLst>
+            </a:pPr>
+            <a:r>
+              <a:rPr lang="en-US" dirty="0" err="1">
+                <a:solidFill>
+                  <a:srgbClr val="000000"/>
+                </a:solidFill>
+                <a:latin typeface="Consolas" panose="020B0609020204030204" pitchFamily="49" charset="0"/>
+                <a:ea typeface="Times New Roman" panose="02020603050405020304" pitchFamily="18" charset="0"/>
+                <a:cs typeface="Times New Roman" panose="02020603050405020304" pitchFamily="18" charset="0"/>
+              </a:rPr>
+              <a:t>Object.defineProperty</a:t>
+            </a:r>
+            <a:r>
+              <a:rPr lang="en-US" dirty="0">
+                <a:solidFill>
+                  <a:srgbClr val="000000"/>
+                </a:solidFill>
+                <a:latin typeface="Consolas" panose="020B0609020204030204" pitchFamily="49" charset="0"/>
+                <a:ea typeface="Times New Roman" panose="02020603050405020304" pitchFamily="18" charset="0"/>
+                <a:cs typeface="Times New Roman" panose="02020603050405020304" pitchFamily="18" charset="0"/>
+              </a:rPr>
+              <a:t>(</a:t>
+            </a:r>
+            <a:r>
+              <a:rPr lang="en-US" dirty="0" err="1">
+                <a:solidFill>
+                  <a:srgbClr val="000000"/>
+                </a:solidFill>
+                <a:latin typeface="Consolas" panose="020B0609020204030204" pitchFamily="49" charset="0"/>
+                <a:ea typeface="Times New Roman" panose="02020603050405020304" pitchFamily="18" charset="0"/>
+                <a:cs typeface="Times New Roman" panose="02020603050405020304" pitchFamily="18" charset="0"/>
+              </a:rPr>
+              <a:t>MyClass.prototype</a:t>
+            </a:r>
+            <a:r>
+              <a:rPr lang="en-US" dirty="0">
+                <a:solidFill>
+                  <a:srgbClr val="000000"/>
+                </a:solidFill>
+                <a:latin typeface="Consolas" panose="020B0609020204030204" pitchFamily="49" charset="0"/>
+                <a:ea typeface="Times New Roman" panose="02020603050405020304" pitchFamily="18" charset="0"/>
+                <a:cs typeface="Times New Roman" panose="02020603050405020304" pitchFamily="18" charset="0"/>
+              </a:rPr>
+              <a:t>, </a:t>
+            </a:r>
+            <a:r>
+              <a:rPr lang="en-US" dirty="0">
+                <a:solidFill>
+                  <a:srgbClr val="A31515"/>
+                </a:solidFill>
+                <a:latin typeface="Consolas" panose="020B0609020204030204" pitchFamily="49" charset="0"/>
+                <a:ea typeface="Times New Roman" panose="02020603050405020304" pitchFamily="18" charset="0"/>
+                <a:cs typeface="Times New Roman" panose="02020603050405020304" pitchFamily="18" charset="0"/>
+              </a:rPr>
+              <a:t>"value"</a:t>
+            </a:r>
+            <a:r>
+              <a:rPr lang="en-US" dirty="0">
+                <a:solidFill>
+                  <a:srgbClr val="000000"/>
+                </a:solidFill>
+                <a:latin typeface="Consolas" panose="020B0609020204030204" pitchFamily="49" charset="0"/>
+                <a:ea typeface="Times New Roman" panose="02020603050405020304" pitchFamily="18" charset="0"/>
+                <a:cs typeface="Times New Roman" panose="02020603050405020304" pitchFamily="18" charset="0"/>
+              </a:rPr>
+              <a:t>, {</a:t>
+            </a:r>
+            <a:endParaRPr lang="en-US" sz="2400" dirty="0">
+              <a:latin typeface="Calibri" panose="020F0502020204030204" pitchFamily="34" charset="0"/>
+              <a:ea typeface="Calibri" panose="020F0502020204030204" pitchFamily="34" charset="0"/>
+              <a:cs typeface="Times New Roman" panose="02020603050405020304" pitchFamily="18" charset="0"/>
+            </a:endParaRPr>
+          </a:p>
+          <a:p>
+            <a:pPr>
+              <a:lnSpc>
+                <a:spcPct val="107000"/>
+              </a:lnSpc>
+              <a:tabLst>
+                <a:tab pos="581660" algn="l"/>
+                <a:tab pos="1163320" algn="l"/>
+                <a:tab pos="1744980" algn="l"/>
+                <a:tab pos="2326640" algn="l"/>
+                <a:tab pos="2908300" algn="l"/>
+                <a:tab pos="3489960" algn="l"/>
+                <a:tab pos="4071620" algn="l"/>
+                <a:tab pos="4653280" algn="l"/>
+                <a:tab pos="5234940" algn="l"/>
+                <a:tab pos="5816600" algn="l"/>
+                <a:tab pos="6398260" algn="l"/>
+                <a:tab pos="6979920" algn="l"/>
+                <a:tab pos="7561580" algn="l"/>
+                <a:tab pos="8143240" algn="l"/>
+                <a:tab pos="8724900" algn="l"/>
+                <a:tab pos="9306560" algn="l"/>
+              </a:tabLst>
+            </a:pPr>
+            <a:r>
+              <a:rPr lang="en-US" dirty="0">
+                <a:solidFill>
+                  <a:srgbClr val="000000"/>
+                </a:solidFill>
+                <a:latin typeface="Consolas" panose="020B0609020204030204" pitchFamily="49" charset="0"/>
+                <a:ea typeface="Times New Roman" panose="02020603050405020304" pitchFamily="18" charset="0"/>
+                <a:cs typeface="Times New Roman" panose="02020603050405020304" pitchFamily="18" charset="0"/>
+              </a:rPr>
+              <a:t>    get: </a:t>
+            </a:r>
+            <a:r>
+              <a:rPr lang="en-US" dirty="0">
+                <a:solidFill>
+                  <a:srgbClr val="0000FF"/>
+                </a:solidFill>
+                <a:latin typeface="Consolas" panose="020B0609020204030204" pitchFamily="49" charset="0"/>
+                <a:ea typeface="Times New Roman" panose="02020603050405020304" pitchFamily="18" charset="0"/>
+                <a:cs typeface="Times New Roman" panose="02020603050405020304" pitchFamily="18" charset="0"/>
+              </a:rPr>
+              <a:t>function</a:t>
+            </a:r>
+            <a:r>
+              <a:rPr lang="en-US" dirty="0">
+                <a:solidFill>
+                  <a:srgbClr val="000000"/>
+                </a:solidFill>
+                <a:latin typeface="Consolas" panose="020B0609020204030204" pitchFamily="49" charset="0"/>
+                <a:ea typeface="Times New Roman" panose="02020603050405020304" pitchFamily="18" charset="0"/>
+                <a:cs typeface="Times New Roman" panose="02020603050405020304" pitchFamily="18" charset="0"/>
+              </a:rPr>
+              <a:t> () {</a:t>
+            </a:r>
+            <a:endParaRPr lang="en-US" sz="2400" dirty="0">
+              <a:latin typeface="Calibri" panose="020F0502020204030204" pitchFamily="34" charset="0"/>
+              <a:ea typeface="Calibri" panose="020F0502020204030204" pitchFamily="34" charset="0"/>
+              <a:cs typeface="Times New Roman" panose="02020603050405020304" pitchFamily="18" charset="0"/>
+            </a:endParaRPr>
+          </a:p>
+          <a:p>
+            <a:pPr>
+              <a:lnSpc>
+                <a:spcPct val="107000"/>
+              </a:lnSpc>
+              <a:tabLst>
+                <a:tab pos="581660" algn="l"/>
+                <a:tab pos="1163320" algn="l"/>
+                <a:tab pos="1744980" algn="l"/>
+                <a:tab pos="2326640" algn="l"/>
+                <a:tab pos="2908300" algn="l"/>
+                <a:tab pos="3489960" algn="l"/>
+                <a:tab pos="4071620" algn="l"/>
+                <a:tab pos="4653280" algn="l"/>
+                <a:tab pos="5234940" algn="l"/>
+                <a:tab pos="5816600" algn="l"/>
+                <a:tab pos="6398260" algn="l"/>
+                <a:tab pos="6979920" algn="l"/>
+                <a:tab pos="7561580" algn="l"/>
+                <a:tab pos="8143240" algn="l"/>
+                <a:tab pos="8724900" algn="l"/>
+                <a:tab pos="9306560" algn="l"/>
+              </a:tabLst>
+            </a:pPr>
+            <a:r>
+              <a:rPr lang="en-US" dirty="0">
+                <a:solidFill>
+                  <a:srgbClr val="000000"/>
+                </a:solidFill>
+                <a:latin typeface="Consolas" panose="020B0609020204030204" pitchFamily="49" charset="0"/>
+                <a:ea typeface="Times New Roman" panose="02020603050405020304" pitchFamily="18" charset="0"/>
+                <a:cs typeface="Times New Roman" panose="02020603050405020304" pitchFamily="18" charset="0"/>
+              </a:rPr>
+              <a:t>        </a:t>
+            </a:r>
+            <a:r>
+              <a:rPr lang="en-US" dirty="0">
+                <a:solidFill>
+                  <a:srgbClr val="0000FF"/>
+                </a:solidFill>
+                <a:latin typeface="Consolas" panose="020B0609020204030204" pitchFamily="49" charset="0"/>
+                <a:ea typeface="Times New Roman" panose="02020603050405020304" pitchFamily="18" charset="0"/>
+                <a:cs typeface="Times New Roman" panose="02020603050405020304" pitchFamily="18" charset="0"/>
+              </a:rPr>
+              <a:t>return</a:t>
+            </a:r>
+            <a:r>
+              <a:rPr lang="en-US" dirty="0">
+                <a:solidFill>
+                  <a:srgbClr val="000000"/>
+                </a:solidFill>
+                <a:latin typeface="Consolas" panose="020B0609020204030204" pitchFamily="49" charset="0"/>
+                <a:ea typeface="Times New Roman" panose="02020603050405020304" pitchFamily="18" charset="0"/>
+                <a:cs typeface="Times New Roman" panose="02020603050405020304" pitchFamily="18" charset="0"/>
+              </a:rPr>
+              <a:t> </a:t>
+            </a:r>
+            <a:r>
+              <a:rPr lang="en-US" dirty="0" err="1">
+                <a:solidFill>
+                  <a:srgbClr val="0000FF"/>
+                </a:solidFill>
+                <a:latin typeface="Consolas" panose="020B0609020204030204" pitchFamily="49" charset="0"/>
+                <a:ea typeface="Times New Roman" panose="02020603050405020304" pitchFamily="18" charset="0"/>
+                <a:cs typeface="Times New Roman" panose="02020603050405020304" pitchFamily="18" charset="0"/>
+              </a:rPr>
+              <a:t>this</a:t>
+            </a:r>
+            <a:r>
+              <a:rPr lang="en-US" dirty="0" err="1">
+                <a:solidFill>
+                  <a:srgbClr val="000000"/>
+                </a:solidFill>
+                <a:latin typeface="Consolas" panose="020B0609020204030204" pitchFamily="49" charset="0"/>
+                <a:ea typeface="Times New Roman" panose="02020603050405020304" pitchFamily="18" charset="0"/>
+                <a:cs typeface="Times New Roman" panose="02020603050405020304" pitchFamily="18" charset="0"/>
+              </a:rPr>
+              <a:t>.val</a:t>
+            </a:r>
+            <a:r>
+              <a:rPr lang="en-US" dirty="0">
+                <a:solidFill>
+                  <a:srgbClr val="000000"/>
+                </a:solidFill>
+                <a:latin typeface="Consolas" panose="020B0609020204030204" pitchFamily="49" charset="0"/>
+                <a:ea typeface="Times New Roman" panose="02020603050405020304" pitchFamily="18" charset="0"/>
+                <a:cs typeface="Times New Roman" panose="02020603050405020304" pitchFamily="18" charset="0"/>
+              </a:rPr>
+              <a:t>; </a:t>
+            </a:r>
+            <a:r>
+              <a:rPr lang="en-US" dirty="0">
+                <a:solidFill>
+                  <a:srgbClr val="008000"/>
+                </a:solidFill>
+                <a:latin typeface="Consolas" panose="020B0609020204030204" pitchFamily="49" charset="0"/>
+                <a:ea typeface="Times New Roman" panose="02020603050405020304" pitchFamily="18" charset="0"/>
+                <a:cs typeface="Times New Roman" panose="02020603050405020304" pitchFamily="18" charset="0"/>
+              </a:rPr>
+              <a:t>// Getter</a:t>
+            </a:r>
+            <a:endParaRPr lang="en-US" sz="2400" dirty="0">
+              <a:latin typeface="Calibri" panose="020F0502020204030204" pitchFamily="34" charset="0"/>
+              <a:ea typeface="Calibri" panose="020F0502020204030204" pitchFamily="34" charset="0"/>
+              <a:cs typeface="Times New Roman" panose="02020603050405020304" pitchFamily="18" charset="0"/>
+            </a:endParaRPr>
+          </a:p>
+          <a:p>
+            <a:pPr>
+              <a:lnSpc>
+                <a:spcPct val="107000"/>
+              </a:lnSpc>
+              <a:tabLst>
+                <a:tab pos="581660" algn="l"/>
+                <a:tab pos="1163320" algn="l"/>
+                <a:tab pos="1744980" algn="l"/>
+                <a:tab pos="2326640" algn="l"/>
+                <a:tab pos="2908300" algn="l"/>
+                <a:tab pos="3489960" algn="l"/>
+                <a:tab pos="4071620" algn="l"/>
+                <a:tab pos="4653280" algn="l"/>
+                <a:tab pos="5234940" algn="l"/>
+                <a:tab pos="5816600" algn="l"/>
+                <a:tab pos="6398260" algn="l"/>
+                <a:tab pos="6979920" algn="l"/>
+                <a:tab pos="7561580" algn="l"/>
+                <a:tab pos="8143240" algn="l"/>
+                <a:tab pos="8724900" algn="l"/>
+                <a:tab pos="9306560" algn="l"/>
+              </a:tabLst>
+            </a:pPr>
+            <a:r>
+              <a:rPr lang="en-US" dirty="0">
+                <a:solidFill>
+                  <a:srgbClr val="000000"/>
+                </a:solidFill>
+                <a:latin typeface="Consolas" panose="020B0609020204030204" pitchFamily="49" charset="0"/>
+                <a:ea typeface="Times New Roman" panose="02020603050405020304" pitchFamily="18" charset="0"/>
+                <a:cs typeface="Times New Roman" panose="02020603050405020304" pitchFamily="18" charset="0"/>
+              </a:rPr>
+              <a:t>    },</a:t>
+            </a:r>
+            <a:endParaRPr lang="en-US" sz="2400" dirty="0">
+              <a:latin typeface="Calibri" panose="020F0502020204030204" pitchFamily="34" charset="0"/>
+              <a:ea typeface="Calibri" panose="020F0502020204030204" pitchFamily="34" charset="0"/>
+              <a:cs typeface="Times New Roman" panose="02020603050405020304" pitchFamily="18" charset="0"/>
+            </a:endParaRPr>
+          </a:p>
+          <a:p>
+            <a:pPr>
+              <a:lnSpc>
+                <a:spcPct val="107000"/>
+              </a:lnSpc>
+              <a:tabLst>
+                <a:tab pos="581660" algn="l"/>
+                <a:tab pos="1163320" algn="l"/>
+                <a:tab pos="1744980" algn="l"/>
+                <a:tab pos="2326640" algn="l"/>
+                <a:tab pos="2908300" algn="l"/>
+                <a:tab pos="3489960" algn="l"/>
+                <a:tab pos="4071620" algn="l"/>
+                <a:tab pos="4653280" algn="l"/>
+                <a:tab pos="5234940" algn="l"/>
+                <a:tab pos="5816600" algn="l"/>
+                <a:tab pos="6398260" algn="l"/>
+                <a:tab pos="6979920" algn="l"/>
+                <a:tab pos="7561580" algn="l"/>
+                <a:tab pos="8143240" algn="l"/>
+                <a:tab pos="8724900" algn="l"/>
+                <a:tab pos="9306560" algn="l"/>
+              </a:tabLst>
+            </a:pPr>
+            <a:r>
+              <a:rPr lang="en-US" dirty="0">
+                <a:solidFill>
+                  <a:srgbClr val="000000"/>
+                </a:solidFill>
+                <a:latin typeface="Consolas" panose="020B0609020204030204" pitchFamily="49" charset="0"/>
+                <a:ea typeface="Times New Roman" panose="02020603050405020304" pitchFamily="18" charset="0"/>
+                <a:cs typeface="Times New Roman" panose="02020603050405020304" pitchFamily="18" charset="0"/>
+              </a:rPr>
+              <a:t>    set: </a:t>
+            </a:r>
+            <a:r>
+              <a:rPr lang="en-US" dirty="0">
+                <a:solidFill>
+                  <a:srgbClr val="0000FF"/>
+                </a:solidFill>
+                <a:latin typeface="Consolas" panose="020B0609020204030204" pitchFamily="49" charset="0"/>
+                <a:ea typeface="Times New Roman" panose="02020603050405020304" pitchFamily="18" charset="0"/>
+                <a:cs typeface="Times New Roman" panose="02020603050405020304" pitchFamily="18" charset="0"/>
+              </a:rPr>
+              <a:t>function</a:t>
+            </a:r>
+            <a:r>
+              <a:rPr lang="en-US" dirty="0">
+                <a:solidFill>
+                  <a:srgbClr val="000000"/>
+                </a:solidFill>
+                <a:latin typeface="Consolas" panose="020B0609020204030204" pitchFamily="49" charset="0"/>
+                <a:ea typeface="Times New Roman" panose="02020603050405020304" pitchFamily="18" charset="0"/>
+                <a:cs typeface="Times New Roman" panose="02020603050405020304" pitchFamily="18" charset="0"/>
+              </a:rPr>
+              <a:t> (</a:t>
+            </a:r>
+            <a:r>
+              <a:rPr lang="en-US" dirty="0" err="1">
+                <a:solidFill>
+                  <a:srgbClr val="000000"/>
+                </a:solidFill>
+                <a:latin typeface="Consolas" panose="020B0609020204030204" pitchFamily="49" charset="0"/>
+                <a:ea typeface="Times New Roman" panose="02020603050405020304" pitchFamily="18" charset="0"/>
+                <a:cs typeface="Times New Roman" panose="02020603050405020304" pitchFamily="18" charset="0"/>
+              </a:rPr>
+              <a:t>newVal</a:t>
+            </a:r>
+            <a:r>
+              <a:rPr lang="en-US" dirty="0">
+                <a:solidFill>
+                  <a:srgbClr val="000000"/>
+                </a:solidFill>
+                <a:latin typeface="Consolas" panose="020B0609020204030204" pitchFamily="49" charset="0"/>
+                <a:ea typeface="Times New Roman" panose="02020603050405020304" pitchFamily="18" charset="0"/>
+                <a:cs typeface="Times New Roman" panose="02020603050405020304" pitchFamily="18" charset="0"/>
+              </a:rPr>
+              <a:t>) {</a:t>
+            </a:r>
+            <a:endParaRPr lang="en-US" sz="2400" dirty="0">
+              <a:latin typeface="Calibri" panose="020F0502020204030204" pitchFamily="34" charset="0"/>
+              <a:ea typeface="Calibri" panose="020F0502020204030204" pitchFamily="34" charset="0"/>
+              <a:cs typeface="Times New Roman" panose="02020603050405020304" pitchFamily="18" charset="0"/>
+            </a:endParaRPr>
+          </a:p>
+          <a:p>
+            <a:pPr>
+              <a:lnSpc>
+                <a:spcPct val="107000"/>
+              </a:lnSpc>
+              <a:tabLst>
+                <a:tab pos="581660" algn="l"/>
+                <a:tab pos="1163320" algn="l"/>
+                <a:tab pos="1744980" algn="l"/>
+                <a:tab pos="2326640" algn="l"/>
+                <a:tab pos="2908300" algn="l"/>
+                <a:tab pos="3489960" algn="l"/>
+                <a:tab pos="4071620" algn="l"/>
+                <a:tab pos="4653280" algn="l"/>
+                <a:tab pos="5234940" algn="l"/>
+                <a:tab pos="5816600" algn="l"/>
+                <a:tab pos="6398260" algn="l"/>
+                <a:tab pos="6979920" algn="l"/>
+                <a:tab pos="7561580" algn="l"/>
+                <a:tab pos="8143240" algn="l"/>
+                <a:tab pos="8724900" algn="l"/>
+                <a:tab pos="9306560" algn="l"/>
+              </a:tabLst>
+            </a:pPr>
+            <a:r>
+              <a:rPr lang="en-US" dirty="0">
+                <a:solidFill>
+                  <a:srgbClr val="000000"/>
+                </a:solidFill>
+                <a:latin typeface="Consolas" panose="020B0609020204030204" pitchFamily="49" charset="0"/>
+                <a:ea typeface="Times New Roman" panose="02020603050405020304" pitchFamily="18" charset="0"/>
+                <a:cs typeface="Times New Roman" panose="02020603050405020304" pitchFamily="18" charset="0"/>
+              </a:rPr>
+              <a:t>        </a:t>
+            </a:r>
+            <a:r>
+              <a:rPr lang="en-US" dirty="0" err="1">
+                <a:solidFill>
+                  <a:srgbClr val="0000FF"/>
+                </a:solidFill>
+                <a:latin typeface="Consolas" panose="020B0609020204030204" pitchFamily="49" charset="0"/>
+                <a:ea typeface="Times New Roman" panose="02020603050405020304" pitchFamily="18" charset="0"/>
+                <a:cs typeface="Times New Roman" panose="02020603050405020304" pitchFamily="18" charset="0"/>
+              </a:rPr>
+              <a:t>this</a:t>
+            </a:r>
+            <a:r>
+              <a:rPr lang="en-US" dirty="0" err="1">
+                <a:solidFill>
+                  <a:srgbClr val="000000"/>
+                </a:solidFill>
+                <a:latin typeface="Consolas" panose="020B0609020204030204" pitchFamily="49" charset="0"/>
+                <a:ea typeface="Times New Roman" panose="02020603050405020304" pitchFamily="18" charset="0"/>
+                <a:cs typeface="Times New Roman" panose="02020603050405020304" pitchFamily="18" charset="0"/>
+              </a:rPr>
+              <a:t>.val</a:t>
+            </a:r>
+            <a:r>
+              <a:rPr lang="en-US" dirty="0">
+                <a:solidFill>
+                  <a:srgbClr val="000000"/>
+                </a:solidFill>
+                <a:latin typeface="Consolas" panose="020B0609020204030204" pitchFamily="49" charset="0"/>
+                <a:ea typeface="Times New Roman" panose="02020603050405020304" pitchFamily="18" charset="0"/>
+                <a:cs typeface="Times New Roman" panose="02020603050405020304" pitchFamily="18" charset="0"/>
+              </a:rPr>
+              <a:t> = </a:t>
+            </a:r>
+            <a:r>
+              <a:rPr lang="en-US" dirty="0" err="1">
+                <a:solidFill>
+                  <a:srgbClr val="000000"/>
+                </a:solidFill>
+                <a:latin typeface="Consolas" panose="020B0609020204030204" pitchFamily="49" charset="0"/>
+                <a:ea typeface="Times New Roman" panose="02020603050405020304" pitchFamily="18" charset="0"/>
+                <a:cs typeface="Times New Roman" panose="02020603050405020304" pitchFamily="18" charset="0"/>
+              </a:rPr>
+              <a:t>newVal</a:t>
+            </a:r>
+            <a:r>
+              <a:rPr lang="en-US" dirty="0">
+                <a:solidFill>
+                  <a:srgbClr val="000000"/>
+                </a:solidFill>
+                <a:latin typeface="Consolas" panose="020B0609020204030204" pitchFamily="49" charset="0"/>
+                <a:ea typeface="Times New Roman" panose="02020603050405020304" pitchFamily="18" charset="0"/>
+                <a:cs typeface="Times New Roman" panose="02020603050405020304" pitchFamily="18" charset="0"/>
+              </a:rPr>
+              <a:t>; </a:t>
+            </a:r>
+            <a:r>
+              <a:rPr lang="en-US" dirty="0">
+                <a:solidFill>
+                  <a:srgbClr val="008000"/>
+                </a:solidFill>
+                <a:latin typeface="Consolas" panose="020B0609020204030204" pitchFamily="49" charset="0"/>
+                <a:ea typeface="Times New Roman" panose="02020603050405020304" pitchFamily="18" charset="0"/>
+                <a:cs typeface="Times New Roman" panose="02020603050405020304" pitchFamily="18" charset="0"/>
+              </a:rPr>
+              <a:t>// Setter</a:t>
+            </a:r>
+            <a:endParaRPr lang="en-US" sz="2400" dirty="0">
+              <a:latin typeface="Calibri" panose="020F0502020204030204" pitchFamily="34" charset="0"/>
+              <a:ea typeface="Calibri" panose="020F0502020204030204" pitchFamily="34" charset="0"/>
+              <a:cs typeface="Times New Roman" panose="02020603050405020304" pitchFamily="18" charset="0"/>
+            </a:endParaRPr>
+          </a:p>
+          <a:p>
+            <a:pPr>
+              <a:lnSpc>
+                <a:spcPct val="107000"/>
+              </a:lnSpc>
+              <a:tabLst>
+                <a:tab pos="581660" algn="l"/>
+                <a:tab pos="1163320" algn="l"/>
+                <a:tab pos="1744980" algn="l"/>
+                <a:tab pos="2326640" algn="l"/>
+                <a:tab pos="2908300" algn="l"/>
+                <a:tab pos="3489960" algn="l"/>
+                <a:tab pos="4071620" algn="l"/>
+                <a:tab pos="4653280" algn="l"/>
+                <a:tab pos="5234940" algn="l"/>
+                <a:tab pos="5816600" algn="l"/>
+                <a:tab pos="6398260" algn="l"/>
+                <a:tab pos="6979920" algn="l"/>
+                <a:tab pos="7561580" algn="l"/>
+                <a:tab pos="8143240" algn="l"/>
+                <a:tab pos="8724900" algn="l"/>
+                <a:tab pos="9306560" algn="l"/>
+              </a:tabLst>
+            </a:pPr>
+            <a:r>
+              <a:rPr lang="en-US" dirty="0">
+                <a:solidFill>
+                  <a:srgbClr val="000000"/>
+                </a:solidFill>
+                <a:latin typeface="Consolas" panose="020B0609020204030204" pitchFamily="49" charset="0"/>
+                <a:ea typeface="Times New Roman" panose="02020603050405020304" pitchFamily="18" charset="0"/>
+                <a:cs typeface="Times New Roman" panose="02020603050405020304" pitchFamily="18" charset="0"/>
+              </a:rPr>
+              <a:t>    },</a:t>
+            </a:r>
+            <a:endParaRPr lang="en-US" sz="2400" dirty="0">
+              <a:latin typeface="Calibri" panose="020F0502020204030204" pitchFamily="34" charset="0"/>
+              <a:ea typeface="Calibri" panose="020F0502020204030204" pitchFamily="34" charset="0"/>
+              <a:cs typeface="Times New Roman" panose="02020603050405020304" pitchFamily="18" charset="0"/>
+            </a:endParaRPr>
+          </a:p>
+          <a:p>
+            <a:pPr>
+              <a:lnSpc>
+                <a:spcPct val="107000"/>
+              </a:lnSpc>
+              <a:tabLst>
+                <a:tab pos="581660" algn="l"/>
+                <a:tab pos="1163320" algn="l"/>
+                <a:tab pos="1744980" algn="l"/>
+                <a:tab pos="2326640" algn="l"/>
+                <a:tab pos="2908300" algn="l"/>
+                <a:tab pos="3489960" algn="l"/>
+                <a:tab pos="4071620" algn="l"/>
+                <a:tab pos="4653280" algn="l"/>
+                <a:tab pos="5234940" algn="l"/>
+                <a:tab pos="5816600" algn="l"/>
+                <a:tab pos="6398260" algn="l"/>
+                <a:tab pos="6979920" algn="l"/>
+                <a:tab pos="7561580" algn="l"/>
+                <a:tab pos="8143240" algn="l"/>
+                <a:tab pos="8724900" algn="l"/>
+                <a:tab pos="9306560" algn="l"/>
+              </a:tabLst>
+            </a:pPr>
+            <a:r>
+              <a:rPr lang="en-US" dirty="0">
+                <a:solidFill>
+                  <a:srgbClr val="000000"/>
+                </a:solidFill>
+                <a:latin typeface="Consolas" panose="020B0609020204030204" pitchFamily="49" charset="0"/>
+                <a:ea typeface="Times New Roman" panose="02020603050405020304" pitchFamily="18" charset="0"/>
+                <a:cs typeface="Times New Roman" panose="02020603050405020304" pitchFamily="18" charset="0"/>
+              </a:rPr>
+              <a:t>    enumerable: </a:t>
+            </a:r>
+            <a:r>
+              <a:rPr lang="en-US" dirty="0">
+                <a:solidFill>
+                  <a:srgbClr val="0000FF"/>
+                </a:solidFill>
+                <a:latin typeface="Consolas" panose="020B0609020204030204" pitchFamily="49" charset="0"/>
+                <a:ea typeface="Times New Roman" panose="02020603050405020304" pitchFamily="18" charset="0"/>
+                <a:cs typeface="Times New Roman" panose="02020603050405020304" pitchFamily="18" charset="0"/>
+              </a:rPr>
+              <a:t>true</a:t>
+            </a:r>
+            <a:r>
+              <a:rPr lang="en-US" dirty="0">
+                <a:solidFill>
+                  <a:srgbClr val="000000"/>
+                </a:solidFill>
+                <a:latin typeface="Consolas" panose="020B0609020204030204" pitchFamily="49" charset="0"/>
+                <a:ea typeface="Times New Roman" panose="02020603050405020304" pitchFamily="18" charset="0"/>
+                <a:cs typeface="Times New Roman" panose="02020603050405020304" pitchFamily="18" charset="0"/>
+              </a:rPr>
+              <a:t>, </a:t>
+            </a:r>
+            <a:r>
+              <a:rPr lang="en-US" dirty="0">
+                <a:solidFill>
+                  <a:srgbClr val="008000"/>
+                </a:solidFill>
+                <a:latin typeface="Consolas" panose="020B0609020204030204" pitchFamily="49" charset="0"/>
+                <a:ea typeface="Times New Roman" panose="02020603050405020304" pitchFamily="18" charset="0"/>
+                <a:cs typeface="Times New Roman" panose="02020603050405020304" pitchFamily="18" charset="0"/>
+              </a:rPr>
+              <a:t>// Various options available</a:t>
+            </a:r>
+            <a:endParaRPr lang="en-US" sz="2400" dirty="0">
+              <a:latin typeface="Calibri" panose="020F0502020204030204" pitchFamily="34" charset="0"/>
+              <a:ea typeface="Calibri" panose="020F0502020204030204" pitchFamily="34" charset="0"/>
+              <a:cs typeface="Times New Roman" panose="02020603050405020304" pitchFamily="18" charset="0"/>
+            </a:endParaRPr>
+          </a:p>
+          <a:p>
+            <a:pPr>
+              <a:lnSpc>
+                <a:spcPct val="107000"/>
+              </a:lnSpc>
+              <a:tabLst>
+                <a:tab pos="581660" algn="l"/>
+                <a:tab pos="1163320" algn="l"/>
+                <a:tab pos="1744980" algn="l"/>
+                <a:tab pos="2326640" algn="l"/>
+                <a:tab pos="2908300" algn="l"/>
+                <a:tab pos="3489960" algn="l"/>
+                <a:tab pos="4071620" algn="l"/>
+                <a:tab pos="4653280" algn="l"/>
+                <a:tab pos="5234940" algn="l"/>
+                <a:tab pos="5816600" algn="l"/>
+                <a:tab pos="6398260" algn="l"/>
+                <a:tab pos="6979920" algn="l"/>
+                <a:tab pos="7561580" algn="l"/>
+                <a:tab pos="8143240" algn="l"/>
+                <a:tab pos="8724900" algn="l"/>
+                <a:tab pos="9306560" algn="l"/>
+              </a:tabLst>
+            </a:pPr>
+            <a:r>
+              <a:rPr lang="en-US" dirty="0">
+                <a:solidFill>
+                  <a:srgbClr val="000000"/>
+                </a:solidFill>
+                <a:latin typeface="Consolas" panose="020B0609020204030204" pitchFamily="49" charset="0"/>
+                <a:ea typeface="Times New Roman" panose="02020603050405020304" pitchFamily="18" charset="0"/>
+                <a:cs typeface="Times New Roman" panose="02020603050405020304" pitchFamily="18" charset="0"/>
+              </a:rPr>
+              <a:t>    configurable: </a:t>
+            </a:r>
+            <a:r>
+              <a:rPr lang="en-US" dirty="0">
+                <a:solidFill>
+                  <a:srgbClr val="0000FF"/>
+                </a:solidFill>
+                <a:latin typeface="Consolas" panose="020B0609020204030204" pitchFamily="49" charset="0"/>
+                <a:ea typeface="Times New Roman" panose="02020603050405020304" pitchFamily="18" charset="0"/>
+                <a:cs typeface="Times New Roman" panose="02020603050405020304" pitchFamily="18" charset="0"/>
+              </a:rPr>
+              <a:t>true</a:t>
+            </a:r>
+            <a:endParaRPr lang="en-US" sz="2400" dirty="0">
+              <a:latin typeface="Calibri" panose="020F0502020204030204" pitchFamily="34" charset="0"/>
+              <a:ea typeface="Calibri" panose="020F0502020204030204" pitchFamily="34" charset="0"/>
+              <a:cs typeface="Times New Roman" panose="02020603050405020304" pitchFamily="18" charset="0"/>
+            </a:endParaRPr>
+          </a:p>
+          <a:p>
+            <a:pPr>
+              <a:lnSpc>
+                <a:spcPct val="107000"/>
+              </a:lnSpc>
+              <a:tabLst>
+                <a:tab pos="581660" algn="l"/>
+                <a:tab pos="1163320" algn="l"/>
+                <a:tab pos="1744980" algn="l"/>
+                <a:tab pos="2326640" algn="l"/>
+                <a:tab pos="2908300" algn="l"/>
+                <a:tab pos="3489960" algn="l"/>
+                <a:tab pos="4071620" algn="l"/>
+                <a:tab pos="4653280" algn="l"/>
+                <a:tab pos="5234940" algn="l"/>
+                <a:tab pos="5816600" algn="l"/>
+                <a:tab pos="6398260" algn="l"/>
+                <a:tab pos="6979920" algn="l"/>
+                <a:tab pos="7561580" algn="l"/>
+                <a:tab pos="8143240" algn="l"/>
+                <a:tab pos="8724900" algn="l"/>
+                <a:tab pos="9306560" algn="l"/>
+              </a:tabLst>
+            </a:pPr>
+            <a:r>
+              <a:rPr lang="en-US" dirty="0">
+                <a:solidFill>
+                  <a:srgbClr val="000000"/>
+                </a:solidFill>
+                <a:latin typeface="Consolas" panose="020B0609020204030204" pitchFamily="49" charset="0"/>
+                <a:ea typeface="Times New Roman" panose="02020603050405020304" pitchFamily="18" charset="0"/>
+                <a:cs typeface="Times New Roman" panose="02020603050405020304" pitchFamily="18" charset="0"/>
+              </a:rPr>
+              <a:t>});</a:t>
+            </a:r>
+            <a:endParaRPr lang="en-US" sz="2400" dirty="0">
+              <a:latin typeface="Calibri" panose="020F0502020204030204" pitchFamily="34" charset="0"/>
+              <a:ea typeface="Calibri" panose="020F0502020204030204" pitchFamily="34" charset="0"/>
+              <a:cs typeface="Times New Roman" panose="02020603050405020304" pitchFamily="18" charset="0"/>
+            </a:endParaRPr>
+          </a:p>
+          <a:p>
+            <a:pPr>
+              <a:lnSpc>
+                <a:spcPct val="107000"/>
+              </a:lnSpc>
+              <a:spcAft>
+                <a:spcPts val="800"/>
+              </a:spcAft>
+            </a:pPr>
+            <a:r>
+              <a:rPr lang="en-US" sz="2400" dirty="0">
+                <a:latin typeface="Calibri" panose="020F0502020204030204" pitchFamily="34" charset="0"/>
+                <a:ea typeface="Calibri" panose="020F0502020204030204" pitchFamily="34" charset="0"/>
+                <a:cs typeface="Times New Roman" panose="02020603050405020304" pitchFamily="18" charset="0"/>
+              </a:rPr>
+              <a:t> </a:t>
+            </a:r>
+            <a:endParaRPr lang="en-US" sz="2400" dirty="0">
+              <a:effectLst/>
+              <a:latin typeface="Calibri" panose="020F0502020204030204" pitchFamily="34" charset="0"/>
+              <a:ea typeface="Calibri" panose="020F0502020204030204" pitchFamily="34" charset="0"/>
+              <a:cs typeface="Times New Roman" panose="02020603050405020304" pitchFamily="18" charset="0"/>
+            </a:endParaRPr>
           </a:p>
         </p:txBody>
       </p:sp>
     </p:spTree>
     <p:extLst>
       <p:ext uri="{BB962C8B-B14F-4D97-AF65-F5344CB8AC3E}">
-        <p14:creationId xmlns:p14="http://schemas.microsoft.com/office/powerpoint/2010/main" val="533197008"/>
+        <p14:creationId xmlns:p14="http://schemas.microsoft.com/office/powerpoint/2010/main" val="2343504363"/>
       </p:ext>
     </p:extLst>
   </p:cSld>
@@ -21337,10 +22072,9 @@
           <a:lstStyle/>
           <a:p>
             <a:r>
-              <a:rPr lang="en-US" dirty="0" smtClean="0"/>
-              <a:t>Best Practices</a:t>
-            </a:r>
-            <a:endParaRPr lang="en-US" dirty="0"/>
+              <a:rPr lang="en-US" dirty="0"/>
+              <a:t>ECMAScript 5 Properties</a:t>
+            </a:r>
           </a:p>
         </p:txBody>
       </p:sp>
@@ -21356,124 +22090,108 @@
         </p:nvSpPr>
         <p:spPr/>
         <p:txBody>
-          <a:bodyPr>
-            <a:normAutofit fontScale="92500" lnSpcReduction="10000"/>
-          </a:bodyPr>
+          <a:bodyPr/>
           <a:lstStyle/>
           <a:p>
-            <a:pPr lvl="0"/>
             <a:r>
               <a:rPr lang="en-US" dirty="0" smtClean="0"/>
-              <a:t>Don’t: Use </a:t>
-            </a:r>
-            <a:r>
-              <a:rPr lang="en-US" altLang="en-US" dirty="0" smtClean="0">
+              <a:t>Typescript provides better syntax for getters/setters</a:t>
+            </a:r>
+          </a:p>
+          <a:p>
+            <a:pPr lvl="1"/>
+            <a:r>
+              <a:rPr lang="en-US" dirty="0" smtClean="0"/>
+              <a:t>Requires targeting ECMAScript 5 in generation</a:t>
+            </a:r>
+          </a:p>
+          <a:p>
+            <a:endParaRPr lang="en-US" dirty="0"/>
+          </a:p>
+          <a:p>
+            <a:r>
+              <a:rPr lang="en-US" dirty="0" smtClean="0"/>
+              <a:t>Similar to method prefixed with</a:t>
+            </a:r>
+            <a:r>
+              <a:rPr lang="en-US" altLang="en-US" dirty="0">
                 <a:solidFill>
                   <a:srgbClr val="0000FF"/>
                 </a:solidFill>
                 <a:latin typeface="Consolas" panose="020B0609020204030204" pitchFamily="49" charset="0"/>
                 <a:cs typeface="Consolas" panose="020B0609020204030204" pitchFamily="49" charset="0"/>
               </a:rPr>
-              <a:t>any</a:t>
+              <a:t> get</a:t>
             </a:r>
             <a:r>
               <a:rPr lang="en-US" dirty="0" smtClean="0"/>
-              <a:t> type too much</a:t>
-            </a:r>
-          </a:p>
-          <a:p>
-            <a:pPr lvl="0"/>
-            <a:endParaRPr lang="en-US" dirty="0"/>
-          </a:p>
-          <a:p>
-            <a:pPr lvl="0"/>
+              <a:t> or </a:t>
+            </a:r>
+            <a:r>
+              <a:rPr lang="en-US" altLang="en-US" dirty="0">
+                <a:solidFill>
+                  <a:srgbClr val="0000FF"/>
+                </a:solidFill>
+                <a:latin typeface="Consolas" panose="020B0609020204030204" pitchFamily="49" charset="0"/>
+                <a:cs typeface="Consolas" panose="020B0609020204030204" pitchFamily="49" charset="0"/>
+              </a:rPr>
+              <a:t>set</a:t>
+            </a:r>
+            <a:r>
+              <a:rPr lang="en-US" altLang="en-US" dirty="0">
+                <a:solidFill>
+                  <a:srgbClr val="000000"/>
+                </a:solidFill>
+                <a:latin typeface="Consolas" panose="020B0609020204030204" pitchFamily="49" charset="0"/>
+                <a:cs typeface="Consolas" panose="020B0609020204030204" pitchFamily="49" charset="0"/>
+              </a:rPr>
+              <a:t> </a:t>
+            </a:r>
+            <a:endParaRPr lang="en-US" altLang="en-US" dirty="0" smtClean="0">
+              <a:solidFill>
+                <a:srgbClr val="000000"/>
+              </a:solidFill>
+              <a:latin typeface="Consolas" panose="020B0609020204030204" pitchFamily="49" charset="0"/>
+              <a:cs typeface="Consolas" panose="020B0609020204030204" pitchFamily="49" charset="0"/>
+            </a:endParaRPr>
+          </a:p>
+          <a:p>
+            <a:endParaRPr lang="en-US" dirty="0">
+              <a:solidFill>
+                <a:srgbClr val="000000"/>
+              </a:solidFill>
+              <a:latin typeface="Consolas" panose="020B0609020204030204" pitchFamily="49" charset="0"/>
+              <a:cs typeface="Consolas" panose="020B0609020204030204" pitchFamily="49" charset="0"/>
+            </a:endParaRPr>
+          </a:p>
+          <a:p>
             <a:r>
               <a:rPr lang="en-US" dirty="0" smtClean="0"/>
-              <a:t>Do: Use modules for logical namespace groupings</a:t>
+              <a:t>Bad news:</a:t>
             </a:r>
           </a:p>
           <a:p>
             <a:pPr lvl="1"/>
             <a:r>
               <a:rPr lang="en-US" dirty="0" smtClean="0"/>
-              <a:t>Match folder structure</a:t>
-            </a:r>
-          </a:p>
-          <a:p>
-            <a:pPr lvl="1"/>
-            <a:endParaRPr lang="en-US" dirty="0"/>
+              <a:t>IE only supports it in IE9+</a:t>
+            </a:r>
+          </a:p>
+          <a:p>
+            <a:endParaRPr lang="en-US" dirty="0" smtClean="0"/>
           </a:p>
           <a:p>
             <a:r>
               <a:rPr lang="en-US" dirty="0" smtClean="0"/>
-              <a:t>Do: Follow JS style guidelines</a:t>
-            </a:r>
-          </a:p>
-          <a:p>
-            <a:pPr lvl="1"/>
-            <a:r>
-              <a:rPr lang="en-US" dirty="0">
-                <a:hlinkClick r:id="rId2"/>
-              </a:rPr>
-              <a:t>https://</a:t>
-            </a:r>
-            <a:r>
-              <a:rPr lang="en-US" dirty="0" smtClean="0">
-                <a:hlinkClick r:id="rId2"/>
-              </a:rPr>
-              <a:t>github.com/airbnb/javascript</a:t>
-            </a:r>
-            <a:endParaRPr lang="en-US" dirty="0" smtClean="0"/>
-          </a:p>
-          <a:p>
-            <a:pPr lvl="1"/>
-            <a:endParaRPr lang="en-US" dirty="0"/>
-          </a:p>
-          <a:p>
-            <a:r>
-              <a:rPr lang="en-US" dirty="0" smtClean="0"/>
-              <a:t>Do: Use </a:t>
-            </a:r>
-            <a:r>
-              <a:rPr lang="en-US" dirty="0" err="1" smtClean="0"/>
-              <a:t>TSLint</a:t>
-            </a:r>
-            <a:endParaRPr lang="en-US" dirty="0" smtClean="0"/>
-          </a:p>
-          <a:p>
-            <a:pPr lvl="1"/>
-            <a:r>
-              <a:rPr lang="en-US" dirty="0">
-                <a:hlinkClick r:id="rId3"/>
-              </a:rPr>
-              <a:t>http://</a:t>
-            </a:r>
-            <a:r>
-              <a:rPr lang="en-US" dirty="0" smtClean="0">
-                <a:hlinkClick r:id="rId3"/>
-              </a:rPr>
-              <a:t>vswebessentials.com/features/typescript</a:t>
-            </a:r>
-            <a:endParaRPr lang="en-US" dirty="0" smtClean="0"/>
-          </a:p>
-          <a:p>
-            <a:pPr lvl="1"/>
-            <a:r>
-              <a:rPr lang="en-US" dirty="0" smtClean="0"/>
-              <a:t>Note: Do not lint </a:t>
-            </a:r>
-            <a:r>
-              <a:rPr lang="en-US" dirty="0" err="1" smtClean="0"/>
-              <a:t>typings</a:t>
-            </a:r>
-            <a:endParaRPr lang="en-US" dirty="0"/>
+              <a:t>Supported well in Chrome, FF, etc.</a:t>
+            </a:r>
           </a:p>
         </p:txBody>
       </p:sp>
     </p:spTree>
     <p:extLst>
       <p:ext uri="{BB962C8B-B14F-4D97-AF65-F5344CB8AC3E}">
-        <p14:creationId xmlns:p14="http://schemas.microsoft.com/office/powerpoint/2010/main" val="439267084"/>
+        <p14:creationId xmlns:p14="http://schemas.microsoft.com/office/powerpoint/2010/main" val="1992463592"/>
       </p:ext>
     </p:extLst>
   </p:cSld>
@@ -21516,8 +22234,12 @@
           <a:lstStyle/>
           <a:p>
             <a:r>
+              <a:rPr lang="en-US" dirty="0"/>
+              <a:t>ECMAScript 5 </a:t>
+            </a:r>
+            <a:r>
               <a:rPr lang="en-US" dirty="0" smtClean="0"/>
-              <a:t>Best Practices</a:t>
+              <a:t>Properties – Demo</a:t>
             </a:r>
             <a:endParaRPr lang="en-US" dirty="0"/>
           </a:p>
@@ -21540,65 +22262,8 @@
           <a:p>
             <a:r>
               <a:rPr lang="en-US" dirty="0" smtClean="0"/>
-              <a:t>Do: Check in typing files into source control</a:t>
-            </a:r>
-          </a:p>
-          <a:p>
-            <a:pPr lvl="1"/>
-            <a:r>
-              <a:rPr lang="en-US" dirty="0" smtClean="0"/>
-              <a:t>Not restored on </a:t>
-            </a:r>
-            <a:r>
-              <a:rPr lang="en-US" dirty="0" err="1" smtClean="0"/>
-              <a:t>Nuget</a:t>
-            </a:r>
-            <a:r>
-              <a:rPr lang="en-US" dirty="0" smtClean="0"/>
-              <a:t> package restore</a:t>
-            </a:r>
-          </a:p>
-          <a:p>
-            <a:pPr lvl="1"/>
-            <a:endParaRPr lang="en-US" dirty="0"/>
-          </a:p>
-          <a:p>
-            <a:r>
-              <a:rPr lang="en-US" dirty="0" smtClean="0"/>
-              <a:t>Do: Submit pull requests for new/fixed </a:t>
-            </a:r>
-            <a:r>
-              <a:rPr lang="en-US" dirty="0" err="1" smtClean="0"/>
-              <a:t>typings</a:t>
-            </a:r>
-            <a:r>
-              <a:rPr lang="en-US" dirty="0" smtClean="0"/>
-              <a:t> to </a:t>
-            </a:r>
-            <a:r>
-              <a:rPr lang="en-US" dirty="0" err="1" smtClean="0"/>
-              <a:t>DefinitelyTyped</a:t>
-            </a:r>
-            <a:endParaRPr lang="en-US" dirty="0" smtClean="0"/>
-          </a:p>
-          <a:p>
-            <a:endParaRPr lang="en-US" dirty="0"/>
-          </a:p>
-          <a:p>
-            <a:r>
-              <a:rPr lang="en-US" dirty="0" smtClean="0"/>
-              <a:t>Don’t: Check in files that </a:t>
-            </a:r>
-            <a:r>
-              <a:rPr lang="en-US" smtClean="0"/>
-              <a:t>don’t compile</a:t>
-            </a:r>
-            <a:endParaRPr lang="en-US" dirty="0" smtClean="0"/>
-          </a:p>
-          <a:p>
-            <a:endParaRPr lang="en-US" dirty="0"/>
-          </a:p>
-          <a:p>
+              <a:t>Section 4 / 1-properties.ts</a:t>
+            </a:r>
             <a:endParaRPr lang="en-US" dirty="0"/>
           </a:p>
         </p:txBody>
@@ -21606,7 +22271,7 @@
     </p:spTree>
     <p:extLst>
       <p:ext uri="{BB962C8B-B14F-4D97-AF65-F5344CB8AC3E}">
-        <p14:creationId xmlns:p14="http://schemas.microsoft.com/office/powerpoint/2010/main" val="2375747027"/>
+        <p14:creationId xmlns:p14="http://schemas.microsoft.com/office/powerpoint/2010/main" val="780732758"/>
       </p:ext>
     </p:extLst>
   </p:cSld>
@@ -21896,6 +22561,1042 @@
     <p:extLst>
       <p:ext uri="{BB962C8B-B14F-4D97-AF65-F5344CB8AC3E}">
         <p14:creationId xmlns:p14="http://schemas.microsoft.com/office/powerpoint/2010/main" val="2600042839"/>
+      </p:ext>
+    </p:extLst>
+  </p:cSld>
+  <p:clrMapOvr>
+    <a:masterClrMapping/>
+  </p:clrMapOvr>
+</p:sld>
+</file>
+
+<file path=ppt/slides/slide50.xml><?xml version="1.0" encoding="utf-8"?>
+<p:sld xmlns:a="http://schemas.openxmlformats.org/drawingml/2006/main" xmlns:r="http://schemas.openxmlformats.org/officeDocument/2006/relationships" xmlns:p="http://schemas.openxmlformats.org/presentationml/2006/main">
+  <p:cSld>
+    <p:spTree>
+      <p:nvGrpSpPr>
+        <p:cNvPr id="1" name=""/>
+        <p:cNvGrpSpPr/>
+        <p:nvPr/>
+      </p:nvGrpSpPr>
+      <p:grpSpPr>
+        <a:xfrm>
+          <a:off x="0" y="0"/>
+          <a:ext cx="0" cy="0"/>
+          <a:chOff x="0" y="0"/>
+          <a:chExt cx="0" cy="0"/>
+        </a:xfrm>
+      </p:grpSpPr>
+      <p:sp>
+        <p:nvSpPr>
+          <p:cNvPr id="2" name="Title 1"/>
+          <p:cNvSpPr>
+            <a:spLocks noGrp="1"/>
+          </p:cNvSpPr>
+          <p:nvPr>
+            <p:ph type="title"/>
+          </p:nvPr>
+        </p:nvSpPr>
+        <p:spPr/>
+        <p:txBody>
+          <a:bodyPr/>
+          <a:lstStyle/>
+          <a:p>
+            <a:r>
+              <a:rPr lang="en-US" dirty="0" smtClean="0"/>
+              <a:t>Extending Libraries</a:t>
+            </a:r>
+            <a:endParaRPr lang="en-US" dirty="0"/>
+          </a:p>
+        </p:txBody>
+      </p:sp>
+      <p:sp>
+        <p:nvSpPr>
+          <p:cNvPr id="3" name="Content Placeholder 2"/>
+          <p:cNvSpPr>
+            <a:spLocks noGrp="1"/>
+          </p:cNvSpPr>
+          <p:nvPr>
+            <p:ph idx="1"/>
+          </p:nvPr>
+        </p:nvSpPr>
+        <p:spPr/>
+        <p:txBody>
+          <a:bodyPr/>
+          <a:lstStyle/>
+          <a:p>
+            <a:r>
+              <a:rPr lang="en-US" dirty="0" smtClean="0"/>
+              <a:t>Simple to extend native/3</a:t>
+            </a:r>
+            <a:r>
+              <a:rPr lang="en-US" baseline="30000" dirty="0" smtClean="0"/>
+              <a:t>rd</a:t>
+            </a:r>
+            <a:r>
+              <a:rPr lang="en-US" dirty="0" smtClean="0"/>
+              <a:t> party libraries in TS</a:t>
+            </a:r>
+          </a:p>
+          <a:p>
+            <a:endParaRPr lang="en-US" dirty="0" smtClean="0"/>
+          </a:p>
+          <a:p>
+            <a:r>
+              <a:rPr lang="en-US" dirty="0" smtClean="0"/>
+              <a:t>Create your own .</a:t>
+            </a:r>
+            <a:r>
+              <a:rPr lang="en-US" dirty="0" err="1" smtClean="0"/>
+              <a:t>d.ts</a:t>
+            </a:r>
+            <a:r>
+              <a:rPr lang="en-US" dirty="0" smtClean="0"/>
+              <a:t> file with extensions</a:t>
+            </a:r>
+          </a:p>
+          <a:p>
+            <a:pPr lvl="1"/>
+            <a:r>
+              <a:rPr lang="en-US" dirty="0" smtClean="0"/>
+              <a:t>Useful when large amount of augmentation</a:t>
+            </a:r>
+          </a:p>
+          <a:p>
+            <a:endParaRPr lang="en-US" dirty="0" smtClean="0"/>
+          </a:p>
+          <a:p>
+            <a:r>
+              <a:rPr lang="en-US" dirty="0" smtClean="0"/>
+              <a:t>Embed interface extensions directly into your </a:t>
+            </a:r>
+            <a:r>
+              <a:rPr lang="en-US" dirty="0" err="1" smtClean="0"/>
+              <a:t>ts</a:t>
+            </a:r>
+            <a:r>
+              <a:rPr lang="en-US" dirty="0" smtClean="0"/>
+              <a:t> file</a:t>
+            </a:r>
+          </a:p>
+          <a:p>
+            <a:pPr lvl="1"/>
+            <a:r>
+              <a:rPr lang="en-US" dirty="0" smtClean="0"/>
+              <a:t>Useful for minor extensions (i.e. Window)</a:t>
+            </a:r>
+          </a:p>
+          <a:p>
+            <a:pPr lvl="1"/>
+            <a:endParaRPr lang="en-US" dirty="0"/>
+          </a:p>
+          <a:p>
+            <a:endParaRPr lang="en-US" dirty="0"/>
+          </a:p>
+        </p:txBody>
+      </p:sp>
+    </p:spTree>
+    <p:extLst>
+      <p:ext uri="{BB962C8B-B14F-4D97-AF65-F5344CB8AC3E}">
+        <p14:creationId xmlns:p14="http://schemas.microsoft.com/office/powerpoint/2010/main" val="1019909126"/>
+      </p:ext>
+    </p:extLst>
+  </p:cSld>
+  <p:clrMapOvr>
+    <a:masterClrMapping/>
+  </p:clrMapOvr>
+</p:sld>
+</file>
+
+<file path=ppt/slides/slide51.xml><?xml version="1.0" encoding="utf-8"?>
+<p:sld xmlns:a="http://schemas.openxmlformats.org/drawingml/2006/main" xmlns:r="http://schemas.openxmlformats.org/officeDocument/2006/relationships" xmlns:p="http://schemas.openxmlformats.org/presentationml/2006/main">
+  <p:cSld>
+    <p:spTree>
+      <p:nvGrpSpPr>
+        <p:cNvPr id="1" name=""/>
+        <p:cNvGrpSpPr/>
+        <p:nvPr/>
+      </p:nvGrpSpPr>
+      <p:grpSpPr>
+        <a:xfrm>
+          <a:off x="0" y="0"/>
+          <a:ext cx="0" cy="0"/>
+          <a:chOff x="0" y="0"/>
+          <a:chExt cx="0" cy="0"/>
+        </a:xfrm>
+      </p:grpSpPr>
+      <p:sp>
+        <p:nvSpPr>
+          <p:cNvPr id="2" name="Title 1"/>
+          <p:cNvSpPr>
+            <a:spLocks noGrp="1"/>
+          </p:cNvSpPr>
+          <p:nvPr>
+            <p:ph type="title"/>
+          </p:nvPr>
+        </p:nvSpPr>
+        <p:spPr/>
+        <p:txBody>
+          <a:bodyPr/>
+          <a:lstStyle/>
+          <a:p>
+            <a:r>
+              <a:rPr lang="en-US" dirty="0"/>
+              <a:t>Extending </a:t>
+            </a:r>
+            <a:r>
+              <a:rPr lang="en-US" dirty="0" smtClean="0"/>
+              <a:t>Libraries – Demo</a:t>
+            </a:r>
+            <a:endParaRPr lang="en-US" dirty="0"/>
+          </a:p>
+        </p:txBody>
+      </p:sp>
+      <p:sp>
+        <p:nvSpPr>
+          <p:cNvPr id="3" name="Content Placeholder 2"/>
+          <p:cNvSpPr>
+            <a:spLocks noGrp="1"/>
+          </p:cNvSpPr>
+          <p:nvPr>
+            <p:ph idx="1"/>
+          </p:nvPr>
+        </p:nvSpPr>
+        <p:spPr/>
+        <p:txBody>
+          <a:bodyPr/>
+          <a:lstStyle/>
+          <a:p>
+            <a:r>
+              <a:rPr lang="en-US" dirty="0" smtClean="0"/>
+              <a:t>Section 4 / 2-extensions.ts</a:t>
+            </a:r>
+            <a:endParaRPr lang="en-US" dirty="0"/>
+          </a:p>
+        </p:txBody>
+      </p:sp>
+    </p:spTree>
+    <p:extLst>
+      <p:ext uri="{BB962C8B-B14F-4D97-AF65-F5344CB8AC3E}">
+        <p14:creationId xmlns:p14="http://schemas.microsoft.com/office/powerpoint/2010/main" val="3384812828"/>
+      </p:ext>
+    </p:extLst>
+  </p:cSld>
+  <p:clrMapOvr>
+    <a:masterClrMapping/>
+  </p:clrMapOvr>
+</p:sld>
+</file>
+
+<file path=ppt/slides/slide52.xml><?xml version="1.0" encoding="utf-8"?>
+<p:sld xmlns:a="http://schemas.openxmlformats.org/drawingml/2006/main" xmlns:r="http://schemas.openxmlformats.org/officeDocument/2006/relationships" xmlns:p="http://schemas.openxmlformats.org/presentationml/2006/main">
+  <p:cSld>
+    <p:spTree>
+      <p:nvGrpSpPr>
+        <p:cNvPr id="1" name=""/>
+        <p:cNvGrpSpPr/>
+        <p:nvPr/>
+      </p:nvGrpSpPr>
+      <p:grpSpPr>
+        <a:xfrm>
+          <a:off x="0" y="0"/>
+          <a:ext cx="0" cy="0"/>
+          <a:chOff x="0" y="0"/>
+          <a:chExt cx="0" cy="0"/>
+        </a:xfrm>
+      </p:grpSpPr>
+      <p:sp>
+        <p:nvSpPr>
+          <p:cNvPr id="4" name="Title 3"/>
+          <p:cNvSpPr>
+            <a:spLocks noGrp="1"/>
+          </p:cNvSpPr>
+          <p:nvPr>
+            <p:ph type="title"/>
+          </p:nvPr>
+        </p:nvSpPr>
+        <p:spPr/>
+        <p:txBody>
+          <a:bodyPr/>
+          <a:lstStyle/>
+          <a:p>
+            <a:r>
+              <a:rPr lang="en-US" dirty="0" smtClean="0"/>
+              <a:t>Putting it all together</a:t>
+            </a:r>
+            <a:endParaRPr lang="en-US" dirty="0"/>
+          </a:p>
+        </p:txBody>
+      </p:sp>
+      <p:sp>
+        <p:nvSpPr>
+          <p:cNvPr id="5" name="Text Placeholder 4"/>
+          <p:cNvSpPr>
+            <a:spLocks noGrp="1"/>
+          </p:cNvSpPr>
+          <p:nvPr>
+            <p:ph type="body" idx="1"/>
+          </p:nvPr>
+        </p:nvSpPr>
+        <p:spPr/>
+        <p:txBody>
+          <a:bodyPr/>
+          <a:lstStyle/>
+          <a:p>
+            <a:endParaRPr lang="en-US"/>
+          </a:p>
+        </p:txBody>
+      </p:sp>
+    </p:spTree>
+    <p:extLst>
+      <p:ext uri="{BB962C8B-B14F-4D97-AF65-F5344CB8AC3E}">
+        <p14:creationId xmlns:p14="http://schemas.microsoft.com/office/powerpoint/2010/main" val="1327164103"/>
+      </p:ext>
+    </p:extLst>
+  </p:cSld>
+  <p:clrMapOvr>
+    <a:masterClrMapping/>
+  </p:clrMapOvr>
+</p:sld>
+</file>
+
+<file path=ppt/slides/slide53.xml><?xml version="1.0" encoding="utf-8"?>
+<p:sld xmlns:a="http://schemas.openxmlformats.org/drawingml/2006/main" xmlns:r="http://schemas.openxmlformats.org/officeDocument/2006/relationships" xmlns:p="http://schemas.openxmlformats.org/presentationml/2006/main">
+  <p:cSld>
+    <p:spTree>
+      <p:nvGrpSpPr>
+        <p:cNvPr id="1" name=""/>
+        <p:cNvGrpSpPr/>
+        <p:nvPr/>
+      </p:nvGrpSpPr>
+      <p:grpSpPr>
+        <a:xfrm>
+          <a:off x="0" y="0"/>
+          <a:ext cx="0" cy="0"/>
+          <a:chOff x="0" y="0"/>
+          <a:chExt cx="0" cy="0"/>
+        </a:xfrm>
+      </p:grpSpPr>
+      <p:sp>
+        <p:nvSpPr>
+          <p:cNvPr id="4" name="Title 3"/>
+          <p:cNvSpPr>
+            <a:spLocks noGrp="1"/>
+          </p:cNvSpPr>
+          <p:nvPr>
+            <p:ph type="title"/>
+          </p:nvPr>
+        </p:nvSpPr>
+        <p:spPr/>
+        <p:txBody>
+          <a:bodyPr/>
+          <a:lstStyle/>
+          <a:p>
+            <a:r>
+              <a:rPr lang="en-US" dirty="0" err="1" smtClean="0"/>
+              <a:t>Todo</a:t>
+            </a:r>
+            <a:r>
+              <a:rPr lang="en-US" dirty="0" smtClean="0"/>
+              <a:t> Demo App</a:t>
+            </a:r>
+            <a:endParaRPr lang="en-US" dirty="0"/>
+          </a:p>
+        </p:txBody>
+      </p:sp>
+      <p:sp>
+        <p:nvSpPr>
+          <p:cNvPr id="5" name="Content Placeholder 4"/>
+          <p:cNvSpPr>
+            <a:spLocks noGrp="1"/>
+          </p:cNvSpPr>
+          <p:nvPr>
+            <p:ph idx="1"/>
+          </p:nvPr>
+        </p:nvSpPr>
+        <p:spPr/>
+        <p:txBody>
+          <a:bodyPr/>
+          <a:lstStyle/>
+          <a:p>
+            <a:r>
+              <a:rPr lang="en-US" dirty="0" smtClean="0"/>
+              <a:t>Simple Knockout-based “</a:t>
+            </a:r>
+            <a:r>
+              <a:rPr lang="en-US" dirty="0" err="1" smtClean="0"/>
+              <a:t>Todo</a:t>
+            </a:r>
+            <a:r>
+              <a:rPr lang="en-US" dirty="0" smtClean="0"/>
+              <a:t>” App</a:t>
+            </a:r>
+          </a:p>
+          <a:p>
+            <a:endParaRPr lang="en-US" dirty="0"/>
+          </a:p>
+          <a:p>
+            <a:r>
+              <a:rPr lang="en-US" dirty="0" smtClean="0"/>
+              <a:t>Illustrates how </a:t>
+            </a:r>
+            <a:r>
+              <a:rPr lang="en-US" dirty="0" err="1" smtClean="0"/>
+              <a:t>TypeScript</a:t>
+            </a:r>
+            <a:r>
+              <a:rPr lang="en-US" dirty="0" smtClean="0"/>
+              <a:t> can be quickly used to build a quick app</a:t>
+            </a:r>
+          </a:p>
+          <a:p>
+            <a:endParaRPr lang="en-US" dirty="0"/>
+          </a:p>
+          <a:p>
+            <a:r>
+              <a:rPr lang="en-US" dirty="0" smtClean="0"/>
+              <a:t>Puts together common </a:t>
+            </a:r>
+            <a:r>
+              <a:rPr lang="en-US" dirty="0" err="1" smtClean="0"/>
+              <a:t>TypeScript</a:t>
+            </a:r>
+            <a:r>
+              <a:rPr lang="en-US" dirty="0" smtClean="0"/>
+              <a:t> usage patterns</a:t>
+            </a:r>
+          </a:p>
+          <a:p>
+            <a:endParaRPr lang="en-US" dirty="0"/>
+          </a:p>
+          <a:p>
+            <a:endParaRPr lang="en-US" dirty="0"/>
+          </a:p>
+        </p:txBody>
+      </p:sp>
+    </p:spTree>
+    <p:extLst>
+      <p:ext uri="{BB962C8B-B14F-4D97-AF65-F5344CB8AC3E}">
+        <p14:creationId xmlns:p14="http://schemas.microsoft.com/office/powerpoint/2010/main" val="1529558165"/>
+      </p:ext>
+    </p:extLst>
+  </p:cSld>
+  <p:clrMapOvr>
+    <a:masterClrMapping/>
+  </p:clrMapOvr>
+</p:sld>
+</file>
+
+<file path=ppt/slides/slide54.xml><?xml version="1.0" encoding="utf-8"?>
+<p:sld xmlns:a="http://schemas.openxmlformats.org/drawingml/2006/main" xmlns:r="http://schemas.openxmlformats.org/officeDocument/2006/relationships" xmlns:p="http://schemas.openxmlformats.org/presentationml/2006/main">
+  <p:cSld>
+    <p:spTree>
+      <p:nvGrpSpPr>
+        <p:cNvPr id="1" name=""/>
+        <p:cNvGrpSpPr/>
+        <p:nvPr/>
+      </p:nvGrpSpPr>
+      <p:grpSpPr>
+        <a:xfrm>
+          <a:off x="0" y="0"/>
+          <a:ext cx="0" cy="0"/>
+          <a:chOff x="0" y="0"/>
+          <a:chExt cx="0" cy="0"/>
+        </a:xfrm>
+      </p:grpSpPr>
+      <p:sp>
+        <p:nvSpPr>
+          <p:cNvPr id="4" name="Title 3"/>
+          <p:cNvSpPr>
+            <a:spLocks noGrp="1"/>
+          </p:cNvSpPr>
+          <p:nvPr>
+            <p:ph type="title"/>
+          </p:nvPr>
+        </p:nvSpPr>
+        <p:spPr/>
+        <p:txBody>
+          <a:bodyPr/>
+          <a:lstStyle/>
+          <a:p>
+            <a:r>
+              <a:rPr lang="en-US" dirty="0" err="1" smtClean="0"/>
+              <a:t>TypeScript</a:t>
+            </a:r>
+            <a:r>
+              <a:rPr lang="en-US" dirty="0" smtClean="0"/>
+              <a:t> Best Practices</a:t>
+            </a:r>
+            <a:endParaRPr lang="en-US" dirty="0"/>
+          </a:p>
+        </p:txBody>
+      </p:sp>
+      <p:sp>
+        <p:nvSpPr>
+          <p:cNvPr id="5" name="Text Placeholder 4"/>
+          <p:cNvSpPr>
+            <a:spLocks noGrp="1"/>
+          </p:cNvSpPr>
+          <p:nvPr>
+            <p:ph type="body" idx="1"/>
+          </p:nvPr>
+        </p:nvSpPr>
+        <p:spPr/>
+        <p:txBody>
+          <a:bodyPr/>
+          <a:lstStyle/>
+          <a:p>
+            <a:endParaRPr lang="en-US"/>
+          </a:p>
+        </p:txBody>
+      </p:sp>
+    </p:spTree>
+    <p:extLst>
+      <p:ext uri="{BB962C8B-B14F-4D97-AF65-F5344CB8AC3E}">
+        <p14:creationId xmlns:p14="http://schemas.microsoft.com/office/powerpoint/2010/main" val="1653242581"/>
+      </p:ext>
+    </p:extLst>
+  </p:cSld>
+  <p:clrMapOvr>
+    <a:masterClrMapping/>
+  </p:clrMapOvr>
+</p:sld>
+</file>
+
+<file path=ppt/slides/slide55.xml><?xml version="1.0" encoding="utf-8"?>
+<p:sld xmlns:a="http://schemas.openxmlformats.org/drawingml/2006/main" xmlns:r="http://schemas.openxmlformats.org/officeDocument/2006/relationships" xmlns:p="http://schemas.openxmlformats.org/presentationml/2006/main">
+  <p:cSld>
+    <p:spTree>
+      <p:nvGrpSpPr>
+        <p:cNvPr id="1" name=""/>
+        <p:cNvGrpSpPr/>
+        <p:nvPr/>
+      </p:nvGrpSpPr>
+      <p:grpSpPr>
+        <a:xfrm>
+          <a:off x="0" y="0"/>
+          <a:ext cx="0" cy="0"/>
+          <a:chOff x="0" y="0"/>
+          <a:chExt cx="0" cy="0"/>
+        </a:xfrm>
+      </p:grpSpPr>
+      <p:sp>
+        <p:nvSpPr>
+          <p:cNvPr id="4" name="Title 3"/>
+          <p:cNvSpPr>
+            <a:spLocks noGrp="1"/>
+          </p:cNvSpPr>
+          <p:nvPr>
+            <p:ph type="title"/>
+          </p:nvPr>
+        </p:nvSpPr>
+        <p:spPr/>
+        <p:txBody>
+          <a:bodyPr/>
+          <a:lstStyle/>
+          <a:p>
+            <a:r>
+              <a:rPr lang="en-US" dirty="0" smtClean="0"/>
+              <a:t>Best Practices</a:t>
+            </a:r>
+            <a:endParaRPr lang="en-US" dirty="0"/>
+          </a:p>
+        </p:txBody>
+      </p:sp>
+      <p:sp>
+        <p:nvSpPr>
+          <p:cNvPr id="5" name="Content Placeholder 4"/>
+          <p:cNvSpPr>
+            <a:spLocks noGrp="1"/>
+          </p:cNvSpPr>
+          <p:nvPr>
+            <p:ph idx="1"/>
+          </p:nvPr>
+        </p:nvSpPr>
+        <p:spPr/>
+        <p:txBody>
+          <a:bodyPr/>
+          <a:lstStyle/>
+          <a:p>
+            <a:r>
+              <a:rPr lang="en-US" dirty="0" smtClean="0"/>
+              <a:t>Do: Use namespace imports to avoid having to fully qualify paths</a:t>
+            </a:r>
+          </a:p>
+          <a:p>
+            <a:pPr lvl="1"/>
+            <a:r>
+              <a:rPr lang="en-US" dirty="0" smtClean="0"/>
+              <a:t>Make sure files are declared in dependency order</a:t>
+            </a:r>
+          </a:p>
+          <a:p>
+            <a:pPr lvl="1"/>
+            <a:endParaRPr lang="en-US" dirty="0" smtClean="0"/>
+          </a:p>
+          <a:p>
+            <a:r>
+              <a:rPr lang="en-US" dirty="0" smtClean="0"/>
+              <a:t>Do: Separate classes into multiple file</a:t>
+            </a:r>
+          </a:p>
+          <a:p>
+            <a:pPr lvl="1"/>
+            <a:r>
+              <a:rPr lang="en-US" dirty="0" smtClean="0"/>
+              <a:t>1 class per file</a:t>
+            </a:r>
+          </a:p>
+          <a:p>
+            <a:pPr lvl="1"/>
+            <a:r>
+              <a:rPr lang="en-US" dirty="0" smtClean="0"/>
+              <a:t>Use logical folder structure</a:t>
+            </a:r>
+          </a:p>
+          <a:p>
+            <a:pPr lvl="1"/>
+            <a:endParaRPr lang="en-US" dirty="0"/>
+          </a:p>
+          <a:p>
+            <a:r>
+              <a:rPr lang="en-US" dirty="0" smtClean="0"/>
+              <a:t>Do: Include _</a:t>
+            </a:r>
+            <a:r>
+              <a:rPr lang="en-US" dirty="0" err="1" smtClean="0"/>
+              <a:t>references.ts</a:t>
+            </a:r>
+            <a:r>
+              <a:rPr lang="en-US" dirty="0" smtClean="0"/>
+              <a:t> file with references to all libraries</a:t>
+            </a:r>
+          </a:p>
+          <a:p>
+            <a:pPr lvl="1"/>
+            <a:r>
+              <a:rPr lang="en-US" dirty="0" smtClean="0"/>
+              <a:t>Don’t manually specify &lt;reference&gt; tags</a:t>
+            </a:r>
+            <a:endParaRPr lang="en-US" dirty="0"/>
+          </a:p>
+          <a:p>
+            <a:endParaRPr lang="en-US" dirty="0" smtClean="0"/>
+          </a:p>
+        </p:txBody>
+      </p:sp>
+    </p:spTree>
+    <p:extLst>
+      <p:ext uri="{BB962C8B-B14F-4D97-AF65-F5344CB8AC3E}">
+        <p14:creationId xmlns:p14="http://schemas.microsoft.com/office/powerpoint/2010/main" val="533197008"/>
+      </p:ext>
+    </p:extLst>
+  </p:cSld>
+  <p:clrMapOvr>
+    <a:masterClrMapping/>
+  </p:clrMapOvr>
+</p:sld>
+</file>
+
+<file path=ppt/slides/slide56.xml><?xml version="1.0" encoding="utf-8"?>
+<p:sld xmlns:a="http://schemas.openxmlformats.org/drawingml/2006/main" xmlns:r="http://schemas.openxmlformats.org/officeDocument/2006/relationships" xmlns:p="http://schemas.openxmlformats.org/presentationml/2006/main">
+  <p:cSld>
+    <p:spTree>
+      <p:nvGrpSpPr>
+        <p:cNvPr id="1" name=""/>
+        <p:cNvGrpSpPr/>
+        <p:nvPr/>
+      </p:nvGrpSpPr>
+      <p:grpSpPr>
+        <a:xfrm>
+          <a:off x="0" y="0"/>
+          <a:ext cx="0" cy="0"/>
+          <a:chOff x="0" y="0"/>
+          <a:chExt cx="0" cy="0"/>
+        </a:xfrm>
+      </p:grpSpPr>
+      <p:sp>
+        <p:nvSpPr>
+          <p:cNvPr id="2" name="Title 1"/>
+          <p:cNvSpPr>
+            <a:spLocks noGrp="1"/>
+          </p:cNvSpPr>
+          <p:nvPr>
+            <p:ph type="title"/>
+          </p:nvPr>
+        </p:nvSpPr>
+        <p:spPr/>
+        <p:txBody>
+          <a:bodyPr/>
+          <a:lstStyle/>
+          <a:p>
+            <a:r>
+              <a:rPr lang="en-US" dirty="0" smtClean="0"/>
+              <a:t>Best Practices</a:t>
+            </a:r>
+            <a:endParaRPr lang="en-US" dirty="0"/>
+          </a:p>
+        </p:txBody>
+      </p:sp>
+      <p:sp>
+        <p:nvSpPr>
+          <p:cNvPr id="3" name="Content Placeholder 2"/>
+          <p:cNvSpPr>
+            <a:spLocks noGrp="1"/>
+          </p:cNvSpPr>
+          <p:nvPr>
+            <p:ph idx="1"/>
+          </p:nvPr>
+        </p:nvSpPr>
+        <p:spPr/>
+        <p:txBody>
+          <a:bodyPr>
+            <a:normAutofit fontScale="92500" lnSpcReduction="10000"/>
+          </a:bodyPr>
+          <a:lstStyle/>
+          <a:p>
+            <a:pPr lvl="0"/>
+            <a:r>
+              <a:rPr lang="en-US" dirty="0" smtClean="0"/>
+              <a:t>Don’t: Use </a:t>
+            </a:r>
+            <a:r>
+              <a:rPr lang="en-US" altLang="en-US" dirty="0" smtClean="0">
+                <a:solidFill>
+                  <a:srgbClr val="0000FF"/>
+                </a:solidFill>
+                <a:latin typeface="Consolas" panose="020B0609020204030204" pitchFamily="49" charset="0"/>
+                <a:cs typeface="Consolas" panose="020B0609020204030204" pitchFamily="49" charset="0"/>
+              </a:rPr>
+              <a:t>any</a:t>
+            </a:r>
+            <a:r>
+              <a:rPr lang="en-US" dirty="0" smtClean="0"/>
+              <a:t> type too much</a:t>
+            </a:r>
+          </a:p>
+          <a:p>
+            <a:pPr lvl="0"/>
+            <a:endParaRPr lang="en-US" dirty="0"/>
+          </a:p>
+          <a:p>
+            <a:pPr lvl="0"/>
+            <a:r>
+              <a:rPr lang="en-US" dirty="0" smtClean="0"/>
+              <a:t>Do: Use modules for logical namespace groupings</a:t>
+            </a:r>
+          </a:p>
+          <a:p>
+            <a:pPr lvl="1"/>
+            <a:r>
+              <a:rPr lang="en-US" dirty="0" smtClean="0"/>
+              <a:t>Match folder structure</a:t>
+            </a:r>
+          </a:p>
+          <a:p>
+            <a:pPr lvl="1"/>
+            <a:endParaRPr lang="en-US" dirty="0"/>
+          </a:p>
+          <a:p>
+            <a:r>
+              <a:rPr lang="en-US" dirty="0" smtClean="0"/>
+              <a:t>Do: Follow JS style guidelines</a:t>
+            </a:r>
+          </a:p>
+          <a:p>
+            <a:pPr lvl="1"/>
+            <a:r>
+              <a:rPr lang="en-US" dirty="0">
+                <a:hlinkClick r:id="rId2"/>
+              </a:rPr>
+              <a:t>https://</a:t>
+            </a:r>
+            <a:r>
+              <a:rPr lang="en-US" dirty="0" smtClean="0">
+                <a:hlinkClick r:id="rId2"/>
+              </a:rPr>
+              <a:t>github.com/airbnb/javascript</a:t>
+            </a:r>
+            <a:endParaRPr lang="en-US" dirty="0" smtClean="0"/>
+          </a:p>
+          <a:p>
+            <a:pPr lvl="1"/>
+            <a:endParaRPr lang="en-US" dirty="0"/>
+          </a:p>
+          <a:p>
+            <a:r>
+              <a:rPr lang="en-US" dirty="0" smtClean="0"/>
+              <a:t>Do: Use </a:t>
+            </a:r>
+            <a:r>
+              <a:rPr lang="en-US" dirty="0" err="1" smtClean="0"/>
+              <a:t>TSLint</a:t>
+            </a:r>
+            <a:endParaRPr lang="en-US" dirty="0" smtClean="0"/>
+          </a:p>
+          <a:p>
+            <a:pPr lvl="1"/>
+            <a:r>
+              <a:rPr lang="en-US" dirty="0">
+                <a:hlinkClick r:id="rId3"/>
+              </a:rPr>
+              <a:t>http://</a:t>
+            </a:r>
+            <a:r>
+              <a:rPr lang="en-US" dirty="0" smtClean="0">
+                <a:hlinkClick r:id="rId3"/>
+              </a:rPr>
+              <a:t>vswebessentials.com/features/typescript</a:t>
+            </a:r>
+            <a:endParaRPr lang="en-US" dirty="0" smtClean="0"/>
+          </a:p>
+          <a:p>
+            <a:pPr lvl="1"/>
+            <a:r>
+              <a:rPr lang="en-US" dirty="0" smtClean="0"/>
+              <a:t>Note: Do not lint </a:t>
+            </a:r>
+            <a:r>
+              <a:rPr lang="en-US" dirty="0" err="1" smtClean="0"/>
+              <a:t>typings</a:t>
+            </a:r>
+            <a:endParaRPr lang="en-US" dirty="0"/>
+          </a:p>
+        </p:txBody>
+      </p:sp>
+    </p:spTree>
+    <p:extLst>
+      <p:ext uri="{BB962C8B-B14F-4D97-AF65-F5344CB8AC3E}">
+        <p14:creationId xmlns:p14="http://schemas.microsoft.com/office/powerpoint/2010/main" val="439267084"/>
+      </p:ext>
+    </p:extLst>
+  </p:cSld>
+  <p:clrMapOvr>
+    <a:masterClrMapping/>
+  </p:clrMapOvr>
+</p:sld>
+</file>
+
+<file path=ppt/slides/slide57.xml><?xml version="1.0" encoding="utf-8"?>
+<p:sld xmlns:a="http://schemas.openxmlformats.org/drawingml/2006/main" xmlns:r="http://schemas.openxmlformats.org/officeDocument/2006/relationships" xmlns:p="http://schemas.openxmlformats.org/presentationml/2006/main">
+  <p:cSld>
+    <p:spTree>
+      <p:nvGrpSpPr>
+        <p:cNvPr id="1" name=""/>
+        <p:cNvGrpSpPr/>
+        <p:nvPr/>
+      </p:nvGrpSpPr>
+      <p:grpSpPr>
+        <a:xfrm>
+          <a:off x="0" y="0"/>
+          <a:ext cx="0" cy="0"/>
+          <a:chOff x="0" y="0"/>
+          <a:chExt cx="0" cy="0"/>
+        </a:xfrm>
+      </p:grpSpPr>
+      <p:sp>
+        <p:nvSpPr>
+          <p:cNvPr id="2" name="Title 1"/>
+          <p:cNvSpPr>
+            <a:spLocks noGrp="1"/>
+          </p:cNvSpPr>
+          <p:nvPr>
+            <p:ph type="title"/>
+          </p:nvPr>
+        </p:nvSpPr>
+        <p:spPr/>
+        <p:txBody>
+          <a:bodyPr/>
+          <a:lstStyle/>
+          <a:p>
+            <a:r>
+              <a:rPr lang="en-US" dirty="0" smtClean="0"/>
+              <a:t>Best Practices</a:t>
+            </a:r>
+            <a:endParaRPr lang="en-US" dirty="0"/>
+          </a:p>
+        </p:txBody>
+      </p:sp>
+      <p:sp>
+        <p:nvSpPr>
+          <p:cNvPr id="3" name="Content Placeholder 2"/>
+          <p:cNvSpPr>
+            <a:spLocks noGrp="1"/>
+          </p:cNvSpPr>
+          <p:nvPr>
+            <p:ph idx="1"/>
+          </p:nvPr>
+        </p:nvSpPr>
+        <p:spPr/>
+        <p:txBody>
+          <a:bodyPr/>
+          <a:lstStyle/>
+          <a:p>
+            <a:r>
+              <a:rPr lang="en-US" dirty="0" smtClean="0"/>
+              <a:t>Do: Check in typing files into source control</a:t>
+            </a:r>
+          </a:p>
+          <a:p>
+            <a:pPr lvl="1"/>
+            <a:r>
+              <a:rPr lang="en-US" dirty="0" smtClean="0"/>
+              <a:t>Not restored on </a:t>
+            </a:r>
+            <a:r>
+              <a:rPr lang="en-US" dirty="0" err="1" smtClean="0"/>
+              <a:t>Nuget</a:t>
+            </a:r>
+            <a:r>
+              <a:rPr lang="en-US" dirty="0" smtClean="0"/>
+              <a:t> package restore</a:t>
+            </a:r>
+          </a:p>
+          <a:p>
+            <a:pPr lvl="1"/>
+            <a:endParaRPr lang="en-US" dirty="0"/>
+          </a:p>
+          <a:p>
+            <a:r>
+              <a:rPr lang="en-US" dirty="0" smtClean="0"/>
+              <a:t>Do: Submit pull requests for new/fixed </a:t>
+            </a:r>
+            <a:r>
+              <a:rPr lang="en-US" dirty="0" err="1" smtClean="0"/>
+              <a:t>typings</a:t>
+            </a:r>
+            <a:r>
+              <a:rPr lang="en-US" dirty="0" smtClean="0"/>
+              <a:t> to </a:t>
+            </a:r>
+            <a:r>
+              <a:rPr lang="en-US" dirty="0" err="1" smtClean="0"/>
+              <a:t>DefinitelyTyped</a:t>
+            </a:r>
+            <a:endParaRPr lang="en-US" dirty="0" smtClean="0"/>
+          </a:p>
+          <a:p>
+            <a:endParaRPr lang="en-US" dirty="0"/>
+          </a:p>
+          <a:p>
+            <a:r>
+              <a:rPr lang="en-US" dirty="0" smtClean="0"/>
+              <a:t>Don’t: Check in files that </a:t>
+            </a:r>
+            <a:r>
+              <a:rPr lang="en-US" smtClean="0"/>
+              <a:t>don’t compile</a:t>
+            </a:r>
+            <a:endParaRPr lang="en-US" dirty="0" smtClean="0"/>
+          </a:p>
+          <a:p>
+            <a:endParaRPr lang="en-US" dirty="0"/>
+          </a:p>
+          <a:p>
+            <a:endParaRPr lang="en-US" dirty="0"/>
+          </a:p>
+        </p:txBody>
+      </p:sp>
+    </p:spTree>
+    <p:extLst>
+      <p:ext uri="{BB962C8B-B14F-4D97-AF65-F5344CB8AC3E}">
+        <p14:creationId xmlns:p14="http://schemas.microsoft.com/office/powerpoint/2010/main" val="2375747027"/>
+      </p:ext>
+    </p:extLst>
+  </p:cSld>
+  <p:clrMapOvr>
+    <a:masterClrMapping/>
+  </p:clrMapOvr>
+</p:sld>
+</file>
+
+<file path=ppt/slides/slide58.xml><?xml version="1.0" encoding="utf-8"?>
+<p:sld xmlns:a="http://schemas.openxmlformats.org/drawingml/2006/main" xmlns:r="http://schemas.openxmlformats.org/officeDocument/2006/relationships" xmlns:p="http://schemas.openxmlformats.org/presentationml/2006/main">
+  <p:cSld>
+    <p:spTree>
+      <p:nvGrpSpPr>
+        <p:cNvPr id="1" name=""/>
+        <p:cNvGrpSpPr/>
+        <p:nvPr/>
+      </p:nvGrpSpPr>
+      <p:grpSpPr>
+        <a:xfrm>
+          <a:off x="0" y="0"/>
+          <a:ext cx="0" cy="0"/>
+          <a:chOff x="0" y="0"/>
+          <a:chExt cx="0" cy="0"/>
+        </a:xfrm>
+      </p:grpSpPr>
+      <p:sp>
+        <p:nvSpPr>
+          <p:cNvPr id="2" name="Title 1"/>
+          <p:cNvSpPr>
+            <a:spLocks noGrp="1"/>
+          </p:cNvSpPr>
+          <p:nvPr>
+            <p:ph type="title"/>
+          </p:nvPr>
+        </p:nvSpPr>
+        <p:spPr/>
+        <p:txBody>
+          <a:bodyPr/>
+          <a:lstStyle/>
+          <a:p>
+            <a:r>
+              <a:rPr lang="en-US" dirty="0" smtClean="0"/>
+              <a:t>Questions</a:t>
+            </a:r>
+            <a:endParaRPr lang="en-US" dirty="0"/>
+          </a:p>
+        </p:txBody>
+      </p:sp>
+      <p:pic>
+        <p:nvPicPr>
+          <p:cNvPr id="2050" name="Picture 2" descr="http://alangregerman.typepad.com/.a/6a00d83516c0ad53ef017c3329aba8970b-800wi"/>
+          <p:cNvPicPr>
+            <a:picLocks noGrp="1" noChangeAspect="1" noChangeArrowheads="1"/>
+          </p:cNvPicPr>
+          <p:nvPr>
+            <p:ph idx="1"/>
+          </p:nvPr>
+        </p:nvPicPr>
+        <p:blipFill>
+          <a:blip r:embed="rId2">
+            <a:extLst>
+              <a:ext uri="{28A0092B-C50C-407E-A947-70E740481C1C}">
+                <a14:useLocalDpi xmlns:a14="http://schemas.microsoft.com/office/drawing/2010/main" val="0"/>
+              </a:ext>
+            </a:extLst>
+          </a:blip>
+          <a:srcRect/>
+          <a:stretch>
+            <a:fillRect/>
+          </a:stretch>
+        </p:blipFill>
+        <p:spPr bwMode="auto">
+          <a:xfrm>
+            <a:off x="3423444" y="2160588"/>
+            <a:ext cx="3105149" cy="3881437"/>
+          </a:xfrm>
+          <a:prstGeom prst="rect">
+            <a:avLst/>
+          </a:prstGeom>
+          <a:noFill/>
+          <a:extLst>
+            <a:ext uri="{909E8E84-426E-40DD-AFC4-6F175D3DCCD1}">
+              <a14:hiddenFill xmlns:a14="http://schemas.microsoft.com/office/drawing/2010/main">
+                <a:solidFill>
+                  <a:srgbClr val="FFFFFF"/>
+                </a:solidFill>
+              </a14:hiddenFill>
+            </a:ext>
+          </a:extLst>
+        </p:spPr>
+      </p:pic>
+    </p:spTree>
+    <p:extLst>
+      <p:ext uri="{BB962C8B-B14F-4D97-AF65-F5344CB8AC3E}">
+        <p14:creationId xmlns:p14="http://schemas.microsoft.com/office/powerpoint/2010/main" val="4174572319"/>
       </p:ext>
     </p:extLst>
   </p:cSld>

</xml_diff>

<commit_message>
DanilF: Added conclusion slide.
</commit_message>
<xml_diff>
--- a/Presentation/TypeScriptFundamentals.pptx
+++ b/Presentation/TypeScriptFundamentals.pptx
@@ -62,7 +62,8 @@
     <p:sldId id="303" r:id="rId56"/>
     <p:sldId id="304" r:id="rId57"/>
     <p:sldId id="305" r:id="rId58"/>
-    <p:sldId id="314" r:id="rId59"/>
+    <p:sldId id="315" r:id="rId59"/>
+    <p:sldId id="314" r:id="rId60"/>
   </p:sldIdLst>
   <p:sldSz cx="12192000" cy="6858000"/>
   <p:notesSz cx="6858000" cy="9144000"/>
@@ -251,6 +252,7 @@
         </p14:section>
         <p14:section name="Conclusion" id="{E240FE6F-BAA6-4501-BD73-66D409C9AB59}">
           <p14:sldIdLst>
+            <p14:sldId id="315"/>
             <p14:sldId id="314"/>
           </p14:sldIdLst>
         </p14:section>
@@ -23544,6 +23546,195 @@
           <a:p>
             <a:r>
               <a:rPr lang="en-US" dirty="0" smtClean="0"/>
+              <a:t>That’s it!</a:t>
+            </a:r>
+            <a:endParaRPr lang="en-US" dirty="0"/>
+          </a:p>
+        </p:txBody>
+      </p:sp>
+      <p:sp>
+        <p:nvSpPr>
+          <p:cNvPr id="3" name="Content Placeholder 2"/>
+          <p:cNvSpPr>
+            <a:spLocks noGrp="1"/>
+          </p:cNvSpPr>
+          <p:nvPr>
+            <p:ph idx="1"/>
+          </p:nvPr>
+        </p:nvSpPr>
+        <p:spPr/>
+        <p:txBody>
+          <a:bodyPr/>
+          <a:lstStyle/>
+          <a:p>
+            <a:r>
+              <a:rPr lang="en-US" dirty="0" smtClean="0"/>
+              <a:t>Presentation slides and code available on </a:t>
+            </a:r>
+            <a:r>
+              <a:rPr lang="en-US" dirty="0" err="1" smtClean="0"/>
+              <a:t>github</a:t>
+            </a:r>
+            <a:r>
+              <a:rPr lang="en-US" dirty="0" smtClean="0"/>
+              <a:t>:</a:t>
+            </a:r>
+          </a:p>
+          <a:p>
+            <a:pPr lvl="1"/>
+            <a:r>
+              <a:rPr lang="en-US" dirty="0">
+                <a:hlinkClick r:id="rId2"/>
+              </a:rPr>
+              <a:t>https://</a:t>
+            </a:r>
+            <a:r>
+              <a:rPr lang="en-US" dirty="0" smtClean="0">
+                <a:hlinkClick r:id="rId2"/>
+              </a:rPr>
+              <a:t>github.com/dflor003/typescript-fundamentals</a:t>
+            </a:r>
+            <a:endParaRPr lang="en-US" dirty="0" smtClean="0"/>
+          </a:p>
+          <a:p>
+            <a:pPr lvl="1"/>
+            <a:endParaRPr lang="en-US" dirty="0"/>
+          </a:p>
+          <a:p>
+            <a:r>
+              <a:rPr lang="en-US" dirty="0" smtClean="0"/>
+              <a:t>Resources:</a:t>
+            </a:r>
+          </a:p>
+          <a:p>
+            <a:pPr lvl="1"/>
+            <a:r>
+              <a:rPr lang="en-US" dirty="0" err="1" smtClean="0"/>
+              <a:t>TypeScript</a:t>
+            </a:r>
+            <a:r>
+              <a:rPr lang="en-US" dirty="0"/>
+              <a:t> tutorial: </a:t>
+            </a:r>
+            <a:r>
+              <a:rPr lang="en-US" dirty="0">
+                <a:hlinkClick r:id="rId3"/>
+              </a:rPr>
+              <a:t>http://</a:t>
+            </a:r>
+            <a:r>
+              <a:rPr lang="en-US" dirty="0" smtClean="0">
+                <a:hlinkClick r:id="rId3"/>
+              </a:rPr>
+              <a:t>www.typescriptlang.org/Tutorial</a:t>
+            </a:r>
+            <a:endParaRPr lang="en-US" dirty="0"/>
+          </a:p>
+          <a:p>
+            <a:pPr lvl="1"/>
+            <a:r>
+              <a:rPr lang="en-US" dirty="0" err="1" smtClean="0"/>
+              <a:t>TypeScript</a:t>
+            </a:r>
+            <a:r>
+              <a:rPr lang="en-US" dirty="0" smtClean="0"/>
+              <a:t> </a:t>
+            </a:r>
+            <a:r>
+              <a:rPr lang="en-US" dirty="0"/>
+              <a:t>playground: </a:t>
+            </a:r>
+            <a:r>
+              <a:rPr lang="en-US" dirty="0">
+                <a:hlinkClick r:id="rId4"/>
+              </a:rPr>
+              <a:t>http://</a:t>
+            </a:r>
+            <a:r>
+              <a:rPr lang="en-US" dirty="0" smtClean="0">
+                <a:hlinkClick r:id="rId4"/>
+              </a:rPr>
+              <a:t>www.typescriptlang.org/Playground</a:t>
+            </a:r>
+            <a:endParaRPr lang="en-US" dirty="0" smtClean="0"/>
+          </a:p>
+          <a:p>
+            <a:pPr lvl="1"/>
+            <a:r>
+              <a:rPr lang="en-US" dirty="0" err="1" smtClean="0"/>
+              <a:t>PluralSight</a:t>
+            </a:r>
+            <a:r>
+              <a:rPr lang="en-US" dirty="0"/>
+              <a:t>: </a:t>
+            </a:r>
+            <a:r>
+              <a:rPr lang="en-US" dirty="0">
+                <a:hlinkClick r:id="rId5"/>
+              </a:rPr>
+              <a:t>http://</a:t>
+            </a:r>
+            <a:r>
+              <a:rPr lang="en-US" dirty="0" smtClean="0">
+                <a:hlinkClick r:id="rId5"/>
+              </a:rPr>
+              <a:t>pluralsight.com/courses/typescript</a:t>
+            </a:r>
+            <a:endParaRPr lang="en-US" dirty="0" smtClean="0"/>
+          </a:p>
+          <a:p>
+            <a:pPr lvl="1"/>
+            <a:endParaRPr lang="en-US" dirty="0"/>
+          </a:p>
+        </p:txBody>
+      </p:sp>
+    </p:spTree>
+    <p:extLst>
+      <p:ext uri="{BB962C8B-B14F-4D97-AF65-F5344CB8AC3E}">
+        <p14:creationId xmlns:p14="http://schemas.microsoft.com/office/powerpoint/2010/main" val="2502509381"/>
+      </p:ext>
+    </p:extLst>
+  </p:cSld>
+  <p:clrMapOvr>
+    <a:masterClrMapping/>
+  </p:clrMapOvr>
+</p:sld>
+</file>
+
+<file path=ppt/slides/slide59.xml><?xml version="1.0" encoding="utf-8"?>
+<p:sld xmlns:a="http://schemas.openxmlformats.org/drawingml/2006/main" xmlns:r="http://schemas.openxmlformats.org/officeDocument/2006/relationships" xmlns:p="http://schemas.openxmlformats.org/presentationml/2006/main">
+  <p:cSld>
+    <p:spTree>
+      <p:nvGrpSpPr>
+        <p:cNvPr id="1" name=""/>
+        <p:cNvGrpSpPr/>
+        <p:nvPr/>
+      </p:nvGrpSpPr>
+      <p:grpSpPr>
+        <a:xfrm>
+          <a:off x="0" y="0"/>
+          <a:ext cx="0" cy="0"/>
+          <a:chOff x="0" y="0"/>
+          <a:chExt cx="0" cy="0"/>
+        </a:xfrm>
+      </p:grpSpPr>
+      <p:sp>
+        <p:nvSpPr>
+          <p:cNvPr id="2" name="Title 1"/>
+          <p:cNvSpPr>
+            <a:spLocks noGrp="1"/>
+          </p:cNvSpPr>
+          <p:nvPr>
+            <p:ph type="title"/>
+          </p:nvPr>
+        </p:nvSpPr>
+        <p:spPr/>
+        <p:txBody>
+          <a:bodyPr/>
+          <a:lstStyle/>
+          <a:p>
+            <a:r>
+              <a:rPr lang="en-US" dirty="0" smtClean="0"/>
               <a:t>Questions</a:t>
             </a:r>
             <a:endParaRPr lang="en-US" dirty="0"/>

</xml_diff>